<commit_message>
Add steps to template creation slide
</commit_message>
<xml_diff>
--- a/Tour de .NET Core CLI.pptx
+++ b/Tour de .NET Core CLI.pptx
@@ -3145,7 +3145,7 @@
           <a:bodyPr/>
           <a:lstStyle/>
           <a:p>
-            <a:endParaRPr lang="en-US"/>
+            <a:endParaRPr lang="en-US" dirty="0"/>
           </a:p>
         </p:txBody>
       </p:sp>
@@ -13272,7 +13272,111 @@
           </a:bodyPr>
           <a:lstStyle/>
           <a:p>
-            <a:endParaRPr lang="en-US" sz="2400"/>
+            <a:pPr marL="457200" indent="-457200">
+              <a:buFont typeface="+mj-lt"/>
+              <a:buAutoNum type="arabicPeriod"/>
+            </a:pPr>
+            <a:r>
+              <a:rPr lang="en-US" sz="2400" dirty="0"/>
+              <a:t>Create </a:t>
+            </a:r>
+            <a:r>
+              <a:rPr lang="en-US" sz="2400" i="1" dirty="0"/>
+              <a:t>.</a:t>
+            </a:r>
+            <a:r>
+              <a:rPr lang="en-US" sz="2400" i="1" dirty="0" err="1"/>
+              <a:t>template.config</a:t>
+            </a:r>
+            <a:r>
+              <a:rPr lang="en-US" sz="2400" i="1" dirty="0"/>
+              <a:t> </a:t>
+            </a:r>
+            <a:r>
+              <a:rPr lang="en-US" sz="2400" dirty="0"/>
+              <a:t>folder</a:t>
+            </a:r>
+          </a:p>
+          <a:p>
+            <a:pPr marL="457200" indent="-457200">
+              <a:buFont typeface="+mj-lt"/>
+              <a:buAutoNum type="arabicPeriod"/>
+            </a:pPr>
+            <a:r>
+              <a:rPr lang="en-US" sz="2400" dirty="0"/>
+              <a:t>Define metadata in </a:t>
+            </a:r>
+            <a:r>
+              <a:rPr lang="en-US" sz="2400" i="1" dirty="0" err="1"/>
+              <a:t>template.json</a:t>
+            </a:r>
+            <a:endParaRPr lang="en-US" sz="2400" i="1" dirty="0"/>
+          </a:p>
+          <a:p>
+            <a:pPr marL="457200" indent="-457200">
+              <a:buFont typeface="+mj-lt"/>
+              <a:buAutoNum type="arabicPeriod"/>
+            </a:pPr>
+            <a:r>
+              <a:rPr lang="en-US" sz="2400" dirty="0"/>
+              <a:t>Create .</a:t>
+            </a:r>
+            <a:r>
+              <a:rPr lang="en-US" sz="2400" dirty="0" err="1"/>
+              <a:t>nuspec</a:t>
+            </a:r>
+            <a:r>
+              <a:rPr lang="en-US" sz="2400" dirty="0"/>
+              <a:t> file</a:t>
+            </a:r>
+          </a:p>
+          <a:p>
+            <a:pPr marL="457200" indent="-457200">
+              <a:buFont typeface="+mj-lt"/>
+              <a:buAutoNum type="arabicPeriod"/>
+            </a:pPr>
+            <a:r>
+              <a:rPr lang="en-US" sz="2400" dirty="0" err="1"/>
+              <a:t>nuget</a:t>
+            </a:r>
+            <a:r>
+              <a:rPr lang="en-US" sz="2400" dirty="0"/>
+              <a:t> pack &lt;</a:t>
+            </a:r>
+            <a:r>
+              <a:rPr lang="en-US" sz="2400" dirty="0" err="1"/>
+              <a:t>path_to_nuspec</a:t>
+            </a:r>
+            <a:r>
+              <a:rPr lang="en-US" sz="2400" dirty="0"/>
+              <a:t>&gt;</a:t>
+            </a:r>
+          </a:p>
+          <a:p>
+            <a:pPr marL="457200" indent="-457200">
+              <a:buFont typeface="+mj-lt"/>
+              <a:buAutoNum type="arabicPeriod"/>
+            </a:pPr>
+            <a:r>
+              <a:rPr lang="en-US" sz="2400" dirty="0"/>
+              <a:t>dotnet new -</a:t>
+            </a:r>
+            <a:r>
+              <a:rPr lang="en-US" sz="2400" dirty="0" err="1"/>
+              <a:t>i</a:t>
+            </a:r>
+            <a:r>
+              <a:rPr lang="en-US" sz="2400" dirty="0"/>
+              <a:t> &lt;</a:t>
+            </a:r>
+            <a:r>
+              <a:rPr lang="en-US" sz="2400" dirty="0" err="1"/>
+              <a:t>path_to_nupkg</a:t>
+            </a:r>
+            <a:r>
+              <a:rPr lang="en-US" sz="2400" dirty="0"/>
+              <a:t>&gt;</a:t>
+            </a:r>
           </a:p>
         </p:txBody>
       </p:sp>
@@ -13307,15 +13411,10 @@
                             </p:stCondLst>
                             <p:childTnLst>
                               <p:par>
-                                <p:cTn id="5" presetID="10" presetClass="entr" presetSubtype="0" fill="hold" nodeType="clickEffect" nodePh="1">
+                                <p:cTn id="5" presetID="10" presetClass="entr" presetSubtype="0" fill="hold" nodeType="clickEffect">
                                   <p:stCondLst>
                                     <p:cond delay="0"/>
                                   </p:stCondLst>
-                                  <p:endCondLst>
-                                    <p:cond evt="begin" delay="0">
-                                      <p:tn val="5"/>
-                                    </p:cond>
-                                  </p:endCondLst>
                                   <p:childTnLst>
                                     <p:set>
                                       <p:cBhvr>
@@ -13346,6 +13445,250 @@
                                           <p:spTgt spid="3">
                                             <p:txEl>
                                               <p:pRg st="0" end="0"/>
+                                            </p:txEl>
+                                          </p:spTgt>
+                                        </p:tgtEl>
+                                      </p:cBhvr>
+                                    </p:animEffect>
+                                  </p:childTnLst>
+                                </p:cTn>
+                              </p:par>
+                            </p:childTnLst>
+                          </p:cTn>
+                        </p:par>
+                      </p:childTnLst>
+                    </p:cTn>
+                  </p:par>
+                  <p:par>
+                    <p:cTn id="8" fill="hold">
+                      <p:stCondLst>
+                        <p:cond delay="indefinite"/>
+                      </p:stCondLst>
+                      <p:childTnLst>
+                        <p:par>
+                          <p:cTn id="9" fill="hold">
+                            <p:stCondLst>
+                              <p:cond delay="0"/>
+                            </p:stCondLst>
+                            <p:childTnLst>
+                              <p:par>
+                                <p:cTn id="10" presetID="10" presetClass="entr" presetSubtype="0" fill="hold" nodeType="clickEffect">
+                                  <p:stCondLst>
+                                    <p:cond delay="0"/>
+                                  </p:stCondLst>
+                                  <p:childTnLst>
+                                    <p:set>
+                                      <p:cBhvr>
+                                        <p:cTn id="11" dur="1" fill="hold">
+                                          <p:stCondLst>
+                                            <p:cond delay="0"/>
+                                          </p:stCondLst>
+                                        </p:cTn>
+                                        <p:tgtEl>
+                                          <p:spTgt spid="3">
+                                            <p:txEl>
+                                              <p:pRg st="1" end="1"/>
+                                            </p:txEl>
+                                          </p:spTgt>
+                                        </p:tgtEl>
+                                        <p:attrNameLst>
+                                          <p:attrName>style.visibility</p:attrName>
+                                        </p:attrNameLst>
+                                      </p:cBhvr>
+                                      <p:to>
+                                        <p:strVal val="visible"/>
+                                      </p:to>
+                                    </p:set>
+                                    <p:animEffect transition="in" filter="fade">
+                                      <p:cBhvr>
+                                        <p:cTn id="12" dur="500"/>
+                                        <p:tgtEl>
+                                          <p:spTgt spid="3">
+                                            <p:txEl>
+                                              <p:pRg st="1" end="1"/>
+                                            </p:txEl>
+                                          </p:spTgt>
+                                        </p:tgtEl>
+                                      </p:cBhvr>
+                                    </p:animEffect>
+                                  </p:childTnLst>
+                                </p:cTn>
+                              </p:par>
+                            </p:childTnLst>
+                          </p:cTn>
+                        </p:par>
+                      </p:childTnLst>
+                    </p:cTn>
+                  </p:par>
+                  <p:par>
+                    <p:cTn id="13" fill="hold">
+                      <p:stCondLst>
+                        <p:cond delay="indefinite"/>
+                      </p:stCondLst>
+                      <p:childTnLst>
+                        <p:par>
+                          <p:cTn id="14" fill="hold">
+                            <p:stCondLst>
+                              <p:cond delay="0"/>
+                            </p:stCondLst>
+                            <p:childTnLst>
+                              <p:par>
+                                <p:cTn id="15" presetID="10" presetClass="entr" presetSubtype="0" fill="hold" nodeType="clickEffect">
+                                  <p:stCondLst>
+                                    <p:cond delay="0"/>
+                                  </p:stCondLst>
+                                  <p:childTnLst>
+                                    <p:set>
+                                      <p:cBhvr>
+                                        <p:cTn id="16" dur="1" fill="hold">
+                                          <p:stCondLst>
+                                            <p:cond delay="0"/>
+                                          </p:stCondLst>
+                                        </p:cTn>
+                                        <p:tgtEl>
+                                          <p:spTgt spid="3">
+                                            <p:txEl>
+                                              <p:pRg st="2" end="2"/>
+                                            </p:txEl>
+                                          </p:spTgt>
+                                        </p:tgtEl>
+                                        <p:attrNameLst>
+                                          <p:attrName>style.visibility</p:attrName>
+                                        </p:attrNameLst>
+                                      </p:cBhvr>
+                                      <p:to>
+                                        <p:strVal val="visible"/>
+                                      </p:to>
+                                    </p:set>
+                                    <p:animEffect transition="in" filter="fade">
+                                      <p:cBhvr>
+                                        <p:cTn id="17" dur="500"/>
+                                        <p:tgtEl>
+                                          <p:spTgt spid="3">
+                                            <p:txEl>
+                                              <p:pRg st="2" end="2"/>
+                                            </p:txEl>
+                                          </p:spTgt>
+                                        </p:tgtEl>
+                                      </p:cBhvr>
+                                    </p:animEffect>
+                                  </p:childTnLst>
+                                </p:cTn>
+                              </p:par>
+                            </p:childTnLst>
+                          </p:cTn>
+                        </p:par>
+                      </p:childTnLst>
+                    </p:cTn>
+                  </p:par>
+                  <p:par>
+                    <p:cTn id="18" fill="hold">
+                      <p:stCondLst>
+                        <p:cond delay="indefinite"/>
+                      </p:stCondLst>
+                      <p:childTnLst>
+                        <p:par>
+                          <p:cTn id="19" fill="hold">
+                            <p:stCondLst>
+                              <p:cond delay="0"/>
+                            </p:stCondLst>
+                            <p:childTnLst>
+                              <p:par>
+                                <p:cTn id="20" presetID="10" presetClass="entr" presetSubtype="0" fill="hold" nodeType="clickEffect">
+                                  <p:stCondLst>
+                                    <p:cond delay="0"/>
+                                  </p:stCondLst>
+                                  <p:childTnLst>
+                                    <p:set>
+                                      <p:cBhvr>
+                                        <p:cTn id="21" dur="1" fill="hold">
+                                          <p:stCondLst>
+                                            <p:cond delay="0"/>
+                                          </p:stCondLst>
+                                        </p:cTn>
+                                        <p:tgtEl>
+                                          <p:spTgt spid="3">
+                                            <p:txEl>
+                                              <p:pRg st="3" end="3"/>
+                                            </p:txEl>
+                                          </p:spTgt>
+                                        </p:tgtEl>
+                                        <p:attrNameLst>
+                                          <p:attrName>style.visibility</p:attrName>
+                                        </p:attrNameLst>
+                                      </p:cBhvr>
+                                      <p:to>
+                                        <p:strVal val="visible"/>
+                                      </p:to>
+                                    </p:set>
+                                    <p:animEffect transition="in" filter="fade">
+                                      <p:cBhvr>
+                                        <p:cTn id="22" dur="500"/>
+                                        <p:tgtEl>
+                                          <p:spTgt spid="3">
+                                            <p:txEl>
+                                              <p:pRg st="3" end="3"/>
+                                            </p:txEl>
+                                          </p:spTgt>
+                                        </p:tgtEl>
+                                      </p:cBhvr>
+                                    </p:animEffect>
+                                  </p:childTnLst>
+                                </p:cTn>
+                              </p:par>
+                            </p:childTnLst>
+                          </p:cTn>
+                        </p:par>
+                      </p:childTnLst>
+                    </p:cTn>
+                  </p:par>
+                  <p:par>
+                    <p:cTn id="23" fill="hold">
+                      <p:stCondLst>
+                        <p:cond delay="indefinite"/>
+                      </p:stCondLst>
+                      <p:childTnLst>
+                        <p:par>
+                          <p:cTn id="24" fill="hold">
+                            <p:stCondLst>
+                              <p:cond delay="0"/>
+                            </p:stCondLst>
+                            <p:childTnLst>
+                              <p:par>
+                                <p:cTn id="25" presetID="10" presetClass="entr" presetSubtype="0" fill="hold" nodeType="clickEffect">
+                                  <p:stCondLst>
+                                    <p:cond delay="0"/>
+                                  </p:stCondLst>
+                                  <p:childTnLst>
+                                    <p:set>
+                                      <p:cBhvr>
+                                        <p:cTn id="26" dur="1" fill="hold">
+                                          <p:stCondLst>
+                                            <p:cond delay="0"/>
+                                          </p:stCondLst>
+                                        </p:cTn>
+                                        <p:tgtEl>
+                                          <p:spTgt spid="3">
+                                            <p:txEl>
+                                              <p:pRg st="4" end="4"/>
+                                            </p:txEl>
+                                          </p:spTgt>
+                                        </p:tgtEl>
+                                        <p:attrNameLst>
+                                          <p:attrName>style.visibility</p:attrName>
+                                        </p:attrNameLst>
+                                      </p:cBhvr>
+                                      <p:to>
+                                        <p:strVal val="visible"/>
+                                      </p:to>
+                                    </p:set>
+                                    <p:animEffect transition="in" filter="fade">
+                                      <p:cBhvr>
+                                        <p:cTn id="27" dur="500"/>
+                                        <p:tgtEl>
+                                          <p:spTgt spid="3">
+                                            <p:txEl>
+                                              <p:pRg st="4" end="4"/>
                                             </p:txEl>
                                           </p:spTgt>
                                         </p:tgtEl>

</xml_diff>

<commit_message>
Add abstraction level slide
</commit_message>
<xml_diff>
--- a/Tour de .NET Core CLI.pptx
+++ b/Tour de .NET Core CLI.pptx
@@ -6,22 +6,23 @@
     <p:sldMasterId id="2147483847" r:id="rId2"/>
   </p:sldMasterIdLst>
   <p:notesMasterIdLst>
-    <p:notesMasterId r:id="rId16"/>
+    <p:notesMasterId r:id="rId17"/>
   </p:notesMasterIdLst>
   <p:sldIdLst>
     <p:sldId id="342" r:id="rId3"/>
     <p:sldId id="322" r:id="rId4"/>
     <p:sldId id="353" r:id="rId5"/>
-    <p:sldId id="352" r:id="rId6"/>
-    <p:sldId id="348" r:id="rId7"/>
-    <p:sldId id="349" r:id="rId8"/>
-    <p:sldId id="354" r:id="rId9"/>
-    <p:sldId id="350" r:id="rId10"/>
-    <p:sldId id="355" r:id="rId11"/>
-    <p:sldId id="351" r:id="rId12"/>
-    <p:sldId id="358" r:id="rId13"/>
-    <p:sldId id="346" r:id="rId14"/>
-    <p:sldId id="356" r:id="rId15"/>
+    <p:sldId id="359" r:id="rId6"/>
+    <p:sldId id="352" r:id="rId7"/>
+    <p:sldId id="348" r:id="rId8"/>
+    <p:sldId id="349" r:id="rId9"/>
+    <p:sldId id="354" r:id="rId10"/>
+    <p:sldId id="350" r:id="rId11"/>
+    <p:sldId id="355" r:id="rId12"/>
+    <p:sldId id="351" r:id="rId13"/>
+    <p:sldId id="358" r:id="rId14"/>
+    <p:sldId id="346" r:id="rId15"/>
+    <p:sldId id="356" r:id="rId16"/>
   </p:sldIdLst>
   <p:sldSz cx="12192000" cy="6858000"/>
   <p:notesSz cx="6858000" cy="9144000"/>
@@ -30,7 +31,7 @@
       <p:sldLst>
         <p:sld r:id="rId3"/>
         <p:sld r:id="rId4"/>
-        <p:sld r:id="rId14"/>
+        <p:sld r:id="rId15"/>
       </p:sldLst>
     </p:custShow>
   </p:custShowLst>
@@ -137,6 +138,7 @@
             <p14:sldId id="342"/>
             <p14:sldId id="322"/>
             <p14:sldId id="353"/>
+            <p14:sldId id="359"/>
             <p14:sldId id="352"/>
             <p14:sldId id="348"/>
             <p14:sldId id="349"/>
@@ -162,6 +164,753 @@
 </file>
 
 <file path=ppt/diagrams/colors1.xml><?xml version="1.0" encoding="utf-8"?>
+<dgm:colorsDef xmlns:dgm="http://schemas.openxmlformats.org/drawingml/2006/diagram" xmlns:a="http://schemas.openxmlformats.org/drawingml/2006/main" uniqueId="urn:microsoft.com/office/officeart/2005/8/colors/accent1_2">
+  <dgm:title val=""/>
+  <dgm:desc val=""/>
+  <dgm:catLst>
+    <dgm:cat type="accent1" pri="11200"/>
+  </dgm:catLst>
+  <dgm:styleLbl name="node0">
+    <dgm:fillClrLst meth="repeat">
+      <a:schemeClr val="accent1"/>
+    </dgm:fillClrLst>
+    <dgm:linClrLst meth="repeat">
+      <a:schemeClr val="lt1"/>
+    </dgm:linClrLst>
+    <dgm:effectClrLst/>
+    <dgm:txLinClrLst/>
+    <dgm:txFillClrLst/>
+    <dgm:txEffectClrLst/>
+  </dgm:styleLbl>
+  <dgm:styleLbl name="alignNode1">
+    <dgm:fillClrLst meth="repeat">
+      <a:schemeClr val="accent1"/>
+    </dgm:fillClrLst>
+    <dgm:linClrLst meth="repeat">
+      <a:schemeClr val="accent1"/>
+    </dgm:linClrLst>
+    <dgm:effectClrLst/>
+    <dgm:txLinClrLst/>
+    <dgm:txFillClrLst/>
+    <dgm:txEffectClrLst/>
+  </dgm:styleLbl>
+  <dgm:styleLbl name="node1">
+    <dgm:fillClrLst meth="repeat">
+      <a:schemeClr val="accent1"/>
+    </dgm:fillClrLst>
+    <dgm:linClrLst meth="repeat">
+      <a:schemeClr val="lt1"/>
+    </dgm:linClrLst>
+    <dgm:effectClrLst/>
+    <dgm:txLinClrLst/>
+    <dgm:txFillClrLst/>
+    <dgm:txEffectClrLst/>
+  </dgm:styleLbl>
+  <dgm:styleLbl name="lnNode1">
+    <dgm:fillClrLst meth="repeat">
+      <a:schemeClr val="accent1"/>
+    </dgm:fillClrLst>
+    <dgm:linClrLst meth="repeat">
+      <a:schemeClr val="lt1"/>
+    </dgm:linClrLst>
+    <dgm:effectClrLst/>
+    <dgm:txLinClrLst/>
+    <dgm:txFillClrLst/>
+    <dgm:txEffectClrLst/>
+  </dgm:styleLbl>
+  <dgm:styleLbl name="vennNode1">
+    <dgm:fillClrLst meth="repeat">
+      <a:schemeClr val="accent1">
+        <a:alpha val="50000"/>
+      </a:schemeClr>
+    </dgm:fillClrLst>
+    <dgm:linClrLst meth="repeat">
+      <a:schemeClr val="lt1"/>
+    </dgm:linClrLst>
+    <dgm:effectClrLst/>
+    <dgm:txLinClrLst/>
+    <dgm:txFillClrLst/>
+    <dgm:txEffectClrLst/>
+  </dgm:styleLbl>
+  <dgm:styleLbl name="node2">
+    <dgm:fillClrLst meth="repeat">
+      <a:schemeClr val="accent1"/>
+    </dgm:fillClrLst>
+    <dgm:linClrLst meth="repeat">
+      <a:schemeClr val="lt1"/>
+    </dgm:linClrLst>
+    <dgm:effectClrLst/>
+    <dgm:txLinClrLst/>
+    <dgm:txFillClrLst/>
+    <dgm:txEffectClrLst/>
+  </dgm:styleLbl>
+  <dgm:styleLbl name="node3">
+    <dgm:fillClrLst meth="repeat">
+      <a:schemeClr val="accent1"/>
+    </dgm:fillClrLst>
+    <dgm:linClrLst meth="repeat">
+      <a:schemeClr val="lt1"/>
+    </dgm:linClrLst>
+    <dgm:effectClrLst/>
+    <dgm:txLinClrLst/>
+    <dgm:txFillClrLst/>
+    <dgm:txEffectClrLst/>
+  </dgm:styleLbl>
+  <dgm:styleLbl name="node4">
+    <dgm:fillClrLst meth="repeat">
+      <a:schemeClr val="accent1"/>
+    </dgm:fillClrLst>
+    <dgm:linClrLst meth="repeat">
+      <a:schemeClr val="lt1"/>
+    </dgm:linClrLst>
+    <dgm:effectClrLst/>
+    <dgm:txLinClrLst/>
+    <dgm:txFillClrLst/>
+    <dgm:txEffectClrLst/>
+  </dgm:styleLbl>
+  <dgm:styleLbl name="fgImgPlace1">
+    <dgm:fillClrLst meth="repeat">
+      <a:schemeClr val="accent1">
+        <a:tint val="50000"/>
+      </a:schemeClr>
+    </dgm:fillClrLst>
+    <dgm:linClrLst meth="repeat">
+      <a:schemeClr val="lt1"/>
+    </dgm:linClrLst>
+    <dgm:effectClrLst/>
+    <dgm:txLinClrLst/>
+    <dgm:txFillClrLst meth="repeat">
+      <a:schemeClr val="lt1"/>
+    </dgm:txFillClrLst>
+    <dgm:txEffectClrLst/>
+  </dgm:styleLbl>
+  <dgm:styleLbl name="alignImgPlace1">
+    <dgm:fillClrLst meth="repeat">
+      <a:schemeClr val="accent1">
+        <a:tint val="50000"/>
+      </a:schemeClr>
+    </dgm:fillClrLst>
+    <dgm:linClrLst meth="repeat">
+      <a:schemeClr val="lt1"/>
+    </dgm:linClrLst>
+    <dgm:effectClrLst/>
+    <dgm:txLinClrLst/>
+    <dgm:txFillClrLst meth="repeat">
+      <a:schemeClr val="lt1"/>
+    </dgm:txFillClrLst>
+    <dgm:txEffectClrLst/>
+  </dgm:styleLbl>
+  <dgm:styleLbl name="bgImgPlace1">
+    <dgm:fillClrLst meth="repeat">
+      <a:schemeClr val="accent1">
+        <a:tint val="50000"/>
+      </a:schemeClr>
+    </dgm:fillClrLst>
+    <dgm:linClrLst meth="repeat">
+      <a:schemeClr val="lt1"/>
+    </dgm:linClrLst>
+    <dgm:effectClrLst/>
+    <dgm:txLinClrLst/>
+    <dgm:txFillClrLst meth="repeat">
+      <a:schemeClr val="lt1"/>
+    </dgm:txFillClrLst>
+    <dgm:txEffectClrLst/>
+  </dgm:styleLbl>
+  <dgm:styleLbl name="sibTrans2D1">
+    <dgm:fillClrLst meth="repeat">
+      <a:schemeClr val="accent1">
+        <a:tint val="60000"/>
+      </a:schemeClr>
+    </dgm:fillClrLst>
+    <dgm:linClrLst meth="repeat">
+      <a:schemeClr val="accent1">
+        <a:tint val="60000"/>
+      </a:schemeClr>
+    </dgm:linClrLst>
+    <dgm:effectClrLst/>
+    <dgm:txLinClrLst/>
+    <dgm:txFillClrLst/>
+    <dgm:txEffectClrLst/>
+  </dgm:styleLbl>
+  <dgm:styleLbl name="fgSibTrans2D1">
+    <dgm:fillClrLst meth="repeat">
+      <a:schemeClr val="accent1">
+        <a:tint val="60000"/>
+      </a:schemeClr>
+    </dgm:fillClrLst>
+    <dgm:linClrLst meth="repeat">
+      <a:schemeClr val="accent1">
+        <a:tint val="60000"/>
+      </a:schemeClr>
+    </dgm:linClrLst>
+    <dgm:effectClrLst/>
+    <dgm:txLinClrLst/>
+    <dgm:txFillClrLst/>
+    <dgm:txEffectClrLst/>
+  </dgm:styleLbl>
+  <dgm:styleLbl name="bgSibTrans2D1">
+    <dgm:fillClrLst meth="repeat">
+      <a:schemeClr val="accent1">
+        <a:tint val="60000"/>
+      </a:schemeClr>
+    </dgm:fillClrLst>
+    <dgm:linClrLst meth="repeat">
+      <a:schemeClr val="accent1">
+        <a:tint val="60000"/>
+      </a:schemeClr>
+    </dgm:linClrLst>
+    <dgm:effectClrLst/>
+    <dgm:txLinClrLst/>
+    <dgm:txFillClrLst/>
+    <dgm:txEffectClrLst/>
+  </dgm:styleLbl>
+  <dgm:styleLbl name="sibTrans1D1">
+    <dgm:fillClrLst meth="repeat">
+      <a:schemeClr val="accent1"/>
+    </dgm:fillClrLst>
+    <dgm:linClrLst meth="repeat">
+      <a:schemeClr val="accent1"/>
+    </dgm:linClrLst>
+    <dgm:effectClrLst/>
+    <dgm:txLinClrLst/>
+    <dgm:txFillClrLst meth="repeat">
+      <a:schemeClr val="tx1"/>
+    </dgm:txFillClrLst>
+    <dgm:txEffectClrLst/>
+  </dgm:styleLbl>
+  <dgm:styleLbl name="callout">
+    <dgm:fillClrLst meth="repeat">
+      <a:schemeClr val="accent1"/>
+    </dgm:fillClrLst>
+    <dgm:linClrLst meth="repeat">
+      <a:schemeClr val="accent1">
+        <a:tint val="50000"/>
+      </a:schemeClr>
+    </dgm:linClrLst>
+    <dgm:effectClrLst/>
+    <dgm:txLinClrLst/>
+    <dgm:txFillClrLst meth="repeat">
+      <a:schemeClr val="tx1"/>
+    </dgm:txFillClrLst>
+    <dgm:txEffectClrLst/>
+  </dgm:styleLbl>
+  <dgm:styleLbl name="asst0">
+    <dgm:fillClrLst meth="repeat">
+      <a:schemeClr val="accent1"/>
+    </dgm:fillClrLst>
+    <dgm:linClrLst meth="repeat">
+      <a:schemeClr val="lt1"/>
+    </dgm:linClrLst>
+    <dgm:effectClrLst/>
+    <dgm:txLinClrLst/>
+    <dgm:txFillClrLst/>
+    <dgm:txEffectClrLst/>
+  </dgm:styleLbl>
+  <dgm:styleLbl name="asst1">
+    <dgm:fillClrLst meth="repeat">
+      <a:schemeClr val="accent1"/>
+    </dgm:fillClrLst>
+    <dgm:linClrLst meth="repeat">
+      <a:schemeClr val="lt1"/>
+    </dgm:linClrLst>
+    <dgm:effectClrLst/>
+    <dgm:txLinClrLst/>
+    <dgm:txFillClrLst/>
+    <dgm:txEffectClrLst/>
+  </dgm:styleLbl>
+  <dgm:styleLbl name="asst2">
+    <dgm:fillClrLst meth="repeat">
+      <a:schemeClr val="accent1"/>
+    </dgm:fillClrLst>
+    <dgm:linClrLst meth="repeat">
+      <a:schemeClr val="lt1"/>
+    </dgm:linClrLst>
+    <dgm:effectClrLst/>
+    <dgm:txLinClrLst/>
+    <dgm:txFillClrLst/>
+    <dgm:txEffectClrLst/>
+  </dgm:styleLbl>
+  <dgm:styleLbl name="asst3">
+    <dgm:fillClrLst meth="repeat">
+      <a:schemeClr val="accent1"/>
+    </dgm:fillClrLst>
+    <dgm:linClrLst meth="repeat">
+      <a:schemeClr val="lt1"/>
+    </dgm:linClrLst>
+    <dgm:effectClrLst/>
+    <dgm:txLinClrLst/>
+    <dgm:txFillClrLst/>
+    <dgm:txEffectClrLst/>
+  </dgm:styleLbl>
+  <dgm:styleLbl name="asst4">
+    <dgm:fillClrLst meth="repeat">
+      <a:schemeClr val="accent1"/>
+    </dgm:fillClrLst>
+    <dgm:linClrLst meth="repeat">
+      <a:schemeClr val="lt1"/>
+    </dgm:linClrLst>
+    <dgm:effectClrLst/>
+    <dgm:txLinClrLst/>
+    <dgm:txFillClrLst/>
+    <dgm:txEffectClrLst/>
+  </dgm:styleLbl>
+  <dgm:styleLbl name="parChTrans2D1">
+    <dgm:fillClrLst meth="repeat">
+      <a:schemeClr val="accent1">
+        <a:tint val="60000"/>
+      </a:schemeClr>
+    </dgm:fillClrLst>
+    <dgm:linClrLst meth="repeat">
+      <a:schemeClr val="accent1">
+        <a:tint val="60000"/>
+      </a:schemeClr>
+    </dgm:linClrLst>
+    <dgm:effectClrLst/>
+    <dgm:txLinClrLst/>
+    <dgm:txFillClrLst meth="repeat">
+      <a:schemeClr val="lt1"/>
+    </dgm:txFillClrLst>
+    <dgm:txEffectClrLst/>
+  </dgm:styleLbl>
+  <dgm:styleLbl name="parChTrans2D2">
+    <dgm:fillClrLst meth="repeat">
+      <a:schemeClr val="accent1"/>
+    </dgm:fillClrLst>
+    <dgm:linClrLst meth="repeat">
+      <a:schemeClr val="accent1"/>
+    </dgm:linClrLst>
+    <dgm:effectClrLst/>
+    <dgm:txLinClrLst/>
+    <dgm:txFillClrLst meth="repeat">
+      <a:schemeClr val="lt1"/>
+    </dgm:txFillClrLst>
+    <dgm:txEffectClrLst/>
+  </dgm:styleLbl>
+  <dgm:styleLbl name="parChTrans2D3">
+    <dgm:fillClrLst meth="repeat">
+      <a:schemeClr val="accent1"/>
+    </dgm:fillClrLst>
+    <dgm:linClrLst meth="repeat">
+      <a:schemeClr val="accent1"/>
+    </dgm:linClrLst>
+    <dgm:effectClrLst/>
+    <dgm:txLinClrLst/>
+    <dgm:txFillClrLst meth="repeat">
+      <a:schemeClr val="lt1"/>
+    </dgm:txFillClrLst>
+    <dgm:txEffectClrLst/>
+  </dgm:styleLbl>
+  <dgm:styleLbl name="parChTrans2D4">
+    <dgm:fillClrLst meth="repeat">
+      <a:schemeClr val="accent1"/>
+    </dgm:fillClrLst>
+    <dgm:linClrLst meth="repeat">
+      <a:schemeClr val="accent1"/>
+    </dgm:linClrLst>
+    <dgm:effectClrLst/>
+    <dgm:txLinClrLst/>
+    <dgm:txFillClrLst meth="repeat">
+      <a:schemeClr val="lt1"/>
+    </dgm:txFillClrLst>
+    <dgm:txEffectClrLst/>
+  </dgm:styleLbl>
+  <dgm:styleLbl name="parChTrans1D1">
+    <dgm:fillClrLst meth="repeat">
+      <a:schemeClr val="accent1"/>
+    </dgm:fillClrLst>
+    <dgm:linClrLst meth="repeat">
+      <a:schemeClr val="accent1">
+        <a:shade val="60000"/>
+      </a:schemeClr>
+    </dgm:linClrLst>
+    <dgm:effectClrLst/>
+    <dgm:txLinClrLst/>
+    <dgm:txFillClrLst meth="repeat">
+      <a:schemeClr val="tx1"/>
+    </dgm:txFillClrLst>
+    <dgm:txEffectClrLst/>
+  </dgm:styleLbl>
+  <dgm:styleLbl name="parChTrans1D2">
+    <dgm:fillClrLst meth="repeat">
+      <a:schemeClr val="accent1"/>
+    </dgm:fillClrLst>
+    <dgm:linClrLst meth="repeat">
+      <a:schemeClr val="accent1">
+        <a:shade val="60000"/>
+      </a:schemeClr>
+    </dgm:linClrLst>
+    <dgm:effectClrLst/>
+    <dgm:txLinClrLst/>
+    <dgm:txFillClrLst meth="repeat">
+      <a:schemeClr val="tx1"/>
+    </dgm:txFillClrLst>
+    <dgm:txEffectClrLst/>
+  </dgm:styleLbl>
+  <dgm:styleLbl name="parChTrans1D3">
+    <dgm:fillClrLst meth="repeat">
+      <a:schemeClr val="accent1"/>
+    </dgm:fillClrLst>
+    <dgm:linClrLst meth="repeat">
+      <a:schemeClr val="accent1">
+        <a:shade val="80000"/>
+      </a:schemeClr>
+    </dgm:linClrLst>
+    <dgm:effectClrLst/>
+    <dgm:txLinClrLst/>
+    <dgm:txFillClrLst meth="repeat">
+      <a:schemeClr val="tx1"/>
+    </dgm:txFillClrLst>
+    <dgm:txEffectClrLst/>
+  </dgm:styleLbl>
+  <dgm:styleLbl name="parChTrans1D4">
+    <dgm:fillClrLst meth="repeat">
+      <a:schemeClr val="accent1"/>
+    </dgm:fillClrLst>
+    <dgm:linClrLst meth="repeat">
+      <a:schemeClr val="accent1">
+        <a:shade val="80000"/>
+      </a:schemeClr>
+    </dgm:linClrLst>
+    <dgm:effectClrLst/>
+    <dgm:txLinClrLst/>
+    <dgm:txFillClrLst meth="repeat">
+      <a:schemeClr val="tx1"/>
+    </dgm:txFillClrLst>
+    <dgm:txEffectClrLst/>
+  </dgm:styleLbl>
+  <dgm:styleLbl name="fgAcc1">
+    <dgm:fillClrLst meth="repeat">
+      <a:schemeClr val="lt1">
+        <a:alpha val="90000"/>
+      </a:schemeClr>
+    </dgm:fillClrLst>
+    <dgm:linClrLst meth="repeat">
+      <a:schemeClr val="accent1"/>
+    </dgm:linClrLst>
+    <dgm:effectClrLst/>
+    <dgm:txLinClrLst/>
+    <dgm:txFillClrLst meth="repeat">
+      <a:schemeClr val="dk1"/>
+    </dgm:txFillClrLst>
+    <dgm:txEffectClrLst/>
+  </dgm:styleLbl>
+  <dgm:styleLbl name="conFgAcc1">
+    <dgm:fillClrLst meth="repeat">
+      <a:schemeClr val="lt1">
+        <a:alpha val="90000"/>
+      </a:schemeClr>
+    </dgm:fillClrLst>
+    <dgm:linClrLst meth="repeat">
+      <a:schemeClr val="accent1"/>
+    </dgm:linClrLst>
+    <dgm:effectClrLst/>
+    <dgm:txLinClrLst/>
+    <dgm:txFillClrLst meth="repeat">
+      <a:schemeClr val="dk1"/>
+    </dgm:txFillClrLst>
+    <dgm:txEffectClrLst/>
+  </dgm:styleLbl>
+  <dgm:styleLbl name="alignAcc1">
+    <dgm:fillClrLst meth="repeat">
+      <a:schemeClr val="lt1">
+        <a:alpha val="90000"/>
+      </a:schemeClr>
+    </dgm:fillClrLst>
+    <dgm:linClrLst meth="repeat">
+      <a:schemeClr val="accent1"/>
+    </dgm:linClrLst>
+    <dgm:effectClrLst/>
+    <dgm:txLinClrLst/>
+    <dgm:txFillClrLst meth="repeat">
+      <a:schemeClr val="dk1"/>
+    </dgm:txFillClrLst>
+    <dgm:txEffectClrLst/>
+  </dgm:styleLbl>
+  <dgm:styleLbl name="trAlignAcc1">
+    <dgm:fillClrLst meth="repeat">
+      <a:schemeClr val="lt1">
+        <a:alpha val="40000"/>
+      </a:schemeClr>
+    </dgm:fillClrLst>
+    <dgm:linClrLst meth="repeat">
+      <a:schemeClr val="accent1"/>
+    </dgm:linClrLst>
+    <dgm:effectClrLst/>
+    <dgm:txLinClrLst/>
+    <dgm:txFillClrLst meth="repeat">
+      <a:schemeClr val="dk1"/>
+    </dgm:txFillClrLst>
+    <dgm:txEffectClrLst/>
+  </dgm:styleLbl>
+  <dgm:styleLbl name="bgAcc1">
+    <dgm:fillClrLst meth="repeat">
+      <a:schemeClr val="lt1">
+        <a:alpha val="90000"/>
+      </a:schemeClr>
+    </dgm:fillClrLst>
+    <dgm:linClrLst meth="repeat">
+      <a:schemeClr val="accent1"/>
+    </dgm:linClrLst>
+    <dgm:effectClrLst/>
+    <dgm:txLinClrLst/>
+    <dgm:txFillClrLst meth="repeat">
+      <a:schemeClr val="dk1"/>
+    </dgm:txFillClrLst>
+    <dgm:txEffectClrLst/>
+  </dgm:styleLbl>
+  <dgm:styleLbl name="solidFgAcc1">
+    <dgm:fillClrLst meth="repeat">
+      <a:schemeClr val="lt1"/>
+    </dgm:fillClrLst>
+    <dgm:linClrLst meth="repeat">
+      <a:schemeClr val="accent1"/>
+    </dgm:linClrLst>
+    <dgm:effectClrLst/>
+    <dgm:txLinClrLst/>
+    <dgm:txFillClrLst meth="repeat">
+      <a:schemeClr val="dk1"/>
+    </dgm:txFillClrLst>
+    <dgm:txEffectClrLst/>
+  </dgm:styleLbl>
+  <dgm:styleLbl name="solidAlignAcc1">
+    <dgm:fillClrLst meth="repeat">
+      <a:schemeClr val="lt1"/>
+    </dgm:fillClrLst>
+    <dgm:linClrLst meth="repeat">
+      <a:schemeClr val="accent1"/>
+    </dgm:linClrLst>
+    <dgm:effectClrLst/>
+    <dgm:txLinClrLst/>
+    <dgm:txFillClrLst meth="repeat">
+      <a:schemeClr val="dk1"/>
+    </dgm:txFillClrLst>
+    <dgm:txEffectClrLst/>
+  </dgm:styleLbl>
+  <dgm:styleLbl name="solidBgAcc1">
+    <dgm:fillClrLst meth="repeat">
+      <a:schemeClr val="lt1"/>
+    </dgm:fillClrLst>
+    <dgm:linClrLst meth="repeat">
+      <a:schemeClr val="accent1"/>
+    </dgm:linClrLst>
+    <dgm:effectClrLst/>
+    <dgm:txLinClrLst/>
+    <dgm:txFillClrLst meth="repeat">
+      <a:schemeClr val="dk1"/>
+    </dgm:txFillClrLst>
+    <dgm:txEffectClrLst/>
+  </dgm:styleLbl>
+  <dgm:styleLbl name="fgAccFollowNode1">
+    <dgm:fillClrLst meth="repeat">
+      <a:schemeClr val="accent1">
+        <a:alpha val="90000"/>
+        <a:tint val="40000"/>
+      </a:schemeClr>
+    </dgm:fillClrLst>
+    <dgm:linClrLst meth="repeat">
+      <a:schemeClr val="accent1">
+        <a:alpha val="90000"/>
+        <a:tint val="40000"/>
+      </a:schemeClr>
+    </dgm:linClrLst>
+    <dgm:effectClrLst/>
+    <dgm:txLinClrLst/>
+    <dgm:txFillClrLst meth="repeat">
+      <a:schemeClr val="dk1"/>
+    </dgm:txFillClrLst>
+    <dgm:txEffectClrLst/>
+  </dgm:styleLbl>
+  <dgm:styleLbl name="alignAccFollowNode1">
+    <dgm:fillClrLst meth="repeat">
+      <a:schemeClr val="accent1">
+        <a:alpha val="90000"/>
+        <a:tint val="40000"/>
+      </a:schemeClr>
+    </dgm:fillClrLst>
+    <dgm:linClrLst meth="repeat">
+      <a:schemeClr val="accent1">
+        <a:alpha val="90000"/>
+        <a:tint val="40000"/>
+      </a:schemeClr>
+    </dgm:linClrLst>
+    <dgm:effectClrLst/>
+    <dgm:txLinClrLst/>
+    <dgm:txFillClrLst meth="repeat">
+      <a:schemeClr val="dk1"/>
+    </dgm:txFillClrLst>
+    <dgm:txEffectClrLst/>
+  </dgm:styleLbl>
+  <dgm:styleLbl name="bgAccFollowNode1">
+    <dgm:fillClrLst meth="repeat">
+      <a:schemeClr val="accent1">
+        <a:alpha val="90000"/>
+        <a:tint val="40000"/>
+      </a:schemeClr>
+    </dgm:fillClrLst>
+    <dgm:linClrLst meth="repeat">
+      <a:schemeClr val="accent1">
+        <a:alpha val="90000"/>
+        <a:tint val="40000"/>
+      </a:schemeClr>
+    </dgm:linClrLst>
+    <dgm:effectClrLst/>
+    <dgm:txLinClrLst/>
+    <dgm:txFillClrLst meth="repeat">
+      <a:schemeClr val="dk1"/>
+    </dgm:txFillClrLst>
+    <dgm:txEffectClrLst/>
+  </dgm:styleLbl>
+  <dgm:styleLbl name="fgAcc0">
+    <dgm:fillClrLst meth="repeat">
+      <a:schemeClr val="lt1">
+        <a:alpha val="90000"/>
+      </a:schemeClr>
+    </dgm:fillClrLst>
+    <dgm:linClrLst meth="repeat">
+      <a:schemeClr val="accent1"/>
+    </dgm:linClrLst>
+    <dgm:effectClrLst/>
+    <dgm:txLinClrLst/>
+    <dgm:txFillClrLst meth="repeat">
+      <a:schemeClr val="dk1"/>
+    </dgm:txFillClrLst>
+    <dgm:txEffectClrLst/>
+  </dgm:styleLbl>
+  <dgm:styleLbl name="fgAcc2">
+    <dgm:fillClrLst meth="repeat">
+      <a:schemeClr val="lt1">
+        <a:alpha val="90000"/>
+      </a:schemeClr>
+    </dgm:fillClrLst>
+    <dgm:linClrLst meth="repeat">
+      <a:schemeClr val="accent1"/>
+    </dgm:linClrLst>
+    <dgm:effectClrLst/>
+    <dgm:txLinClrLst/>
+    <dgm:txFillClrLst meth="repeat">
+      <a:schemeClr val="dk1"/>
+    </dgm:txFillClrLst>
+    <dgm:txEffectClrLst/>
+  </dgm:styleLbl>
+  <dgm:styleLbl name="fgAcc3">
+    <dgm:fillClrLst meth="repeat">
+      <a:schemeClr val="lt1">
+        <a:alpha val="90000"/>
+      </a:schemeClr>
+    </dgm:fillClrLst>
+    <dgm:linClrLst meth="repeat">
+      <a:schemeClr val="accent1"/>
+    </dgm:linClrLst>
+    <dgm:effectClrLst/>
+    <dgm:txLinClrLst/>
+    <dgm:txFillClrLst meth="repeat">
+      <a:schemeClr val="dk1"/>
+    </dgm:txFillClrLst>
+    <dgm:txEffectClrLst/>
+  </dgm:styleLbl>
+  <dgm:styleLbl name="fgAcc4">
+    <dgm:fillClrLst meth="repeat">
+      <a:schemeClr val="lt1">
+        <a:alpha val="90000"/>
+      </a:schemeClr>
+    </dgm:fillClrLst>
+    <dgm:linClrLst meth="repeat">
+      <a:schemeClr val="accent1"/>
+    </dgm:linClrLst>
+    <dgm:effectClrLst/>
+    <dgm:txLinClrLst/>
+    <dgm:txFillClrLst meth="repeat">
+      <a:schemeClr val="dk1"/>
+    </dgm:txFillClrLst>
+    <dgm:txEffectClrLst/>
+  </dgm:styleLbl>
+  <dgm:styleLbl name="bgShp">
+    <dgm:fillClrLst meth="repeat">
+      <a:schemeClr val="accent1">
+        <a:tint val="40000"/>
+      </a:schemeClr>
+    </dgm:fillClrLst>
+    <dgm:linClrLst meth="repeat">
+      <a:schemeClr val="accent1"/>
+    </dgm:linClrLst>
+    <dgm:effectClrLst/>
+    <dgm:txLinClrLst/>
+    <dgm:txFillClrLst meth="repeat">
+      <a:schemeClr val="dk1"/>
+    </dgm:txFillClrLst>
+    <dgm:txEffectClrLst/>
+  </dgm:styleLbl>
+  <dgm:styleLbl name="dkBgShp">
+    <dgm:fillClrLst meth="repeat">
+      <a:schemeClr val="accent1">
+        <a:shade val="80000"/>
+      </a:schemeClr>
+    </dgm:fillClrLst>
+    <dgm:linClrLst meth="repeat">
+      <a:schemeClr val="accent1"/>
+    </dgm:linClrLst>
+    <dgm:effectClrLst/>
+    <dgm:txLinClrLst/>
+    <dgm:txFillClrLst meth="repeat">
+      <a:schemeClr val="lt1"/>
+    </dgm:txFillClrLst>
+    <dgm:txEffectClrLst/>
+  </dgm:styleLbl>
+  <dgm:styleLbl name="trBgShp">
+    <dgm:fillClrLst meth="repeat">
+      <a:schemeClr val="accent1">
+        <a:tint val="50000"/>
+        <a:alpha val="40000"/>
+      </a:schemeClr>
+    </dgm:fillClrLst>
+    <dgm:linClrLst meth="repeat">
+      <a:schemeClr val="accent1"/>
+    </dgm:linClrLst>
+    <dgm:effectClrLst/>
+    <dgm:txLinClrLst/>
+    <dgm:txFillClrLst meth="repeat">
+      <a:schemeClr val="lt1"/>
+    </dgm:txFillClrLst>
+    <dgm:txEffectClrLst/>
+  </dgm:styleLbl>
+  <dgm:styleLbl name="fgShp">
+    <dgm:fillClrLst meth="repeat">
+      <a:schemeClr val="accent1">
+        <a:tint val="60000"/>
+      </a:schemeClr>
+    </dgm:fillClrLst>
+    <dgm:linClrLst meth="repeat">
+      <a:schemeClr val="lt1"/>
+    </dgm:linClrLst>
+    <dgm:effectClrLst/>
+    <dgm:txLinClrLst/>
+    <dgm:txFillClrLst meth="repeat">
+      <a:schemeClr val="dk1"/>
+    </dgm:txFillClrLst>
+    <dgm:txEffectClrLst/>
+  </dgm:styleLbl>
+  <dgm:styleLbl name="revTx">
+    <dgm:fillClrLst meth="repeat">
+      <a:schemeClr val="lt1">
+        <a:alpha val="0"/>
+      </a:schemeClr>
+    </dgm:fillClrLst>
+    <dgm:linClrLst meth="repeat">
+      <a:schemeClr val="dk1">
+        <a:alpha val="0"/>
+      </a:schemeClr>
+    </dgm:linClrLst>
+    <dgm:effectClrLst/>
+    <dgm:txLinClrLst/>
+    <dgm:txFillClrLst meth="repeat">
+      <a:schemeClr val="tx1"/>
+    </dgm:txFillClrLst>
+    <dgm:txEffectClrLst/>
+  </dgm:styleLbl>
+</dgm:colorsDef>
+</file>
+
+<file path=ppt/diagrams/colors2.xml><?xml version="1.0" encoding="utf-8"?>
 <dgm:colorsDef xmlns:dgm="http://schemas.openxmlformats.org/drawingml/2006/diagram" xmlns:a="http://schemas.openxmlformats.org/drawingml/2006/main" uniqueId="urn:microsoft.com/office/officeart/2005/8/colors/colorful1">
   <dgm:title val=""/>
   <dgm:desc val=""/>
@@ -1083,6 +1832,289 @@
 <file path=ppt/diagrams/data1.xml><?xml version="1.0" encoding="utf-8"?>
 <dgm:dataModel xmlns:dgm="http://schemas.openxmlformats.org/drawingml/2006/diagram" xmlns:a="http://schemas.openxmlformats.org/drawingml/2006/main">
   <dgm:ptLst>
+    <dgm:pt modelId="{BC7AF320-7AFA-42A3-BDE5-9072CDB627E3}" type="doc">
+      <dgm:prSet loTypeId="urn:microsoft.com/office/officeart/2005/8/layout/architecture" loCatId="relationship" qsTypeId="urn:microsoft.com/office/officeart/2005/8/quickstyle/simple1" qsCatId="simple" csTypeId="urn:microsoft.com/office/officeart/2005/8/colors/accent1_2" csCatId="accent1" phldr="1"/>
+      <dgm:spPr/>
+      <dgm:t>
+        <a:bodyPr/>
+        <a:lstStyle/>
+        <a:p>
+          <a:endParaRPr lang="en-US"/>
+        </a:p>
+      </dgm:t>
+    </dgm:pt>
+    <dgm:pt modelId="{D9775271-425C-4B4F-85A6-07886A6D55E4}">
+      <dgm:prSet phldrT="[Text]" custT="1"/>
+      <dgm:spPr/>
+      <dgm:t>
+        <a:bodyPr/>
+        <a:lstStyle/>
+        <a:p>
+          <a:r>
+            <a:rPr lang="en-US" sz="2800" dirty="0"/>
+            <a:t>Visual Studio</a:t>
+          </a:r>
+        </a:p>
+      </dgm:t>
+    </dgm:pt>
+    <dgm:pt modelId="{E44C516F-A7BC-467C-8B6E-9145CEC56748}" type="parTrans" cxnId="{E1DFC625-D026-4F31-B829-C87F0D7B6A05}">
+      <dgm:prSet/>
+      <dgm:spPr/>
+      <dgm:t>
+        <a:bodyPr/>
+        <a:lstStyle/>
+        <a:p>
+          <a:endParaRPr lang="en-US"/>
+        </a:p>
+      </dgm:t>
+    </dgm:pt>
+    <dgm:pt modelId="{EF89B725-0DFA-4EE4-B5B6-220EFADF2320}" type="sibTrans" cxnId="{E1DFC625-D026-4F31-B829-C87F0D7B6A05}">
+      <dgm:prSet/>
+      <dgm:spPr/>
+      <dgm:t>
+        <a:bodyPr/>
+        <a:lstStyle/>
+        <a:p>
+          <a:endParaRPr lang="en-US"/>
+        </a:p>
+      </dgm:t>
+    </dgm:pt>
+    <dgm:pt modelId="{E0B0EDA1-F659-4751-86B9-BD9CEE59513F}">
+      <dgm:prSet phldrT="[Text]" custT="1"/>
+      <dgm:spPr/>
+      <dgm:t>
+        <a:bodyPr/>
+        <a:lstStyle/>
+        <a:p>
+          <a:r>
+            <a:rPr lang="en-US" sz="2800" dirty="0"/>
+            <a:t>Visual Studio Code</a:t>
+          </a:r>
+        </a:p>
+      </dgm:t>
+    </dgm:pt>
+    <dgm:pt modelId="{E212CABA-3591-45C5-8E26-731E1F3C8C31}" type="parTrans" cxnId="{B08F83FE-474C-4BE9-A2B4-A58E42E218D9}">
+      <dgm:prSet/>
+      <dgm:spPr/>
+      <dgm:t>
+        <a:bodyPr/>
+        <a:lstStyle/>
+        <a:p>
+          <a:endParaRPr lang="en-US"/>
+        </a:p>
+      </dgm:t>
+    </dgm:pt>
+    <dgm:pt modelId="{335C44E7-CF54-4BCB-AFDE-F0F261EA1DF0}" type="sibTrans" cxnId="{B08F83FE-474C-4BE9-A2B4-A58E42E218D9}">
+      <dgm:prSet/>
+      <dgm:spPr/>
+      <dgm:t>
+        <a:bodyPr/>
+        <a:lstStyle/>
+        <a:p>
+          <a:endParaRPr lang="en-US"/>
+        </a:p>
+      </dgm:t>
+    </dgm:pt>
+    <dgm:pt modelId="{0E38893E-4337-487F-9332-DCBC3CC8A6C7}">
+      <dgm:prSet phldrT="[Text]" custT="1"/>
+      <dgm:spPr/>
+      <dgm:t>
+        <a:bodyPr/>
+        <a:lstStyle/>
+        <a:p>
+          <a:r>
+            <a:rPr lang="en-US" sz="2800" dirty="0"/>
+            <a:t>Visual Studio for Mac</a:t>
+          </a:r>
+        </a:p>
+      </dgm:t>
+    </dgm:pt>
+    <dgm:pt modelId="{018257BF-89E9-497D-9337-B9D2DFFBF94C}" type="sibTrans" cxnId="{C8F1AD98-63E1-416A-A3A7-AC680C712127}">
+      <dgm:prSet/>
+      <dgm:spPr/>
+      <dgm:t>
+        <a:bodyPr/>
+        <a:lstStyle/>
+        <a:p>
+          <a:endParaRPr lang="en-US"/>
+        </a:p>
+      </dgm:t>
+    </dgm:pt>
+    <dgm:pt modelId="{9FFA70A6-A239-4434-95C8-5A8DBEF62F79}" type="parTrans" cxnId="{C8F1AD98-63E1-416A-A3A7-AC680C712127}">
+      <dgm:prSet/>
+      <dgm:spPr/>
+      <dgm:t>
+        <a:bodyPr/>
+        <a:lstStyle/>
+        <a:p>
+          <a:endParaRPr lang="en-US"/>
+        </a:p>
+      </dgm:t>
+    </dgm:pt>
+    <dgm:pt modelId="{BAE44503-9403-4D5B-AE69-6EB5849D21B7}">
+      <dgm:prSet phldrT="[Text]"/>
+      <dgm:spPr/>
+      <dgm:t>
+        <a:bodyPr/>
+        <a:lstStyle/>
+        <a:p>
+          <a:r>
+            <a:rPr lang="en-US" dirty="0"/>
+            <a:t>.NET Core CLI</a:t>
+          </a:r>
+        </a:p>
+      </dgm:t>
+    </dgm:pt>
+    <dgm:pt modelId="{79181678-EBEA-4284-A6AD-6EE938241842}" type="parTrans" cxnId="{2E5690A5-98F7-4B7D-BC3A-2E92BF982979}">
+      <dgm:prSet/>
+      <dgm:spPr/>
+      <dgm:t>
+        <a:bodyPr/>
+        <a:lstStyle/>
+        <a:p>
+          <a:endParaRPr lang="en-US"/>
+        </a:p>
+      </dgm:t>
+    </dgm:pt>
+    <dgm:pt modelId="{F845C359-4C7D-4F9A-8A06-375321C9FD3E}" type="sibTrans" cxnId="{2E5690A5-98F7-4B7D-BC3A-2E92BF982979}">
+      <dgm:prSet/>
+      <dgm:spPr/>
+      <dgm:t>
+        <a:bodyPr/>
+        <a:lstStyle/>
+        <a:p>
+          <a:endParaRPr lang="en-US"/>
+        </a:p>
+      </dgm:t>
+    </dgm:pt>
+    <dgm:pt modelId="{B09816E3-A792-447C-A85F-0CAED126194F}" type="pres">
+      <dgm:prSet presAssocID="{BC7AF320-7AFA-42A3-BDE5-9072CDB627E3}" presName="Name0" presStyleCnt="0">
+        <dgm:presLayoutVars>
+          <dgm:chPref val="1"/>
+          <dgm:dir/>
+          <dgm:animOne val="branch"/>
+          <dgm:animLvl val="lvl"/>
+          <dgm:resizeHandles/>
+        </dgm:presLayoutVars>
+      </dgm:prSet>
+      <dgm:spPr/>
+    </dgm:pt>
+    <dgm:pt modelId="{7C43DDC6-D31F-40D3-A288-7D42E7A0FA3A}" type="pres">
+      <dgm:prSet presAssocID="{BAE44503-9403-4D5B-AE69-6EB5849D21B7}" presName="vertOne" presStyleCnt="0"/>
+      <dgm:spPr/>
+    </dgm:pt>
+    <dgm:pt modelId="{FD6C78DC-C982-4EB8-B72C-CF9B927D7CD6}" type="pres">
+      <dgm:prSet presAssocID="{BAE44503-9403-4D5B-AE69-6EB5849D21B7}" presName="txOne" presStyleLbl="node0" presStyleIdx="0" presStyleCnt="1" custLinFactNeighborY="9784">
+        <dgm:presLayoutVars>
+          <dgm:chPref val="3"/>
+        </dgm:presLayoutVars>
+      </dgm:prSet>
+      <dgm:spPr/>
+    </dgm:pt>
+    <dgm:pt modelId="{85A117ED-8447-44B9-8BE1-2BFA52C0152D}" type="pres">
+      <dgm:prSet presAssocID="{BAE44503-9403-4D5B-AE69-6EB5849D21B7}" presName="parTransOne" presStyleCnt="0"/>
+      <dgm:spPr/>
+    </dgm:pt>
+    <dgm:pt modelId="{FF32DEBE-E4E5-48B1-830D-77588A403133}" type="pres">
+      <dgm:prSet presAssocID="{BAE44503-9403-4D5B-AE69-6EB5849D21B7}" presName="horzOne" presStyleCnt="0"/>
+      <dgm:spPr/>
+    </dgm:pt>
+    <dgm:pt modelId="{75B1FA2E-CBA3-4CF4-8AF4-D56B56221651}" type="pres">
+      <dgm:prSet presAssocID="{D9775271-425C-4B4F-85A6-07886A6D55E4}" presName="vertTwo" presStyleCnt="0"/>
+      <dgm:spPr/>
+    </dgm:pt>
+    <dgm:pt modelId="{D3C4656B-96C8-4C58-B394-BD787E9002E6}" type="pres">
+      <dgm:prSet presAssocID="{D9775271-425C-4B4F-85A6-07886A6D55E4}" presName="txTwo" presStyleLbl="node2" presStyleIdx="0" presStyleCnt="3">
+        <dgm:presLayoutVars>
+          <dgm:chPref val="3"/>
+        </dgm:presLayoutVars>
+      </dgm:prSet>
+      <dgm:spPr/>
+    </dgm:pt>
+    <dgm:pt modelId="{112CD85F-8F63-451B-95D9-9FEF322B8424}" type="pres">
+      <dgm:prSet presAssocID="{D9775271-425C-4B4F-85A6-07886A6D55E4}" presName="horzTwo" presStyleCnt="0"/>
+      <dgm:spPr/>
+    </dgm:pt>
+    <dgm:pt modelId="{9D9F3192-DAAD-4870-BCFF-71DA05435227}" type="pres">
+      <dgm:prSet presAssocID="{EF89B725-0DFA-4EE4-B5B6-220EFADF2320}" presName="sibSpaceTwo" presStyleCnt="0"/>
+      <dgm:spPr/>
+    </dgm:pt>
+    <dgm:pt modelId="{8D045E23-25B2-4E2D-B4F3-D1943D46E86D}" type="pres">
+      <dgm:prSet presAssocID="{0E38893E-4337-487F-9332-DCBC3CC8A6C7}" presName="vertTwo" presStyleCnt="0"/>
+      <dgm:spPr/>
+    </dgm:pt>
+    <dgm:pt modelId="{8779E483-D32A-45C6-AC38-689CFC31597C}" type="pres">
+      <dgm:prSet presAssocID="{0E38893E-4337-487F-9332-DCBC3CC8A6C7}" presName="txTwo" presStyleLbl="node2" presStyleIdx="1" presStyleCnt="3">
+        <dgm:presLayoutVars>
+          <dgm:chPref val="3"/>
+        </dgm:presLayoutVars>
+      </dgm:prSet>
+      <dgm:spPr/>
+    </dgm:pt>
+    <dgm:pt modelId="{11D56116-98F7-4493-8D66-186C61446615}" type="pres">
+      <dgm:prSet presAssocID="{0E38893E-4337-487F-9332-DCBC3CC8A6C7}" presName="horzTwo" presStyleCnt="0"/>
+      <dgm:spPr/>
+    </dgm:pt>
+    <dgm:pt modelId="{25B40700-B42F-408B-BBE0-7B2B1C32F594}" type="pres">
+      <dgm:prSet presAssocID="{018257BF-89E9-497D-9337-B9D2DFFBF94C}" presName="sibSpaceTwo" presStyleCnt="0"/>
+      <dgm:spPr/>
+    </dgm:pt>
+    <dgm:pt modelId="{67862819-981C-4D55-BB80-E310B9F97D8B}" type="pres">
+      <dgm:prSet presAssocID="{E0B0EDA1-F659-4751-86B9-BD9CEE59513F}" presName="vertTwo" presStyleCnt="0"/>
+      <dgm:spPr/>
+    </dgm:pt>
+    <dgm:pt modelId="{B0680C6A-DDE6-42F5-9A21-72816797E8DA}" type="pres">
+      <dgm:prSet presAssocID="{E0B0EDA1-F659-4751-86B9-BD9CEE59513F}" presName="txTwo" presStyleLbl="node2" presStyleIdx="2" presStyleCnt="3">
+        <dgm:presLayoutVars>
+          <dgm:chPref val="3"/>
+        </dgm:presLayoutVars>
+      </dgm:prSet>
+      <dgm:spPr/>
+    </dgm:pt>
+    <dgm:pt modelId="{164B157B-BD8C-45E4-BF6E-E025F77C1928}" type="pres">
+      <dgm:prSet presAssocID="{E0B0EDA1-F659-4751-86B9-BD9CEE59513F}" presName="horzTwo" presStyleCnt="0"/>
+      <dgm:spPr/>
+    </dgm:pt>
+  </dgm:ptLst>
+  <dgm:cxnLst>
+    <dgm:cxn modelId="{179A7901-199D-4319-A035-B8796073A6B3}" type="presOf" srcId="{BC7AF320-7AFA-42A3-BDE5-9072CDB627E3}" destId="{B09816E3-A792-447C-A85F-0CAED126194F}" srcOrd="0" destOrd="0" presId="urn:microsoft.com/office/officeart/2005/8/layout/architecture"/>
+    <dgm:cxn modelId="{E1DFC625-D026-4F31-B829-C87F0D7B6A05}" srcId="{BAE44503-9403-4D5B-AE69-6EB5849D21B7}" destId="{D9775271-425C-4B4F-85A6-07886A6D55E4}" srcOrd="0" destOrd="0" parTransId="{E44C516F-A7BC-467C-8B6E-9145CEC56748}" sibTransId="{EF89B725-0DFA-4EE4-B5B6-220EFADF2320}"/>
+    <dgm:cxn modelId="{C5DFAC2A-3151-4FA8-9E00-BAADADD3DE8C}" type="presOf" srcId="{0E38893E-4337-487F-9332-DCBC3CC8A6C7}" destId="{8779E483-D32A-45C6-AC38-689CFC31597C}" srcOrd="0" destOrd="0" presId="urn:microsoft.com/office/officeart/2005/8/layout/architecture"/>
+    <dgm:cxn modelId="{C8F1AD98-63E1-416A-A3A7-AC680C712127}" srcId="{BAE44503-9403-4D5B-AE69-6EB5849D21B7}" destId="{0E38893E-4337-487F-9332-DCBC3CC8A6C7}" srcOrd="1" destOrd="0" parTransId="{9FFA70A6-A239-4434-95C8-5A8DBEF62F79}" sibTransId="{018257BF-89E9-497D-9337-B9D2DFFBF94C}"/>
+    <dgm:cxn modelId="{2E5690A5-98F7-4B7D-BC3A-2E92BF982979}" srcId="{BC7AF320-7AFA-42A3-BDE5-9072CDB627E3}" destId="{BAE44503-9403-4D5B-AE69-6EB5849D21B7}" srcOrd="0" destOrd="0" parTransId="{79181678-EBEA-4284-A6AD-6EE938241842}" sibTransId="{F845C359-4C7D-4F9A-8A06-375321C9FD3E}"/>
+    <dgm:cxn modelId="{39BFA2B9-48D7-4404-9C15-CC2074C27C65}" type="presOf" srcId="{BAE44503-9403-4D5B-AE69-6EB5849D21B7}" destId="{FD6C78DC-C982-4EB8-B72C-CF9B927D7CD6}" srcOrd="0" destOrd="0" presId="urn:microsoft.com/office/officeart/2005/8/layout/architecture"/>
+    <dgm:cxn modelId="{EE6199E2-8F8D-4021-B88D-D2F1C58D57D4}" type="presOf" srcId="{E0B0EDA1-F659-4751-86B9-BD9CEE59513F}" destId="{B0680C6A-DDE6-42F5-9A21-72816797E8DA}" srcOrd="0" destOrd="0" presId="urn:microsoft.com/office/officeart/2005/8/layout/architecture"/>
+    <dgm:cxn modelId="{25F09AF3-F32D-43F9-A0D8-F03D2099922C}" type="presOf" srcId="{D9775271-425C-4B4F-85A6-07886A6D55E4}" destId="{D3C4656B-96C8-4C58-B394-BD787E9002E6}" srcOrd="0" destOrd="0" presId="urn:microsoft.com/office/officeart/2005/8/layout/architecture"/>
+    <dgm:cxn modelId="{B08F83FE-474C-4BE9-A2B4-A58E42E218D9}" srcId="{BAE44503-9403-4D5B-AE69-6EB5849D21B7}" destId="{E0B0EDA1-F659-4751-86B9-BD9CEE59513F}" srcOrd="2" destOrd="0" parTransId="{E212CABA-3591-45C5-8E26-731E1F3C8C31}" sibTransId="{335C44E7-CF54-4BCB-AFDE-F0F261EA1DF0}"/>
+    <dgm:cxn modelId="{D9BA4D18-4DB5-4619-B7E9-1567482C245F}" type="presParOf" srcId="{B09816E3-A792-447C-A85F-0CAED126194F}" destId="{7C43DDC6-D31F-40D3-A288-7D42E7A0FA3A}" srcOrd="0" destOrd="0" presId="urn:microsoft.com/office/officeart/2005/8/layout/architecture"/>
+    <dgm:cxn modelId="{564A10BB-6310-4144-A279-BE499C0307AB}" type="presParOf" srcId="{7C43DDC6-D31F-40D3-A288-7D42E7A0FA3A}" destId="{FD6C78DC-C982-4EB8-B72C-CF9B927D7CD6}" srcOrd="0" destOrd="0" presId="urn:microsoft.com/office/officeart/2005/8/layout/architecture"/>
+    <dgm:cxn modelId="{C4104592-60D0-4D52-AACC-206296F01E57}" type="presParOf" srcId="{7C43DDC6-D31F-40D3-A288-7D42E7A0FA3A}" destId="{85A117ED-8447-44B9-8BE1-2BFA52C0152D}" srcOrd="1" destOrd="0" presId="urn:microsoft.com/office/officeart/2005/8/layout/architecture"/>
+    <dgm:cxn modelId="{5E36883C-B89F-47C8-89AB-78F7CA0624DB}" type="presParOf" srcId="{7C43DDC6-D31F-40D3-A288-7D42E7A0FA3A}" destId="{FF32DEBE-E4E5-48B1-830D-77588A403133}" srcOrd="2" destOrd="0" presId="urn:microsoft.com/office/officeart/2005/8/layout/architecture"/>
+    <dgm:cxn modelId="{B762D97F-D380-433F-9F48-00E0179D4B66}" type="presParOf" srcId="{FF32DEBE-E4E5-48B1-830D-77588A403133}" destId="{75B1FA2E-CBA3-4CF4-8AF4-D56B56221651}" srcOrd="0" destOrd="0" presId="urn:microsoft.com/office/officeart/2005/8/layout/architecture"/>
+    <dgm:cxn modelId="{989C5666-BE90-4AB2-9F75-5D064D5CFE17}" type="presParOf" srcId="{75B1FA2E-CBA3-4CF4-8AF4-D56B56221651}" destId="{D3C4656B-96C8-4C58-B394-BD787E9002E6}" srcOrd="0" destOrd="0" presId="urn:microsoft.com/office/officeart/2005/8/layout/architecture"/>
+    <dgm:cxn modelId="{EAA59B0E-0149-491B-AFA2-1B0D6029B13A}" type="presParOf" srcId="{75B1FA2E-CBA3-4CF4-8AF4-D56B56221651}" destId="{112CD85F-8F63-451B-95D9-9FEF322B8424}" srcOrd="1" destOrd="0" presId="urn:microsoft.com/office/officeart/2005/8/layout/architecture"/>
+    <dgm:cxn modelId="{4B5B7A98-14C5-45B0-9736-F69D01C2F51B}" type="presParOf" srcId="{FF32DEBE-E4E5-48B1-830D-77588A403133}" destId="{9D9F3192-DAAD-4870-BCFF-71DA05435227}" srcOrd="1" destOrd="0" presId="urn:microsoft.com/office/officeart/2005/8/layout/architecture"/>
+    <dgm:cxn modelId="{EA23AC6F-9389-4569-8350-7F15ACAB0908}" type="presParOf" srcId="{FF32DEBE-E4E5-48B1-830D-77588A403133}" destId="{8D045E23-25B2-4E2D-B4F3-D1943D46E86D}" srcOrd="2" destOrd="0" presId="urn:microsoft.com/office/officeart/2005/8/layout/architecture"/>
+    <dgm:cxn modelId="{DD0C5108-0E05-41A7-B838-56677498374B}" type="presParOf" srcId="{8D045E23-25B2-4E2D-B4F3-D1943D46E86D}" destId="{8779E483-D32A-45C6-AC38-689CFC31597C}" srcOrd="0" destOrd="0" presId="urn:microsoft.com/office/officeart/2005/8/layout/architecture"/>
+    <dgm:cxn modelId="{EC610756-659D-44CF-A462-0EC6BE245397}" type="presParOf" srcId="{8D045E23-25B2-4E2D-B4F3-D1943D46E86D}" destId="{11D56116-98F7-4493-8D66-186C61446615}" srcOrd="1" destOrd="0" presId="urn:microsoft.com/office/officeart/2005/8/layout/architecture"/>
+    <dgm:cxn modelId="{517C38C0-80EF-4425-B6EE-C7AD9460E115}" type="presParOf" srcId="{FF32DEBE-E4E5-48B1-830D-77588A403133}" destId="{25B40700-B42F-408B-BBE0-7B2B1C32F594}" srcOrd="3" destOrd="0" presId="urn:microsoft.com/office/officeart/2005/8/layout/architecture"/>
+    <dgm:cxn modelId="{64202FE0-D2A7-4957-87ED-71223807D707}" type="presParOf" srcId="{FF32DEBE-E4E5-48B1-830D-77588A403133}" destId="{67862819-981C-4D55-BB80-E310B9F97D8B}" srcOrd="4" destOrd="0" presId="urn:microsoft.com/office/officeart/2005/8/layout/architecture"/>
+    <dgm:cxn modelId="{93F4900D-5489-48CA-8EB5-72A4E11A89ED}" type="presParOf" srcId="{67862819-981C-4D55-BB80-E310B9F97D8B}" destId="{B0680C6A-DDE6-42F5-9A21-72816797E8DA}" srcOrd="0" destOrd="0" presId="urn:microsoft.com/office/officeart/2005/8/layout/architecture"/>
+    <dgm:cxn modelId="{4FD2845E-0FF0-46A4-A321-8DFCD3DBA7FA}" type="presParOf" srcId="{67862819-981C-4D55-BB80-E310B9F97D8B}" destId="{164B157B-BD8C-45E4-BF6E-E025F77C1928}" srcOrd="1" destOrd="0" presId="urn:microsoft.com/office/officeart/2005/8/layout/architecture"/>
+  </dgm:cxnLst>
+  <dgm:bg/>
+  <dgm:whole/>
+  <dgm:extLst>
+    <a:ext uri="http://schemas.microsoft.com/office/drawing/2008/diagram">
+      <dsp:dataModelExt xmlns:dsp="http://schemas.microsoft.com/office/drawing/2008/diagram" relId="rId9" minVer="http://schemas.openxmlformats.org/drawingml/2006/diagram"/>
+    </a:ext>
+  </dgm:extLst>
+</dgm:dataModel>
+</file>
+
+<file path=ppt/diagrams/data2.xml><?xml version="1.0" encoding="utf-8"?>
+<dgm:dataModel xmlns:dgm="http://schemas.openxmlformats.org/drawingml/2006/diagram" xmlns:a="http://schemas.openxmlformats.org/drawingml/2006/main">
+  <dgm:ptLst>
     <dgm:pt modelId="{C1268568-3361-421A-9004-9137023FFAF5}" type="doc">
       <dgm:prSet loTypeId="urn:microsoft.com/office/officeart/2009/3/layout/HorizontalOrganizationChart" loCatId="hierarchy" qsTypeId="urn:microsoft.com/office/officeart/2005/8/quickstyle/simple4" qsCatId="simple" csTypeId="urn:microsoft.com/office/officeart/2005/8/colors/colorful1" csCatId="colorful" phldr="1"/>
       <dgm:spPr/>
@@ -1284,6 +2316,338 @@
 </file>
 
 <file path=ppt/diagrams/drawing1.xml><?xml version="1.0" encoding="utf-8"?>
+<dsp:drawing xmlns:dgm="http://schemas.openxmlformats.org/drawingml/2006/diagram" xmlns:dsp="http://schemas.microsoft.com/office/drawing/2008/diagram" xmlns:a="http://schemas.openxmlformats.org/drawingml/2006/main">
+  <dsp:spTree>
+    <dsp:nvGrpSpPr>
+      <dsp:cNvPr id="0" name=""/>
+      <dsp:cNvGrpSpPr/>
+    </dsp:nvGrpSpPr>
+    <dsp:grpSpPr/>
+    <dsp:sp modelId="{FD6C78DC-C982-4EB8-B72C-CF9B927D7CD6}">
+      <dsp:nvSpPr>
+        <dsp:cNvPr id="0" name=""/>
+        <dsp:cNvSpPr/>
+      </dsp:nvSpPr>
+      <dsp:spPr>
+        <a:xfrm>
+          <a:off x="1976" y="1890210"/>
+          <a:ext cx="5495510" cy="1741263"/>
+        </a:xfrm>
+        <a:prstGeom prst="roundRect">
+          <a:avLst>
+            <a:gd name="adj" fmla="val 10000"/>
+          </a:avLst>
+        </a:prstGeom>
+        <a:solidFill>
+          <a:schemeClr val="accent1">
+            <a:hueOff val="0"/>
+            <a:satOff val="0"/>
+            <a:lumOff val="0"/>
+            <a:alphaOff val="0"/>
+          </a:schemeClr>
+        </a:solidFill>
+        <a:ln w="12700" cap="flat" cmpd="sng" algn="ctr">
+          <a:solidFill>
+            <a:schemeClr val="lt1">
+              <a:hueOff val="0"/>
+              <a:satOff val="0"/>
+              <a:lumOff val="0"/>
+              <a:alphaOff val="0"/>
+            </a:schemeClr>
+          </a:solidFill>
+          <a:prstDash val="solid"/>
+          <a:miter lim="800000"/>
+        </a:ln>
+        <a:effectLst/>
+      </dsp:spPr>
+      <dsp:style>
+        <a:lnRef idx="2">
+          <a:scrgbClr r="0" g="0" b="0"/>
+        </a:lnRef>
+        <a:fillRef idx="1">
+          <a:scrgbClr r="0" g="0" b="0"/>
+        </a:fillRef>
+        <a:effectRef idx="0">
+          <a:scrgbClr r="0" g="0" b="0"/>
+        </a:effectRef>
+        <a:fontRef idx="minor">
+          <a:schemeClr val="lt1"/>
+        </a:fontRef>
+      </dsp:style>
+      <dsp:txBody>
+        <a:bodyPr spcFirstLastPara="0" vert="horz" wrap="square" lIns="247650" tIns="247650" rIns="247650" bIns="247650" numCol="1" spcCol="1270" anchor="ctr" anchorCtr="0">
+          <a:noAutofit/>
+        </a:bodyPr>
+        <a:lstStyle/>
+        <a:p>
+          <a:pPr marL="0" lvl="0" indent="0" algn="ctr" defTabSz="2889250">
+            <a:lnSpc>
+              <a:spcPct val="90000"/>
+            </a:lnSpc>
+            <a:spcBef>
+              <a:spcPct val="0"/>
+            </a:spcBef>
+            <a:spcAft>
+              <a:spcPct val="35000"/>
+            </a:spcAft>
+            <a:buNone/>
+          </a:pPr>
+          <a:r>
+            <a:rPr lang="en-US" sz="6500" kern="1200" dirty="0"/>
+            <a:t>.NET Core CLI</a:t>
+          </a:r>
+        </a:p>
+      </dsp:txBody>
+      <dsp:txXfrm>
+        <a:off x="52976" y="1941210"/>
+        <a:ext cx="5393510" cy="1639263"/>
+      </dsp:txXfrm>
+    </dsp:sp>
+    <dsp:sp modelId="{D3C4656B-96C8-4C58-B394-BD787E9002E6}">
+      <dsp:nvSpPr>
+        <dsp:cNvPr id="0" name=""/>
+        <dsp:cNvSpPr/>
+      </dsp:nvSpPr>
+      <dsp:spPr>
+        <a:xfrm>
+          <a:off x="1976" y="639"/>
+          <a:ext cx="1734693" cy="1741263"/>
+        </a:xfrm>
+        <a:prstGeom prst="roundRect">
+          <a:avLst>
+            <a:gd name="adj" fmla="val 10000"/>
+          </a:avLst>
+        </a:prstGeom>
+        <a:solidFill>
+          <a:schemeClr val="accent1">
+            <a:hueOff val="0"/>
+            <a:satOff val="0"/>
+            <a:lumOff val="0"/>
+            <a:alphaOff val="0"/>
+          </a:schemeClr>
+        </a:solidFill>
+        <a:ln w="12700" cap="flat" cmpd="sng" algn="ctr">
+          <a:solidFill>
+            <a:schemeClr val="lt1">
+              <a:hueOff val="0"/>
+              <a:satOff val="0"/>
+              <a:lumOff val="0"/>
+              <a:alphaOff val="0"/>
+            </a:schemeClr>
+          </a:solidFill>
+          <a:prstDash val="solid"/>
+          <a:miter lim="800000"/>
+        </a:ln>
+        <a:effectLst/>
+      </dsp:spPr>
+      <dsp:style>
+        <a:lnRef idx="2">
+          <a:scrgbClr r="0" g="0" b="0"/>
+        </a:lnRef>
+        <a:fillRef idx="1">
+          <a:scrgbClr r="0" g="0" b="0"/>
+        </a:fillRef>
+        <a:effectRef idx="0">
+          <a:scrgbClr r="0" g="0" b="0"/>
+        </a:effectRef>
+        <a:fontRef idx="minor">
+          <a:schemeClr val="lt1"/>
+        </a:fontRef>
+      </dsp:style>
+      <dsp:txBody>
+        <a:bodyPr spcFirstLastPara="0" vert="horz" wrap="square" lIns="106680" tIns="106680" rIns="106680" bIns="106680" numCol="1" spcCol="1270" anchor="ctr" anchorCtr="0">
+          <a:noAutofit/>
+        </a:bodyPr>
+        <a:lstStyle/>
+        <a:p>
+          <a:pPr marL="0" lvl="0" indent="0" algn="ctr" defTabSz="1244600">
+            <a:lnSpc>
+              <a:spcPct val="90000"/>
+            </a:lnSpc>
+            <a:spcBef>
+              <a:spcPct val="0"/>
+            </a:spcBef>
+            <a:spcAft>
+              <a:spcPct val="35000"/>
+            </a:spcAft>
+            <a:buNone/>
+          </a:pPr>
+          <a:r>
+            <a:rPr lang="en-US" sz="2800" kern="1200" dirty="0"/>
+            <a:t>Visual Studio</a:t>
+          </a:r>
+        </a:p>
+      </dsp:txBody>
+      <dsp:txXfrm>
+        <a:off x="52783" y="51446"/>
+        <a:ext cx="1633079" cy="1639649"/>
+      </dsp:txXfrm>
+    </dsp:sp>
+    <dsp:sp modelId="{8779E483-D32A-45C6-AC38-689CFC31597C}">
+      <dsp:nvSpPr>
+        <dsp:cNvPr id="0" name=""/>
+        <dsp:cNvSpPr/>
+      </dsp:nvSpPr>
+      <dsp:spPr>
+        <a:xfrm>
+          <a:off x="1882384" y="639"/>
+          <a:ext cx="1734693" cy="1741263"/>
+        </a:xfrm>
+        <a:prstGeom prst="roundRect">
+          <a:avLst>
+            <a:gd name="adj" fmla="val 10000"/>
+          </a:avLst>
+        </a:prstGeom>
+        <a:solidFill>
+          <a:schemeClr val="accent1">
+            <a:hueOff val="0"/>
+            <a:satOff val="0"/>
+            <a:lumOff val="0"/>
+            <a:alphaOff val="0"/>
+          </a:schemeClr>
+        </a:solidFill>
+        <a:ln w="12700" cap="flat" cmpd="sng" algn="ctr">
+          <a:solidFill>
+            <a:schemeClr val="lt1">
+              <a:hueOff val="0"/>
+              <a:satOff val="0"/>
+              <a:lumOff val="0"/>
+              <a:alphaOff val="0"/>
+            </a:schemeClr>
+          </a:solidFill>
+          <a:prstDash val="solid"/>
+          <a:miter lim="800000"/>
+        </a:ln>
+        <a:effectLst/>
+      </dsp:spPr>
+      <dsp:style>
+        <a:lnRef idx="2">
+          <a:scrgbClr r="0" g="0" b="0"/>
+        </a:lnRef>
+        <a:fillRef idx="1">
+          <a:scrgbClr r="0" g="0" b="0"/>
+        </a:fillRef>
+        <a:effectRef idx="0">
+          <a:scrgbClr r="0" g="0" b="0"/>
+        </a:effectRef>
+        <a:fontRef idx="minor">
+          <a:schemeClr val="lt1"/>
+        </a:fontRef>
+      </dsp:style>
+      <dsp:txBody>
+        <a:bodyPr spcFirstLastPara="0" vert="horz" wrap="square" lIns="106680" tIns="106680" rIns="106680" bIns="106680" numCol="1" spcCol="1270" anchor="ctr" anchorCtr="0">
+          <a:noAutofit/>
+        </a:bodyPr>
+        <a:lstStyle/>
+        <a:p>
+          <a:pPr marL="0" lvl="0" indent="0" algn="ctr" defTabSz="1244600">
+            <a:lnSpc>
+              <a:spcPct val="90000"/>
+            </a:lnSpc>
+            <a:spcBef>
+              <a:spcPct val="0"/>
+            </a:spcBef>
+            <a:spcAft>
+              <a:spcPct val="35000"/>
+            </a:spcAft>
+            <a:buNone/>
+          </a:pPr>
+          <a:r>
+            <a:rPr lang="en-US" sz="2800" kern="1200" dirty="0"/>
+            <a:t>Visual Studio for Mac</a:t>
+          </a:r>
+        </a:p>
+      </dsp:txBody>
+      <dsp:txXfrm>
+        <a:off x="1933191" y="51446"/>
+        <a:ext cx="1633079" cy="1639649"/>
+      </dsp:txXfrm>
+    </dsp:sp>
+    <dsp:sp modelId="{B0680C6A-DDE6-42F5-9A21-72816797E8DA}">
+      <dsp:nvSpPr>
+        <dsp:cNvPr id="0" name=""/>
+        <dsp:cNvSpPr/>
+      </dsp:nvSpPr>
+      <dsp:spPr>
+        <a:xfrm>
+          <a:off x="3762792" y="639"/>
+          <a:ext cx="1734693" cy="1741263"/>
+        </a:xfrm>
+        <a:prstGeom prst="roundRect">
+          <a:avLst>
+            <a:gd name="adj" fmla="val 10000"/>
+          </a:avLst>
+        </a:prstGeom>
+        <a:solidFill>
+          <a:schemeClr val="accent1">
+            <a:hueOff val="0"/>
+            <a:satOff val="0"/>
+            <a:lumOff val="0"/>
+            <a:alphaOff val="0"/>
+          </a:schemeClr>
+        </a:solidFill>
+        <a:ln w="12700" cap="flat" cmpd="sng" algn="ctr">
+          <a:solidFill>
+            <a:schemeClr val="lt1">
+              <a:hueOff val="0"/>
+              <a:satOff val="0"/>
+              <a:lumOff val="0"/>
+              <a:alphaOff val="0"/>
+            </a:schemeClr>
+          </a:solidFill>
+          <a:prstDash val="solid"/>
+          <a:miter lim="800000"/>
+        </a:ln>
+        <a:effectLst/>
+      </dsp:spPr>
+      <dsp:style>
+        <a:lnRef idx="2">
+          <a:scrgbClr r="0" g="0" b="0"/>
+        </a:lnRef>
+        <a:fillRef idx="1">
+          <a:scrgbClr r="0" g="0" b="0"/>
+        </a:fillRef>
+        <a:effectRef idx="0">
+          <a:scrgbClr r="0" g="0" b="0"/>
+        </a:effectRef>
+        <a:fontRef idx="minor">
+          <a:schemeClr val="lt1"/>
+        </a:fontRef>
+      </dsp:style>
+      <dsp:txBody>
+        <a:bodyPr spcFirstLastPara="0" vert="horz" wrap="square" lIns="106680" tIns="106680" rIns="106680" bIns="106680" numCol="1" spcCol="1270" anchor="ctr" anchorCtr="0">
+          <a:noAutofit/>
+        </a:bodyPr>
+        <a:lstStyle/>
+        <a:p>
+          <a:pPr marL="0" lvl="0" indent="0" algn="ctr" defTabSz="1244600">
+            <a:lnSpc>
+              <a:spcPct val="90000"/>
+            </a:lnSpc>
+            <a:spcBef>
+              <a:spcPct val="0"/>
+            </a:spcBef>
+            <a:spcAft>
+              <a:spcPct val="35000"/>
+            </a:spcAft>
+            <a:buNone/>
+          </a:pPr>
+          <a:r>
+            <a:rPr lang="en-US" sz="2800" kern="1200" dirty="0"/>
+            <a:t>Visual Studio Code</a:t>
+          </a:r>
+        </a:p>
+      </dsp:txBody>
+      <dsp:txXfrm>
+        <a:off x="3813599" y="51446"/>
+        <a:ext cx="1633079" cy="1639649"/>
+      </dsp:txXfrm>
+    </dsp:sp>
+  </dsp:spTree>
+</dsp:drawing>
+</file>
+
+<file path=ppt/diagrams/drawing2.xml><?xml version="1.0" encoding="utf-8"?>
 <dsp:drawing xmlns:dgm="http://schemas.openxmlformats.org/drawingml/2006/diagram" xmlns:dsp="http://schemas.microsoft.com/office/drawing/2008/diagram" xmlns:a="http://schemas.openxmlformats.org/drawingml/2006/main">
   <dsp:spTree>
     <dsp:nvGrpSpPr>
@@ -1502,6 +2866,529 @@
 </file>
 
 <file path=ppt/diagrams/layout1.xml><?xml version="1.0" encoding="utf-8"?>
+<dgm:layoutDef xmlns:dgm="http://schemas.openxmlformats.org/drawingml/2006/diagram" xmlns:a="http://schemas.openxmlformats.org/drawingml/2006/main" uniqueId="urn:microsoft.com/office/officeart/2005/8/layout/architecture">
+  <dgm:title val="Architecture Layout"/>
+  <dgm:desc val="Use to show hierarchical relationships that build from the bottom up. This layout works well for showing architectural components or objects that build on other objects."/>
+  <dgm:catLst>
+    <dgm:cat type="hierarchy" pri="4500"/>
+    <dgm:cat type="list" pri="24500"/>
+    <dgm:cat type="relationship" pri="10500"/>
+    <dgm:cat type="officeonline" pri="7000"/>
+  </dgm:catLst>
+  <dgm:sampData>
+    <dgm:dataModel>
+      <dgm:ptLst>
+        <dgm:pt modelId="0" type="doc"/>
+        <dgm:pt modelId="1">
+          <dgm:prSet phldr="1"/>
+        </dgm:pt>
+        <dgm:pt modelId="2">
+          <dgm:prSet phldr="1"/>
+        </dgm:pt>
+        <dgm:pt modelId="21">
+          <dgm:prSet phldr="1"/>
+        </dgm:pt>
+        <dgm:pt modelId="22">
+          <dgm:prSet phldr="1"/>
+        </dgm:pt>
+        <dgm:pt modelId="3">
+          <dgm:prSet phldr="1"/>
+        </dgm:pt>
+        <dgm:pt modelId="31">
+          <dgm:prSet phldr="1"/>
+        </dgm:pt>
+      </dgm:ptLst>
+      <dgm:cxnLst>
+        <dgm:cxn modelId="4" srcId="0" destId="1" srcOrd="0" destOrd="0"/>
+        <dgm:cxn modelId="5" srcId="1" destId="2" srcOrd="0" destOrd="0"/>
+        <dgm:cxn modelId="6" srcId="1" destId="3" srcOrd="1" destOrd="0"/>
+        <dgm:cxn modelId="23" srcId="2" destId="21" srcOrd="0" destOrd="0"/>
+        <dgm:cxn modelId="24" srcId="2" destId="22" srcOrd="1" destOrd="0"/>
+        <dgm:cxn modelId="33" srcId="3" destId="31" srcOrd="0" destOrd="0"/>
+      </dgm:cxnLst>
+      <dgm:bg/>
+      <dgm:whole/>
+    </dgm:dataModel>
+  </dgm:sampData>
+  <dgm:styleData>
+    <dgm:dataModel>
+      <dgm:ptLst>
+        <dgm:pt modelId="0" type="doc"/>
+        <dgm:pt modelId="1"/>
+        <dgm:pt modelId="11"/>
+        <dgm:pt modelId="12"/>
+      </dgm:ptLst>
+      <dgm:cxnLst>
+        <dgm:cxn modelId="2" srcId="0" destId="1" srcOrd="0" destOrd="0"/>
+        <dgm:cxn modelId="13" srcId="1" destId="11" srcOrd="0" destOrd="0"/>
+        <dgm:cxn modelId="14" srcId="1" destId="12" srcOrd="1" destOrd="0"/>
+      </dgm:cxnLst>
+      <dgm:bg/>
+      <dgm:whole/>
+    </dgm:dataModel>
+  </dgm:styleData>
+  <dgm:clrData>
+    <dgm:dataModel>
+      <dgm:ptLst>
+        <dgm:pt modelId="0" type="doc"/>
+        <dgm:pt modelId="1"/>
+        <dgm:pt modelId="2"/>
+        <dgm:pt modelId="21"/>
+        <dgm:pt modelId="211"/>
+        <dgm:pt modelId="3"/>
+        <dgm:pt modelId="31"/>
+        <dgm:pt modelId="311"/>
+      </dgm:ptLst>
+      <dgm:cxnLst>
+        <dgm:cxn modelId="4" srcId="0" destId="1" srcOrd="0" destOrd="0"/>
+        <dgm:cxn modelId="5" srcId="1" destId="2" srcOrd="0" destOrd="0"/>
+        <dgm:cxn modelId="6" srcId="1" destId="3" srcOrd="1" destOrd="0"/>
+        <dgm:cxn modelId="23" srcId="2" destId="21" srcOrd="0" destOrd="0"/>
+        <dgm:cxn modelId="24" srcId="21" destId="211" srcOrd="0" destOrd="0"/>
+        <dgm:cxn modelId="33" srcId="3" destId="31" srcOrd="0" destOrd="0"/>
+        <dgm:cxn modelId="34" srcId="31" destId="311" srcOrd="0" destOrd="0"/>
+      </dgm:cxnLst>
+      <dgm:bg/>
+      <dgm:whole/>
+    </dgm:dataModel>
+  </dgm:clrData>
+  <dgm:layoutNode name="Name0">
+    <dgm:varLst>
+      <dgm:chPref val="1"/>
+      <dgm:dir/>
+      <dgm:animOne val="branch"/>
+      <dgm:animLvl val="lvl"/>
+      <dgm:resizeHandles/>
+    </dgm:varLst>
+    <dgm:choose name="Name1">
+      <dgm:if name="Name2" func="var" arg="dir" op="equ" val="norm">
+        <dgm:alg type="lin">
+          <dgm:param type="linDir" val="fromL"/>
+          <dgm:param type="nodeVertAlign" val="b"/>
+        </dgm:alg>
+      </dgm:if>
+      <dgm:else name="Name3">
+        <dgm:alg type="lin">
+          <dgm:param type="linDir" val="fromR"/>
+          <dgm:param type="nodeVertAlign" val="b"/>
+        </dgm:alg>
+      </dgm:else>
+    </dgm:choose>
+    <dgm:shape xmlns:r="http://schemas.openxmlformats.org/officeDocument/2006/relationships" r:blip="">
+      <dgm:adjLst/>
+    </dgm:shape>
+    <dgm:presOf/>
+    <dgm:constrLst>
+      <dgm:constr type="w" for="ch" forName="vertOne" refType="w"/>
+      <dgm:constr type="w" for="des" forName="horzOne" refType="w"/>
+      <dgm:constr type="w" for="des" forName="txOne" refType="w"/>
+      <dgm:constr type="w" for="des" forName="vertTwo" refType="w"/>
+      <dgm:constr type="w" for="des" forName="horzTwo" refType="w"/>
+      <dgm:constr type="w" for="des" forName="txTwo" refType="w"/>
+      <dgm:constr type="w" for="des" forName="vertThree" refType="w"/>
+      <dgm:constr type="w" for="des" forName="horzThree" refType="w"/>
+      <dgm:constr type="w" for="des" forName="txThree" refType="w"/>
+      <dgm:constr type="w" for="des" forName="vertFour" refType="w"/>
+      <dgm:constr type="w" for="des" forName="horzFour" refType="w"/>
+      <dgm:constr type="w" for="des" forName="txFour" refType="w"/>
+      <dgm:constr type="h" for="des" ptType="node" op="equ"/>
+      <dgm:constr type="h" for="des" forName="txOne" refType="h"/>
+      <dgm:constr type="userH" for="des" ptType="node" refType="h" refFor="des" refForName="txOne"/>
+      <dgm:constr type="primFontSz" for="des" forName="txOne" val="65"/>
+      <dgm:constr type="primFontSz" for="des" forName="txTwo" val="65"/>
+      <dgm:constr type="primFontSz" for="des" forName="txTwo" refType="primFontSz" refFor="des" refForName="txOne" op="lte"/>
+      <dgm:constr type="primFontSz" for="des" forName="txThree" val="65"/>
+      <dgm:constr type="primFontSz" for="des" forName="txThree" refType="primFontSz" refFor="des" refForName="txOne" op="lte"/>
+      <dgm:constr type="primFontSz" for="des" forName="txThree" refType="primFontSz" refFor="des" refForName="txTwo" op="lte"/>
+      <dgm:constr type="primFontSz" for="des" forName="txFour" val="65"/>
+      <dgm:constr type="primFontSz" for="des" forName="txFour" refType="primFontSz" refFor="des" refForName="txOne" op="lte"/>
+      <dgm:constr type="primFontSz" for="des" forName="txFour" refType="primFontSz" refFor="des" refForName="txTwo" op="lte"/>
+      <dgm:constr type="primFontSz" for="des" forName="txFour" refType="primFontSz" refFor="des" refForName="txThree" op="lte"/>
+      <dgm:constr type="w" for="des" forName="sibSpaceOne" refType="w" fact="0.168"/>
+      <dgm:constr type="w" for="des" forName="sibSpaceTwo" refType="w" refFor="des" refForName="sibSpaceOne" op="equ" fact="0.5"/>
+      <dgm:constr type="w" for="des" forName="sibSpaceThree" refType="w" refFor="des" refForName="sibSpaceTwo" op="equ" fact="0.5"/>
+      <dgm:constr type="w" for="des" forName="sibSpaceFour" refType="w" refFor="des" refForName="sibSpaceThree" op="equ" fact="0.5"/>
+      <dgm:constr type="h" for="des" forName="parTransOne" refType="w" fact="0.056"/>
+      <dgm:constr type="h" for="des" forName="parTransTwo" refType="h" refFor="des" refForName="parTransOne" op="equ"/>
+      <dgm:constr type="h" for="des" forName="parTransThree" refType="h" refFor="des" refForName="parTransTwo" op="equ"/>
+      <dgm:constr type="h" for="des" forName="parTransFour" refType="h" refFor="des" refForName="parTransThree" op="equ"/>
+    </dgm:constrLst>
+    <dgm:ruleLst/>
+    <dgm:forEach name="Name4" axis="ch" ptType="node">
+      <dgm:layoutNode name="vertOne">
+        <dgm:alg type="lin">
+          <dgm:param type="linDir" val="fromB"/>
+        </dgm:alg>
+        <dgm:shape xmlns:r="http://schemas.openxmlformats.org/officeDocument/2006/relationships" r:blip="">
+          <dgm:adjLst/>
+        </dgm:shape>
+        <dgm:presOf/>
+        <dgm:constrLst>
+          <dgm:constr type="w" for="ch" forName="txOne" refType="w" refFor="ch" refForName="horzOne" op="gte"/>
+        </dgm:constrLst>
+        <dgm:ruleLst/>
+        <dgm:layoutNode name="txOne" styleLbl="node0">
+          <dgm:varLst>
+            <dgm:chPref val="3"/>
+          </dgm:varLst>
+          <dgm:alg type="tx"/>
+          <dgm:shape xmlns:r="http://schemas.openxmlformats.org/officeDocument/2006/relationships" type="roundRect" r:blip="">
+            <dgm:adjLst>
+              <dgm:adj idx="1" val="0.1"/>
+            </dgm:adjLst>
+          </dgm:shape>
+          <dgm:presOf axis="self"/>
+          <dgm:constrLst>
+            <dgm:constr type="tMarg" refType="primFontSz" fact="0.3"/>
+            <dgm:constr type="bMarg" refType="primFontSz" fact="0.3"/>
+            <dgm:constr type="lMarg" refType="primFontSz" fact="0.3"/>
+            <dgm:constr type="rMarg" refType="primFontSz" fact="0.3"/>
+          </dgm:constrLst>
+          <dgm:ruleLst>
+            <dgm:rule type="primFontSz" val="5" fact="NaN" max="NaN"/>
+          </dgm:ruleLst>
+        </dgm:layoutNode>
+        <dgm:choose name="Name5">
+          <dgm:if name="Name6" axis="des" ptType="node" func="cnt" op="gt" val="0">
+            <dgm:layoutNode name="parTransOne">
+              <dgm:alg type="sp"/>
+              <dgm:shape xmlns:r="http://schemas.openxmlformats.org/officeDocument/2006/relationships" r:blip="">
+                <dgm:adjLst/>
+              </dgm:shape>
+              <dgm:presOf/>
+              <dgm:constrLst/>
+              <dgm:ruleLst/>
+            </dgm:layoutNode>
+          </dgm:if>
+          <dgm:else name="Name7"/>
+        </dgm:choose>
+        <dgm:layoutNode name="horzOne">
+          <dgm:choose name="Name8">
+            <dgm:if name="Name9" func="var" arg="dir" op="equ" val="norm">
+              <dgm:alg type="lin">
+                <dgm:param type="linDir" val="fromL"/>
+                <dgm:param type="nodeVertAlign" val="b"/>
+              </dgm:alg>
+            </dgm:if>
+            <dgm:else name="Name10">
+              <dgm:alg type="lin">
+                <dgm:param type="linDir" val="fromR"/>
+                <dgm:param type="nodeVertAlign" val="b"/>
+              </dgm:alg>
+            </dgm:else>
+          </dgm:choose>
+          <dgm:shape xmlns:r="http://schemas.openxmlformats.org/officeDocument/2006/relationships" r:blip="">
+            <dgm:adjLst/>
+          </dgm:shape>
+          <dgm:presOf/>
+          <dgm:constrLst/>
+          <dgm:ruleLst>
+            <dgm:rule type="w" val="INF" fact="NaN" max="NaN"/>
+          </dgm:ruleLst>
+          <dgm:forEach name="Name11" axis="ch" ptType="node">
+            <dgm:layoutNode name="vertTwo">
+              <dgm:alg type="lin">
+                <dgm:param type="linDir" val="fromB"/>
+              </dgm:alg>
+              <dgm:shape xmlns:r="http://schemas.openxmlformats.org/officeDocument/2006/relationships" r:blip="">
+                <dgm:adjLst/>
+              </dgm:shape>
+              <dgm:presOf/>
+              <dgm:constrLst>
+                <dgm:constr type="w" for="ch" forName="txTwo" refType="w" refFor="ch" refForName="horzTwo" op="gte"/>
+              </dgm:constrLst>
+              <dgm:ruleLst/>
+              <dgm:layoutNode name="txTwo">
+                <dgm:varLst>
+                  <dgm:chPref val="3"/>
+                </dgm:varLst>
+                <dgm:alg type="tx"/>
+                <dgm:shape xmlns:r="http://schemas.openxmlformats.org/officeDocument/2006/relationships" type="roundRect" r:blip="">
+                  <dgm:adjLst>
+                    <dgm:adj idx="1" val="0.1"/>
+                  </dgm:adjLst>
+                </dgm:shape>
+                <dgm:presOf axis="self"/>
+                <dgm:constrLst>
+                  <dgm:constr type="userH"/>
+                  <dgm:constr type="h" refType="userH"/>
+                  <dgm:constr type="tMarg" refType="primFontSz" fact="0.3"/>
+                  <dgm:constr type="bMarg" refType="primFontSz" fact="0.3"/>
+                  <dgm:constr type="lMarg" refType="primFontSz" fact="0.3"/>
+                  <dgm:constr type="rMarg" refType="primFontSz" fact="0.3"/>
+                </dgm:constrLst>
+                <dgm:ruleLst>
+                  <dgm:rule type="primFontSz" val="5" fact="NaN" max="NaN"/>
+                </dgm:ruleLst>
+              </dgm:layoutNode>
+              <dgm:choose name="Name12">
+                <dgm:if name="Name13" axis="des" ptType="node" func="cnt" op="gt" val="0">
+                  <dgm:layoutNode name="parTransTwo">
+                    <dgm:alg type="sp"/>
+                    <dgm:shape xmlns:r="http://schemas.openxmlformats.org/officeDocument/2006/relationships" r:blip="">
+                      <dgm:adjLst/>
+                    </dgm:shape>
+                    <dgm:presOf/>
+                    <dgm:constrLst/>
+                    <dgm:ruleLst/>
+                  </dgm:layoutNode>
+                </dgm:if>
+                <dgm:else name="Name14"/>
+              </dgm:choose>
+              <dgm:layoutNode name="horzTwo">
+                <dgm:choose name="Name15">
+                  <dgm:if name="Name16" func="var" arg="dir" op="equ" val="norm">
+                    <dgm:alg type="lin">
+                      <dgm:param type="linDir" val="fromL"/>
+                      <dgm:param type="nodeVertAlign" val="b"/>
+                    </dgm:alg>
+                  </dgm:if>
+                  <dgm:else name="Name17">
+                    <dgm:alg type="lin">
+                      <dgm:param type="linDir" val="fromR"/>
+                      <dgm:param type="nodeVertAlign" val="b"/>
+                    </dgm:alg>
+                  </dgm:else>
+                </dgm:choose>
+                <dgm:shape xmlns:r="http://schemas.openxmlformats.org/officeDocument/2006/relationships" r:blip="">
+                  <dgm:adjLst/>
+                </dgm:shape>
+                <dgm:presOf/>
+                <dgm:constrLst/>
+                <dgm:ruleLst>
+                  <dgm:rule type="w" val="INF" fact="NaN" max="NaN"/>
+                </dgm:ruleLst>
+                <dgm:forEach name="Name18" axis="ch" ptType="node">
+                  <dgm:layoutNode name="vertThree">
+                    <dgm:alg type="lin">
+                      <dgm:param type="linDir" val="fromB"/>
+                    </dgm:alg>
+                    <dgm:shape xmlns:r="http://schemas.openxmlformats.org/officeDocument/2006/relationships" r:blip="">
+                      <dgm:adjLst/>
+                    </dgm:shape>
+                    <dgm:presOf/>
+                    <dgm:constrLst>
+                      <dgm:constr type="w" for="ch" forName="txThree" refType="w" refFor="ch" refForName="horzThree" op="gte"/>
+                    </dgm:constrLst>
+                    <dgm:ruleLst/>
+                    <dgm:layoutNode name="txThree">
+                      <dgm:varLst>
+                        <dgm:chPref val="3"/>
+                      </dgm:varLst>
+                      <dgm:alg type="tx"/>
+                      <dgm:shape xmlns:r="http://schemas.openxmlformats.org/officeDocument/2006/relationships" type="roundRect" r:blip="">
+                        <dgm:adjLst>
+                          <dgm:adj idx="1" val="0.1"/>
+                        </dgm:adjLst>
+                      </dgm:shape>
+                      <dgm:presOf axis="self"/>
+                      <dgm:constrLst>
+                        <dgm:constr type="userH"/>
+                        <dgm:constr type="h" refType="userH"/>
+                        <dgm:constr type="tMarg" refType="primFontSz" fact="0.3"/>
+                        <dgm:constr type="bMarg" refType="primFontSz" fact="0.3"/>
+                        <dgm:constr type="lMarg" refType="primFontSz" fact="0.3"/>
+                        <dgm:constr type="rMarg" refType="primFontSz" fact="0.3"/>
+                      </dgm:constrLst>
+                      <dgm:ruleLst>
+                        <dgm:rule type="primFontSz" val="5" fact="NaN" max="NaN"/>
+                      </dgm:ruleLst>
+                    </dgm:layoutNode>
+                    <dgm:choose name="Name19">
+                      <dgm:if name="Name20" axis="des" ptType="node" func="cnt" op="gt" val="0">
+                        <dgm:layoutNode name="parTransThree">
+                          <dgm:alg type="sp"/>
+                          <dgm:shape xmlns:r="http://schemas.openxmlformats.org/officeDocument/2006/relationships" r:blip="">
+                            <dgm:adjLst/>
+                          </dgm:shape>
+                          <dgm:presOf/>
+                          <dgm:constrLst/>
+                          <dgm:ruleLst/>
+                        </dgm:layoutNode>
+                      </dgm:if>
+                      <dgm:else name="Name21"/>
+                    </dgm:choose>
+                    <dgm:layoutNode name="horzThree">
+                      <dgm:choose name="Name22">
+                        <dgm:if name="Name23" func="var" arg="dir" op="equ" val="norm">
+                          <dgm:alg type="lin">
+                            <dgm:param type="linDir" val="fromL"/>
+                            <dgm:param type="nodeVertAlign" val="b"/>
+                          </dgm:alg>
+                        </dgm:if>
+                        <dgm:else name="Name24">
+                          <dgm:alg type="lin">
+                            <dgm:param type="linDir" val="fromR"/>
+                            <dgm:param type="nodeVertAlign" val="b"/>
+                          </dgm:alg>
+                        </dgm:else>
+                      </dgm:choose>
+                      <dgm:shape xmlns:r="http://schemas.openxmlformats.org/officeDocument/2006/relationships" r:blip="">
+                        <dgm:adjLst/>
+                      </dgm:shape>
+                      <dgm:presOf/>
+                      <dgm:constrLst/>
+                      <dgm:ruleLst>
+                        <dgm:rule type="w" val="INF" fact="NaN" max="NaN"/>
+                      </dgm:ruleLst>
+                      <dgm:forEach name="repeat" axis="ch" ptType="node">
+                        <dgm:layoutNode name="vertFour">
+                          <dgm:varLst>
+                            <dgm:chPref val="3"/>
+                          </dgm:varLst>
+                          <dgm:alg type="lin">
+                            <dgm:param type="linDir" val="fromB"/>
+                          </dgm:alg>
+                          <dgm:shape xmlns:r="http://schemas.openxmlformats.org/officeDocument/2006/relationships" r:blip="">
+                            <dgm:adjLst/>
+                          </dgm:shape>
+                          <dgm:presOf/>
+                          <dgm:constrLst>
+                            <dgm:constr type="w" for="ch" forName="txFour" refType="w" refFor="ch" refForName="horzFour" op="gte"/>
+                          </dgm:constrLst>
+                          <dgm:ruleLst/>
+                          <dgm:layoutNode name="txFour">
+                            <dgm:varLst>
+                              <dgm:chPref val="3"/>
+                            </dgm:varLst>
+                            <dgm:alg type="tx"/>
+                            <dgm:shape xmlns:r="http://schemas.openxmlformats.org/officeDocument/2006/relationships" type="roundRect" r:blip="">
+                              <dgm:adjLst>
+                                <dgm:adj idx="1" val="0.1"/>
+                              </dgm:adjLst>
+                            </dgm:shape>
+                            <dgm:presOf axis="self"/>
+                            <dgm:constrLst>
+                              <dgm:constr type="userH"/>
+                              <dgm:constr type="h" refType="userH"/>
+                              <dgm:constr type="tMarg" refType="primFontSz" fact="0.3"/>
+                              <dgm:constr type="bMarg" refType="primFontSz" fact="0.3"/>
+                              <dgm:constr type="lMarg" refType="primFontSz" fact="0.3"/>
+                              <dgm:constr type="rMarg" refType="primFontSz" fact="0.3"/>
+                            </dgm:constrLst>
+                            <dgm:ruleLst>
+                              <dgm:rule type="primFontSz" val="5" fact="NaN" max="NaN"/>
+                            </dgm:ruleLst>
+                          </dgm:layoutNode>
+                          <dgm:choose name="Name25">
+                            <dgm:if name="Name26" axis="des" ptType="node" func="cnt" op="gt" val="0">
+                              <dgm:layoutNode name="parTransFour">
+                                <dgm:alg type="sp"/>
+                                <dgm:shape xmlns:r="http://schemas.openxmlformats.org/officeDocument/2006/relationships" r:blip="">
+                                  <dgm:adjLst/>
+                                </dgm:shape>
+                                <dgm:presOf/>
+                                <dgm:constrLst/>
+                                <dgm:ruleLst/>
+                              </dgm:layoutNode>
+                            </dgm:if>
+                            <dgm:else name="Name27"/>
+                          </dgm:choose>
+                          <dgm:layoutNode name="horzFour">
+                            <dgm:choose name="Name28">
+                              <dgm:if name="Name29" func="var" arg="dir" op="equ" val="norm">
+                                <dgm:alg type="lin">
+                                  <dgm:param type="linDir" val="fromL"/>
+                                  <dgm:param type="nodeVertAlign" val="b"/>
+                                </dgm:alg>
+                              </dgm:if>
+                              <dgm:else name="Name30">
+                                <dgm:alg type="lin">
+                                  <dgm:param type="linDir" val="fromR"/>
+                                  <dgm:param type="nodeVertAlign" val="b"/>
+                                </dgm:alg>
+                              </dgm:else>
+                            </dgm:choose>
+                            <dgm:shape xmlns:r="http://schemas.openxmlformats.org/officeDocument/2006/relationships" r:blip="">
+                              <dgm:adjLst/>
+                            </dgm:shape>
+                            <dgm:presOf/>
+                            <dgm:constrLst/>
+                            <dgm:ruleLst>
+                              <dgm:rule type="w" val="INF" fact="NaN" max="NaN"/>
+                            </dgm:ruleLst>
+                            <dgm:forEach name="Name31" ref="repeat"/>
+                          </dgm:layoutNode>
+                        </dgm:layoutNode>
+                        <dgm:choose name="Name32">
+                          <dgm:if name="Name33" axis="self" ptType="node" func="revPos" op="gte" val="2">
+                            <dgm:forEach name="Name34" axis="followSib" ptType="sibTrans" cnt="1">
+                              <dgm:layoutNode name="sibSpaceFour">
+                                <dgm:alg type="sp"/>
+                                <dgm:shape xmlns:r="http://schemas.openxmlformats.org/officeDocument/2006/relationships" r:blip="">
+                                  <dgm:adjLst/>
+                                </dgm:shape>
+                                <dgm:presOf/>
+                                <dgm:constrLst/>
+                                <dgm:ruleLst/>
+                              </dgm:layoutNode>
+                            </dgm:forEach>
+                          </dgm:if>
+                          <dgm:else name="Name35"/>
+                        </dgm:choose>
+                      </dgm:forEach>
+                    </dgm:layoutNode>
+                  </dgm:layoutNode>
+                  <dgm:choose name="Name36">
+                    <dgm:if name="Name37" axis="self" ptType="node" func="revPos" op="gte" val="2">
+                      <dgm:forEach name="Name38" axis="followSib" ptType="sibTrans" cnt="1">
+                        <dgm:layoutNode name="sibSpaceThree">
+                          <dgm:alg type="sp"/>
+                          <dgm:shape xmlns:r="http://schemas.openxmlformats.org/officeDocument/2006/relationships" r:blip="">
+                            <dgm:adjLst/>
+                          </dgm:shape>
+                          <dgm:presOf/>
+                          <dgm:constrLst/>
+                          <dgm:ruleLst/>
+                        </dgm:layoutNode>
+                      </dgm:forEach>
+                    </dgm:if>
+                    <dgm:else name="Name39"/>
+                  </dgm:choose>
+                </dgm:forEach>
+              </dgm:layoutNode>
+            </dgm:layoutNode>
+            <dgm:choose name="Name40">
+              <dgm:if name="Name41" axis="self" ptType="node" func="revPos" op="gte" val="2">
+                <dgm:forEach name="Name42" axis="followSib" ptType="sibTrans" cnt="1">
+                  <dgm:layoutNode name="sibSpaceTwo">
+                    <dgm:alg type="sp"/>
+                    <dgm:shape xmlns:r="http://schemas.openxmlformats.org/officeDocument/2006/relationships" r:blip="">
+                      <dgm:adjLst/>
+                    </dgm:shape>
+                    <dgm:presOf/>
+                    <dgm:constrLst/>
+                    <dgm:ruleLst/>
+                  </dgm:layoutNode>
+                </dgm:forEach>
+              </dgm:if>
+              <dgm:else name="Name43"/>
+            </dgm:choose>
+          </dgm:forEach>
+        </dgm:layoutNode>
+      </dgm:layoutNode>
+      <dgm:choose name="Name44">
+        <dgm:if name="Name45" axis="self" ptType="node" func="revPos" op="gte" val="2">
+          <dgm:forEach name="Name46" axis="followSib" ptType="sibTrans" cnt="1">
+            <dgm:layoutNode name="sibSpaceOne">
+              <dgm:alg type="sp"/>
+              <dgm:shape xmlns:r="http://schemas.openxmlformats.org/officeDocument/2006/relationships" r:blip="">
+                <dgm:adjLst/>
+              </dgm:shape>
+              <dgm:presOf/>
+              <dgm:constrLst/>
+              <dgm:ruleLst/>
+            </dgm:layoutNode>
+          </dgm:forEach>
+        </dgm:if>
+        <dgm:else name="Name47"/>
+      </dgm:choose>
+    </dgm:forEach>
+  </dgm:layoutNode>
+</dgm:layoutDef>
+</file>
+
+<file path=ppt/diagrams/layout2.xml><?xml version="1.0" encoding="utf-8"?>
 <dgm:layoutDef xmlns:dgm="http://schemas.openxmlformats.org/drawingml/2006/diagram" xmlns:a="http://schemas.openxmlformats.org/drawingml/2006/main" uniqueId="urn:microsoft.com/office/officeart/2009/3/layout/HorizontalOrganizationChart">
   <dgm:title val=""/>
   <dgm:desc val=""/>
@@ -2686,6 +4573,1040 @@
 </file>
 
 <file path=ppt/diagrams/quickStyle1.xml><?xml version="1.0" encoding="utf-8"?>
+<dgm:styleDef xmlns:dgm="http://schemas.openxmlformats.org/drawingml/2006/diagram" xmlns:a="http://schemas.openxmlformats.org/drawingml/2006/main" uniqueId="urn:microsoft.com/office/officeart/2005/8/quickstyle/simple1">
+  <dgm:title val=""/>
+  <dgm:desc val=""/>
+  <dgm:catLst>
+    <dgm:cat type="simple" pri="10100"/>
+  </dgm:catLst>
+  <dgm:scene3d>
+    <a:camera prst="orthographicFront"/>
+    <a:lightRig rig="threePt" dir="t"/>
+  </dgm:scene3d>
+  <dgm:styleLbl name="node0">
+    <dgm:scene3d>
+      <a:camera prst="orthographicFront"/>
+      <a:lightRig rig="threePt" dir="t"/>
+    </dgm:scene3d>
+    <dgm:sp3d/>
+    <dgm:txPr/>
+    <dgm:style>
+      <a:lnRef idx="2">
+        <a:scrgbClr r="0" g="0" b="0"/>
+      </a:lnRef>
+      <a:fillRef idx="1">
+        <a:scrgbClr r="0" g="0" b="0"/>
+      </a:fillRef>
+      <a:effectRef idx="0">
+        <a:scrgbClr r="0" g="0" b="0"/>
+      </a:effectRef>
+      <a:fontRef idx="minor">
+        <a:schemeClr val="lt1"/>
+      </a:fontRef>
+    </dgm:style>
+  </dgm:styleLbl>
+  <dgm:styleLbl name="lnNode1">
+    <dgm:scene3d>
+      <a:camera prst="orthographicFront"/>
+      <a:lightRig rig="threePt" dir="t"/>
+    </dgm:scene3d>
+    <dgm:sp3d/>
+    <dgm:txPr/>
+    <dgm:style>
+      <a:lnRef idx="2">
+        <a:scrgbClr r="0" g="0" b="0"/>
+      </a:lnRef>
+      <a:fillRef idx="1">
+        <a:scrgbClr r="0" g="0" b="0"/>
+      </a:fillRef>
+      <a:effectRef idx="0">
+        <a:scrgbClr r="0" g="0" b="0"/>
+      </a:effectRef>
+      <a:fontRef idx="minor">
+        <a:schemeClr val="lt1"/>
+      </a:fontRef>
+    </dgm:style>
+  </dgm:styleLbl>
+  <dgm:styleLbl name="vennNode1">
+    <dgm:scene3d>
+      <a:camera prst="orthographicFront"/>
+      <a:lightRig rig="threePt" dir="t"/>
+    </dgm:scene3d>
+    <dgm:sp3d/>
+    <dgm:txPr/>
+    <dgm:style>
+      <a:lnRef idx="2">
+        <a:scrgbClr r="0" g="0" b="0"/>
+      </a:lnRef>
+      <a:fillRef idx="1">
+        <a:scrgbClr r="0" g="0" b="0"/>
+      </a:fillRef>
+      <a:effectRef idx="0">
+        <a:scrgbClr r="0" g="0" b="0"/>
+      </a:effectRef>
+      <a:fontRef idx="minor">
+        <a:schemeClr val="tx1"/>
+      </a:fontRef>
+    </dgm:style>
+  </dgm:styleLbl>
+  <dgm:styleLbl name="alignNode1">
+    <dgm:scene3d>
+      <a:camera prst="orthographicFront"/>
+      <a:lightRig rig="threePt" dir="t"/>
+    </dgm:scene3d>
+    <dgm:sp3d/>
+    <dgm:txPr/>
+    <dgm:style>
+      <a:lnRef idx="2">
+        <a:scrgbClr r="0" g="0" b="0"/>
+      </a:lnRef>
+      <a:fillRef idx="1">
+        <a:scrgbClr r="0" g="0" b="0"/>
+      </a:fillRef>
+      <a:effectRef idx="0">
+        <a:scrgbClr r="0" g="0" b="0"/>
+      </a:effectRef>
+      <a:fontRef idx="minor">
+        <a:schemeClr val="lt1"/>
+      </a:fontRef>
+    </dgm:style>
+  </dgm:styleLbl>
+  <dgm:styleLbl name="node1">
+    <dgm:scene3d>
+      <a:camera prst="orthographicFront"/>
+      <a:lightRig rig="threePt" dir="t"/>
+    </dgm:scene3d>
+    <dgm:sp3d/>
+    <dgm:txPr/>
+    <dgm:style>
+      <a:lnRef idx="2">
+        <a:scrgbClr r="0" g="0" b="0"/>
+      </a:lnRef>
+      <a:fillRef idx="1">
+        <a:scrgbClr r="0" g="0" b="0"/>
+      </a:fillRef>
+      <a:effectRef idx="0">
+        <a:scrgbClr r="0" g="0" b="0"/>
+      </a:effectRef>
+      <a:fontRef idx="minor">
+        <a:schemeClr val="lt1"/>
+      </a:fontRef>
+    </dgm:style>
+  </dgm:styleLbl>
+  <dgm:styleLbl name="node2">
+    <dgm:scene3d>
+      <a:camera prst="orthographicFront"/>
+      <a:lightRig rig="threePt" dir="t"/>
+    </dgm:scene3d>
+    <dgm:sp3d/>
+    <dgm:txPr/>
+    <dgm:style>
+      <a:lnRef idx="2">
+        <a:scrgbClr r="0" g="0" b="0"/>
+      </a:lnRef>
+      <a:fillRef idx="1">
+        <a:scrgbClr r="0" g="0" b="0"/>
+      </a:fillRef>
+      <a:effectRef idx="0">
+        <a:scrgbClr r="0" g="0" b="0"/>
+      </a:effectRef>
+      <a:fontRef idx="minor">
+        <a:schemeClr val="lt1"/>
+      </a:fontRef>
+    </dgm:style>
+  </dgm:styleLbl>
+  <dgm:styleLbl name="node3">
+    <dgm:scene3d>
+      <a:camera prst="orthographicFront"/>
+      <a:lightRig rig="threePt" dir="t"/>
+    </dgm:scene3d>
+    <dgm:sp3d/>
+    <dgm:txPr/>
+    <dgm:style>
+      <a:lnRef idx="2">
+        <a:scrgbClr r="0" g="0" b="0"/>
+      </a:lnRef>
+      <a:fillRef idx="1">
+        <a:scrgbClr r="0" g="0" b="0"/>
+      </a:fillRef>
+      <a:effectRef idx="0">
+        <a:scrgbClr r="0" g="0" b="0"/>
+      </a:effectRef>
+      <a:fontRef idx="minor">
+        <a:schemeClr val="lt1"/>
+      </a:fontRef>
+    </dgm:style>
+  </dgm:styleLbl>
+  <dgm:styleLbl name="node4">
+    <dgm:scene3d>
+      <a:camera prst="orthographicFront"/>
+      <a:lightRig rig="threePt" dir="t"/>
+    </dgm:scene3d>
+    <dgm:sp3d/>
+    <dgm:txPr/>
+    <dgm:style>
+      <a:lnRef idx="2">
+        <a:scrgbClr r="0" g="0" b="0"/>
+      </a:lnRef>
+      <a:fillRef idx="1">
+        <a:scrgbClr r="0" g="0" b="0"/>
+      </a:fillRef>
+      <a:effectRef idx="0">
+        <a:scrgbClr r="0" g="0" b="0"/>
+      </a:effectRef>
+      <a:fontRef idx="minor">
+        <a:schemeClr val="lt1"/>
+      </a:fontRef>
+    </dgm:style>
+  </dgm:styleLbl>
+  <dgm:styleLbl name="fgImgPlace1">
+    <dgm:scene3d>
+      <a:camera prst="orthographicFront"/>
+      <a:lightRig rig="threePt" dir="t"/>
+    </dgm:scene3d>
+    <dgm:sp3d/>
+    <dgm:txPr/>
+    <dgm:style>
+      <a:lnRef idx="2">
+        <a:scrgbClr r="0" g="0" b="0"/>
+      </a:lnRef>
+      <a:fillRef idx="1">
+        <a:scrgbClr r="0" g="0" b="0"/>
+      </a:fillRef>
+      <a:effectRef idx="0">
+        <a:scrgbClr r="0" g="0" b="0"/>
+      </a:effectRef>
+      <a:fontRef idx="minor"/>
+    </dgm:style>
+  </dgm:styleLbl>
+  <dgm:styleLbl name="alignImgPlace1">
+    <dgm:scene3d>
+      <a:camera prst="orthographicFront"/>
+      <a:lightRig rig="threePt" dir="t"/>
+    </dgm:scene3d>
+    <dgm:sp3d/>
+    <dgm:txPr/>
+    <dgm:style>
+      <a:lnRef idx="2">
+        <a:scrgbClr r="0" g="0" b="0"/>
+      </a:lnRef>
+      <a:fillRef idx="1">
+        <a:scrgbClr r="0" g="0" b="0"/>
+      </a:fillRef>
+      <a:effectRef idx="0">
+        <a:scrgbClr r="0" g="0" b="0"/>
+      </a:effectRef>
+      <a:fontRef idx="minor"/>
+    </dgm:style>
+  </dgm:styleLbl>
+  <dgm:styleLbl name="bgImgPlace1">
+    <dgm:scene3d>
+      <a:camera prst="orthographicFront"/>
+      <a:lightRig rig="threePt" dir="t"/>
+    </dgm:scene3d>
+    <dgm:sp3d/>
+    <dgm:txPr/>
+    <dgm:style>
+      <a:lnRef idx="2">
+        <a:scrgbClr r="0" g="0" b="0"/>
+      </a:lnRef>
+      <a:fillRef idx="1">
+        <a:scrgbClr r="0" g="0" b="0"/>
+      </a:fillRef>
+      <a:effectRef idx="0">
+        <a:scrgbClr r="0" g="0" b="0"/>
+      </a:effectRef>
+      <a:fontRef idx="minor"/>
+    </dgm:style>
+  </dgm:styleLbl>
+  <dgm:styleLbl name="sibTrans2D1">
+    <dgm:scene3d>
+      <a:camera prst="orthographicFront"/>
+      <a:lightRig rig="threePt" dir="t"/>
+    </dgm:scene3d>
+    <dgm:sp3d/>
+    <dgm:txPr/>
+    <dgm:style>
+      <a:lnRef idx="0">
+        <a:scrgbClr r="0" g="0" b="0"/>
+      </a:lnRef>
+      <a:fillRef idx="1">
+        <a:scrgbClr r="0" g="0" b="0"/>
+      </a:fillRef>
+      <a:effectRef idx="0">
+        <a:scrgbClr r="0" g="0" b="0"/>
+      </a:effectRef>
+      <a:fontRef idx="minor">
+        <a:schemeClr val="lt1"/>
+      </a:fontRef>
+    </dgm:style>
+  </dgm:styleLbl>
+  <dgm:styleLbl name="fgSibTrans2D1">
+    <dgm:scene3d>
+      <a:camera prst="orthographicFront"/>
+      <a:lightRig rig="threePt" dir="t"/>
+    </dgm:scene3d>
+    <dgm:sp3d/>
+    <dgm:txPr/>
+    <dgm:style>
+      <a:lnRef idx="0">
+        <a:scrgbClr r="0" g="0" b="0"/>
+      </a:lnRef>
+      <a:fillRef idx="1">
+        <a:scrgbClr r="0" g="0" b="0"/>
+      </a:fillRef>
+      <a:effectRef idx="0">
+        <a:scrgbClr r="0" g="0" b="0"/>
+      </a:effectRef>
+      <a:fontRef idx="minor">
+        <a:schemeClr val="lt1"/>
+      </a:fontRef>
+    </dgm:style>
+  </dgm:styleLbl>
+  <dgm:styleLbl name="bgSibTrans2D1">
+    <dgm:scene3d>
+      <a:camera prst="orthographicFront"/>
+      <a:lightRig rig="threePt" dir="t"/>
+    </dgm:scene3d>
+    <dgm:sp3d/>
+    <dgm:txPr/>
+    <dgm:style>
+      <a:lnRef idx="0">
+        <a:scrgbClr r="0" g="0" b="0"/>
+      </a:lnRef>
+      <a:fillRef idx="1">
+        <a:scrgbClr r="0" g="0" b="0"/>
+      </a:fillRef>
+      <a:effectRef idx="0">
+        <a:scrgbClr r="0" g="0" b="0"/>
+      </a:effectRef>
+      <a:fontRef idx="minor">
+        <a:schemeClr val="lt1"/>
+      </a:fontRef>
+    </dgm:style>
+  </dgm:styleLbl>
+  <dgm:styleLbl name="sibTrans1D1">
+    <dgm:scene3d>
+      <a:camera prst="orthographicFront"/>
+      <a:lightRig rig="threePt" dir="t"/>
+    </dgm:scene3d>
+    <dgm:sp3d/>
+    <dgm:txPr/>
+    <dgm:style>
+      <a:lnRef idx="1">
+        <a:scrgbClr r="0" g="0" b="0"/>
+      </a:lnRef>
+      <a:fillRef idx="0">
+        <a:scrgbClr r="0" g="0" b="0"/>
+      </a:fillRef>
+      <a:effectRef idx="0">
+        <a:scrgbClr r="0" g="0" b="0"/>
+      </a:effectRef>
+      <a:fontRef idx="minor"/>
+    </dgm:style>
+  </dgm:styleLbl>
+  <dgm:styleLbl name="callout">
+    <dgm:scene3d>
+      <a:camera prst="orthographicFront"/>
+      <a:lightRig rig="threePt" dir="t"/>
+    </dgm:scene3d>
+    <dgm:sp3d/>
+    <dgm:txPr/>
+    <dgm:style>
+      <a:lnRef idx="2">
+        <a:scrgbClr r="0" g="0" b="0"/>
+      </a:lnRef>
+      <a:fillRef idx="1">
+        <a:scrgbClr r="0" g="0" b="0"/>
+      </a:fillRef>
+      <a:effectRef idx="0">
+        <a:scrgbClr r="0" g="0" b="0"/>
+      </a:effectRef>
+      <a:fontRef idx="minor"/>
+    </dgm:style>
+  </dgm:styleLbl>
+  <dgm:styleLbl name="asst0">
+    <dgm:scene3d>
+      <a:camera prst="orthographicFront"/>
+      <a:lightRig rig="threePt" dir="t"/>
+    </dgm:scene3d>
+    <dgm:sp3d/>
+    <dgm:txPr/>
+    <dgm:style>
+      <a:lnRef idx="2">
+        <a:scrgbClr r="0" g="0" b="0"/>
+      </a:lnRef>
+      <a:fillRef idx="1">
+        <a:scrgbClr r="0" g="0" b="0"/>
+      </a:fillRef>
+      <a:effectRef idx="0">
+        <a:scrgbClr r="0" g="0" b="0"/>
+      </a:effectRef>
+      <a:fontRef idx="minor">
+        <a:schemeClr val="lt1"/>
+      </a:fontRef>
+    </dgm:style>
+  </dgm:styleLbl>
+  <dgm:styleLbl name="asst1">
+    <dgm:scene3d>
+      <a:camera prst="orthographicFront"/>
+      <a:lightRig rig="threePt" dir="t"/>
+    </dgm:scene3d>
+    <dgm:sp3d/>
+    <dgm:txPr/>
+    <dgm:style>
+      <a:lnRef idx="2">
+        <a:scrgbClr r="0" g="0" b="0"/>
+      </a:lnRef>
+      <a:fillRef idx="1">
+        <a:scrgbClr r="0" g="0" b="0"/>
+      </a:fillRef>
+      <a:effectRef idx="0">
+        <a:scrgbClr r="0" g="0" b="0"/>
+      </a:effectRef>
+      <a:fontRef idx="minor">
+        <a:schemeClr val="lt1"/>
+      </a:fontRef>
+    </dgm:style>
+  </dgm:styleLbl>
+  <dgm:styleLbl name="asst2">
+    <dgm:scene3d>
+      <a:camera prst="orthographicFront"/>
+      <a:lightRig rig="threePt" dir="t"/>
+    </dgm:scene3d>
+    <dgm:sp3d/>
+    <dgm:txPr/>
+    <dgm:style>
+      <a:lnRef idx="2">
+        <a:scrgbClr r="0" g="0" b="0"/>
+      </a:lnRef>
+      <a:fillRef idx="1">
+        <a:scrgbClr r="0" g="0" b="0"/>
+      </a:fillRef>
+      <a:effectRef idx="0">
+        <a:scrgbClr r="0" g="0" b="0"/>
+      </a:effectRef>
+      <a:fontRef idx="minor">
+        <a:schemeClr val="lt1"/>
+      </a:fontRef>
+    </dgm:style>
+  </dgm:styleLbl>
+  <dgm:styleLbl name="asst3">
+    <dgm:scene3d>
+      <a:camera prst="orthographicFront"/>
+      <a:lightRig rig="threePt" dir="t"/>
+    </dgm:scene3d>
+    <dgm:sp3d/>
+    <dgm:txPr/>
+    <dgm:style>
+      <a:lnRef idx="2">
+        <a:scrgbClr r="0" g="0" b="0"/>
+      </a:lnRef>
+      <a:fillRef idx="1">
+        <a:scrgbClr r="0" g="0" b="0"/>
+      </a:fillRef>
+      <a:effectRef idx="0">
+        <a:scrgbClr r="0" g="0" b="0"/>
+      </a:effectRef>
+      <a:fontRef idx="minor">
+        <a:schemeClr val="lt1"/>
+      </a:fontRef>
+    </dgm:style>
+  </dgm:styleLbl>
+  <dgm:styleLbl name="asst4">
+    <dgm:scene3d>
+      <a:camera prst="orthographicFront"/>
+      <a:lightRig rig="threePt" dir="t"/>
+    </dgm:scene3d>
+    <dgm:sp3d/>
+    <dgm:txPr/>
+    <dgm:style>
+      <a:lnRef idx="2">
+        <a:scrgbClr r="0" g="0" b="0"/>
+      </a:lnRef>
+      <a:fillRef idx="1">
+        <a:scrgbClr r="0" g="0" b="0"/>
+      </a:fillRef>
+      <a:effectRef idx="0">
+        <a:scrgbClr r="0" g="0" b="0"/>
+      </a:effectRef>
+      <a:fontRef idx="minor">
+        <a:schemeClr val="lt1"/>
+      </a:fontRef>
+    </dgm:style>
+  </dgm:styleLbl>
+  <dgm:styleLbl name="parChTrans2D1">
+    <dgm:scene3d>
+      <a:camera prst="orthographicFront"/>
+      <a:lightRig rig="threePt" dir="t"/>
+    </dgm:scene3d>
+    <dgm:sp3d/>
+    <dgm:txPr/>
+    <dgm:style>
+      <a:lnRef idx="2">
+        <a:scrgbClr r="0" g="0" b="0"/>
+      </a:lnRef>
+      <a:fillRef idx="1">
+        <a:scrgbClr r="0" g="0" b="0"/>
+      </a:fillRef>
+      <a:effectRef idx="0">
+        <a:scrgbClr r="0" g="0" b="0"/>
+      </a:effectRef>
+      <a:fontRef idx="minor">
+        <a:schemeClr val="lt1"/>
+      </a:fontRef>
+    </dgm:style>
+  </dgm:styleLbl>
+  <dgm:styleLbl name="parChTrans2D2">
+    <dgm:scene3d>
+      <a:camera prst="orthographicFront"/>
+      <a:lightRig rig="threePt" dir="t"/>
+    </dgm:scene3d>
+    <dgm:sp3d/>
+    <dgm:txPr/>
+    <dgm:style>
+      <a:lnRef idx="2">
+        <a:scrgbClr r="0" g="0" b="0"/>
+      </a:lnRef>
+      <a:fillRef idx="1">
+        <a:scrgbClr r="0" g="0" b="0"/>
+      </a:fillRef>
+      <a:effectRef idx="0">
+        <a:scrgbClr r="0" g="0" b="0"/>
+      </a:effectRef>
+      <a:fontRef idx="minor">
+        <a:schemeClr val="lt1"/>
+      </a:fontRef>
+    </dgm:style>
+  </dgm:styleLbl>
+  <dgm:styleLbl name="parChTrans2D3">
+    <dgm:scene3d>
+      <a:camera prst="orthographicFront"/>
+      <a:lightRig rig="threePt" dir="t"/>
+    </dgm:scene3d>
+    <dgm:sp3d/>
+    <dgm:txPr/>
+    <dgm:style>
+      <a:lnRef idx="2">
+        <a:scrgbClr r="0" g="0" b="0"/>
+      </a:lnRef>
+      <a:fillRef idx="1">
+        <a:scrgbClr r="0" g="0" b="0"/>
+      </a:fillRef>
+      <a:effectRef idx="0">
+        <a:scrgbClr r="0" g="0" b="0"/>
+      </a:effectRef>
+      <a:fontRef idx="minor">
+        <a:schemeClr val="lt1"/>
+      </a:fontRef>
+    </dgm:style>
+  </dgm:styleLbl>
+  <dgm:styleLbl name="parChTrans2D4">
+    <dgm:scene3d>
+      <a:camera prst="orthographicFront"/>
+      <a:lightRig rig="threePt" dir="t"/>
+    </dgm:scene3d>
+    <dgm:sp3d/>
+    <dgm:txPr/>
+    <dgm:style>
+      <a:lnRef idx="2">
+        <a:scrgbClr r="0" g="0" b="0"/>
+      </a:lnRef>
+      <a:fillRef idx="1">
+        <a:scrgbClr r="0" g="0" b="0"/>
+      </a:fillRef>
+      <a:effectRef idx="0">
+        <a:scrgbClr r="0" g="0" b="0"/>
+      </a:effectRef>
+      <a:fontRef idx="minor">
+        <a:schemeClr val="lt1"/>
+      </a:fontRef>
+    </dgm:style>
+  </dgm:styleLbl>
+  <dgm:styleLbl name="parChTrans1D1">
+    <dgm:scene3d>
+      <a:camera prst="orthographicFront"/>
+      <a:lightRig rig="threePt" dir="t"/>
+    </dgm:scene3d>
+    <dgm:sp3d/>
+    <dgm:txPr/>
+    <dgm:style>
+      <a:lnRef idx="2">
+        <a:scrgbClr r="0" g="0" b="0"/>
+      </a:lnRef>
+      <a:fillRef idx="0">
+        <a:scrgbClr r="0" g="0" b="0"/>
+      </a:fillRef>
+      <a:effectRef idx="0">
+        <a:scrgbClr r="0" g="0" b="0"/>
+      </a:effectRef>
+      <a:fontRef idx="minor"/>
+    </dgm:style>
+  </dgm:styleLbl>
+  <dgm:styleLbl name="parChTrans1D2">
+    <dgm:scene3d>
+      <a:camera prst="orthographicFront"/>
+      <a:lightRig rig="threePt" dir="t"/>
+    </dgm:scene3d>
+    <dgm:sp3d/>
+    <dgm:txPr/>
+    <dgm:style>
+      <a:lnRef idx="2">
+        <a:scrgbClr r="0" g="0" b="0"/>
+      </a:lnRef>
+      <a:fillRef idx="0">
+        <a:scrgbClr r="0" g="0" b="0"/>
+      </a:fillRef>
+      <a:effectRef idx="0">
+        <a:scrgbClr r="0" g="0" b="0"/>
+      </a:effectRef>
+      <a:fontRef idx="minor"/>
+    </dgm:style>
+  </dgm:styleLbl>
+  <dgm:styleLbl name="parChTrans1D3">
+    <dgm:scene3d>
+      <a:camera prst="orthographicFront"/>
+      <a:lightRig rig="threePt" dir="t"/>
+    </dgm:scene3d>
+    <dgm:sp3d/>
+    <dgm:txPr/>
+    <dgm:style>
+      <a:lnRef idx="2">
+        <a:scrgbClr r="0" g="0" b="0"/>
+      </a:lnRef>
+      <a:fillRef idx="0">
+        <a:scrgbClr r="0" g="0" b="0"/>
+      </a:fillRef>
+      <a:effectRef idx="0">
+        <a:scrgbClr r="0" g="0" b="0"/>
+      </a:effectRef>
+      <a:fontRef idx="minor"/>
+    </dgm:style>
+  </dgm:styleLbl>
+  <dgm:styleLbl name="parChTrans1D4">
+    <dgm:scene3d>
+      <a:camera prst="orthographicFront"/>
+      <a:lightRig rig="threePt" dir="t"/>
+    </dgm:scene3d>
+    <dgm:sp3d/>
+    <dgm:txPr/>
+    <dgm:style>
+      <a:lnRef idx="2">
+        <a:scrgbClr r="0" g="0" b="0"/>
+      </a:lnRef>
+      <a:fillRef idx="0">
+        <a:scrgbClr r="0" g="0" b="0"/>
+      </a:fillRef>
+      <a:effectRef idx="0">
+        <a:scrgbClr r="0" g="0" b="0"/>
+      </a:effectRef>
+      <a:fontRef idx="minor"/>
+    </dgm:style>
+  </dgm:styleLbl>
+  <dgm:styleLbl name="fgAcc1">
+    <dgm:scene3d>
+      <a:camera prst="orthographicFront"/>
+      <a:lightRig rig="threePt" dir="t"/>
+    </dgm:scene3d>
+    <dgm:sp3d/>
+    <dgm:txPr/>
+    <dgm:style>
+      <a:lnRef idx="2">
+        <a:scrgbClr r="0" g="0" b="0"/>
+      </a:lnRef>
+      <a:fillRef idx="1">
+        <a:scrgbClr r="0" g="0" b="0"/>
+      </a:fillRef>
+      <a:effectRef idx="0">
+        <a:scrgbClr r="0" g="0" b="0"/>
+      </a:effectRef>
+      <a:fontRef idx="minor"/>
+    </dgm:style>
+  </dgm:styleLbl>
+  <dgm:styleLbl name="conFgAcc1">
+    <dgm:scene3d>
+      <a:camera prst="orthographicFront"/>
+      <a:lightRig rig="threePt" dir="t"/>
+    </dgm:scene3d>
+    <dgm:sp3d/>
+    <dgm:txPr/>
+    <dgm:style>
+      <a:lnRef idx="2">
+        <a:scrgbClr r="0" g="0" b="0"/>
+      </a:lnRef>
+      <a:fillRef idx="1">
+        <a:scrgbClr r="0" g="0" b="0"/>
+      </a:fillRef>
+      <a:effectRef idx="0">
+        <a:scrgbClr r="0" g="0" b="0"/>
+      </a:effectRef>
+      <a:fontRef idx="minor"/>
+    </dgm:style>
+  </dgm:styleLbl>
+  <dgm:styleLbl name="alignAcc1">
+    <dgm:scene3d>
+      <a:camera prst="orthographicFront"/>
+      <a:lightRig rig="threePt" dir="t"/>
+    </dgm:scene3d>
+    <dgm:sp3d/>
+    <dgm:txPr/>
+    <dgm:style>
+      <a:lnRef idx="2">
+        <a:scrgbClr r="0" g="0" b="0"/>
+      </a:lnRef>
+      <a:fillRef idx="1">
+        <a:scrgbClr r="0" g="0" b="0"/>
+      </a:fillRef>
+      <a:effectRef idx="0">
+        <a:scrgbClr r="0" g="0" b="0"/>
+      </a:effectRef>
+      <a:fontRef idx="minor"/>
+    </dgm:style>
+  </dgm:styleLbl>
+  <dgm:styleLbl name="trAlignAcc1">
+    <dgm:scene3d>
+      <a:camera prst="orthographicFront"/>
+      <a:lightRig rig="threePt" dir="t"/>
+    </dgm:scene3d>
+    <dgm:sp3d/>
+    <dgm:txPr/>
+    <dgm:style>
+      <a:lnRef idx="1">
+        <a:scrgbClr r="0" g="0" b="0"/>
+      </a:lnRef>
+      <a:fillRef idx="1">
+        <a:scrgbClr r="0" g="0" b="0"/>
+      </a:fillRef>
+      <a:effectRef idx="0">
+        <a:scrgbClr r="0" g="0" b="0"/>
+      </a:effectRef>
+      <a:fontRef idx="minor"/>
+    </dgm:style>
+  </dgm:styleLbl>
+  <dgm:styleLbl name="bgAcc1">
+    <dgm:scene3d>
+      <a:camera prst="orthographicFront"/>
+      <a:lightRig rig="threePt" dir="t"/>
+    </dgm:scene3d>
+    <dgm:sp3d/>
+    <dgm:txPr/>
+    <dgm:style>
+      <a:lnRef idx="2">
+        <a:scrgbClr r="0" g="0" b="0"/>
+      </a:lnRef>
+      <a:fillRef idx="1">
+        <a:scrgbClr r="0" g="0" b="0"/>
+      </a:fillRef>
+      <a:effectRef idx="0">
+        <a:scrgbClr r="0" g="0" b="0"/>
+      </a:effectRef>
+      <a:fontRef idx="minor"/>
+    </dgm:style>
+  </dgm:styleLbl>
+  <dgm:styleLbl name="solidFgAcc1">
+    <dgm:scene3d>
+      <a:camera prst="orthographicFront"/>
+      <a:lightRig rig="threePt" dir="t"/>
+    </dgm:scene3d>
+    <dgm:sp3d/>
+    <dgm:txPr/>
+    <dgm:style>
+      <a:lnRef idx="2">
+        <a:scrgbClr r="0" g="0" b="0"/>
+      </a:lnRef>
+      <a:fillRef idx="1">
+        <a:scrgbClr r="0" g="0" b="0"/>
+      </a:fillRef>
+      <a:effectRef idx="0">
+        <a:scrgbClr r="0" g="0" b="0"/>
+      </a:effectRef>
+      <a:fontRef idx="minor"/>
+    </dgm:style>
+  </dgm:styleLbl>
+  <dgm:styleLbl name="solidAlignAcc1">
+    <dgm:scene3d>
+      <a:camera prst="orthographicFront"/>
+      <a:lightRig rig="threePt" dir="t"/>
+    </dgm:scene3d>
+    <dgm:sp3d/>
+    <dgm:txPr/>
+    <dgm:style>
+      <a:lnRef idx="2">
+        <a:scrgbClr r="0" g="0" b="0"/>
+      </a:lnRef>
+      <a:fillRef idx="1">
+        <a:scrgbClr r="0" g="0" b="0"/>
+      </a:fillRef>
+      <a:effectRef idx="0">
+        <a:scrgbClr r="0" g="0" b="0"/>
+      </a:effectRef>
+      <a:fontRef idx="minor"/>
+    </dgm:style>
+  </dgm:styleLbl>
+  <dgm:styleLbl name="solidBgAcc1">
+    <dgm:scene3d>
+      <a:camera prst="orthographicFront"/>
+      <a:lightRig rig="threePt" dir="t"/>
+    </dgm:scene3d>
+    <dgm:sp3d/>
+    <dgm:txPr/>
+    <dgm:style>
+      <a:lnRef idx="2">
+        <a:scrgbClr r="0" g="0" b="0"/>
+      </a:lnRef>
+      <a:fillRef idx="1">
+        <a:scrgbClr r="0" g="0" b="0"/>
+      </a:fillRef>
+      <a:effectRef idx="0">
+        <a:scrgbClr r="0" g="0" b="0"/>
+      </a:effectRef>
+      <a:fontRef idx="minor"/>
+    </dgm:style>
+  </dgm:styleLbl>
+  <dgm:styleLbl name="fgAccFollowNode1">
+    <dgm:scene3d>
+      <a:camera prst="orthographicFront"/>
+      <a:lightRig rig="threePt" dir="t"/>
+    </dgm:scene3d>
+    <dgm:sp3d/>
+    <dgm:txPr/>
+    <dgm:style>
+      <a:lnRef idx="2">
+        <a:scrgbClr r="0" g="0" b="0"/>
+      </a:lnRef>
+      <a:fillRef idx="1">
+        <a:scrgbClr r="0" g="0" b="0"/>
+      </a:fillRef>
+      <a:effectRef idx="0">
+        <a:scrgbClr r="0" g="0" b="0"/>
+      </a:effectRef>
+      <a:fontRef idx="minor"/>
+    </dgm:style>
+  </dgm:styleLbl>
+  <dgm:styleLbl name="alignAccFollowNode1">
+    <dgm:scene3d>
+      <a:camera prst="orthographicFront"/>
+      <a:lightRig rig="threePt" dir="t"/>
+    </dgm:scene3d>
+    <dgm:sp3d/>
+    <dgm:txPr/>
+    <dgm:style>
+      <a:lnRef idx="2">
+        <a:scrgbClr r="0" g="0" b="0"/>
+      </a:lnRef>
+      <a:fillRef idx="1">
+        <a:scrgbClr r="0" g="0" b="0"/>
+      </a:fillRef>
+      <a:effectRef idx="0">
+        <a:scrgbClr r="0" g="0" b="0"/>
+      </a:effectRef>
+      <a:fontRef idx="minor"/>
+    </dgm:style>
+  </dgm:styleLbl>
+  <dgm:styleLbl name="bgAccFollowNode1">
+    <dgm:scene3d>
+      <a:camera prst="orthographicFront"/>
+      <a:lightRig rig="threePt" dir="t"/>
+    </dgm:scene3d>
+    <dgm:sp3d/>
+    <dgm:txPr/>
+    <dgm:style>
+      <a:lnRef idx="2">
+        <a:scrgbClr r="0" g="0" b="0"/>
+      </a:lnRef>
+      <a:fillRef idx="1">
+        <a:scrgbClr r="0" g="0" b="0"/>
+      </a:fillRef>
+      <a:effectRef idx="0">
+        <a:scrgbClr r="0" g="0" b="0"/>
+      </a:effectRef>
+      <a:fontRef idx="minor"/>
+    </dgm:style>
+  </dgm:styleLbl>
+  <dgm:styleLbl name="fgAcc0">
+    <dgm:scene3d>
+      <a:camera prst="orthographicFront"/>
+      <a:lightRig rig="threePt" dir="t"/>
+    </dgm:scene3d>
+    <dgm:sp3d/>
+    <dgm:txPr/>
+    <dgm:style>
+      <a:lnRef idx="2">
+        <a:scrgbClr r="0" g="0" b="0"/>
+      </a:lnRef>
+      <a:fillRef idx="1">
+        <a:scrgbClr r="0" g="0" b="0"/>
+      </a:fillRef>
+      <a:effectRef idx="0">
+        <a:scrgbClr r="0" g="0" b="0"/>
+      </a:effectRef>
+      <a:fontRef idx="minor"/>
+    </dgm:style>
+  </dgm:styleLbl>
+  <dgm:styleLbl name="fgAcc2">
+    <dgm:scene3d>
+      <a:camera prst="orthographicFront"/>
+      <a:lightRig rig="threePt" dir="t"/>
+    </dgm:scene3d>
+    <dgm:sp3d/>
+    <dgm:txPr/>
+    <dgm:style>
+      <a:lnRef idx="2">
+        <a:scrgbClr r="0" g="0" b="0"/>
+      </a:lnRef>
+      <a:fillRef idx="1">
+        <a:scrgbClr r="0" g="0" b="0"/>
+      </a:fillRef>
+      <a:effectRef idx="0">
+        <a:scrgbClr r="0" g="0" b="0"/>
+      </a:effectRef>
+      <a:fontRef idx="minor"/>
+    </dgm:style>
+  </dgm:styleLbl>
+  <dgm:styleLbl name="fgAcc3">
+    <dgm:scene3d>
+      <a:camera prst="orthographicFront"/>
+      <a:lightRig rig="threePt" dir="t"/>
+    </dgm:scene3d>
+    <dgm:sp3d/>
+    <dgm:txPr/>
+    <dgm:style>
+      <a:lnRef idx="2">
+        <a:scrgbClr r="0" g="0" b="0"/>
+      </a:lnRef>
+      <a:fillRef idx="1">
+        <a:scrgbClr r="0" g="0" b="0"/>
+      </a:fillRef>
+      <a:effectRef idx="0">
+        <a:scrgbClr r="0" g="0" b="0"/>
+      </a:effectRef>
+      <a:fontRef idx="minor"/>
+    </dgm:style>
+  </dgm:styleLbl>
+  <dgm:styleLbl name="fgAcc4">
+    <dgm:scene3d>
+      <a:camera prst="orthographicFront"/>
+      <a:lightRig rig="threePt" dir="t"/>
+    </dgm:scene3d>
+    <dgm:sp3d/>
+    <dgm:txPr/>
+    <dgm:style>
+      <a:lnRef idx="2">
+        <a:scrgbClr r="0" g="0" b="0"/>
+      </a:lnRef>
+      <a:fillRef idx="1">
+        <a:scrgbClr r="0" g="0" b="0"/>
+      </a:fillRef>
+      <a:effectRef idx="0">
+        <a:scrgbClr r="0" g="0" b="0"/>
+      </a:effectRef>
+      <a:fontRef idx="minor"/>
+    </dgm:style>
+  </dgm:styleLbl>
+  <dgm:styleLbl name="bgShp">
+    <dgm:scene3d>
+      <a:camera prst="orthographicFront"/>
+      <a:lightRig rig="threePt" dir="t"/>
+    </dgm:scene3d>
+    <dgm:sp3d/>
+    <dgm:txPr/>
+    <dgm:style>
+      <a:lnRef idx="0">
+        <a:scrgbClr r="0" g="0" b="0"/>
+      </a:lnRef>
+      <a:fillRef idx="1">
+        <a:scrgbClr r="0" g="0" b="0"/>
+      </a:fillRef>
+      <a:effectRef idx="0">
+        <a:scrgbClr r="0" g="0" b="0"/>
+      </a:effectRef>
+      <a:fontRef idx="minor"/>
+    </dgm:style>
+  </dgm:styleLbl>
+  <dgm:styleLbl name="dkBgShp">
+    <dgm:scene3d>
+      <a:camera prst="orthographicFront"/>
+      <a:lightRig rig="threePt" dir="t"/>
+    </dgm:scene3d>
+    <dgm:sp3d/>
+    <dgm:txPr/>
+    <dgm:style>
+      <a:lnRef idx="0">
+        <a:scrgbClr r="0" g="0" b="0"/>
+      </a:lnRef>
+      <a:fillRef idx="1">
+        <a:scrgbClr r="0" g="0" b="0"/>
+      </a:fillRef>
+      <a:effectRef idx="0">
+        <a:scrgbClr r="0" g="0" b="0"/>
+      </a:effectRef>
+      <a:fontRef idx="minor"/>
+    </dgm:style>
+  </dgm:styleLbl>
+  <dgm:styleLbl name="trBgShp">
+    <dgm:scene3d>
+      <a:camera prst="orthographicFront"/>
+      <a:lightRig rig="threePt" dir="t"/>
+    </dgm:scene3d>
+    <dgm:sp3d/>
+    <dgm:txPr/>
+    <dgm:style>
+      <a:lnRef idx="0">
+        <a:scrgbClr r="0" g="0" b="0"/>
+      </a:lnRef>
+      <a:fillRef idx="1">
+        <a:scrgbClr r="0" g="0" b="0"/>
+      </a:fillRef>
+      <a:effectRef idx="0">
+        <a:scrgbClr r="0" g="0" b="0"/>
+      </a:effectRef>
+      <a:fontRef idx="minor"/>
+    </dgm:style>
+  </dgm:styleLbl>
+  <dgm:styleLbl name="fgShp">
+    <dgm:scene3d>
+      <a:camera prst="orthographicFront"/>
+      <a:lightRig rig="threePt" dir="t"/>
+    </dgm:scene3d>
+    <dgm:sp3d/>
+    <dgm:txPr/>
+    <dgm:style>
+      <a:lnRef idx="2">
+        <a:scrgbClr r="0" g="0" b="0"/>
+      </a:lnRef>
+      <a:fillRef idx="1">
+        <a:scrgbClr r="0" g="0" b="0"/>
+      </a:fillRef>
+      <a:effectRef idx="0">
+        <a:scrgbClr r="0" g="0" b="0"/>
+      </a:effectRef>
+      <a:fontRef idx="minor"/>
+    </dgm:style>
+  </dgm:styleLbl>
+  <dgm:styleLbl name="revTx">
+    <dgm:scene3d>
+      <a:camera prst="orthographicFront"/>
+      <a:lightRig rig="threePt" dir="t"/>
+    </dgm:scene3d>
+    <dgm:sp3d/>
+    <dgm:txPr/>
+    <dgm:style>
+      <a:lnRef idx="0">
+        <a:scrgbClr r="0" g="0" b="0"/>
+      </a:lnRef>
+      <a:fillRef idx="0">
+        <a:scrgbClr r="0" g="0" b="0"/>
+      </a:fillRef>
+      <a:effectRef idx="0">
+        <a:scrgbClr r="0" g="0" b="0"/>
+      </a:effectRef>
+      <a:fontRef idx="minor"/>
+    </dgm:style>
+  </dgm:styleLbl>
+</dgm:styleDef>
+</file>
+
+<file path=ppt/diagrams/quickStyle2.xml><?xml version="1.0" encoding="utf-8"?>
 <dgm:styleDef xmlns:dgm="http://schemas.openxmlformats.org/drawingml/2006/diagram" xmlns:a="http://schemas.openxmlformats.org/drawingml/2006/main" uniqueId="urn:microsoft.com/office/officeart/2005/8/quickstyle/simple4">
   <dgm:title val=""/>
   <dgm:desc val=""/>
@@ -3801,7 +6722,7 @@
           <a:p>
             <a:fld id="{3B87D1B5-D667-42F5-9E38-2FD202ABDFA0}" type="datetimeFigureOut">
               <a:rPr lang="en-US" smtClean="0"/>
-              <a:t>3/15/2018</a:t>
+              <a:t>3/17/2018</a:t>
             </a:fld>
             <a:endParaRPr lang="en-US"/>
           </a:p>
@@ -4250,23 +7171,17 @@
           <a:bodyPr/>
           <a:lstStyle/>
           <a:p>
-            <a:pPr marL="171450" indent="-171450">
-              <a:buFontTx/>
-              <a:buChar char="-"/>
-            </a:pPr>
             <a:r>
               <a:rPr lang="en-US" dirty="0"/>
-              <a:t>works for project &amp; item templates</a:t>
-            </a:r>
-          </a:p>
-          <a:p>
-            <a:pPr marL="171450" indent="-171450">
-              <a:buFontTx/>
-              <a:buChar char="-"/>
-            </a:pPr>
+              <a:t>- scottaddie.visualstudio.com &gt; </a:t>
+            </a:r>
+            <a:r>
+              <a:rPr lang="en-US" dirty="0" err="1"/>
+              <a:t>TagHelperSuite</a:t>
+            </a:r>
             <a:r>
               <a:rPr lang="en-US" dirty="0"/>
-              <a:t>NuGet steps optional if doing file system installation</a:t>
+              <a:t> build definition</a:t>
             </a:r>
           </a:p>
         </p:txBody>
@@ -4297,7 +7212,7 @@
     </p:spTree>
     <p:extLst>
       <p:ext uri="{BB962C8B-B14F-4D97-AF65-F5344CB8AC3E}">
-        <p14:creationId xmlns:p14="http://schemas.microsoft.com/office/powerpoint/2010/main" val="2867391736"/>
+        <p14:creationId xmlns:p14="http://schemas.microsoft.com/office/powerpoint/2010/main" val="170369036"/>
       </p:ext>
     </p:extLst>
   </p:cSld>
@@ -4351,6 +7266,50 @@
           <a:bodyPr/>
           <a:lstStyle/>
           <a:p>
+            <a:pPr marL="171450" indent="-171450">
+              <a:buFontTx/>
+              <a:buChar char="-"/>
+            </a:pPr>
+            <a:r>
+              <a:rPr lang="en-US" dirty="0"/>
+              <a:t>works for project &amp; item templates</a:t>
+            </a:r>
+          </a:p>
+          <a:p>
+            <a:pPr marL="171450" indent="-171450">
+              <a:buFontTx/>
+              <a:buChar char="-"/>
+            </a:pPr>
+            <a:r>
+              <a:rPr lang="en-US" dirty="0"/>
+              <a:t>NuGet steps optional if doing file system / network share installation</a:t>
+            </a:r>
+          </a:p>
+          <a:p>
+            <a:pPr marL="171450" indent="-171450">
+              <a:buFontTx/>
+              <a:buChar char="-"/>
+            </a:pPr>
+            <a:r>
+              <a:rPr lang="en-US" dirty="0" err="1"/>
+              <a:t>SideWaffle</a:t>
+            </a:r>
+            <a:r>
+              <a:rPr lang="en-US" dirty="0"/>
+              <a:t> Template Creator extension for VS 2017 </a:t>
+            </a:r>
+            <a:r>
+              <a:rPr lang="en-US" dirty="0">
+                <a:sym typeface="Wingdings" panose="05000000000000000000" pitchFamily="2" charset="2"/>
+              </a:rPr>
+              <a:t> add templates to VS</a:t>
+            </a:r>
+          </a:p>
+          <a:p>
+            <a:pPr marL="171450" indent="-171450">
+              <a:buFontTx/>
+              <a:buChar char="-"/>
+            </a:pPr>
             <a:endParaRPr lang="en-US" dirty="0"/>
           </a:p>
         </p:txBody>
@@ -4381,7 +7340,7 @@
     </p:spTree>
     <p:extLst>
       <p:ext uri="{BB962C8B-B14F-4D97-AF65-F5344CB8AC3E}">
-        <p14:creationId xmlns:p14="http://schemas.microsoft.com/office/powerpoint/2010/main" val="1134501301"/>
+        <p14:creationId xmlns:p14="http://schemas.microsoft.com/office/powerpoint/2010/main" val="2867391736"/>
       </p:ext>
     </p:extLst>
   </p:cSld>
@@ -4435,7 +7394,7 @@
           <a:bodyPr/>
           <a:lstStyle/>
           <a:p>
-            <a:endParaRPr lang="en-US"/>
+            <a:endParaRPr lang="en-US" dirty="0"/>
           </a:p>
         </p:txBody>
       </p:sp>
@@ -4454,78 +7413,18 @@
           <a:bodyPr/>
           <a:lstStyle/>
           <a:p>
-            <a:pPr marL="0" marR="0" lvl="0" indent="0" algn="r" defTabSz="457200" rtl="0" eaLnBrk="1" fontAlgn="auto" latinLnBrk="0" hangingPunct="1">
-              <a:lnSpc>
-                <a:spcPct val="100000"/>
-              </a:lnSpc>
-              <a:spcBef>
-                <a:spcPts val="0"/>
-              </a:spcBef>
-              <a:spcAft>
-                <a:spcPts val="0"/>
-              </a:spcAft>
-              <a:buClrTx/>
-              <a:buSzTx/>
-              <a:buFontTx/>
-              <a:buNone/>
-              <a:tabLst/>
-              <a:defRPr/>
-            </a:pPr>
             <a:fld id="{16A87904-88DE-4022-A424-ACD2E6FC1751}" type="slidenum">
-              <a:rPr kumimoji="0" lang="en-US" sz="1200" b="0" i="0" u="none" strike="noStrike" kern="1200" cap="none" spc="0" normalizeH="0" baseline="0" noProof="0" smtClean="0">
-                <a:ln>
-                  <a:noFill/>
-                </a:ln>
-                <a:solidFill>
-                  <a:prstClr val="black"/>
-                </a:solidFill>
-                <a:effectLst/>
-                <a:uLnTx/>
-                <a:uFillTx/>
-                <a:latin typeface="Calibri" panose="020F0502020204030204"/>
-                <a:ea typeface="+mn-ea"/>
-                <a:cs typeface="+mn-cs"/>
-              </a:rPr>
-              <a:pPr marL="0" marR="0" lvl="0" indent="0" algn="r" defTabSz="457200" rtl="0" eaLnBrk="1" fontAlgn="auto" latinLnBrk="0" hangingPunct="1">
-                <a:lnSpc>
-                  <a:spcPct val="100000"/>
-                </a:lnSpc>
-                <a:spcBef>
-                  <a:spcPts val="0"/>
-                </a:spcBef>
-                <a:spcAft>
-                  <a:spcPts val="0"/>
-                </a:spcAft>
-                <a:buClrTx/>
-                <a:buSzTx/>
-                <a:buFontTx/>
-                <a:buNone/>
-                <a:tabLst/>
-                <a:defRPr/>
-              </a:pPr>
+              <a:rPr lang="en-US" smtClean="0"/>
               <a:t>12</a:t>
             </a:fld>
-            <a:endParaRPr kumimoji="0" lang="en-US" sz="1200" b="0" i="0" u="none" strike="noStrike" kern="1200" cap="none" spc="0" normalizeH="0" baseline="0" noProof="0">
-              <a:ln>
-                <a:noFill/>
-              </a:ln>
-              <a:solidFill>
-                <a:prstClr val="black"/>
-              </a:solidFill>
-              <a:effectLst/>
-              <a:uLnTx/>
-              <a:uFillTx/>
-              <a:latin typeface="Calibri" panose="020F0502020204030204"/>
-              <a:ea typeface="+mn-ea"/>
-              <a:cs typeface="+mn-cs"/>
-            </a:endParaRPr>
+            <a:endParaRPr lang="en-US"/>
           </a:p>
         </p:txBody>
       </p:sp>
     </p:spTree>
     <p:extLst>
       <p:ext uri="{BB962C8B-B14F-4D97-AF65-F5344CB8AC3E}">
-        <p14:creationId xmlns:p14="http://schemas.microsoft.com/office/powerpoint/2010/main" val="1176352571"/>
+        <p14:creationId xmlns:p14="http://schemas.microsoft.com/office/powerpoint/2010/main" val="1134501301"/>
       </p:ext>
     </p:extLst>
   </p:cSld>
@@ -4598,9 +7497,153 @@
           <a:bodyPr/>
           <a:lstStyle/>
           <a:p>
+            <a:pPr marL="0" marR="0" lvl="0" indent="0" algn="r" defTabSz="457200" rtl="0" eaLnBrk="1" fontAlgn="auto" latinLnBrk="0" hangingPunct="1">
+              <a:lnSpc>
+                <a:spcPct val="100000"/>
+              </a:lnSpc>
+              <a:spcBef>
+                <a:spcPts val="0"/>
+              </a:spcBef>
+              <a:spcAft>
+                <a:spcPts val="0"/>
+              </a:spcAft>
+              <a:buClrTx/>
+              <a:buSzTx/>
+              <a:buFontTx/>
+              <a:buNone/>
+              <a:tabLst/>
+              <a:defRPr/>
+            </a:pPr>
+            <a:fld id="{16A87904-88DE-4022-A424-ACD2E6FC1751}" type="slidenum">
+              <a:rPr kumimoji="0" lang="en-US" sz="1200" b="0" i="0" u="none" strike="noStrike" kern="1200" cap="none" spc="0" normalizeH="0" baseline="0" noProof="0" smtClean="0">
+                <a:ln>
+                  <a:noFill/>
+                </a:ln>
+                <a:solidFill>
+                  <a:prstClr val="black"/>
+                </a:solidFill>
+                <a:effectLst/>
+                <a:uLnTx/>
+                <a:uFillTx/>
+                <a:latin typeface="Calibri" panose="020F0502020204030204"/>
+                <a:ea typeface="+mn-ea"/>
+                <a:cs typeface="+mn-cs"/>
+              </a:rPr>
+              <a:pPr marL="0" marR="0" lvl="0" indent="0" algn="r" defTabSz="457200" rtl="0" eaLnBrk="1" fontAlgn="auto" latinLnBrk="0" hangingPunct="1">
+                <a:lnSpc>
+                  <a:spcPct val="100000"/>
+                </a:lnSpc>
+                <a:spcBef>
+                  <a:spcPts val="0"/>
+                </a:spcBef>
+                <a:spcAft>
+                  <a:spcPts val="0"/>
+                </a:spcAft>
+                <a:buClrTx/>
+                <a:buSzTx/>
+                <a:buFontTx/>
+                <a:buNone/>
+                <a:tabLst/>
+                <a:defRPr/>
+              </a:pPr>
+              <a:t>13</a:t>
+            </a:fld>
+            <a:endParaRPr kumimoji="0" lang="en-US" sz="1200" b="0" i="0" u="none" strike="noStrike" kern="1200" cap="none" spc="0" normalizeH="0" baseline="0" noProof="0">
+              <a:ln>
+                <a:noFill/>
+              </a:ln>
+              <a:solidFill>
+                <a:prstClr val="black"/>
+              </a:solidFill>
+              <a:effectLst/>
+              <a:uLnTx/>
+              <a:uFillTx/>
+              <a:latin typeface="Calibri" panose="020F0502020204030204"/>
+              <a:ea typeface="+mn-ea"/>
+              <a:cs typeface="+mn-cs"/>
+            </a:endParaRPr>
+          </a:p>
+        </p:txBody>
+      </p:sp>
+    </p:spTree>
+    <p:extLst>
+      <p:ext uri="{BB962C8B-B14F-4D97-AF65-F5344CB8AC3E}">
+        <p14:creationId xmlns:p14="http://schemas.microsoft.com/office/powerpoint/2010/main" val="1176352571"/>
+      </p:ext>
+    </p:extLst>
+  </p:cSld>
+  <p:clrMapOvr>
+    <a:masterClrMapping/>
+  </p:clrMapOvr>
+</p:notes>
+</file>
+
+<file path=ppt/notesSlides/notesSlide14.xml><?xml version="1.0" encoding="utf-8"?>
+<p:notes xmlns:a="http://schemas.openxmlformats.org/drawingml/2006/main" xmlns:r="http://schemas.openxmlformats.org/officeDocument/2006/relationships" xmlns:p="http://schemas.openxmlformats.org/presentationml/2006/main">
+  <p:cSld>
+    <p:spTree>
+      <p:nvGrpSpPr>
+        <p:cNvPr id="1" name=""/>
+        <p:cNvGrpSpPr/>
+        <p:nvPr/>
+      </p:nvGrpSpPr>
+      <p:grpSpPr>
+        <a:xfrm>
+          <a:off x="0" y="0"/>
+          <a:ext cx="0" cy="0"/>
+          <a:chOff x="0" y="0"/>
+          <a:chExt cx="0" cy="0"/>
+        </a:xfrm>
+      </p:grpSpPr>
+      <p:sp>
+        <p:nvSpPr>
+          <p:cNvPr id="2" name="Slide Image Placeholder 1"/>
+          <p:cNvSpPr>
+            <a:spLocks noGrp="1" noRot="1" noChangeAspect="1"/>
+          </p:cNvSpPr>
+          <p:nvPr>
+            <p:ph type="sldImg"/>
+          </p:nvPr>
+        </p:nvSpPr>
+        <p:spPr/>
+      </p:sp>
+      <p:sp>
+        <p:nvSpPr>
+          <p:cNvPr id="3" name="Notes Placeholder 2"/>
+          <p:cNvSpPr>
+            <a:spLocks noGrp="1"/>
+          </p:cNvSpPr>
+          <p:nvPr>
+            <p:ph type="body" idx="1"/>
+          </p:nvPr>
+        </p:nvSpPr>
+        <p:spPr/>
+        <p:txBody>
+          <a:bodyPr/>
+          <a:lstStyle/>
+          <a:p>
+            <a:endParaRPr lang="en-US"/>
+          </a:p>
+        </p:txBody>
+      </p:sp>
+      <p:sp>
+        <p:nvSpPr>
+          <p:cNvPr id="4" name="Slide Number Placeholder 3"/>
+          <p:cNvSpPr>
+            <a:spLocks noGrp="1"/>
+          </p:cNvSpPr>
+          <p:nvPr>
+            <p:ph type="sldNum" sz="quarter" idx="10"/>
+          </p:nvPr>
+        </p:nvSpPr>
+        <p:spPr/>
+        <p:txBody>
+          <a:bodyPr/>
+          <a:lstStyle/>
+          <a:p>
             <a:fld id="{16A87904-88DE-4022-A424-ACD2E6FC1751}" type="slidenum">
               <a:rPr lang="en-US" smtClean="0"/>
-              <a:t>13</a:t>
+              <a:t>14</a:t>
             </a:fld>
             <a:endParaRPr lang="en-US"/>
           </a:p>
@@ -4831,29 +7874,50 @@
           <a:bodyPr/>
           <a:lstStyle/>
           <a:p>
+            <a:pPr marL="171450" marR="0" lvl="0" indent="-171450" algn="l" defTabSz="914400" rtl="0" eaLnBrk="1" fontAlgn="auto" latinLnBrk="0" hangingPunct="1">
+              <a:lnSpc>
+                <a:spcPct val="100000"/>
+              </a:lnSpc>
+              <a:spcBef>
+                <a:spcPts val="0"/>
+              </a:spcBef>
+              <a:spcAft>
+                <a:spcPts val="0"/>
+              </a:spcAft>
+              <a:buClrTx/>
+              <a:buSzTx/>
+              <a:buFontTx/>
+              <a:buChar char="-"/>
+              <a:tabLst/>
+              <a:defRPr/>
+            </a:pPr>
             <a:r>
               <a:rPr lang="en-US" dirty="0"/>
-              <a:t>- dotnet my_app.dll </a:t>
-            </a:r>
-            <a:r>
-              <a:rPr lang="en-US" dirty="0">
-                <a:sym typeface="Wingdings" panose="05000000000000000000" pitchFamily="2" charset="2"/>
-              </a:rPr>
-              <a:t> only case when </a:t>
-            </a:r>
-            <a:r>
-              <a:rPr lang="en-US" i="1" dirty="0">
-                <a:sym typeface="Wingdings" panose="05000000000000000000" pitchFamily="2" charset="2"/>
-              </a:rPr>
-              <a:t>dotnet</a:t>
-            </a:r>
-            <a:r>
-              <a:rPr lang="en-US" dirty="0">
-                <a:sym typeface="Wingdings" panose="05000000000000000000" pitchFamily="2" charset="2"/>
-              </a:rPr>
-              <a:t> is used w/o command</a:t>
-            </a:r>
-            <a:endParaRPr lang="en-US" dirty="0"/>
+              <a:t>Not all commands accounted for in tooling</a:t>
+            </a:r>
+          </a:p>
+          <a:p>
+            <a:pPr marL="171450" marR="0" lvl="0" indent="-171450" algn="l" defTabSz="914400" rtl="0" eaLnBrk="1" fontAlgn="auto" latinLnBrk="0" hangingPunct="1">
+              <a:lnSpc>
+                <a:spcPct val="100000"/>
+              </a:lnSpc>
+              <a:spcBef>
+                <a:spcPts val="0"/>
+              </a:spcBef>
+              <a:spcAft>
+                <a:spcPts val="0"/>
+              </a:spcAft>
+              <a:buClrTx/>
+              <a:buSzTx/>
+              <a:buFontTx/>
+              <a:buChar char="-"/>
+              <a:tabLst/>
+              <a:defRPr/>
+            </a:pPr>
+            <a:r>
+              <a:rPr lang="en-US" dirty="0"/>
+              <a:t>Compare to GitHub for Windows UI vs. Git command line</a:t>
+            </a:r>
           </a:p>
         </p:txBody>
       </p:sp>
@@ -4883,7 +7947,7 @@
     </p:spTree>
     <p:extLst>
       <p:ext uri="{BB962C8B-B14F-4D97-AF65-F5344CB8AC3E}">
-        <p14:creationId xmlns:p14="http://schemas.microsoft.com/office/powerpoint/2010/main" val="1960770763"/>
+        <p14:creationId xmlns:p14="http://schemas.microsoft.com/office/powerpoint/2010/main" val="1327865442"/>
       </p:ext>
     </p:extLst>
   </p:cSld>
@@ -4937,6 +8001,28 @@
           <a:bodyPr/>
           <a:lstStyle/>
           <a:p>
+            <a:r>
+              <a:rPr lang="en-US" dirty="0"/>
+              <a:t>- dotnet my_app.dll </a:t>
+            </a:r>
+            <a:r>
+              <a:rPr lang="en-US" dirty="0">
+                <a:sym typeface="Wingdings" panose="05000000000000000000" pitchFamily="2" charset="2"/>
+              </a:rPr>
+              <a:t> only case when </a:t>
+            </a:r>
+            <a:r>
+              <a:rPr lang="en-US" i="1" dirty="0">
+                <a:sym typeface="Wingdings" panose="05000000000000000000" pitchFamily="2" charset="2"/>
+              </a:rPr>
+              <a:t>dotnet</a:t>
+            </a:r>
+            <a:r>
+              <a:rPr lang="en-US" dirty="0">
+                <a:sym typeface="Wingdings" panose="05000000000000000000" pitchFamily="2" charset="2"/>
+              </a:rPr>
+              <a:t> is used w/o command</a:t>
+            </a:r>
             <a:endParaRPr lang="en-US" dirty="0"/>
           </a:p>
         </p:txBody>
@@ -4967,7 +8053,7 @@
     </p:spTree>
     <p:extLst>
       <p:ext uri="{BB962C8B-B14F-4D97-AF65-F5344CB8AC3E}">
-        <p14:creationId xmlns:p14="http://schemas.microsoft.com/office/powerpoint/2010/main" val="898768016"/>
+        <p14:creationId xmlns:p14="http://schemas.microsoft.com/office/powerpoint/2010/main" val="1960770763"/>
       </p:ext>
     </p:extLst>
   </p:cSld>
@@ -5051,7 +8137,7 @@
     </p:spTree>
     <p:extLst>
       <p:ext uri="{BB962C8B-B14F-4D97-AF65-F5344CB8AC3E}">
-        <p14:creationId xmlns:p14="http://schemas.microsoft.com/office/powerpoint/2010/main" val="3124676736"/>
+        <p14:creationId xmlns:p14="http://schemas.microsoft.com/office/powerpoint/2010/main" val="898768016"/>
       </p:ext>
     </p:extLst>
   </p:cSld>
@@ -5135,7 +8221,7 @@
     </p:spTree>
     <p:extLst>
       <p:ext uri="{BB962C8B-B14F-4D97-AF65-F5344CB8AC3E}">
-        <p14:creationId xmlns:p14="http://schemas.microsoft.com/office/powerpoint/2010/main" val="178583391"/>
+        <p14:creationId xmlns:p14="http://schemas.microsoft.com/office/powerpoint/2010/main" val="3124676736"/>
       </p:ext>
     </p:extLst>
   </p:cSld>
@@ -5219,7 +8305,7 @@
     </p:spTree>
     <p:extLst>
       <p:ext uri="{BB962C8B-B14F-4D97-AF65-F5344CB8AC3E}">
-        <p14:creationId xmlns:p14="http://schemas.microsoft.com/office/powerpoint/2010/main" val="2199057065"/>
+        <p14:creationId xmlns:p14="http://schemas.microsoft.com/office/powerpoint/2010/main" val="178583391"/>
       </p:ext>
     </p:extLst>
   </p:cSld>
@@ -5273,18 +8359,7 @@
           <a:bodyPr/>
           <a:lstStyle/>
           <a:p>
-            <a:r>
-              <a:rPr lang="en-US" dirty="0"/>
-              <a:t>- scottaddie.visualstudio.com &gt; </a:t>
-            </a:r>
-            <a:r>
-              <a:rPr lang="en-US" dirty="0" err="1"/>
-              <a:t>TagHelperSuite</a:t>
-            </a:r>
-            <a:r>
-              <a:rPr lang="en-US" dirty="0"/>
-              <a:t> build definition</a:t>
-            </a:r>
+            <a:endParaRPr lang="en-US" dirty="0"/>
           </a:p>
         </p:txBody>
       </p:sp>
@@ -5314,7 +8389,7 @@
     </p:spTree>
     <p:extLst>
       <p:ext uri="{BB962C8B-B14F-4D97-AF65-F5344CB8AC3E}">
-        <p14:creationId xmlns:p14="http://schemas.microsoft.com/office/powerpoint/2010/main" val="170369036"/>
+        <p14:creationId xmlns:p14="http://schemas.microsoft.com/office/powerpoint/2010/main" val="2199057065"/>
       </p:ext>
     </p:extLst>
   </p:cSld>
@@ -5455,7 +8530,7 @@
           <a:p>
             <a:fld id="{EEC3160E-2579-4584-9765-DC1BA0B358F9}" type="datetimeFigureOut">
               <a:rPr lang="en-US" smtClean="0"/>
-              <a:t>3/15/2018</a:t>
+              <a:t>3/17/2018</a:t>
             </a:fld>
             <a:endParaRPr lang="en-US"/>
           </a:p>
@@ -5625,7 +8700,7 @@
           <a:p>
             <a:fld id="{EEC3160E-2579-4584-9765-DC1BA0B358F9}" type="datetimeFigureOut">
               <a:rPr lang="en-US" smtClean="0"/>
-              <a:t>3/15/2018</a:t>
+              <a:t>3/17/2018</a:t>
             </a:fld>
             <a:endParaRPr lang="en-US"/>
           </a:p>
@@ -5805,7 +8880,7 @@
           <a:p>
             <a:fld id="{EEC3160E-2579-4584-9765-DC1BA0B358F9}" type="datetimeFigureOut">
               <a:rPr lang="en-US" smtClean="0"/>
-              <a:t>3/15/2018</a:t>
+              <a:t>3/17/2018</a:t>
             </a:fld>
             <a:endParaRPr lang="en-US"/>
           </a:p>
@@ -7720,7 +10795,7 @@
           <a:p>
             <a:fld id="{EEC3160E-2579-4584-9765-DC1BA0B358F9}" type="datetimeFigureOut">
               <a:rPr lang="en-US" smtClean="0"/>
-              <a:t>3/15/2018</a:t>
+              <a:t>3/17/2018</a:t>
             </a:fld>
             <a:endParaRPr lang="en-US"/>
           </a:p>
@@ -9202,7 +12277,7 @@
           <a:p>
             <a:fld id="{EEC3160E-2579-4584-9765-DC1BA0B358F9}" type="datetimeFigureOut">
               <a:rPr lang="en-US" smtClean="0"/>
-              <a:t>3/15/2018</a:t>
+              <a:t>3/17/2018</a:t>
             </a:fld>
             <a:endParaRPr lang="en-US"/>
           </a:p>
@@ -10342,7 +13417,7 @@
           <a:p>
             <a:fld id="{EEC3160E-2579-4584-9765-DC1BA0B358F9}" type="datetimeFigureOut">
               <a:rPr lang="en-US" smtClean="0"/>
-              <a:t>3/15/2018</a:t>
+              <a:t>3/17/2018</a:t>
             </a:fld>
             <a:endParaRPr lang="en-US"/>
           </a:p>
@@ -10709,7 +13784,7 @@
           <a:p>
             <a:fld id="{EEC3160E-2579-4584-9765-DC1BA0B358F9}" type="datetimeFigureOut">
               <a:rPr lang="en-US" smtClean="0"/>
-              <a:t>3/15/2018</a:t>
+              <a:t>3/17/2018</a:t>
             </a:fld>
             <a:endParaRPr lang="en-US"/>
           </a:p>
@@ -10827,7 +13902,7 @@
           <a:p>
             <a:fld id="{EEC3160E-2579-4584-9765-DC1BA0B358F9}" type="datetimeFigureOut">
               <a:rPr lang="en-US" smtClean="0"/>
-              <a:t>3/15/2018</a:t>
+              <a:t>3/17/2018</a:t>
             </a:fld>
             <a:endParaRPr lang="en-US"/>
           </a:p>
@@ -10922,7 +13997,7 @@
           <a:p>
             <a:fld id="{EEC3160E-2579-4584-9765-DC1BA0B358F9}" type="datetimeFigureOut">
               <a:rPr lang="en-US" smtClean="0"/>
-              <a:t>3/15/2018</a:t>
+              <a:t>3/17/2018</a:t>
             </a:fld>
             <a:endParaRPr lang="en-US"/>
           </a:p>
@@ -11199,7 +14274,7 @@
           <a:p>
             <a:fld id="{EEC3160E-2579-4584-9765-DC1BA0B358F9}" type="datetimeFigureOut">
               <a:rPr lang="en-US" smtClean="0"/>
-              <a:t>3/15/2018</a:t>
+              <a:t>3/17/2018</a:t>
             </a:fld>
             <a:endParaRPr lang="en-US"/>
           </a:p>
@@ -11456,7 +14531,7 @@
           <a:p>
             <a:fld id="{EEC3160E-2579-4584-9765-DC1BA0B358F9}" type="datetimeFigureOut">
               <a:rPr lang="en-US" smtClean="0"/>
-              <a:t>3/15/2018</a:t>
+              <a:t>3/17/2018</a:t>
             </a:fld>
             <a:endParaRPr lang="en-US"/>
           </a:p>
@@ -11669,7 +14744,7 @@
           <a:p>
             <a:fld id="{EEC3160E-2579-4584-9765-DC1BA0B358F9}" type="datetimeFigureOut">
               <a:rPr lang="en-US" smtClean="0"/>
-              <a:t>3/15/2018</a:t>
+              <a:t>3/17/2018</a:t>
             </a:fld>
             <a:endParaRPr lang="en-US"/>
           </a:p>
@@ -14310,6 +17385,335 @@
       </p:grpSpPr>
       <p:sp>
         <p:nvSpPr>
+          <p:cNvPr id="22" name="Freeform: Shape 21">
+            <a:extLst>
+              <a:ext uri="{FF2B5EF4-FFF2-40B4-BE49-F238E27FC236}">
+                <a16:creationId xmlns:a16="http://schemas.microsoft.com/office/drawing/2014/main" id="{64965EAE-E41A-435F-B993-07E824B6C977}"/>
+              </a:ext>
+            </a:extLst>
+          </p:cNvPr>
+          <p:cNvSpPr>
+            <a:spLocks noGrp="1" noRot="1" noChangeAspect="1" noMove="1" noResize="1" noEditPoints="1" noAdjustHandles="1" noChangeArrowheads="1" noChangeShapeType="1" noTextEdit="1"/>
+          </p:cNvSpPr>
+          <p:nvPr>
+            <p:extLst>
+              <p:ext uri="{386F3935-93C4-4BCD-93E2-E3B085C9AB24}">
+                <p16:designElem xmlns:p16="http://schemas.microsoft.com/office/powerpoint/2015/main" val="1"/>
+              </p:ext>
+            </p:extLst>
+          </p:nvPr>
+        </p:nvSpPr>
+        <p:spPr>
+          <a:xfrm flipV="1">
+            <a:off x="1" y="0"/>
+            <a:ext cx="7539895" cy="6858000"/>
+          </a:xfrm>
+          <a:custGeom>
+            <a:avLst/>
+            <a:gdLst>
+              <a:gd name="connsiteX0" fmla="*/ 7539895 w 7539895"/>
+              <a:gd name="connsiteY0" fmla="*/ 6858000 h 6858000"/>
+              <a:gd name="connsiteX1" fmla="*/ 0 w 7539895"/>
+              <a:gd name="connsiteY1" fmla="*/ 6858000 h 6858000"/>
+              <a:gd name="connsiteX2" fmla="*/ 0 w 7539895"/>
+              <a:gd name="connsiteY2" fmla="*/ 0 h 6858000"/>
+              <a:gd name="connsiteX3" fmla="*/ 4363741 w 7539895"/>
+              <a:gd name="connsiteY3" fmla="*/ 0 h 6858000"/>
+            </a:gdLst>
+            <a:ahLst/>
+            <a:cxnLst>
+              <a:cxn ang="0">
+                <a:pos x="connsiteX0" y="connsiteY0"/>
+              </a:cxn>
+              <a:cxn ang="0">
+                <a:pos x="connsiteX1" y="connsiteY1"/>
+              </a:cxn>
+              <a:cxn ang="0">
+                <a:pos x="connsiteX2" y="connsiteY2"/>
+              </a:cxn>
+              <a:cxn ang="0">
+                <a:pos x="connsiteX3" y="connsiteY3"/>
+              </a:cxn>
+            </a:cxnLst>
+            <a:rect l="l" t="t" r="r" b="b"/>
+            <a:pathLst>
+              <a:path w="7539895" h="6858000">
+                <a:moveTo>
+                  <a:pt x="7539895" y="6858000"/>
+                </a:moveTo>
+                <a:lnTo>
+                  <a:pt x="0" y="6858000"/>
+                </a:lnTo>
+                <a:lnTo>
+                  <a:pt x="0" y="0"/>
+                </a:lnTo>
+                <a:lnTo>
+                  <a:pt x="4363741" y="0"/>
+                </a:lnTo>
+                <a:close/>
+              </a:path>
+            </a:pathLst>
+          </a:custGeom>
+          <a:solidFill>
+            <a:schemeClr val="tx1">
+              <a:lumMod val="85000"/>
+              <a:lumOff val="15000"/>
+              <a:alpha val="70000"/>
+            </a:schemeClr>
+          </a:solidFill>
+          <a:ln>
+            <a:noFill/>
+          </a:ln>
+        </p:spPr>
+        <p:style>
+          <a:lnRef idx="2">
+            <a:schemeClr val="accent1">
+              <a:shade val="50000"/>
+            </a:schemeClr>
+          </a:lnRef>
+          <a:fillRef idx="1">
+            <a:schemeClr val="accent1"/>
+          </a:fillRef>
+          <a:effectRef idx="0">
+            <a:schemeClr val="accent1"/>
+          </a:effectRef>
+          <a:fontRef idx="minor">
+            <a:schemeClr val="lt1"/>
+          </a:fontRef>
+        </p:style>
+        <p:txBody>
+          <a:bodyPr wrap="square" rtlCol="0" anchor="ctr">
+            <a:noAutofit/>
+          </a:bodyPr>
+          <a:lstStyle/>
+          <a:p>
+            <a:pPr algn="ctr"/>
+            <a:endParaRPr lang="en-US"/>
+          </a:p>
+        </p:txBody>
+      </p:sp>
+      <p:sp>
+        <p:nvSpPr>
+          <p:cNvPr id="24" name="Freeform: Shape 23">
+            <a:extLst>
+              <a:ext uri="{FF2B5EF4-FFF2-40B4-BE49-F238E27FC236}">
+                <a16:creationId xmlns:a16="http://schemas.microsoft.com/office/drawing/2014/main" id="{152F8994-E6D4-4311-9548-C3607BC43645}"/>
+              </a:ext>
+            </a:extLst>
+          </p:cNvPr>
+          <p:cNvSpPr>
+            <a:spLocks noGrp="1" noRot="1" noChangeAspect="1" noMove="1" noResize="1" noEditPoints="1" noAdjustHandles="1" noChangeArrowheads="1" noChangeShapeType="1" noTextEdit="1"/>
+          </p:cNvSpPr>
+          <p:nvPr>
+            <p:extLst>
+              <p:ext uri="{386F3935-93C4-4BCD-93E2-E3B085C9AB24}">
+                <p16:designElem xmlns:p16="http://schemas.microsoft.com/office/powerpoint/2015/main" val="1"/>
+              </p:ext>
+            </p:extLst>
+          </p:nvPr>
+        </p:nvSpPr>
+        <p:spPr>
+          <a:xfrm flipV="1">
+            <a:off x="0" y="0"/>
+            <a:ext cx="7092985" cy="6858000"/>
+          </a:xfrm>
+          <a:custGeom>
+            <a:avLst/>
+            <a:gdLst>
+              <a:gd name="connsiteX0" fmla="*/ 7092985 w 7092985"/>
+              <a:gd name="connsiteY0" fmla="*/ 6858000 h 6858000"/>
+              <a:gd name="connsiteX1" fmla="*/ 0 w 7092985"/>
+              <a:gd name="connsiteY1" fmla="*/ 6858000 h 6858000"/>
+              <a:gd name="connsiteX2" fmla="*/ 0 w 7092985"/>
+              <a:gd name="connsiteY2" fmla="*/ 0 h 6858000"/>
+              <a:gd name="connsiteX3" fmla="*/ 3916831 w 7092985"/>
+              <a:gd name="connsiteY3" fmla="*/ 0 h 6858000"/>
+            </a:gdLst>
+            <a:ahLst/>
+            <a:cxnLst>
+              <a:cxn ang="0">
+                <a:pos x="connsiteX0" y="connsiteY0"/>
+              </a:cxn>
+              <a:cxn ang="0">
+                <a:pos x="connsiteX1" y="connsiteY1"/>
+              </a:cxn>
+              <a:cxn ang="0">
+                <a:pos x="connsiteX2" y="connsiteY2"/>
+              </a:cxn>
+              <a:cxn ang="0">
+                <a:pos x="connsiteX3" y="connsiteY3"/>
+              </a:cxn>
+            </a:cxnLst>
+            <a:rect l="l" t="t" r="r" b="b"/>
+            <a:pathLst>
+              <a:path w="7092985" h="6858000">
+                <a:moveTo>
+                  <a:pt x="7092985" y="6858000"/>
+                </a:moveTo>
+                <a:lnTo>
+                  <a:pt x="0" y="6858000"/>
+                </a:lnTo>
+                <a:lnTo>
+                  <a:pt x="0" y="0"/>
+                </a:lnTo>
+                <a:lnTo>
+                  <a:pt x="3916831" y="0"/>
+                </a:lnTo>
+                <a:close/>
+              </a:path>
+            </a:pathLst>
+          </a:custGeom>
+          <a:solidFill>
+            <a:schemeClr val="tx1">
+              <a:lumMod val="85000"/>
+              <a:lumOff val="15000"/>
+            </a:schemeClr>
+          </a:solidFill>
+          <a:ln>
+            <a:noFill/>
+          </a:ln>
+        </p:spPr>
+        <p:style>
+          <a:lnRef idx="2">
+            <a:schemeClr val="accent1">
+              <a:shade val="50000"/>
+            </a:schemeClr>
+          </a:lnRef>
+          <a:fillRef idx="1">
+            <a:schemeClr val="accent1"/>
+          </a:fillRef>
+          <a:effectRef idx="0">
+            <a:schemeClr val="accent1"/>
+          </a:effectRef>
+          <a:fontRef idx="minor">
+            <a:schemeClr val="lt1"/>
+          </a:fontRef>
+        </p:style>
+        <p:txBody>
+          <a:bodyPr wrap="square" rtlCol="0" anchor="ctr">
+            <a:noAutofit/>
+          </a:bodyPr>
+          <a:lstStyle/>
+          <a:p>
+            <a:pPr algn="ctr"/>
+            <a:endParaRPr lang="en-US"/>
+          </a:p>
+        </p:txBody>
+      </p:sp>
+      <p:sp>
+        <p:nvSpPr>
+          <p:cNvPr id="8" name="Title 7">
+            <a:extLst>
+              <a:ext uri="{FF2B5EF4-FFF2-40B4-BE49-F238E27FC236}">
+                <a16:creationId xmlns:a16="http://schemas.microsoft.com/office/drawing/2014/main" id="{9AAF6E53-C7E3-404C-8C15-A04C67BE1A24}"/>
+              </a:ext>
+            </a:extLst>
+          </p:cNvPr>
+          <p:cNvSpPr>
+            <a:spLocks noGrp="1"/>
+          </p:cNvSpPr>
+          <p:nvPr>
+            <p:ph type="title"/>
+          </p:nvPr>
+        </p:nvSpPr>
+        <p:spPr>
+          <a:xfrm>
+            <a:off x="838199" y="365125"/>
+            <a:ext cx="5529943" cy="1325563"/>
+          </a:xfrm>
+        </p:spPr>
+        <p:txBody>
+          <a:bodyPr>
+            <a:normAutofit/>
+          </a:bodyPr>
+          <a:lstStyle/>
+          <a:p>
+            <a:r>
+              <a:rPr lang="en-US" dirty="0">
+                <a:solidFill>
+                  <a:schemeClr val="bg1"/>
+                </a:solidFill>
+              </a:rPr>
+              <a:t>VSTS DEMO</a:t>
+            </a:r>
+          </a:p>
+        </p:txBody>
+      </p:sp>
+      <p:pic>
+        <p:nvPicPr>
+          <p:cNvPr id="3" name="Content Placeholder 2">
+            <a:extLst>
+              <a:ext uri="{FF2B5EF4-FFF2-40B4-BE49-F238E27FC236}">
+                <a16:creationId xmlns:a16="http://schemas.microsoft.com/office/drawing/2014/main" id="{C2A63A71-EC7F-479B-9854-E0B25655E4C0}"/>
+              </a:ext>
+            </a:extLst>
+          </p:cNvPr>
+          <p:cNvPicPr>
+            <a:picLocks noGrp="1" noChangeAspect="1"/>
+          </p:cNvPicPr>
+          <p:nvPr>
+            <p:ph idx="1"/>
+          </p:nvPr>
+        </p:nvPicPr>
+        <p:blipFill>
+          <a:blip r:embed="rId3">
+            <a:extLst>
+              <a:ext uri="{28A0092B-C50C-407E-A947-70E740481C1C}">
+                <a14:useLocalDpi xmlns:a14="http://schemas.microsoft.com/office/drawing/2010/main" val="0"/>
+              </a:ext>
+            </a:extLst>
+          </a:blip>
+          <a:stretch>
+            <a:fillRect/>
+          </a:stretch>
+        </p:blipFill>
+        <p:spPr>
+          <a:xfrm>
+            <a:off x="838198" y="1690688"/>
+            <a:ext cx="3398838" cy="3398838"/>
+          </a:xfrm>
+        </p:spPr>
+      </p:pic>
+    </p:spTree>
+    <p:extLst>
+      <p:ext uri="{BB962C8B-B14F-4D97-AF65-F5344CB8AC3E}">
+        <p14:creationId xmlns:p14="http://schemas.microsoft.com/office/powerpoint/2010/main" val="3899177888"/>
+      </p:ext>
+    </p:extLst>
+  </p:cSld>
+  <p:clrMapOvr>
+    <a:masterClrMapping/>
+  </p:clrMapOvr>
+</p:sld>
+</file>
+
+<file path=ppt/slides/slide11.xml><?xml version="1.0" encoding="utf-8"?>
+<p:sld xmlns:a="http://schemas.openxmlformats.org/drawingml/2006/main" xmlns:r="http://schemas.openxmlformats.org/officeDocument/2006/relationships" xmlns:p="http://schemas.openxmlformats.org/presentationml/2006/main">
+  <p:cSld>
+    <p:bg>
+      <p:bgPr>
+        <a:solidFill>
+          <a:schemeClr val="bg1"/>
+        </a:solidFill>
+        <a:effectLst/>
+      </p:bgPr>
+    </p:bg>
+    <p:spTree>
+      <p:nvGrpSpPr>
+        <p:cNvPr id="1" name=""/>
+        <p:cNvGrpSpPr/>
+        <p:nvPr/>
+      </p:nvGrpSpPr>
+      <p:grpSpPr>
+        <a:xfrm>
+          <a:off x="0" y="0"/>
+          <a:ext cx="0" cy="0"/>
+          <a:chOff x="0" y="0"/>
+          <a:chExt cx="0" cy="0"/>
+        </a:xfrm>
+      </p:grpSpPr>
+      <p:sp>
+        <p:nvSpPr>
           <p:cNvPr id="8" name="Rectangle 7">
             <a:extLst>
               <a:ext uri="{FF2B5EF4-FFF2-40B4-BE49-F238E27FC236}">
@@ -14934,7 +18338,7 @@
 </p:sld>
 </file>
 
-<file path=ppt/slides/slide11.xml><?xml version="1.0" encoding="utf-8"?>
+<file path=ppt/slides/slide12.xml><?xml version="1.0" encoding="utf-8"?>
 <p:sld xmlns:a="http://schemas.openxmlformats.org/drawingml/2006/main" xmlns:r="http://schemas.openxmlformats.org/officeDocument/2006/relationships" xmlns:p="http://schemas.openxmlformats.org/presentationml/2006/main">
   <p:cSld>
     <p:spTree>
@@ -15047,7 +18451,7 @@
 </p:sld>
 </file>
 
-<file path=ppt/slides/slide12.xml><?xml version="1.0" encoding="utf-8"?>
+<file path=ppt/slides/slide13.xml><?xml version="1.0" encoding="utf-8"?>
 <p:sld xmlns:a="http://schemas.openxmlformats.org/drawingml/2006/main" xmlns:r="http://schemas.openxmlformats.org/officeDocument/2006/relationships" xmlns:p="http://schemas.openxmlformats.org/presentationml/2006/main">
   <p:cSld>
     <p:bg>
@@ -15941,7 +19345,7 @@
 </p:sld>
 </file>
 
-<file path=ppt/slides/slide13.xml><?xml version="1.0" encoding="utf-8"?>
+<file path=ppt/slides/slide14.xml><?xml version="1.0" encoding="utf-8"?>
 <p:sld xmlns:a="http://schemas.openxmlformats.org/drawingml/2006/main" xmlns:r="http://schemas.openxmlformats.org/officeDocument/2006/relationships" xmlns:p="http://schemas.openxmlformats.org/presentationml/2006/main">
   <p:cSld>
     <p:spTree>
@@ -16415,31 +19819,31 @@
           <a:lstStyle/>
           <a:p>
             <a:r>
-              <a:rPr lang="en-US" sz="2400"/>
-              <a:t>What is the CLI?</a:t>
-            </a:r>
-          </a:p>
-          <a:p>
-            <a:r>
-              <a:rPr lang="en-US" sz="2400"/>
+              <a:rPr lang="en-US" sz="2400" dirty="0"/>
+              <a:t>CLI overview</a:t>
+            </a:r>
+          </a:p>
+          <a:p>
+            <a:r>
+              <a:rPr lang="en-US" sz="2400" dirty="0"/>
               <a:t>Frequently used commands</a:t>
             </a:r>
           </a:p>
           <a:p>
             <a:r>
-              <a:rPr lang="en-US" sz="2400"/>
+              <a:rPr lang="en-US" sz="2400" dirty="0"/>
               <a:t>VS Code integration</a:t>
             </a:r>
           </a:p>
           <a:p>
             <a:r>
-              <a:rPr lang="en-US" sz="2400"/>
+              <a:rPr lang="en-US" sz="2400" dirty="0"/>
               <a:t>VSTS integration</a:t>
             </a:r>
           </a:p>
           <a:p>
             <a:r>
-              <a:rPr lang="en-US" sz="2400"/>
+              <a:rPr lang="en-US" sz="2400" dirty="0"/>
               <a:t>Template creation</a:t>
             </a:r>
           </a:p>
@@ -16799,7 +20203,7 @@
     <p:bg>
       <p:bgPr>
         <a:solidFill>
-          <a:schemeClr val="bg1"/>
+          <a:srgbClr val="000000"/>
         </a:solidFill>
         <a:effectLst/>
       </p:bgPr>
@@ -17530,6 +20934,273 @@
           <a:chExt cx="0" cy="0"/>
         </a:xfrm>
       </p:grpSpPr>
+      <p:pic>
+        <p:nvPicPr>
+          <p:cNvPr id="20" name="Picture 19" descr="A picture containing device, gauge&#10;&#10;Description generated with high confidence">
+            <a:extLst>
+              <a:ext uri="{FF2B5EF4-FFF2-40B4-BE49-F238E27FC236}">
+                <a16:creationId xmlns:a16="http://schemas.microsoft.com/office/drawing/2014/main" id="{7C161F73-CAB5-41B9-AAE3-A88389E1DC22}"/>
+              </a:ext>
+            </a:extLst>
+          </p:cNvPr>
+          <p:cNvPicPr>
+            <a:picLocks noChangeAspect="1"/>
+          </p:cNvPicPr>
+          <p:nvPr/>
+        </p:nvPicPr>
+        <p:blipFill>
+          <a:blip r:embed="rId3">
+            <a:duotone>
+              <a:prstClr val="black"/>
+              <a:schemeClr val="accent1">
+                <a:tint val="45000"/>
+                <a:satMod val="400000"/>
+              </a:schemeClr>
+            </a:duotone>
+            <a:extLst>
+              <a:ext uri="{28A0092B-C50C-407E-A947-70E740481C1C}">
+                <a14:useLocalDpi xmlns:a14="http://schemas.microsoft.com/office/drawing/2010/main" val="0"/>
+              </a:ext>
+            </a:extLst>
+          </a:blip>
+          <a:stretch>
+            <a:fillRect/>
+          </a:stretch>
+        </p:blipFill>
+        <p:spPr>
+          <a:xfrm>
+            <a:off x="6430046" y="3522905"/>
+            <a:ext cx="4923754" cy="3309695"/>
+          </a:xfrm>
+          <a:prstGeom prst="rect">
+            <a:avLst/>
+          </a:prstGeom>
+        </p:spPr>
+      </p:pic>
+      <p:pic>
+        <p:nvPicPr>
+          <p:cNvPr id="21" name="Picture 20" descr="A picture containing device, red&#10;&#10;Description generated with very high confidence">
+            <a:extLst>
+              <a:ext uri="{FF2B5EF4-FFF2-40B4-BE49-F238E27FC236}">
+                <a16:creationId xmlns:a16="http://schemas.microsoft.com/office/drawing/2014/main" id="{57AD2DC8-4304-46D1-93A3-AE2459F7E90F}"/>
+              </a:ext>
+            </a:extLst>
+          </p:cNvPr>
+          <p:cNvPicPr>
+            <a:picLocks noChangeAspect="1"/>
+          </p:cNvPicPr>
+          <p:nvPr/>
+        </p:nvPicPr>
+        <p:blipFill>
+          <a:blip r:embed="rId4">
+            <a:duotone>
+              <a:prstClr val="black"/>
+              <a:schemeClr val="accent1">
+                <a:tint val="45000"/>
+                <a:satMod val="400000"/>
+              </a:schemeClr>
+            </a:duotone>
+            <a:extLst>
+              <a:ext uri="{28A0092B-C50C-407E-A947-70E740481C1C}">
+                <a14:useLocalDpi xmlns:a14="http://schemas.microsoft.com/office/drawing/2010/main" val="0"/>
+              </a:ext>
+            </a:extLst>
+          </a:blip>
+          <a:stretch>
+            <a:fillRect/>
+          </a:stretch>
+        </p:blipFill>
+        <p:spPr>
+          <a:xfrm>
+            <a:off x="6622533" y="1036330"/>
+            <a:ext cx="4538779" cy="3247527"/>
+          </a:xfrm>
+          <a:prstGeom prst="rect">
+            <a:avLst/>
+          </a:prstGeom>
+        </p:spPr>
+      </p:pic>
+      <p:sp>
+        <p:nvSpPr>
+          <p:cNvPr id="2" name="Title 1">
+            <a:extLst>
+              <a:ext uri="{FF2B5EF4-FFF2-40B4-BE49-F238E27FC236}">
+                <a16:creationId xmlns:a16="http://schemas.microsoft.com/office/drawing/2014/main" id="{9E94D111-6A7C-4BE8-ACAA-678197CD7AAE}"/>
+              </a:ext>
+            </a:extLst>
+          </p:cNvPr>
+          <p:cNvSpPr>
+            <a:spLocks noGrp="1"/>
+          </p:cNvSpPr>
+          <p:nvPr>
+            <p:ph type="title"/>
+          </p:nvPr>
+        </p:nvSpPr>
+        <p:spPr/>
+        <p:txBody>
+          <a:bodyPr/>
+          <a:lstStyle/>
+          <a:p>
+            <a:r>
+              <a:rPr lang="en-US" dirty="0"/>
+              <a:t>Learn abstraction below comfort zone</a:t>
+            </a:r>
+          </a:p>
+        </p:txBody>
+      </p:sp>
+      <p:sp>
+        <p:nvSpPr>
+          <p:cNvPr id="3" name="Content Placeholder 2">
+            <a:extLst>
+              <a:ext uri="{FF2B5EF4-FFF2-40B4-BE49-F238E27FC236}">
+                <a16:creationId xmlns:a16="http://schemas.microsoft.com/office/drawing/2014/main" id="{CBC0E78D-879C-418D-9572-A93E72EB7B6F}"/>
+              </a:ext>
+            </a:extLst>
+          </p:cNvPr>
+          <p:cNvSpPr>
+            <a:spLocks noGrp="1"/>
+          </p:cNvSpPr>
+          <p:nvPr>
+            <p:ph idx="1"/>
+          </p:nvPr>
+        </p:nvSpPr>
+        <p:spPr/>
+        <p:txBody>
+          <a:bodyPr/>
+          <a:lstStyle/>
+          <a:p>
+            <a:pPr marL="0" indent="0">
+              <a:buNone/>
+            </a:pPr>
+            <a:endParaRPr lang="en-US" dirty="0"/>
+          </a:p>
+          <a:p>
+            <a:endParaRPr lang="en-US" dirty="0"/>
+          </a:p>
+          <a:p>
+            <a:endParaRPr lang="en-US" dirty="0"/>
+          </a:p>
+          <a:p>
+            <a:endParaRPr lang="en-US" dirty="0"/>
+          </a:p>
+          <a:p>
+            <a:endParaRPr lang="en-US" dirty="0"/>
+          </a:p>
+          <a:p>
+            <a:pPr lvl="1"/>
+            <a:endParaRPr lang="en-US" dirty="0"/>
+          </a:p>
+        </p:txBody>
+      </p:sp>
+      <p:graphicFrame>
+        <p:nvGraphicFramePr>
+          <p:cNvPr id="4" name="Diagram 3">
+            <a:extLst>
+              <a:ext uri="{FF2B5EF4-FFF2-40B4-BE49-F238E27FC236}">
+                <a16:creationId xmlns:a16="http://schemas.microsoft.com/office/drawing/2014/main" id="{46C719C0-9A6F-4D5D-ADA8-523D64F380BB}"/>
+              </a:ext>
+            </a:extLst>
+          </p:cNvPr>
+          <p:cNvGraphicFramePr/>
+          <p:nvPr>
+            <p:extLst>
+              <p:ext uri="{D42A27DB-BD31-4B8C-83A1-F6EECF244321}">
+                <p14:modId xmlns:p14="http://schemas.microsoft.com/office/powerpoint/2010/main" val="1066157779"/>
+              </p:ext>
+            </p:extLst>
+          </p:nvPr>
+        </p:nvGraphicFramePr>
+        <p:xfrm>
+          <a:off x="838200" y="2037807"/>
+          <a:ext cx="5499463" cy="3631474"/>
+        </p:xfrm>
+        <a:graphic>
+          <a:graphicData uri="http://schemas.openxmlformats.org/drawingml/2006/diagram">
+            <dgm:relIds xmlns:dgm="http://schemas.openxmlformats.org/drawingml/2006/diagram" xmlns:r="http://schemas.openxmlformats.org/officeDocument/2006/relationships" r:dm="rId5" r:lo="rId6" r:qs="rId7" r:cs="rId8"/>
+          </a:graphicData>
+        </a:graphic>
+      </p:graphicFrame>
+      <p:cxnSp>
+        <p:nvCxnSpPr>
+          <p:cNvPr id="9" name="Straight Connector 8">
+            <a:extLst>
+              <a:ext uri="{FF2B5EF4-FFF2-40B4-BE49-F238E27FC236}">
+                <a16:creationId xmlns:a16="http://schemas.microsoft.com/office/drawing/2014/main" id="{A979FC5E-52CD-4D86-8B11-884A083D57DC}"/>
+              </a:ext>
+            </a:extLst>
+          </p:cNvPr>
+          <p:cNvCxnSpPr>
+            <a:cxnSpLocks/>
+          </p:cNvCxnSpPr>
+          <p:nvPr/>
+        </p:nvCxnSpPr>
+        <p:spPr>
+          <a:xfrm>
+            <a:off x="769621" y="3853544"/>
+            <a:ext cx="10515600" cy="0"/>
+          </a:xfrm>
+          <a:prstGeom prst="line">
+            <a:avLst/>
+          </a:prstGeom>
+          <a:ln w="38100">
+            <a:solidFill>
+              <a:schemeClr val="tx1"/>
+            </a:solidFill>
+          </a:ln>
+        </p:spPr>
+        <p:style>
+          <a:lnRef idx="1">
+            <a:schemeClr val="accent1"/>
+          </a:lnRef>
+          <a:fillRef idx="0">
+            <a:schemeClr val="accent1"/>
+          </a:fillRef>
+          <a:effectRef idx="0">
+            <a:schemeClr val="accent1"/>
+          </a:effectRef>
+          <a:fontRef idx="minor">
+            <a:schemeClr val="tx1"/>
+          </a:fontRef>
+        </p:style>
+      </p:cxnSp>
+    </p:spTree>
+    <p:extLst>
+      <p:ext uri="{BB962C8B-B14F-4D97-AF65-F5344CB8AC3E}">
+        <p14:creationId xmlns:p14="http://schemas.microsoft.com/office/powerpoint/2010/main" val="2170745747"/>
+      </p:ext>
+    </p:extLst>
+  </p:cSld>
+  <p:clrMapOvr>
+    <a:masterClrMapping/>
+  </p:clrMapOvr>
+</p:sld>
+</file>
+
+<file path=ppt/slides/slide5.xml><?xml version="1.0" encoding="utf-8"?>
+<p:sld xmlns:a="http://schemas.openxmlformats.org/drawingml/2006/main" xmlns:r="http://schemas.openxmlformats.org/officeDocument/2006/relationships" xmlns:p="http://schemas.openxmlformats.org/presentationml/2006/main">
+  <p:cSld>
+    <p:bg>
+      <p:bgPr>
+        <a:solidFill>
+          <a:schemeClr val="bg1"/>
+        </a:solidFill>
+        <a:effectLst/>
+      </p:bgPr>
+    </p:bg>
+    <p:spTree>
+      <p:nvGrpSpPr>
+        <p:cNvPr id="1" name=""/>
+        <p:cNvGrpSpPr/>
+        <p:nvPr/>
+      </p:nvGrpSpPr>
+      <p:grpSpPr>
+        <a:xfrm>
+          <a:off x="0" y="0"/>
+          <a:ext cx="0" cy="0"/>
+          <a:chOff x="0" y="0"/>
+          <a:chExt cx="0" cy="0"/>
+        </a:xfrm>
+      </p:grpSpPr>
       <p:sp>
         <p:nvSpPr>
           <p:cNvPr id="44" name="Rectangle 43">
@@ -17761,7 +21432,7 @@
 </p:sld>
 </file>
 
-<file path=ppt/slides/slide5.xml><?xml version="1.0" encoding="utf-8"?>
+<file path=ppt/slides/slide6.xml><?xml version="1.0" encoding="utf-8"?>
 <p:sld xmlns:a="http://schemas.openxmlformats.org/drawingml/2006/main" xmlns:r="http://schemas.openxmlformats.org/officeDocument/2006/relationships" xmlns:p="http://schemas.openxmlformats.org/presentationml/2006/main">
   <p:cSld>
     <p:bg>
@@ -18239,7 +21910,7 @@
 </p:sld>
 </file>
 
-<file path=ppt/slides/slide6.xml><?xml version="1.0" encoding="utf-8"?>
+<file path=ppt/slides/slide7.xml><?xml version="1.0" encoding="utf-8"?>
 <p:sld xmlns:a="http://schemas.openxmlformats.org/drawingml/2006/main" xmlns:r="http://schemas.openxmlformats.org/officeDocument/2006/relationships" xmlns:p="http://schemas.openxmlformats.org/presentationml/2006/main">
   <p:cSld>
     <p:bg>
@@ -19030,7 +22701,7 @@
 </p:sld>
 </file>
 
-<file path=ppt/slides/slide7.xml><?xml version="1.0" encoding="utf-8"?>
+<file path=ppt/slides/slide8.xml><?xml version="1.0" encoding="utf-8"?>
 <p:sld xmlns:a="http://schemas.openxmlformats.org/drawingml/2006/main" xmlns:r="http://schemas.openxmlformats.org/officeDocument/2006/relationships" xmlns:p="http://schemas.openxmlformats.org/presentationml/2006/main">
   <p:cSld>
     <p:bg>
@@ -19396,7 +23067,7 @@
 </p:sld>
 </file>
 
-<file path=ppt/slides/slide8.xml><?xml version="1.0" encoding="utf-8"?>
+<file path=ppt/slides/slide9.xml><?xml version="1.0" encoding="utf-8"?>
 <p:sld xmlns:a="http://schemas.openxmlformats.org/drawingml/2006/main" xmlns:r="http://schemas.openxmlformats.org/officeDocument/2006/relationships" xmlns:p="http://schemas.openxmlformats.org/presentationml/2006/main">
   <p:cSld>
     <p:bg>
@@ -19701,335 +23372,6 @@
       </p:par>
     </p:tnLst>
   </p:timing>
-</p:sld>
-</file>
-
-<file path=ppt/slides/slide9.xml><?xml version="1.0" encoding="utf-8"?>
-<p:sld xmlns:a="http://schemas.openxmlformats.org/drawingml/2006/main" xmlns:r="http://schemas.openxmlformats.org/officeDocument/2006/relationships" xmlns:p="http://schemas.openxmlformats.org/presentationml/2006/main">
-  <p:cSld>
-    <p:bg>
-      <p:bgPr>
-        <a:solidFill>
-          <a:schemeClr val="bg1"/>
-        </a:solidFill>
-        <a:effectLst/>
-      </p:bgPr>
-    </p:bg>
-    <p:spTree>
-      <p:nvGrpSpPr>
-        <p:cNvPr id="1" name=""/>
-        <p:cNvGrpSpPr/>
-        <p:nvPr/>
-      </p:nvGrpSpPr>
-      <p:grpSpPr>
-        <a:xfrm>
-          <a:off x="0" y="0"/>
-          <a:ext cx="0" cy="0"/>
-          <a:chOff x="0" y="0"/>
-          <a:chExt cx="0" cy="0"/>
-        </a:xfrm>
-      </p:grpSpPr>
-      <p:sp>
-        <p:nvSpPr>
-          <p:cNvPr id="22" name="Freeform: Shape 21">
-            <a:extLst>
-              <a:ext uri="{FF2B5EF4-FFF2-40B4-BE49-F238E27FC236}">
-                <a16:creationId xmlns:a16="http://schemas.microsoft.com/office/drawing/2014/main" id="{64965EAE-E41A-435F-B993-07E824B6C977}"/>
-              </a:ext>
-            </a:extLst>
-          </p:cNvPr>
-          <p:cNvSpPr>
-            <a:spLocks noGrp="1" noRot="1" noChangeAspect="1" noMove="1" noResize="1" noEditPoints="1" noAdjustHandles="1" noChangeArrowheads="1" noChangeShapeType="1" noTextEdit="1"/>
-          </p:cNvSpPr>
-          <p:nvPr>
-            <p:extLst>
-              <p:ext uri="{386F3935-93C4-4BCD-93E2-E3B085C9AB24}">
-                <p16:designElem xmlns:p16="http://schemas.microsoft.com/office/powerpoint/2015/main" val="1"/>
-              </p:ext>
-            </p:extLst>
-          </p:nvPr>
-        </p:nvSpPr>
-        <p:spPr>
-          <a:xfrm flipV="1">
-            <a:off x="1" y="0"/>
-            <a:ext cx="7539895" cy="6858000"/>
-          </a:xfrm>
-          <a:custGeom>
-            <a:avLst/>
-            <a:gdLst>
-              <a:gd name="connsiteX0" fmla="*/ 7539895 w 7539895"/>
-              <a:gd name="connsiteY0" fmla="*/ 6858000 h 6858000"/>
-              <a:gd name="connsiteX1" fmla="*/ 0 w 7539895"/>
-              <a:gd name="connsiteY1" fmla="*/ 6858000 h 6858000"/>
-              <a:gd name="connsiteX2" fmla="*/ 0 w 7539895"/>
-              <a:gd name="connsiteY2" fmla="*/ 0 h 6858000"/>
-              <a:gd name="connsiteX3" fmla="*/ 4363741 w 7539895"/>
-              <a:gd name="connsiteY3" fmla="*/ 0 h 6858000"/>
-            </a:gdLst>
-            <a:ahLst/>
-            <a:cxnLst>
-              <a:cxn ang="0">
-                <a:pos x="connsiteX0" y="connsiteY0"/>
-              </a:cxn>
-              <a:cxn ang="0">
-                <a:pos x="connsiteX1" y="connsiteY1"/>
-              </a:cxn>
-              <a:cxn ang="0">
-                <a:pos x="connsiteX2" y="connsiteY2"/>
-              </a:cxn>
-              <a:cxn ang="0">
-                <a:pos x="connsiteX3" y="connsiteY3"/>
-              </a:cxn>
-            </a:cxnLst>
-            <a:rect l="l" t="t" r="r" b="b"/>
-            <a:pathLst>
-              <a:path w="7539895" h="6858000">
-                <a:moveTo>
-                  <a:pt x="7539895" y="6858000"/>
-                </a:moveTo>
-                <a:lnTo>
-                  <a:pt x="0" y="6858000"/>
-                </a:lnTo>
-                <a:lnTo>
-                  <a:pt x="0" y="0"/>
-                </a:lnTo>
-                <a:lnTo>
-                  <a:pt x="4363741" y="0"/>
-                </a:lnTo>
-                <a:close/>
-              </a:path>
-            </a:pathLst>
-          </a:custGeom>
-          <a:solidFill>
-            <a:schemeClr val="tx1">
-              <a:lumMod val="85000"/>
-              <a:lumOff val="15000"/>
-              <a:alpha val="70000"/>
-            </a:schemeClr>
-          </a:solidFill>
-          <a:ln>
-            <a:noFill/>
-          </a:ln>
-        </p:spPr>
-        <p:style>
-          <a:lnRef idx="2">
-            <a:schemeClr val="accent1">
-              <a:shade val="50000"/>
-            </a:schemeClr>
-          </a:lnRef>
-          <a:fillRef idx="1">
-            <a:schemeClr val="accent1"/>
-          </a:fillRef>
-          <a:effectRef idx="0">
-            <a:schemeClr val="accent1"/>
-          </a:effectRef>
-          <a:fontRef idx="minor">
-            <a:schemeClr val="lt1"/>
-          </a:fontRef>
-        </p:style>
-        <p:txBody>
-          <a:bodyPr wrap="square" rtlCol="0" anchor="ctr">
-            <a:noAutofit/>
-          </a:bodyPr>
-          <a:lstStyle/>
-          <a:p>
-            <a:pPr algn="ctr"/>
-            <a:endParaRPr lang="en-US"/>
-          </a:p>
-        </p:txBody>
-      </p:sp>
-      <p:sp>
-        <p:nvSpPr>
-          <p:cNvPr id="24" name="Freeform: Shape 23">
-            <a:extLst>
-              <a:ext uri="{FF2B5EF4-FFF2-40B4-BE49-F238E27FC236}">
-                <a16:creationId xmlns:a16="http://schemas.microsoft.com/office/drawing/2014/main" id="{152F8994-E6D4-4311-9548-C3607BC43645}"/>
-              </a:ext>
-            </a:extLst>
-          </p:cNvPr>
-          <p:cNvSpPr>
-            <a:spLocks noGrp="1" noRot="1" noChangeAspect="1" noMove="1" noResize="1" noEditPoints="1" noAdjustHandles="1" noChangeArrowheads="1" noChangeShapeType="1" noTextEdit="1"/>
-          </p:cNvSpPr>
-          <p:nvPr>
-            <p:extLst>
-              <p:ext uri="{386F3935-93C4-4BCD-93E2-E3B085C9AB24}">
-                <p16:designElem xmlns:p16="http://schemas.microsoft.com/office/powerpoint/2015/main" val="1"/>
-              </p:ext>
-            </p:extLst>
-          </p:nvPr>
-        </p:nvSpPr>
-        <p:spPr>
-          <a:xfrm flipV="1">
-            <a:off x="0" y="0"/>
-            <a:ext cx="7092985" cy="6858000"/>
-          </a:xfrm>
-          <a:custGeom>
-            <a:avLst/>
-            <a:gdLst>
-              <a:gd name="connsiteX0" fmla="*/ 7092985 w 7092985"/>
-              <a:gd name="connsiteY0" fmla="*/ 6858000 h 6858000"/>
-              <a:gd name="connsiteX1" fmla="*/ 0 w 7092985"/>
-              <a:gd name="connsiteY1" fmla="*/ 6858000 h 6858000"/>
-              <a:gd name="connsiteX2" fmla="*/ 0 w 7092985"/>
-              <a:gd name="connsiteY2" fmla="*/ 0 h 6858000"/>
-              <a:gd name="connsiteX3" fmla="*/ 3916831 w 7092985"/>
-              <a:gd name="connsiteY3" fmla="*/ 0 h 6858000"/>
-            </a:gdLst>
-            <a:ahLst/>
-            <a:cxnLst>
-              <a:cxn ang="0">
-                <a:pos x="connsiteX0" y="connsiteY0"/>
-              </a:cxn>
-              <a:cxn ang="0">
-                <a:pos x="connsiteX1" y="connsiteY1"/>
-              </a:cxn>
-              <a:cxn ang="0">
-                <a:pos x="connsiteX2" y="connsiteY2"/>
-              </a:cxn>
-              <a:cxn ang="0">
-                <a:pos x="connsiteX3" y="connsiteY3"/>
-              </a:cxn>
-            </a:cxnLst>
-            <a:rect l="l" t="t" r="r" b="b"/>
-            <a:pathLst>
-              <a:path w="7092985" h="6858000">
-                <a:moveTo>
-                  <a:pt x="7092985" y="6858000"/>
-                </a:moveTo>
-                <a:lnTo>
-                  <a:pt x="0" y="6858000"/>
-                </a:lnTo>
-                <a:lnTo>
-                  <a:pt x="0" y="0"/>
-                </a:lnTo>
-                <a:lnTo>
-                  <a:pt x="3916831" y="0"/>
-                </a:lnTo>
-                <a:close/>
-              </a:path>
-            </a:pathLst>
-          </a:custGeom>
-          <a:solidFill>
-            <a:schemeClr val="tx1">
-              <a:lumMod val="85000"/>
-              <a:lumOff val="15000"/>
-            </a:schemeClr>
-          </a:solidFill>
-          <a:ln>
-            <a:noFill/>
-          </a:ln>
-        </p:spPr>
-        <p:style>
-          <a:lnRef idx="2">
-            <a:schemeClr val="accent1">
-              <a:shade val="50000"/>
-            </a:schemeClr>
-          </a:lnRef>
-          <a:fillRef idx="1">
-            <a:schemeClr val="accent1"/>
-          </a:fillRef>
-          <a:effectRef idx="0">
-            <a:schemeClr val="accent1"/>
-          </a:effectRef>
-          <a:fontRef idx="minor">
-            <a:schemeClr val="lt1"/>
-          </a:fontRef>
-        </p:style>
-        <p:txBody>
-          <a:bodyPr wrap="square" rtlCol="0" anchor="ctr">
-            <a:noAutofit/>
-          </a:bodyPr>
-          <a:lstStyle/>
-          <a:p>
-            <a:pPr algn="ctr"/>
-            <a:endParaRPr lang="en-US"/>
-          </a:p>
-        </p:txBody>
-      </p:sp>
-      <p:sp>
-        <p:nvSpPr>
-          <p:cNvPr id="8" name="Title 7">
-            <a:extLst>
-              <a:ext uri="{FF2B5EF4-FFF2-40B4-BE49-F238E27FC236}">
-                <a16:creationId xmlns:a16="http://schemas.microsoft.com/office/drawing/2014/main" id="{9AAF6E53-C7E3-404C-8C15-A04C67BE1A24}"/>
-              </a:ext>
-            </a:extLst>
-          </p:cNvPr>
-          <p:cNvSpPr>
-            <a:spLocks noGrp="1"/>
-          </p:cNvSpPr>
-          <p:nvPr>
-            <p:ph type="title"/>
-          </p:nvPr>
-        </p:nvSpPr>
-        <p:spPr>
-          <a:xfrm>
-            <a:off x="838199" y="365125"/>
-            <a:ext cx="5529943" cy="1325563"/>
-          </a:xfrm>
-        </p:spPr>
-        <p:txBody>
-          <a:bodyPr>
-            <a:normAutofit/>
-          </a:bodyPr>
-          <a:lstStyle/>
-          <a:p>
-            <a:r>
-              <a:rPr lang="en-US" dirty="0">
-                <a:solidFill>
-                  <a:schemeClr val="bg1"/>
-                </a:solidFill>
-              </a:rPr>
-              <a:t>VSTS DEMO</a:t>
-            </a:r>
-          </a:p>
-        </p:txBody>
-      </p:sp>
-      <p:pic>
-        <p:nvPicPr>
-          <p:cNvPr id="3" name="Content Placeholder 2">
-            <a:extLst>
-              <a:ext uri="{FF2B5EF4-FFF2-40B4-BE49-F238E27FC236}">
-                <a16:creationId xmlns:a16="http://schemas.microsoft.com/office/drawing/2014/main" id="{C2A63A71-EC7F-479B-9854-E0B25655E4C0}"/>
-              </a:ext>
-            </a:extLst>
-          </p:cNvPr>
-          <p:cNvPicPr>
-            <a:picLocks noGrp="1" noChangeAspect="1"/>
-          </p:cNvPicPr>
-          <p:nvPr>
-            <p:ph idx="1"/>
-          </p:nvPr>
-        </p:nvPicPr>
-        <p:blipFill>
-          <a:blip r:embed="rId3">
-            <a:extLst>
-              <a:ext uri="{28A0092B-C50C-407E-A947-70E740481C1C}">
-                <a14:useLocalDpi xmlns:a14="http://schemas.microsoft.com/office/drawing/2010/main" val="0"/>
-              </a:ext>
-            </a:extLst>
-          </a:blip>
-          <a:stretch>
-            <a:fillRect/>
-          </a:stretch>
-        </p:blipFill>
-        <p:spPr>
-          <a:xfrm>
-            <a:off x="838198" y="1690688"/>
-            <a:ext cx="3398838" cy="3398838"/>
-          </a:xfrm>
-        </p:spPr>
-      </p:pic>
-    </p:spTree>
-    <p:extLst>
-      <p:ext uri="{BB962C8B-B14F-4D97-AF65-F5344CB8AC3E}">
-        <p14:creationId xmlns:p14="http://schemas.microsoft.com/office/powerpoint/2010/main" val="3899177888"/>
-      </p:ext>
-    </p:extLst>
-  </p:cSld>
-  <p:clrMapOvr>
-    <a:masterClrMapping/>
-  </p:clrMapOvr>
 </p:sld>
 </file>
 

</xml_diff>

<commit_message>
Update demo slide formatting
</commit_message>
<xml_diff>
--- a/Tour de .NET Core CLI.pptx
+++ b/Tour de .NET Core CLI.pptx
@@ -20,7 +20,7 @@
     <p:sldId id="350" r:id="rId11"/>
     <p:sldId id="355" r:id="rId12"/>
     <p:sldId id="351" r:id="rId13"/>
-    <p:sldId id="358" r:id="rId14"/>
+    <p:sldId id="360" r:id="rId14"/>
     <p:sldId id="346" r:id="rId15"/>
     <p:sldId id="356" r:id="rId16"/>
   </p:sldIdLst>
@@ -146,7 +146,7 @@
             <p14:sldId id="350"/>
             <p14:sldId id="355"/>
             <p14:sldId id="351"/>
-            <p14:sldId id="358"/>
+            <p14:sldId id="360"/>
             <p14:sldId id="346"/>
             <p14:sldId id="356"/>
           </p14:sldIdLst>
@@ -7424,7 +7424,7 @@
     </p:spTree>
     <p:extLst>
       <p:ext uri="{BB962C8B-B14F-4D97-AF65-F5344CB8AC3E}">
-        <p14:creationId xmlns:p14="http://schemas.microsoft.com/office/powerpoint/2010/main" val="1134501301"/>
+        <p14:creationId xmlns:p14="http://schemas.microsoft.com/office/powerpoint/2010/main" val="3206361114"/>
       </p:ext>
     </p:extLst>
   </p:cSld>
@@ -18379,6 +18379,16 @@
 <file path=ppt/slides/slide12.xml><?xml version="1.0" encoding="utf-8"?>
 <p:sld xmlns:a="http://schemas.openxmlformats.org/drawingml/2006/main" xmlns:r="http://schemas.openxmlformats.org/officeDocument/2006/relationships" xmlns:p="http://schemas.openxmlformats.org/presentationml/2006/main">
   <p:cSld>
+    <p:bg>
+      <p:bgPr>
+        <a:solidFill>
+          <a:schemeClr val="accent3">
+            <a:lumMod val="75000"/>
+          </a:schemeClr>
+        </a:solidFill>
+        <a:effectLst/>
+      </p:bgPr>
+    </p:bg>
     <p:spTree>
       <p:nvGrpSpPr>
         <p:cNvPr id="1" name=""/>
@@ -18393,6 +18403,361 @@
           <a:chExt cx="0" cy="0"/>
         </a:xfrm>
       </p:grpSpPr>
+      <p:sp>
+        <p:nvSpPr>
+          <p:cNvPr id="29" name="Rectangle 28">
+            <a:extLst>
+              <a:ext uri="{FF2B5EF4-FFF2-40B4-BE49-F238E27FC236}">
+                <a16:creationId xmlns:a16="http://schemas.microsoft.com/office/drawing/2014/main" id="{23207CC6-EAA1-4BFF-A48A-DECAD8972717}"/>
+              </a:ext>
+            </a:extLst>
+          </p:cNvPr>
+          <p:cNvSpPr>
+            <a:spLocks noGrp="1" noRot="1" noChangeAspect="1" noMove="1" noResize="1" noEditPoints="1" noAdjustHandles="1" noChangeArrowheads="1" noChangeShapeType="1" noTextEdit="1"/>
+          </p:cNvSpPr>
+          <p:nvPr>
+            <p:extLst>
+              <p:ext uri="{386F3935-93C4-4BCD-93E2-E3B085C9AB24}">
+                <p16:designElem xmlns:p16="http://schemas.microsoft.com/office/powerpoint/2015/main" val="1"/>
+              </p:ext>
+            </p:extLst>
+          </p:nvPr>
+        </p:nvSpPr>
+        <p:spPr>
+          <a:xfrm>
+            <a:off x="0" y="-3324"/>
+            <a:ext cx="12192000" cy="6861324"/>
+          </a:xfrm>
+          <a:prstGeom prst="rect">
+            <a:avLst/>
+          </a:prstGeom>
+          <a:solidFill>
+            <a:schemeClr val="accent3">
+              <a:lumMod val="75000"/>
+            </a:schemeClr>
+          </a:solidFill>
+          <a:ln>
+            <a:noFill/>
+          </a:ln>
+        </p:spPr>
+        <p:style>
+          <a:lnRef idx="2">
+            <a:schemeClr val="accent1">
+              <a:shade val="50000"/>
+            </a:schemeClr>
+          </a:lnRef>
+          <a:fillRef idx="1">
+            <a:schemeClr val="accent1"/>
+          </a:fillRef>
+          <a:effectRef idx="0">
+            <a:schemeClr val="accent1"/>
+          </a:effectRef>
+          <a:fontRef idx="minor">
+            <a:schemeClr val="lt1"/>
+          </a:fontRef>
+        </p:style>
+        <p:txBody>
+          <a:bodyPr rtlCol="0" anchor="ctr"/>
+          <a:lstStyle/>
+          <a:p>
+            <a:pPr algn="ctr"/>
+            <a:endParaRPr lang="en-US"/>
+          </a:p>
+        </p:txBody>
+      </p:sp>
+      <p:sp>
+        <p:nvSpPr>
+          <p:cNvPr id="31" name="Freeform 3">
+            <a:extLst>
+              <a:ext uri="{FF2B5EF4-FFF2-40B4-BE49-F238E27FC236}">
+                <a16:creationId xmlns:a16="http://schemas.microsoft.com/office/drawing/2014/main" id="{B234A3DD-923D-4166-8B19-7DD589908C68}"/>
+              </a:ext>
+            </a:extLst>
+          </p:cNvPr>
+          <p:cNvSpPr>
+            <a:spLocks noGrp="1" noRot="1" noChangeAspect="1" noMove="1" noResize="1" noEditPoints="1" noAdjustHandles="1" noChangeArrowheads="1" noChangeShapeType="1" noTextEdit="1"/>
+          </p:cNvSpPr>
+          <p:nvPr>
+            <p:extLst>
+              <p:ext uri="{386F3935-93C4-4BCD-93E2-E3B085C9AB24}">
+                <p16:designElem xmlns:p16="http://schemas.microsoft.com/office/powerpoint/2015/main" val="1"/>
+              </p:ext>
+            </p:extLst>
+          </p:nvPr>
+        </p:nvSpPr>
+        <p:spPr>
+          <a:xfrm>
+            <a:off x="1246925" y="-479"/>
+            <a:ext cx="9468701" cy="6858478"/>
+          </a:xfrm>
+          <a:custGeom>
+            <a:avLst/>
+            <a:gdLst>
+              <a:gd name="connsiteX0" fmla="*/ 0 w 8078051"/>
+              <a:gd name="connsiteY0" fmla="*/ 0 h 5829300"/>
+              <a:gd name="connsiteX1" fmla="*/ 4453793 w 8078051"/>
+              <a:gd name="connsiteY1" fmla="*/ 0 h 5829300"/>
+              <a:gd name="connsiteX2" fmla="*/ 5363426 w 8078051"/>
+              <a:gd name="connsiteY2" fmla="*/ 0 h 5829300"/>
+              <a:gd name="connsiteX3" fmla="*/ 5368184 w 8078051"/>
+              <a:gd name="connsiteY3" fmla="*/ 0 h 5829300"/>
+              <a:gd name="connsiteX4" fmla="*/ 8078051 w 8078051"/>
+              <a:gd name="connsiteY4" fmla="*/ 5829300 h 5829300"/>
+              <a:gd name="connsiteX5" fmla="*/ 1743926 w 8078051"/>
+              <a:gd name="connsiteY5" fmla="*/ 5829300 h 5829300"/>
+              <a:gd name="connsiteX6" fmla="*/ 1744148 w 8078051"/>
+              <a:gd name="connsiteY6" fmla="*/ 5828822 h 5829300"/>
+              <a:gd name="connsiteX7" fmla="*/ 0 w 8078051"/>
+              <a:gd name="connsiteY7" fmla="*/ 5828822 h 5829300"/>
+            </a:gdLst>
+            <a:ahLst/>
+            <a:cxnLst>
+              <a:cxn ang="0">
+                <a:pos x="connsiteX0" y="connsiteY0"/>
+              </a:cxn>
+              <a:cxn ang="0">
+                <a:pos x="connsiteX1" y="connsiteY1"/>
+              </a:cxn>
+              <a:cxn ang="0">
+                <a:pos x="connsiteX2" y="connsiteY2"/>
+              </a:cxn>
+              <a:cxn ang="0">
+                <a:pos x="connsiteX3" y="connsiteY3"/>
+              </a:cxn>
+              <a:cxn ang="0">
+                <a:pos x="connsiteX4" y="connsiteY4"/>
+              </a:cxn>
+              <a:cxn ang="0">
+                <a:pos x="connsiteX5" y="connsiteY5"/>
+              </a:cxn>
+              <a:cxn ang="0">
+                <a:pos x="connsiteX6" y="connsiteY6"/>
+              </a:cxn>
+              <a:cxn ang="0">
+                <a:pos x="connsiteX7" y="connsiteY7"/>
+              </a:cxn>
+            </a:cxnLst>
+            <a:rect l="l" t="t" r="r" b="b"/>
+            <a:pathLst>
+              <a:path w="8078051" h="5829300">
+                <a:moveTo>
+                  <a:pt x="0" y="0"/>
+                </a:moveTo>
+                <a:lnTo>
+                  <a:pt x="4453793" y="0"/>
+                </a:lnTo>
+                <a:lnTo>
+                  <a:pt x="5363426" y="0"/>
+                </a:lnTo>
+                <a:lnTo>
+                  <a:pt x="5368184" y="0"/>
+                </a:lnTo>
+                <a:lnTo>
+                  <a:pt x="8078051" y="5829300"/>
+                </a:lnTo>
+                <a:lnTo>
+                  <a:pt x="1743926" y="5829300"/>
+                </a:lnTo>
+                <a:lnTo>
+                  <a:pt x="1744148" y="5828822"/>
+                </a:lnTo>
+                <a:lnTo>
+                  <a:pt x="0" y="5828822"/>
+                </a:lnTo>
+                <a:close/>
+              </a:path>
+            </a:pathLst>
+          </a:custGeom>
+          <a:solidFill>
+            <a:schemeClr val="bg1">
+              <a:lumMod val="85000"/>
+              <a:lumOff val="15000"/>
+              <a:alpha val="70000"/>
+            </a:schemeClr>
+          </a:solidFill>
+          <a:ln>
+            <a:noFill/>
+          </a:ln>
+        </p:spPr>
+        <p:style>
+          <a:lnRef idx="2">
+            <a:schemeClr val="accent1">
+              <a:shade val="50000"/>
+            </a:schemeClr>
+          </a:lnRef>
+          <a:fillRef idx="1">
+            <a:schemeClr val="accent1"/>
+          </a:fillRef>
+          <a:effectRef idx="0">
+            <a:schemeClr val="accent1"/>
+          </a:effectRef>
+          <a:fontRef idx="minor">
+            <a:schemeClr val="lt1"/>
+          </a:fontRef>
+        </p:style>
+        <p:txBody>
+          <a:bodyPr rtlCol="0" anchor="ctr"/>
+          <a:lstStyle/>
+          <a:p>
+            <a:pPr algn="ctr"/>
+            <a:endParaRPr lang="en-US"/>
+          </a:p>
+        </p:txBody>
+      </p:sp>
+      <p:sp>
+        <p:nvSpPr>
+          <p:cNvPr id="33" name="Freeform 16">
+            <a:extLst>
+              <a:ext uri="{FF2B5EF4-FFF2-40B4-BE49-F238E27FC236}">
+                <a16:creationId xmlns:a16="http://schemas.microsoft.com/office/drawing/2014/main" id="{F6ACA5AC-3C5D-4994-B40F-FC8349E4D6F4}"/>
+              </a:ext>
+            </a:extLst>
+          </p:cNvPr>
+          <p:cNvSpPr>
+            <a:spLocks noGrp="1" noRot="1" noChangeAspect="1" noMove="1" noResize="1" noEditPoints="1" noAdjustHandles="1" noChangeArrowheads="1" noChangeShapeType="1" noTextEdit="1"/>
+          </p:cNvSpPr>
+          <p:nvPr>
+            <p:extLst>
+              <p:ext uri="{386F3935-93C4-4BCD-93E2-E3B085C9AB24}">
+                <p16:designElem xmlns:p16="http://schemas.microsoft.com/office/powerpoint/2015/main" val="1"/>
+              </p:ext>
+            </p:extLst>
+          </p:nvPr>
+        </p:nvSpPr>
+        <p:spPr>
+          <a:xfrm>
+            <a:off x="-1" y="-479"/>
+            <a:ext cx="9324977" cy="6858479"/>
+          </a:xfrm>
+          <a:custGeom>
+            <a:avLst/>
+            <a:gdLst>
+              <a:gd name="connsiteX0" fmla="*/ 1246925 w 9324977"/>
+              <a:gd name="connsiteY0" fmla="*/ 0 h 6858479"/>
+              <a:gd name="connsiteX1" fmla="*/ 5076797 w 9324977"/>
+              <a:gd name="connsiteY1" fmla="*/ 0 h 6858479"/>
+              <a:gd name="connsiteX2" fmla="*/ 6143025 w 9324977"/>
+              <a:gd name="connsiteY2" fmla="*/ 0 h 6858479"/>
+              <a:gd name="connsiteX3" fmla="*/ 6148602 w 9324977"/>
+              <a:gd name="connsiteY3" fmla="*/ 0 h 6858479"/>
+              <a:gd name="connsiteX4" fmla="*/ 9324977 w 9324977"/>
+              <a:gd name="connsiteY4" fmla="*/ 6858478 h 6858479"/>
+              <a:gd name="connsiteX5" fmla="*/ 3359025 w 9324977"/>
+              <a:gd name="connsiteY5" fmla="*/ 6858478 h 6858479"/>
+              <a:gd name="connsiteX6" fmla="*/ 3359025 w 9324977"/>
+              <a:gd name="connsiteY6" fmla="*/ 6858479 h 6858479"/>
+              <a:gd name="connsiteX7" fmla="*/ 0 w 9324977"/>
+              <a:gd name="connsiteY7" fmla="*/ 6858479 h 6858479"/>
+              <a:gd name="connsiteX8" fmla="*/ 0 w 9324977"/>
+              <a:gd name="connsiteY8" fmla="*/ 479 h 6858479"/>
+              <a:gd name="connsiteX9" fmla="*/ 1246925 w 9324977"/>
+              <a:gd name="connsiteY9" fmla="*/ 479 h 6858479"/>
+            </a:gdLst>
+            <a:ahLst/>
+            <a:cxnLst>
+              <a:cxn ang="0">
+                <a:pos x="connsiteX0" y="connsiteY0"/>
+              </a:cxn>
+              <a:cxn ang="0">
+                <a:pos x="connsiteX1" y="connsiteY1"/>
+              </a:cxn>
+              <a:cxn ang="0">
+                <a:pos x="connsiteX2" y="connsiteY2"/>
+              </a:cxn>
+              <a:cxn ang="0">
+                <a:pos x="connsiteX3" y="connsiteY3"/>
+              </a:cxn>
+              <a:cxn ang="0">
+                <a:pos x="connsiteX4" y="connsiteY4"/>
+              </a:cxn>
+              <a:cxn ang="0">
+                <a:pos x="connsiteX5" y="connsiteY5"/>
+              </a:cxn>
+              <a:cxn ang="0">
+                <a:pos x="connsiteX6" y="connsiteY6"/>
+              </a:cxn>
+              <a:cxn ang="0">
+                <a:pos x="connsiteX7" y="connsiteY7"/>
+              </a:cxn>
+              <a:cxn ang="0">
+                <a:pos x="connsiteX8" y="connsiteY8"/>
+              </a:cxn>
+              <a:cxn ang="0">
+                <a:pos x="connsiteX9" y="connsiteY9"/>
+              </a:cxn>
+            </a:cxnLst>
+            <a:rect l="l" t="t" r="r" b="b"/>
+            <a:pathLst>
+              <a:path w="9324977" h="6858479">
+                <a:moveTo>
+                  <a:pt x="1246925" y="0"/>
+                </a:moveTo>
+                <a:lnTo>
+                  <a:pt x="5076797" y="0"/>
+                </a:lnTo>
+                <a:lnTo>
+                  <a:pt x="6143025" y="0"/>
+                </a:lnTo>
+                <a:lnTo>
+                  <a:pt x="6148602" y="0"/>
+                </a:lnTo>
+                <a:lnTo>
+                  <a:pt x="9324977" y="6858478"/>
+                </a:lnTo>
+                <a:lnTo>
+                  <a:pt x="3359025" y="6858478"/>
+                </a:lnTo>
+                <a:lnTo>
+                  <a:pt x="3359025" y="6858479"/>
+                </a:lnTo>
+                <a:lnTo>
+                  <a:pt x="0" y="6858479"/>
+                </a:lnTo>
+                <a:lnTo>
+                  <a:pt x="0" y="479"/>
+                </a:lnTo>
+                <a:lnTo>
+                  <a:pt x="1246925" y="479"/>
+                </a:lnTo>
+                <a:close/>
+              </a:path>
+            </a:pathLst>
+          </a:custGeom>
+          <a:solidFill>
+            <a:schemeClr val="bg1">
+              <a:lumMod val="85000"/>
+              <a:lumOff val="15000"/>
+            </a:schemeClr>
+          </a:solidFill>
+          <a:ln>
+            <a:noFill/>
+          </a:ln>
+        </p:spPr>
+        <p:style>
+          <a:lnRef idx="2">
+            <a:schemeClr val="accent1">
+              <a:shade val="50000"/>
+            </a:schemeClr>
+          </a:lnRef>
+          <a:fillRef idx="1">
+            <a:schemeClr val="accent1"/>
+          </a:fillRef>
+          <a:effectRef idx="0">
+            <a:schemeClr val="accent1"/>
+          </a:effectRef>
+          <a:fontRef idx="minor">
+            <a:schemeClr val="lt1"/>
+          </a:fontRef>
+        </p:style>
+        <p:txBody>
+          <a:bodyPr rtlCol="0" anchor="ctr"/>
+          <a:lstStyle/>
+          <a:p>
+            <a:pPr algn="ctr"/>
+            <a:endParaRPr lang="en-US"/>
+          </a:p>
+        </p:txBody>
+      </p:sp>
       <p:sp>
         <p:nvSpPr>
           <p:cNvPr id="2" name="Title 1"/>
@@ -18479,7 +18844,7 @@
     </p:spTree>
     <p:extLst>
       <p:ext uri="{BB962C8B-B14F-4D97-AF65-F5344CB8AC3E}">
-        <p14:creationId xmlns:p14="http://schemas.microsoft.com/office/powerpoint/2010/main" val="3080341078"/>
+        <p14:creationId xmlns:p14="http://schemas.microsoft.com/office/powerpoint/2010/main" val="551720111"/>
       </p:ext>
     </p:extLst>
   </p:cSld>

</xml_diff>

<commit_message>
Add a couple new slides
</commit_message>
<xml_diff>
--- a/Tour de .NET Core CLI.pptx
+++ b/Tour de .NET Core CLI.pptx
@@ -6,7 +6,7 @@
     <p:sldMasterId id="2147483847" r:id="rId2"/>
   </p:sldMasterIdLst>
   <p:notesMasterIdLst>
-    <p:notesMasterId r:id="rId17"/>
+    <p:notesMasterId r:id="rId19"/>
   </p:notesMasterIdLst>
   <p:sldIdLst>
     <p:sldId id="342" r:id="rId3"/>
@@ -16,13 +16,15 @@
     <p:sldId id="352" r:id="rId7"/>
     <p:sldId id="348" r:id="rId8"/>
     <p:sldId id="349" r:id="rId9"/>
-    <p:sldId id="354" r:id="rId10"/>
-    <p:sldId id="350" r:id="rId11"/>
-    <p:sldId id="355" r:id="rId12"/>
+    <p:sldId id="361" r:id="rId10"/>
+    <p:sldId id="362" r:id="rId11"/>
+    <p:sldId id="354" r:id="rId12"/>
     <p:sldId id="351" r:id="rId13"/>
     <p:sldId id="360" r:id="rId14"/>
-    <p:sldId id="346" r:id="rId15"/>
-    <p:sldId id="356" r:id="rId16"/>
+    <p:sldId id="350" r:id="rId15"/>
+    <p:sldId id="355" r:id="rId16"/>
+    <p:sldId id="346" r:id="rId17"/>
+    <p:sldId id="356" r:id="rId18"/>
   </p:sldIdLst>
   <p:sldSz cx="12192000" cy="6858000"/>
   <p:notesSz cx="6858000" cy="9144000"/>
@@ -31,7 +33,7 @@
       <p:sldLst>
         <p:sld r:id="rId3"/>
         <p:sld r:id="rId4"/>
-        <p:sld r:id="rId15"/>
+        <p:sld r:id="rId17"/>
       </p:sldLst>
     </p:custShow>
   </p:custShowLst>
@@ -142,11 +144,13 @@
             <p14:sldId id="352"/>
             <p14:sldId id="348"/>
             <p14:sldId id="349"/>
+            <p14:sldId id="361"/>
+            <p14:sldId id="362"/>
             <p14:sldId id="354"/>
+            <p14:sldId id="351"/>
+            <p14:sldId id="360"/>
             <p14:sldId id="350"/>
             <p14:sldId id="355"/>
-            <p14:sldId id="351"/>
-            <p14:sldId id="360"/>
             <p14:sldId id="346"/>
             <p14:sldId id="356"/>
           </p14:sldIdLst>
@@ -6722,7 +6726,7 @@
           <a:p>
             <a:fld id="{3B87D1B5-D667-42F5-9E38-2FD202ABDFA0}" type="datetimeFigureOut">
               <a:rPr lang="en-US" smtClean="0"/>
-              <a:t>3/21/2018</a:t>
+              <a:t>3/22/2018</a:t>
             </a:fld>
             <a:endParaRPr lang="en-US"/>
           </a:p>
@@ -7171,18 +7175,7 @@
           <a:bodyPr/>
           <a:lstStyle/>
           <a:p>
-            <a:r>
-              <a:rPr lang="en-US" dirty="0"/>
-              <a:t>- scottaddie.visualstudio.com &gt; </a:t>
-            </a:r>
-            <a:r>
-              <a:rPr lang="en-US" dirty="0" err="1"/>
-              <a:t>TagHelperSuite</a:t>
-            </a:r>
-            <a:r>
-              <a:rPr lang="en-US" dirty="0"/>
-              <a:t> build definition</a:t>
-            </a:r>
+            <a:endParaRPr lang="en-US" dirty="0"/>
           </a:p>
         </p:txBody>
       </p:sp>
@@ -7212,7 +7205,7 @@
     </p:spTree>
     <p:extLst>
       <p:ext uri="{BB962C8B-B14F-4D97-AF65-F5344CB8AC3E}">
-        <p14:creationId xmlns:p14="http://schemas.microsoft.com/office/powerpoint/2010/main" val="170369036"/>
+        <p14:creationId xmlns:p14="http://schemas.microsoft.com/office/powerpoint/2010/main" val="178583391"/>
       </p:ext>
     </p:extLst>
   </p:cSld>
@@ -7478,7 +7471,37 @@
           <a:bodyPr/>
           <a:lstStyle/>
           <a:p>
-            <a:endParaRPr lang="en-US"/>
+            <a:pPr marL="171450" indent="-171450">
+              <a:buFontTx/>
+              <a:buChar char="-"/>
+            </a:pPr>
+            <a:r>
+              <a:rPr lang="en-US" dirty="0"/>
+              <a:t>Also applies to TFS</a:t>
+            </a:r>
+          </a:p>
+          <a:p>
+            <a:pPr marL="171450" indent="-171450">
+              <a:buFontTx/>
+              <a:buChar char="-"/>
+            </a:pPr>
+            <a:r>
+              <a:rPr lang="en-US" dirty="0"/>
+              <a:t>If using IDE / editor, you wouldn’t know the CLI </a:t>
+            </a:r>
+            <a:r>
+              <a:rPr lang="en-US" dirty="0" err="1"/>
+              <a:t>params</a:t>
+            </a:r>
+            <a:r>
+              <a:rPr lang="en-US" dirty="0"/>
+              <a:t> </a:t>
+            </a:r>
+            <a:r>
+              <a:rPr lang="en-US"/>
+              <a:t>to pass</a:t>
+            </a:r>
+            <a:endParaRPr lang="en-US" dirty="0"/>
           </a:p>
         </p:txBody>
       </p:sp>
@@ -7497,78 +7520,18 @@
           <a:bodyPr/>
           <a:lstStyle/>
           <a:p>
-            <a:pPr marL="0" marR="0" lvl="0" indent="0" algn="r" defTabSz="457200" rtl="0" eaLnBrk="1" fontAlgn="auto" latinLnBrk="0" hangingPunct="1">
-              <a:lnSpc>
-                <a:spcPct val="100000"/>
-              </a:lnSpc>
-              <a:spcBef>
-                <a:spcPts val="0"/>
-              </a:spcBef>
-              <a:spcAft>
-                <a:spcPts val="0"/>
-              </a:spcAft>
-              <a:buClrTx/>
-              <a:buSzTx/>
-              <a:buFontTx/>
-              <a:buNone/>
-              <a:tabLst/>
-              <a:defRPr/>
-            </a:pPr>
             <a:fld id="{16A87904-88DE-4022-A424-ACD2E6FC1751}" type="slidenum">
-              <a:rPr kumimoji="0" lang="en-US" sz="1200" b="0" i="0" u="none" strike="noStrike" kern="1200" cap="none" spc="0" normalizeH="0" baseline="0" noProof="0" smtClean="0">
-                <a:ln>
-                  <a:noFill/>
-                </a:ln>
-                <a:solidFill>
-                  <a:prstClr val="black"/>
-                </a:solidFill>
-                <a:effectLst/>
-                <a:uLnTx/>
-                <a:uFillTx/>
-                <a:latin typeface="Calibri" panose="020F0502020204030204"/>
-                <a:ea typeface="+mn-ea"/>
-                <a:cs typeface="+mn-cs"/>
-              </a:rPr>
-              <a:pPr marL="0" marR="0" lvl="0" indent="0" algn="r" defTabSz="457200" rtl="0" eaLnBrk="1" fontAlgn="auto" latinLnBrk="0" hangingPunct="1">
-                <a:lnSpc>
-                  <a:spcPct val="100000"/>
-                </a:lnSpc>
-                <a:spcBef>
-                  <a:spcPts val="0"/>
-                </a:spcBef>
-                <a:spcAft>
-                  <a:spcPts val="0"/>
-                </a:spcAft>
-                <a:buClrTx/>
-                <a:buSzTx/>
-                <a:buFontTx/>
-                <a:buNone/>
-                <a:tabLst/>
-                <a:defRPr/>
-              </a:pPr>
+              <a:rPr lang="en-US" smtClean="0"/>
               <a:t>13</a:t>
             </a:fld>
-            <a:endParaRPr kumimoji="0" lang="en-US" sz="1200" b="0" i="0" u="none" strike="noStrike" kern="1200" cap="none" spc="0" normalizeH="0" baseline="0" noProof="0">
-              <a:ln>
-                <a:noFill/>
-              </a:ln>
-              <a:solidFill>
-                <a:prstClr val="black"/>
-              </a:solidFill>
-              <a:effectLst/>
-              <a:uLnTx/>
-              <a:uFillTx/>
-              <a:latin typeface="Calibri" panose="020F0502020204030204"/>
-              <a:ea typeface="+mn-ea"/>
-              <a:cs typeface="+mn-cs"/>
-            </a:endParaRPr>
+            <a:endParaRPr lang="en-US"/>
           </a:p>
         </p:txBody>
       </p:sp>
     </p:spTree>
     <p:extLst>
       <p:ext uri="{BB962C8B-B14F-4D97-AF65-F5344CB8AC3E}">
-        <p14:creationId xmlns:p14="http://schemas.microsoft.com/office/powerpoint/2010/main" val="1176352571"/>
+        <p14:creationId xmlns:p14="http://schemas.microsoft.com/office/powerpoint/2010/main" val="2199057065"/>
       </p:ext>
     </p:extLst>
   </p:cSld>
@@ -7622,7 +7585,18 @@
           <a:bodyPr/>
           <a:lstStyle/>
           <a:p>
-            <a:endParaRPr lang="en-US"/>
+            <a:r>
+              <a:rPr lang="en-US" dirty="0"/>
+              <a:t>- scottaddie.visualstudio.com &gt; </a:t>
+            </a:r>
+            <a:r>
+              <a:rPr lang="en-US" dirty="0" err="1"/>
+              <a:t>TagHelperSuite</a:t>
+            </a:r>
+            <a:r>
+              <a:rPr lang="en-US" dirty="0"/>
+              <a:t> build definition</a:t>
+            </a:r>
           </a:p>
         </p:txBody>
       </p:sp>
@@ -7644,6 +7618,234 @@
             <a:fld id="{16A87904-88DE-4022-A424-ACD2E6FC1751}" type="slidenum">
               <a:rPr lang="en-US" smtClean="0"/>
               <a:t>14</a:t>
+            </a:fld>
+            <a:endParaRPr lang="en-US"/>
+          </a:p>
+        </p:txBody>
+      </p:sp>
+    </p:spTree>
+    <p:extLst>
+      <p:ext uri="{BB962C8B-B14F-4D97-AF65-F5344CB8AC3E}">
+        <p14:creationId xmlns:p14="http://schemas.microsoft.com/office/powerpoint/2010/main" val="170369036"/>
+      </p:ext>
+    </p:extLst>
+  </p:cSld>
+  <p:clrMapOvr>
+    <a:masterClrMapping/>
+  </p:clrMapOvr>
+</p:notes>
+</file>
+
+<file path=ppt/notesSlides/notesSlide15.xml><?xml version="1.0" encoding="utf-8"?>
+<p:notes xmlns:a="http://schemas.openxmlformats.org/drawingml/2006/main" xmlns:r="http://schemas.openxmlformats.org/officeDocument/2006/relationships" xmlns:p="http://schemas.openxmlformats.org/presentationml/2006/main">
+  <p:cSld>
+    <p:spTree>
+      <p:nvGrpSpPr>
+        <p:cNvPr id="1" name=""/>
+        <p:cNvGrpSpPr/>
+        <p:nvPr/>
+      </p:nvGrpSpPr>
+      <p:grpSpPr>
+        <a:xfrm>
+          <a:off x="0" y="0"/>
+          <a:ext cx="0" cy="0"/>
+          <a:chOff x="0" y="0"/>
+          <a:chExt cx="0" cy="0"/>
+        </a:xfrm>
+      </p:grpSpPr>
+      <p:sp>
+        <p:nvSpPr>
+          <p:cNvPr id="2" name="Slide Image Placeholder 1"/>
+          <p:cNvSpPr>
+            <a:spLocks noGrp="1" noRot="1" noChangeAspect="1"/>
+          </p:cNvSpPr>
+          <p:nvPr>
+            <p:ph type="sldImg"/>
+          </p:nvPr>
+        </p:nvSpPr>
+        <p:spPr/>
+      </p:sp>
+      <p:sp>
+        <p:nvSpPr>
+          <p:cNvPr id="3" name="Notes Placeholder 2"/>
+          <p:cNvSpPr>
+            <a:spLocks noGrp="1"/>
+          </p:cNvSpPr>
+          <p:nvPr>
+            <p:ph type="body" idx="1"/>
+          </p:nvPr>
+        </p:nvSpPr>
+        <p:spPr/>
+        <p:txBody>
+          <a:bodyPr/>
+          <a:lstStyle/>
+          <a:p>
+            <a:endParaRPr lang="en-US"/>
+          </a:p>
+        </p:txBody>
+      </p:sp>
+      <p:sp>
+        <p:nvSpPr>
+          <p:cNvPr id="4" name="Slide Number Placeholder 3"/>
+          <p:cNvSpPr>
+            <a:spLocks noGrp="1"/>
+          </p:cNvSpPr>
+          <p:nvPr>
+            <p:ph type="sldNum" sz="quarter" idx="10"/>
+          </p:nvPr>
+        </p:nvSpPr>
+        <p:spPr/>
+        <p:txBody>
+          <a:bodyPr/>
+          <a:lstStyle/>
+          <a:p>
+            <a:pPr marL="0" marR="0" lvl="0" indent="0" algn="r" defTabSz="457200" rtl="0" eaLnBrk="1" fontAlgn="auto" latinLnBrk="0" hangingPunct="1">
+              <a:lnSpc>
+                <a:spcPct val="100000"/>
+              </a:lnSpc>
+              <a:spcBef>
+                <a:spcPts val="0"/>
+              </a:spcBef>
+              <a:spcAft>
+                <a:spcPts val="0"/>
+              </a:spcAft>
+              <a:buClrTx/>
+              <a:buSzTx/>
+              <a:buFontTx/>
+              <a:buNone/>
+              <a:tabLst/>
+              <a:defRPr/>
+            </a:pPr>
+            <a:fld id="{16A87904-88DE-4022-A424-ACD2E6FC1751}" type="slidenum">
+              <a:rPr kumimoji="0" lang="en-US" sz="1200" b="0" i="0" u="none" strike="noStrike" kern="1200" cap="none" spc="0" normalizeH="0" baseline="0" noProof="0" smtClean="0">
+                <a:ln>
+                  <a:noFill/>
+                </a:ln>
+                <a:solidFill>
+                  <a:prstClr val="black"/>
+                </a:solidFill>
+                <a:effectLst/>
+                <a:uLnTx/>
+                <a:uFillTx/>
+                <a:latin typeface="Calibri" panose="020F0502020204030204"/>
+                <a:ea typeface="+mn-ea"/>
+                <a:cs typeface="+mn-cs"/>
+              </a:rPr>
+              <a:pPr marL="0" marR="0" lvl="0" indent="0" algn="r" defTabSz="457200" rtl="0" eaLnBrk="1" fontAlgn="auto" latinLnBrk="0" hangingPunct="1">
+                <a:lnSpc>
+                  <a:spcPct val="100000"/>
+                </a:lnSpc>
+                <a:spcBef>
+                  <a:spcPts val="0"/>
+                </a:spcBef>
+                <a:spcAft>
+                  <a:spcPts val="0"/>
+                </a:spcAft>
+                <a:buClrTx/>
+                <a:buSzTx/>
+                <a:buFontTx/>
+                <a:buNone/>
+                <a:tabLst/>
+                <a:defRPr/>
+              </a:pPr>
+              <a:t>15</a:t>
+            </a:fld>
+            <a:endParaRPr kumimoji="0" lang="en-US" sz="1200" b="0" i="0" u="none" strike="noStrike" kern="1200" cap="none" spc="0" normalizeH="0" baseline="0" noProof="0">
+              <a:ln>
+                <a:noFill/>
+              </a:ln>
+              <a:solidFill>
+                <a:prstClr val="black"/>
+              </a:solidFill>
+              <a:effectLst/>
+              <a:uLnTx/>
+              <a:uFillTx/>
+              <a:latin typeface="Calibri" panose="020F0502020204030204"/>
+              <a:ea typeface="+mn-ea"/>
+              <a:cs typeface="+mn-cs"/>
+            </a:endParaRPr>
+          </a:p>
+        </p:txBody>
+      </p:sp>
+    </p:spTree>
+    <p:extLst>
+      <p:ext uri="{BB962C8B-B14F-4D97-AF65-F5344CB8AC3E}">
+        <p14:creationId xmlns:p14="http://schemas.microsoft.com/office/powerpoint/2010/main" val="1176352571"/>
+      </p:ext>
+    </p:extLst>
+  </p:cSld>
+  <p:clrMapOvr>
+    <a:masterClrMapping/>
+  </p:clrMapOvr>
+</p:notes>
+</file>
+
+<file path=ppt/notesSlides/notesSlide16.xml><?xml version="1.0" encoding="utf-8"?>
+<p:notes xmlns:a="http://schemas.openxmlformats.org/drawingml/2006/main" xmlns:r="http://schemas.openxmlformats.org/officeDocument/2006/relationships" xmlns:p="http://schemas.openxmlformats.org/presentationml/2006/main">
+  <p:cSld>
+    <p:spTree>
+      <p:nvGrpSpPr>
+        <p:cNvPr id="1" name=""/>
+        <p:cNvGrpSpPr/>
+        <p:nvPr/>
+      </p:nvGrpSpPr>
+      <p:grpSpPr>
+        <a:xfrm>
+          <a:off x="0" y="0"/>
+          <a:ext cx="0" cy="0"/>
+          <a:chOff x="0" y="0"/>
+          <a:chExt cx="0" cy="0"/>
+        </a:xfrm>
+      </p:grpSpPr>
+      <p:sp>
+        <p:nvSpPr>
+          <p:cNvPr id="2" name="Slide Image Placeholder 1"/>
+          <p:cNvSpPr>
+            <a:spLocks noGrp="1" noRot="1" noChangeAspect="1"/>
+          </p:cNvSpPr>
+          <p:nvPr>
+            <p:ph type="sldImg"/>
+          </p:nvPr>
+        </p:nvSpPr>
+        <p:spPr/>
+      </p:sp>
+      <p:sp>
+        <p:nvSpPr>
+          <p:cNvPr id="3" name="Notes Placeholder 2"/>
+          <p:cNvSpPr>
+            <a:spLocks noGrp="1"/>
+          </p:cNvSpPr>
+          <p:nvPr>
+            <p:ph type="body" idx="1"/>
+          </p:nvPr>
+        </p:nvSpPr>
+        <p:spPr/>
+        <p:txBody>
+          <a:bodyPr/>
+          <a:lstStyle/>
+          <a:p>
+            <a:endParaRPr lang="en-US"/>
+          </a:p>
+        </p:txBody>
+      </p:sp>
+      <p:sp>
+        <p:nvSpPr>
+          <p:cNvPr id="4" name="Slide Number Placeholder 3"/>
+          <p:cNvSpPr>
+            <a:spLocks noGrp="1"/>
+          </p:cNvSpPr>
+          <p:nvPr>
+            <p:ph type="sldNum" sz="quarter" idx="10"/>
+          </p:nvPr>
+        </p:nvSpPr>
+        <p:spPr/>
+        <p:txBody>
+          <a:bodyPr/>
+          <a:lstStyle/>
+          <a:p>
+            <a:fld id="{16A87904-88DE-4022-A424-ACD2E6FC1751}" type="slidenum">
+              <a:rPr lang="en-US" smtClean="0"/>
+              <a:t>16</a:t>
             </a:fld>
             <a:endParaRPr lang="en-US"/>
           </a:p>
@@ -8344,7 +8546,14 @@
           <a:bodyPr/>
           <a:lstStyle/>
           <a:p>
-            <a:endParaRPr lang="en-US" dirty="0"/>
+            <a:pPr marL="171450" indent="-171450">
+              <a:buFontTx/>
+              <a:buChar char="-"/>
+            </a:pPr>
+            <a:r>
+              <a:rPr lang="en-US" dirty="0"/>
+              <a:t>enables item template generation</a:t>
+            </a:r>
           </a:p>
         </p:txBody>
       </p:sp>
@@ -8374,7 +8583,7 @@
     </p:spTree>
     <p:extLst>
       <p:ext uri="{BB962C8B-B14F-4D97-AF65-F5344CB8AC3E}">
-        <p14:creationId xmlns:p14="http://schemas.microsoft.com/office/powerpoint/2010/main" val="178583391"/>
+        <p14:creationId xmlns:p14="http://schemas.microsoft.com/office/powerpoint/2010/main" val="1652413329"/>
       </p:ext>
     </p:extLst>
   </p:cSld>
@@ -8428,36 +8637,6 @@
           <a:bodyPr/>
           <a:lstStyle/>
           <a:p>
-            <a:pPr marL="171450" indent="-171450">
-              <a:buFontTx/>
-              <a:buChar char="-"/>
-            </a:pPr>
-            <a:r>
-              <a:rPr lang="en-US" dirty="0"/>
-              <a:t>Also applies to TFS</a:t>
-            </a:r>
-          </a:p>
-          <a:p>
-            <a:pPr marL="171450" indent="-171450">
-              <a:buFontTx/>
-              <a:buChar char="-"/>
-            </a:pPr>
-            <a:r>
-              <a:rPr lang="en-US" dirty="0"/>
-              <a:t>If using IDE / editor, you wouldn’t know the CLI </a:t>
-            </a:r>
-            <a:r>
-              <a:rPr lang="en-US" dirty="0" err="1"/>
-              <a:t>params</a:t>
-            </a:r>
-            <a:r>
-              <a:rPr lang="en-US" dirty="0"/>
-              <a:t> </a:t>
-            </a:r>
-            <a:r>
-              <a:rPr lang="en-US"/>
-              <a:t>to pass</a:t>
-            </a:r>
             <a:endParaRPr lang="en-US" dirty="0"/>
           </a:p>
         </p:txBody>
@@ -8488,7 +8667,7 @@
     </p:spTree>
     <p:extLst>
       <p:ext uri="{BB962C8B-B14F-4D97-AF65-F5344CB8AC3E}">
-        <p14:creationId xmlns:p14="http://schemas.microsoft.com/office/powerpoint/2010/main" val="2199057065"/>
+        <p14:creationId xmlns:p14="http://schemas.microsoft.com/office/powerpoint/2010/main" val="822866661"/>
       </p:ext>
     </p:extLst>
   </p:cSld>
@@ -8629,7 +8808,7 @@
           <a:p>
             <a:fld id="{EEC3160E-2579-4584-9765-DC1BA0B358F9}" type="datetimeFigureOut">
               <a:rPr lang="en-US" smtClean="0"/>
-              <a:t>3/21/2018</a:t>
+              <a:t>3/22/2018</a:t>
             </a:fld>
             <a:endParaRPr lang="en-US"/>
           </a:p>
@@ -8799,7 +8978,7 @@
           <a:p>
             <a:fld id="{EEC3160E-2579-4584-9765-DC1BA0B358F9}" type="datetimeFigureOut">
               <a:rPr lang="en-US" smtClean="0"/>
-              <a:t>3/21/2018</a:t>
+              <a:t>3/22/2018</a:t>
             </a:fld>
             <a:endParaRPr lang="en-US"/>
           </a:p>
@@ -8979,7 +9158,7 @@
           <a:p>
             <a:fld id="{EEC3160E-2579-4584-9765-DC1BA0B358F9}" type="datetimeFigureOut">
               <a:rPr lang="en-US" smtClean="0"/>
-              <a:t>3/21/2018</a:t>
+              <a:t>3/22/2018</a:t>
             </a:fld>
             <a:endParaRPr lang="en-US"/>
           </a:p>
@@ -10894,7 +11073,7 @@
           <a:p>
             <a:fld id="{EEC3160E-2579-4584-9765-DC1BA0B358F9}" type="datetimeFigureOut">
               <a:rPr lang="en-US" smtClean="0"/>
-              <a:t>3/21/2018</a:t>
+              <a:t>3/22/2018</a:t>
             </a:fld>
             <a:endParaRPr lang="en-US"/>
           </a:p>
@@ -12376,7 +12555,7 @@
           <a:p>
             <a:fld id="{EEC3160E-2579-4584-9765-DC1BA0B358F9}" type="datetimeFigureOut">
               <a:rPr lang="en-US" smtClean="0"/>
-              <a:t>3/21/2018</a:t>
+              <a:t>3/22/2018</a:t>
             </a:fld>
             <a:endParaRPr lang="en-US"/>
           </a:p>
@@ -13516,7 +13695,7 @@
           <a:p>
             <a:fld id="{EEC3160E-2579-4584-9765-DC1BA0B358F9}" type="datetimeFigureOut">
               <a:rPr lang="en-US" smtClean="0"/>
-              <a:t>3/21/2018</a:t>
+              <a:t>3/22/2018</a:t>
             </a:fld>
             <a:endParaRPr lang="en-US"/>
           </a:p>
@@ -13883,7 +14062,7 @@
           <a:p>
             <a:fld id="{EEC3160E-2579-4584-9765-DC1BA0B358F9}" type="datetimeFigureOut">
               <a:rPr lang="en-US" smtClean="0"/>
-              <a:t>3/21/2018</a:t>
+              <a:t>3/22/2018</a:t>
             </a:fld>
             <a:endParaRPr lang="en-US"/>
           </a:p>
@@ -14001,7 +14180,7 @@
           <a:p>
             <a:fld id="{EEC3160E-2579-4584-9765-DC1BA0B358F9}" type="datetimeFigureOut">
               <a:rPr lang="en-US" smtClean="0"/>
-              <a:t>3/21/2018</a:t>
+              <a:t>3/22/2018</a:t>
             </a:fld>
             <a:endParaRPr lang="en-US"/>
           </a:p>
@@ -14096,7 +14275,7 @@
           <a:p>
             <a:fld id="{EEC3160E-2579-4584-9765-DC1BA0B358F9}" type="datetimeFigureOut">
               <a:rPr lang="en-US" smtClean="0"/>
-              <a:t>3/21/2018</a:t>
+              <a:t>3/22/2018</a:t>
             </a:fld>
             <a:endParaRPr lang="en-US"/>
           </a:p>
@@ -14373,7 +14552,7 @@
           <a:p>
             <a:fld id="{EEC3160E-2579-4584-9765-DC1BA0B358F9}" type="datetimeFigureOut">
               <a:rPr lang="en-US" smtClean="0"/>
-              <a:t>3/21/2018</a:t>
+              <a:t>3/22/2018</a:t>
             </a:fld>
             <a:endParaRPr lang="en-US"/>
           </a:p>
@@ -14630,7 +14809,7 @@
           <a:p>
             <a:fld id="{EEC3160E-2579-4584-9765-DC1BA0B358F9}" type="datetimeFigureOut">
               <a:rPr lang="en-US" smtClean="0"/>
-              <a:t>3/21/2018</a:t>
+              <a:t>3/22/2018</a:t>
             </a:fld>
             <a:endParaRPr lang="en-US"/>
           </a:p>
@@ -14843,7 +15022,7 @@
           <a:p>
             <a:fld id="{EEC3160E-2579-4584-9765-DC1BA0B358F9}" type="datetimeFigureOut">
               <a:rPr lang="en-US" smtClean="0"/>
-              <a:t>3/21/2018</a:t>
+              <a:t>3/22/2018</a:t>
             </a:fld>
             <a:endParaRPr lang="en-US"/>
           </a:p>
@@ -17728,31 +17907,65 @@
           <a:lstStyle/>
           <a:p>
             <a:r>
-              <a:rPr lang="en-US" dirty="0">
+              <a:rPr lang="en-US">
                 <a:solidFill>
                   <a:schemeClr val="bg1"/>
                 </a:solidFill>
               </a:rPr>
-              <a:t>VSTS DEMO</a:t>
+              <a:t>VS Code DEMO</a:t>
             </a:r>
+          </a:p>
+        </p:txBody>
+      </p:sp>
+      <p:sp>
+        <p:nvSpPr>
+          <p:cNvPr id="21" name="Content Placeholder 18">
+            <a:extLst>
+              <a:ext uri="{FF2B5EF4-FFF2-40B4-BE49-F238E27FC236}">
+                <a16:creationId xmlns:a16="http://schemas.microsoft.com/office/drawing/2014/main" id="{74E7A070-D35D-4F51-A17C-F0F85E45F25A}"/>
+              </a:ext>
+            </a:extLst>
+          </p:cNvPr>
+          <p:cNvSpPr>
+            <a:spLocks noGrp="1"/>
+          </p:cNvSpPr>
+          <p:nvPr>
+            <p:ph idx="1"/>
+          </p:nvPr>
+        </p:nvSpPr>
+        <p:spPr>
+          <a:xfrm>
+            <a:off x="838199" y="1825625"/>
+            <a:ext cx="4128169" cy="3399518"/>
+          </a:xfrm>
+        </p:spPr>
+        <p:txBody>
+          <a:bodyPr>
+            <a:normAutofit/>
+          </a:bodyPr>
+          <a:lstStyle/>
+          <a:p>
+            <a:endParaRPr lang="en-US" sz="2000">
+              <a:solidFill>
+                <a:schemeClr val="bg1"/>
+              </a:solidFill>
+            </a:endParaRPr>
           </a:p>
         </p:txBody>
       </p:sp>
       <p:pic>
         <p:nvPicPr>
-          <p:cNvPr id="3" name="Content Placeholder 2">
+          <p:cNvPr id="17" name="Content Placeholder 10">
             <a:extLst>
               <a:ext uri="{FF2B5EF4-FFF2-40B4-BE49-F238E27FC236}">
-                <a16:creationId xmlns:a16="http://schemas.microsoft.com/office/drawing/2014/main" id="{C2A63A71-EC7F-479B-9854-E0B25655E4C0}"/>
+                <a16:creationId xmlns:a16="http://schemas.microsoft.com/office/drawing/2014/main" id="{65A7D466-8CEF-4FDA-864F-09BC3FFAA26D}"/>
               </a:ext>
             </a:extLst>
           </p:cNvPr>
           <p:cNvPicPr>
-            <a:picLocks noGrp="1" noChangeAspect="1"/>
+            <a:picLocks noChangeAspect="1"/>
           </p:cNvPicPr>
-          <p:nvPr>
-            <p:ph idx="1"/>
-          </p:nvPr>
+          <p:nvPr/>
         </p:nvPicPr>
         <p:blipFill>
           <a:blip r:embed="rId3">
@@ -17768,15 +17981,18 @@
         </p:blipFill>
         <p:spPr>
           <a:xfrm>
-            <a:off x="838198" y="1690688"/>
-            <a:ext cx="3398838" cy="3398838"/>
+            <a:off x="1383499" y="2016769"/>
+            <a:ext cx="2835804" cy="2824461"/>
           </a:xfrm>
+          <a:prstGeom prst="rect">
+            <a:avLst/>
+          </a:prstGeom>
         </p:spPr>
       </p:pic>
     </p:spTree>
     <p:extLst>
       <p:ext uri="{BB962C8B-B14F-4D97-AF65-F5344CB8AC3E}">
-        <p14:creationId xmlns:p14="http://schemas.microsoft.com/office/powerpoint/2010/main" val="3899177888"/>
+        <p14:creationId xmlns:p14="http://schemas.microsoft.com/office/powerpoint/2010/main" val="682550062"/>
       </p:ext>
     </p:extLst>
   </p:cSld>
@@ -18921,6 +19137,844 @@
     <p:bg>
       <p:bgPr>
         <a:solidFill>
+          <a:schemeClr val="bg1"/>
+        </a:solidFill>
+        <a:effectLst/>
+      </p:bgPr>
+    </p:bg>
+    <p:spTree>
+      <p:nvGrpSpPr>
+        <p:cNvPr id="1" name=""/>
+        <p:cNvGrpSpPr/>
+        <p:nvPr/>
+      </p:nvGrpSpPr>
+      <p:grpSpPr>
+        <a:xfrm>
+          <a:off x="0" y="0"/>
+          <a:ext cx="0" cy="0"/>
+          <a:chOff x="0" y="0"/>
+          <a:chExt cx="0" cy="0"/>
+        </a:xfrm>
+      </p:grpSpPr>
+      <p:sp>
+        <p:nvSpPr>
+          <p:cNvPr id="8" name="Rectangle 7">
+            <a:extLst>
+              <a:ext uri="{FF2B5EF4-FFF2-40B4-BE49-F238E27FC236}">
+                <a16:creationId xmlns:a16="http://schemas.microsoft.com/office/drawing/2014/main" id="{8D70B121-56F4-4848-B38B-182089D909FA}"/>
+              </a:ext>
+            </a:extLst>
+          </p:cNvPr>
+          <p:cNvSpPr>
+            <a:spLocks noGrp="1" noRot="1" noChangeAspect="1" noMove="1" noResize="1" noEditPoints="1" noAdjustHandles="1" noChangeArrowheads="1" noChangeShapeType="1" noTextEdit="1"/>
+          </p:cNvSpPr>
+          <p:nvPr>
+            <p:extLst>
+              <p:ext uri="{386F3935-93C4-4BCD-93E2-E3B085C9AB24}">
+                <p16:designElem xmlns:p16="http://schemas.microsoft.com/office/powerpoint/2015/main" val="1"/>
+              </p:ext>
+            </p:extLst>
+          </p:nvPr>
+        </p:nvSpPr>
+        <p:spPr bwMode="ltGray">
+          <a:xfrm>
+            <a:off x="321564" y="320040"/>
+            <a:ext cx="11548872" cy="6217920"/>
+          </a:xfrm>
+          <a:prstGeom prst="rect">
+            <a:avLst/>
+          </a:prstGeom>
+          <a:solidFill>
+            <a:schemeClr val="tx1">
+              <a:alpha val="8000"/>
+            </a:schemeClr>
+          </a:solidFill>
+          <a:ln w="127000" cap="sq" cmpd="thinThick">
+            <a:noFill/>
+          </a:ln>
+        </p:spPr>
+        <p:style>
+          <a:lnRef idx="2">
+            <a:schemeClr val="accent1">
+              <a:shade val="50000"/>
+            </a:schemeClr>
+          </a:lnRef>
+          <a:fillRef idx="1">
+            <a:schemeClr val="accent1"/>
+          </a:fillRef>
+          <a:effectRef idx="0">
+            <a:schemeClr val="accent1"/>
+          </a:effectRef>
+          <a:fontRef idx="minor">
+            <a:schemeClr val="lt1"/>
+          </a:fontRef>
+        </p:style>
+        <p:txBody>
+          <a:bodyPr rtlCol="0" anchor="ctr"/>
+          <a:lstStyle/>
+          <a:p>
+            <a:pPr algn="ctr"/>
+            <a:endParaRPr lang="en-US"/>
+          </a:p>
+        </p:txBody>
+      </p:sp>
+      <p:cxnSp>
+        <p:nvCxnSpPr>
+          <p:cNvPr id="10" name="Straight Connector 9">
+            <a:extLst>
+              <a:ext uri="{FF2B5EF4-FFF2-40B4-BE49-F238E27FC236}">
+                <a16:creationId xmlns:a16="http://schemas.microsoft.com/office/drawing/2014/main" id="{2D72A2C9-F3CA-4216-8BAD-FA4C970C3C4E}"/>
+              </a:ext>
+            </a:extLst>
+          </p:cNvPr>
+          <p:cNvCxnSpPr>
+            <a:cxnSpLocks noGrp="1" noRot="1" noChangeAspect="1" noMove="1" noResize="1" noEditPoints="1" noAdjustHandles="1" noChangeArrowheads="1" noChangeShapeType="1"/>
+          </p:cNvCxnSpPr>
+          <p:nvPr>
+            <p:extLst>
+              <p:ext uri="{386F3935-93C4-4BCD-93E2-E3B085C9AB24}">
+                <p16:designElem xmlns:p16="http://schemas.microsoft.com/office/powerpoint/2015/main" val="1"/>
+              </p:ext>
+            </p:extLst>
+          </p:nvPr>
+        </p:nvCxnSpPr>
+        <p:spPr>
+          <a:xfrm>
+            <a:off x="4654296" y="2057400"/>
+            <a:ext cx="0" cy="2743200"/>
+          </a:xfrm>
+          <a:prstGeom prst="line">
+            <a:avLst/>
+          </a:prstGeom>
+          <a:ln w="19050">
+            <a:solidFill>
+              <a:schemeClr val="tx1">
+                <a:lumMod val="85000"/>
+                <a:lumOff val="15000"/>
+              </a:schemeClr>
+            </a:solidFill>
+          </a:ln>
+        </p:spPr>
+        <p:style>
+          <a:lnRef idx="1">
+            <a:schemeClr val="accent1"/>
+          </a:lnRef>
+          <a:fillRef idx="0">
+            <a:schemeClr val="accent1"/>
+          </a:fillRef>
+          <a:effectRef idx="0">
+            <a:schemeClr val="accent1"/>
+          </a:effectRef>
+          <a:fontRef idx="minor">
+            <a:schemeClr val="tx1"/>
+          </a:fontRef>
+        </p:style>
+      </p:cxnSp>
+      <p:sp>
+        <p:nvSpPr>
+          <p:cNvPr id="2" name="Title 1"/>
+          <p:cNvSpPr>
+            <a:spLocks noGrp="1"/>
+          </p:cNvSpPr>
+          <p:nvPr>
+            <p:ph type="title"/>
+          </p:nvPr>
+        </p:nvSpPr>
+        <p:spPr>
+          <a:xfrm>
+            <a:off x="838200" y="963877"/>
+            <a:ext cx="3494362" cy="4930246"/>
+          </a:xfrm>
+        </p:spPr>
+        <p:txBody>
+          <a:bodyPr>
+            <a:normAutofit/>
+          </a:bodyPr>
+          <a:lstStyle/>
+          <a:p>
+            <a:pPr algn="r"/>
+            <a:r>
+              <a:rPr lang="en-US">
+                <a:solidFill>
+                  <a:schemeClr val="accent1"/>
+                </a:solidFill>
+              </a:rPr>
+              <a:t>Integration with VSTS</a:t>
+            </a:r>
+          </a:p>
+        </p:txBody>
+      </p:sp>
+      <p:sp>
+        <p:nvSpPr>
+          <p:cNvPr id="3" name="Content Placeholder 2"/>
+          <p:cNvSpPr>
+            <a:spLocks noGrp="1"/>
+          </p:cNvSpPr>
+          <p:nvPr>
+            <p:ph idx="1"/>
+          </p:nvPr>
+        </p:nvSpPr>
+        <p:spPr>
+          <a:xfrm>
+            <a:off x="4976031" y="963877"/>
+            <a:ext cx="6377769" cy="4930246"/>
+          </a:xfrm>
+        </p:spPr>
+        <p:txBody>
+          <a:bodyPr anchor="ctr">
+            <a:normAutofit/>
+          </a:bodyPr>
+          <a:lstStyle/>
+          <a:p>
+            <a:r>
+              <a:rPr lang="en-US" sz="2400" dirty="0"/>
+              <a:t>CI / CD pipeline</a:t>
+            </a:r>
+          </a:p>
+          <a:p>
+            <a:pPr lvl="1"/>
+            <a:r>
+              <a:rPr lang="en-US" sz="2000" dirty="0"/>
+              <a:t>Build definitions</a:t>
+            </a:r>
+          </a:p>
+          <a:p>
+            <a:pPr lvl="1"/>
+            <a:r>
+              <a:rPr lang="en-US" sz="2000" dirty="0"/>
+              <a:t>Release definitions</a:t>
+            </a:r>
+          </a:p>
+          <a:p>
+            <a:r>
+              <a:rPr lang="en-US" sz="2400" dirty="0"/>
+              <a:t>CLI knowledge needed for advanced cases</a:t>
+            </a:r>
+          </a:p>
+        </p:txBody>
+      </p:sp>
+    </p:spTree>
+    <p:extLst>
+      <p:ext uri="{BB962C8B-B14F-4D97-AF65-F5344CB8AC3E}">
+        <p14:creationId xmlns:p14="http://schemas.microsoft.com/office/powerpoint/2010/main" val="1360020685"/>
+      </p:ext>
+    </p:extLst>
+  </p:cSld>
+  <p:clrMapOvr>
+    <a:masterClrMapping/>
+  </p:clrMapOvr>
+  <p:timing>
+    <p:tnLst>
+      <p:par>
+        <p:cTn id="1" dur="indefinite" restart="never" nodeType="tmRoot">
+          <p:childTnLst>
+            <p:seq concurrent="1" nextAc="seek">
+              <p:cTn id="2" dur="indefinite" nodeType="mainSeq">
+                <p:childTnLst>
+                  <p:par>
+                    <p:cTn id="3" fill="hold">
+                      <p:stCondLst>
+                        <p:cond delay="indefinite"/>
+                      </p:stCondLst>
+                      <p:childTnLst>
+                        <p:par>
+                          <p:cTn id="4" fill="hold">
+                            <p:stCondLst>
+                              <p:cond delay="0"/>
+                            </p:stCondLst>
+                            <p:childTnLst>
+                              <p:par>
+                                <p:cTn id="5" presetID="10" presetClass="entr" presetSubtype="0" fill="hold" nodeType="clickEffect">
+                                  <p:stCondLst>
+                                    <p:cond delay="0"/>
+                                  </p:stCondLst>
+                                  <p:childTnLst>
+                                    <p:set>
+                                      <p:cBhvr>
+                                        <p:cTn id="6" dur="1" fill="hold">
+                                          <p:stCondLst>
+                                            <p:cond delay="0"/>
+                                          </p:stCondLst>
+                                        </p:cTn>
+                                        <p:tgtEl>
+                                          <p:spTgt spid="3">
+                                            <p:txEl>
+                                              <p:pRg st="0" end="0"/>
+                                            </p:txEl>
+                                          </p:spTgt>
+                                        </p:tgtEl>
+                                        <p:attrNameLst>
+                                          <p:attrName>style.visibility</p:attrName>
+                                        </p:attrNameLst>
+                                      </p:cBhvr>
+                                      <p:to>
+                                        <p:strVal val="visible"/>
+                                      </p:to>
+                                    </p:set>
+                                    <p:animEffect transition="in" filter="fade">
+                                      <p:cBhvr>
+                                        <p:cTn id="7" dur="500"/>
+                                        <p:tgtEl>
+                                          <p:spTgt spid="3">
+                                            <p:txEl>
+                                              <p:pRg st="0" end="0"/>
+                                            </p:txEl>
+                                          </p:spTgt>
+                                        </p:tgtEl>
+                                      </p:cBhvr>
+                                    </p:animEffect>
+                                  </p:childTnLst>
+                                </p:cTn>
+                              </p:par>
+                            </p:childTnLst>
+                          </p:cTn>
+                        </p:par>
+                      </p:childTnLst>
+                    </p:cTn>
+                  </p:par>
+                  <p:par>
+                    <p:cTn id="8" fill="hold">
+                      <p:stCondLst>
+                        <p:cond delay="indefinite"/>
+                      </p:stCondLst>
+                      <p:childTnLst>
+                        <p:par>
+                          <p:cTn id="9" fill="hold">
+                            <p:stCondLst>
+                              <p:cond delay="0"/>
+                            </p:stCondLst>
+                            <p:childTnLst>
+                              <p:par>
+                                <p:cTn id="10" presetID="10" presetClass="entr" presetSubtype="0" fill="hold" nodeType="clickEffect">
+                                  <p:stCondLst>
+                                    <p:cond delay="0"/>
+                                  </p:stCondLst>
+                                  <p:childTnLst>
+                                    <p:set>
+                                      <p:cBhvr>
+                                        <p:cTn id="11" dur="1" fill="hold">
+                                          <p:stCondLst>
+                                            <p:cond delay="0"/>
+                                          </p:stCondLst>
+                                        </p:cTn>
+                                        <p:tgtEl>
+                                          <p:spTgt spid="3">
+                                            <p:txEl>
+                                              <p:pRg st="1" end="1"/>
+                                            </p:txEl>
+                                          </p:spTgt>
+                                        </p:tgtEl>
+                                        <p:attrNameLst>
+                                          <p:attrName>style.visibility</p:attrName>
+                                        </p:attrNameLst>
+                                      </p:cBhvr>
+                                      <p:to>
+                                        <p:strVal val="visible"/>
+                                      </p:to>
+                                    </p:set>
+                                    <p:animEffect transition="in" filter="fade">
+                                      <p:cBhvr>
+                                        <p:cTn id="12" dur="500"/>
+                                        <p:tgtEl>
+                                          <p:spTgt spid="3">
+                                            <p:txEl>
+                                              <p:pRg st="1" end="1"/>
+                                            </p:txEl>
+                                          </p:spTgt>
+                                        </p:tgtEl>
+                                      </p:cBhvr>
+                                    </p:animEffect>
+                                  </p:childTnLst>
+                                </p:cTn>
+                              </p:par>
+                            </p:childTnLst>
+                          </p:cTn>
+                        </p:par>
+                      </p:childTnLst>
+                    </p:cTn>
+                  </p:par>
+                  <p:par>
+                    <p:cTn id="13" fill="hold">
+                      <p:stCondLst>
+                        <p:cond delay="indefinite"/>
+                      </p:stCondLst>
+                      <p:childTnLst>
+                        <p:par>
+                          <p:cTn id="14" fill="hold">
+                            <p:stCondLst>
+                              <p:cond delay="0"/>
+                            </p:stCondLst>
+                            <p:childTnLst>
+                              <p:par>
+                                <p:cTn id="15" presetID="10" presetClass="entr" presetSubtype="0" fill="hold" nodeType="clickEffect">
+                                  <p:stCondLst>
+                                    <p:cond delay="0"/>
+                                  </p:stCondLst>
+                                  <p:childTnLst>
+                                    <p:set>
+                                      <p:cBhvr>
+                                        <p:cTn id="16" dur="1" fill="hold">
+                                          <p:stCondLst>
+                                            <p:cond delay="0"/>
+                                          </p:stCondLst>
+                                        </p:cTn>
+                                        <p:tgtEl>
+                                          <p:spTgt spid="3">
+                                            <p:txEl>
+                                              <p:pRg st="2" end="2"/>
+                                            </p:txEl>
+                                          </p:spTgt>
+                                        </p:tgtEl>
+                                        <p:attrNameLst>
+                                          <p:attrName>style.visibility</p:attrName>
+                                        </p:attrNameLst>
+                                      </p:cBhvr>
+                                      <p:to>
+                                        <p:strVal val="visible"/>
+                                      </p:to>
+                                    </p:set>
+                                    <p:animEffect transition="in" filter="fade">
+                                      <p:cBhvr>
+                                        <p:cTn id="17" dur="500"/>
+                                        <p:tgtEl>
+                                          <p:spTgt spid="3">
+                                            <p:txEl>
+                                              <p:pRg st="2" end="2"/>
+                                            </p:txEl>
+                                          </p:spTgt>
+                                        </p:tgtEl>
+                                      </p:cBhvr>
+                                    </p:animEffect>
+                                  </p:childTnLst>
+                                </p:cTn>
+                              </p:par>
+                            </p:childTnLst>
+                          </p:cTn>
+                        </p:par>
+                      </p:childTnLst>
+                    </p:cTn>
+                  </p:par>
+                  <p:par>
+                    <p:cTn id="18" fill="hold">
+                      <p:stCondLst>
+                        <p:cond delay="indefinite"/>
+                      </p:stCondLst>
+                      <p:childTnLst>
+                        <p:par>
+                          <p:cTn id="19" fill="hold">
+                            <p:stCondLst>
+                              <p:cond delay="0"/>
+                            </p:stCondLst>
+                            <p:childTnLst>
+                              <p:par>
+                                <p:cTn id="20" presetID="10" presetClass="entr" presetSubtype="0" fill="hold" nodeType="clickEffect">
+                                  <p:stCondLst>
+                                    <p:cond delay="0"/>
+                                  </p:stCondLst>
+                                  <p:childTnLst>
+                                    <p:set>
+                                      <p:cBhvr>
+                                        <p:cTn id="21" dur="1" fill="hold">
+                                          <p:stCondLst>
+                                            <p:cond delay="0"/>
+                                          </p:stCondLst>
+                                        </p:cTn>
+                                        <p:tgtEl>
+                                          <p:spTgt spid="3">
+                                            <p:txEl>
+                                              <p:pRg st="3" end="3"/>
+                                            </p:txEl>
+                                          </p:spTgt>
+                                        </p:tgtEl>
+                                        <p:attrNameLst>
+                                          <p:attrName>style.visibility</p:attrName>
+                                        </p:attrNameLst>
+                                      </p:cBhvr>
+                                      <p:to>
+                                        <p:strVal val="visible"/>
+                                      </p:to>
+                                    </p:set>
+                                    <p:animEffect transition="in" filter="fade">
+                                      <p:cBhvr>
+                                        <p:cTn id="22" dur="500"/>
+                                        <p:tgtEl>
+                                          <p:spTgt spid="3">
+                                            <p:txEl>
+                                              <p:pRg st="3" end="3"/>
+                                            </p:txEl>
+                                          </p:spTgt>
+                                        </p:tgtEl>
+                                      </p:cBhvr>
+                                    </p:animEffect>
+                                  </p:childTnLst>
+                                </p:cTn>
+                              </p:par>
+                            </p:childTnLst>
+                          </p:cTn>
+                        </p:par>
+                      </p:childTnLst>
+                    </p:cTn>
+                  </p:par>
+                </p:childTnLst>
+              </p:cTn>
+              <p:prevCondLst>
+                <p:cond evt="onPrev" delay="0">
+                  <p:tgtEl>
+                    <p:sldTgt/>
+                  </p:tgtEl>
+                </p:cond>
+              </p:prevCondLst>
+              <p:nextCondLst>
+                <p:cond evt="onNext" delay="0">
+                  <p:tgtEl>
+                    <p:sldTgt/>
+                  </p:tgtEl>
+                </p:cond>
+              </p:nextCondLst>
+            </p:seq>
+          </p:childTnLst>
+        </p:cTn>
+      </p:par>
+    </p:tnLst>
+  </p:timing>
+</p:sld>
+</file>
+
+<file path=ppt/slides/slide14.xml><?xml version="1.0" encoding="utf-8"?>
+<p:sld xmlns:a="http://schemas.openxmlformats.org/drawingml/2006/main" xmlns:r="http://schemas.openxmlformats.org/officeDocument/2006/relationships" xmlns:p="http://schemas.openxmlformats.org/presentationml/2006/main">
+  <p:cSld>
+    <p:bg>
+      <p:bgPr>
+        <a:solidFill>
+          <a:schemeClr val="bg1"/>
+        </a:solidFill>
+        <a:effectLst/>
+      </p:bgPr>
+    </p:bg>
+    <p:spTree>
+      <p:nvGrpSpPr>
+        <p:cNvPr id="1" name=""/>
+        <p:cNvGrpSpPr/>
+        <p:nvPr/>
+      </p:nvGrpSpPr>
+      <p:grpSpPr>
+        <a:xfrm>
+          <a:off x="0" y="0"/>
+          <a:ext cx="0" cy="0"/>
+          <a:chOff x="0" y="0"/>
+          <a:chExt cx="0" cy="0"/>
+        </a:xfrm>
+      </p:grpSpPr>
+      <p:sp>
+        <p:nvSpPr>
+          <p:cNvPr id="22" name="Freeform: Shape 21">
+            <a:extLst>
+              <a:ext uri="{FF2B5EF4-FFF2-40B4-BE49-F238E27FC236}">
+                <a16:creationId xmlns:a16="http://schemas.microsoft.com/office/drawing/2014/main" id="{64965EAE-E41A-435F-B993-07E824B6C977}"/>
+              </a:ext>
+            </a:extLst>
+          </p:cNvPr>
+          <p:cNvSpPr>
+            <a:spLocks noGrp="1" noRot="1" noChangeAspect="1" noMove="1" noResize="1" noEditPoints="1" noAdjustHandles="1" noChangeArrowheads="1" noChangeShapeType="1" noTextEdit="1"/>
+          </p:cNvSpPr>
+          <p:nvPr>
+            <p:extLst>
+              <p:ext uri="{386F3935-93C4-4BCD-93E2-E3B085C9AB24}">
+                <p16:designElem xmlns:p16="http://schemas.microsoft.com/office/powerpoint/2015/main" val="1"/>
+              </p:ext>
+            </p:extLst>
+          </p:nvPr>
+        </p:nvSpPr>
+        <p:spPr>
+          <a:xfrm flipV="1">
+            <a:off x="1" y="0"/>
+            <a:ext cx="7539895" cy="6858000"/>
+          </a:xfrm>
+          <a:custGeom>
+            <a:avLst/>
+            <a:gdLst>
+              <a:gd name="connsiteX0" fmla="*/ 7539895 w 7539895"/>
+              <a:gd name="connsiteY0" fmla="*/ 6858000 h 6858000"/>
+              <a:gd name="connsiteX1" fmla="*/ 0 w 7539895"/>
+              <a:gd name="connsiteY1" fmla="*/ 6858000 h 6858000"/>
+              <a:gd name="connsiteX2" fmla="*/ 0 w 7539895"/>
+              <a:gd name="connsiteY2" fmla="*/ 0 h 6858000"/>
+              <a:gd name="connsiteX3" fmla="*/ 4363741 w 7539895"/>
+              <a:gd name="connsiteY3" fmla="*/ 0 h 6858000"/>
+            </a:gdLst>
+            <a:ahLst/>
+            <a:cxnLst>
+              <a:cxn ang="0">
+                <a:pos x="connsiteX0" y="connsiteY0"/>
+              </a:cxn>
+              <a:cxn ang="0">
+                <a:pos x="connsiteX1" y="connsiteY1"/>
+              </a:cxn>
+              <a:cxn ang="0">
+                <a:pos x="connsiteX2" y="connsiteY2"/>
+              </a:cxn>
+              <a:cxn ang="0">
+                <a:pos x="connsiteX3" y="connsiteY3"/>
+              </a:cxn>
+            </a:cxnLst>
+            <a:rect l="l" t="t" r="r" b="b"/>
+            <a:pathLst>
+              <a:path w="7539895" h="6858000">
+                <a:moveTo>
+                  <a:pt x="7539895" y="6858000"/>
+                </a:moveTo>
+                <a:lnTo>
+                  <a:pt x="0" y="6858000"/>
+                </a:lnTo>
+                <a:lnTo>
+                  <a:pt x="0" y="0"/>
+                </a:lnTo>
+                <a:lnTo>
+                  <a:pt x="4363741" y="0"/>
+                </a:lnTo>
+                <a:close/>
+              </a:path>
+            </a:pathLst>
+          </a:custGeom>
+          <a:solidFill>
+            <a:schemeClr val="tx1">
+              <a:lumMod val="85000"/>
+              <a:lumOff val="15000"/>
+              <a:alpha val="70000"/>
+            </a:schemeClr>
+          </a:solidFill>
+          <a:ln>
+            <a:noFill/>
+          </a:ln>
+        </p:spPr>
+        <p:style>
+          <a:lnRef idx="2">
+            <a:schemeClr val="accent1">
+              <a:shade val="50000"/>
+            </a:schemeClr>
+          </a:lnRef>
+          <a:fillRef idx="1">
+            <a:schemeClr val="accent1"/>
+          </a:fillRef>
+          <a:effectRef idx="0">
+            <a:schemeClr val="accent1"/>
+          </a:effectRef>
+          <a:fontRef idx="minor">
+            <a:schemeClr val="lt1"/>
+          </a:fontRef>
+        </p:style>
+        <p:txBody>
+          <a:bodyPr wrap="square" rtlCol="0" anchor="ctr">
+            <a:noAutofit/>
+          </a:bodyPr>
+          <a:lstStyle/>
+          <a:p>
+            <a:pPr algn="ctr"/>
+            <a:endParaRPr lang="en-US"/>
+          </a:p>
+        </p:txBody>
+      </p:sp>
+      <p:sp>
+        <p:nvSpPr>
+          <p:cNvPr id="24" name="Freeform: Shape 23">
+            <a:extLst>
+              <a:ext uri="{FF2B5EF4-FFF2-40B4-BE49-F238E27FC236}">
+                <a16:creationId xmlns:a16="http://schemas.microsoft.com/office/drawing/2014/main" id="{152F8994-E6D4-4311-9548-C3607BC43645}"/>
+              </a:ext>
+            </a:extLst>
+          </p:cNvPr>
+          <p:cNvSpPr>
+            <a:spLocks noGrp="1" noRot="1" noChangeAspect="1" noMove="1" noResize="1" noEditPoints="1" noAdjustHandles="1" noChangeArrowheads="1" noChangeShapeType="1" noTextEdit="1"/>
+          </p:cNvSpPr>
+          <p:nvPr>
+            <p:extLst>
+              <p:ext uri="{386F3935-93C4-4BCD-93E2-E3B085C9AB24}">
+                <p16:designElem xmlns:p16="http://schemas.microsoft.com/office/powerpoint/2015/main" val="1"/>
+              </p:ext>
+            </p:extLst>
+          </p:nvPr>
+        </p:nvSpPr>
+        <p:spPr>
+          <a:xfrm flipV="1">
+            <a:off x="0" y="0"/>
+            <a:ext cx="7092985" cy="6858000"/>
+          </a:xfrm>
+          <a:custGeom>
+            <a:avLst/>
+            <a:gdLst>
+              <a:gd name="connsiteX0" fmla="*/ 7092985 w 7092985"/>
+              <a:gd name="connsiteY0" fmla="*/ 6858000 h 6858000"/>
+              <a:gd name="connsiteX1" fmla="*/ 0 w 7092985"/>
+              <a:gd name="connsiteY1" fmla="*/ 6858000 h 6858000"/>
+              <a:gd name="connsiteX2" fmla="*/ 0 w 7092985"/>
+              <a:gd name="connsiteY2" fmla="*/ 0 h 6858000"/>
+              <a:gd name="connsiteX3" fmla="*/ 3916831 w 7092985"/>
+              <a:gd name="connsiteY3" fmla="*/ 0 h 6858000"/>
+            </a:gdLst>
+            <a:ahLst/>
+            <a:cxnLst>
+              <a:cxn ang="0">
+                <a:pos x="connsiteX0" y="connsiteY0"/>
+              </a:cxn>
+              <a:cxn ang="0">
+                <a:pos x="connsiteX1" y="connsiteY1"/>
+              </a:cxn>
+              <a:cxn ang="0">
+                <a:pos x="connsiteX2" y="connsiteY2"/>
+              </a:cxn>
+              <a:cxn ang="0">
+                <a:pos x="connsiteX3" y="connsiteY3"/>
+              </a:cxn>
+            </a:cxnLst>
+            <a:rect l="l" t="t" r="r" b="b"/>
+            <a:pathLst>
+              <a:path w="7092985" h="6858000">
+                <a:moveTo>
+                  <a:pt x="7092985" y="6858000"/>
+                </a:moveTo>
+                <a:lnTo>
+                  <a:pt x="0" y="6858000"/>
+                </a:lnTo>
+                <a:lnTo>
+                  <a:pt x="0" y="0"/>
+                </a:lnTo>
+                <a:lnTo>
+                  <a:pt x="3916831" y="0"/>
+                </a:lnTo>
+                <a:close/>
+              </a:path>
+            </a:pathLst>
+          </a:custGeom>
+          <a:solidFill>
+            <a:schemeClr val="tx1">
+              <a:lumMod val="85000"/>
+              <a:lumOff val="15000"/>
+            </a:schemeClr>
+          </a:solidFill>
+          <a:ln>
+            <a:noFill/>
+          </a:ln>
+        </p:spPr>
+        <p:style>
+          <a:lnRef idx="2">
+            <a:schemeClr val="accent1">
+              <a:shade val="50000"/>
+            </a:schemeClr>
+          </a:lnRef>
+          <a:fillRef idx="1">
+            <a:schemeClr val="accent1"/>
+          </a:fillRef>
+          <a:effectRef idx="0">
+            <a:schemeClr val="accent1"/>
+          </a:effectRef>
+          <a:fontRef idx="minor">
+            <a:schemeClr val="lt1"/>
+          </a:fontRef>
+        </p:style>
+        <p:txBody>
+          <a:bodyPr wrap="square" rtlCol="0" anchor="ctr">
+            <a:noAutofit/>
+          </a:bodyPr>
+          <a:lstStyle/>
+          <a:p>
+            <a:pPr algn="ctr"/>
+            <a:endParaRPr lang="en-US"/>
+          </a:p>
+        </p:txBody>
+      </p:sp>
+      <p:sp>
+        <p:nvSpPr>
+          <p:cNvPr id="8" name="Title 7">
+            <a:extLst>
+              <a:ext uri="{FF2B5EF4-FFF2-40B4-BE49-F238E27FC236}">
+                <a16:creationId xmlns:a16="http://schemas.microsoft.com/office/drawing/2014/main" id="{9AAF6E53-C7E3-404C-8C15-A04C67BE1A24}"/>
+              </a:ext>
+            </a:extLst>
+          </p:cNvPr>
+          <p:cNvSpPr>
+            <a:spLocks noGrp="1"/>
+          </p:cNvSpPr>
+          <p:nvPr>
+            <p:ph type="title"/>
+          </p:nvPr>
+        </p:nvSpPr>
+        <p:spPr>
+          <a:xfrm>
+            <a:off x="838199" y="365125"/>
+            <a:ext cx="5529943" cy="1325563"/>
+          </a:xfrm>
+        </p:spPr>
+        <p:txBody>
+          <a:bodyPr>
+            <a:normAutofit/>
+          </a:bodyPr>
+          <a:lstStyle/>
+          <a:p>
+            <a:r>
+              <a:rPr lang="en-US" dirty="0">
+                <a:solidFill>
+                  <a:schemeClr val="bg1"/>
+                </a:solidFill>
+              </a:rPr>
+              <a:t>VSTS DEMO</a:t>
+            </a:r>
+          </a:p>
+        </p:txBody>
+      </p:sp>
+      <p:pic>
+        <p:nvPicPr>
+          <p:cNvPr id="3" name="Content Placeholder 2">
+            <a:extLst>
+              <a:ext uri="{FF2B5EF4-FFF2-40B4-BE49-F238E27FC236}">
+                <a16:creationId xmlns:a16="http://schemas.microsoft.com/office/drawing/2014/main" id="{C2A63A71-EC7F-479B-9854-E0B25655E4C0}"/>
+              </a:ext>
+            </a:extLst>
+          </p:cNvPr>
+          <p:cNvPicPr>
+            <a:picLocks noGrp="1" noChangeAspect="1"/>
+          </p:cNvPicPr>
+          <p:nvPr>
+            <p:ph idx="1"/>
+          </p:nvPr>
+        </p:nvPicPr>
+        <p:blipFill>
+          <a:blip r:embed="rId3">
+            <a:extLst>
+              <a:ext uri="{28A0092B-C50C-407E-A947-70E740481C1C}">
+                <a14:useLocalDpi xmlns:a14="http://schemas.microsoft.com/office/drawing/2010/main" val="0"/>
+              </a:ext>
+            </a:extLst>
+          </a:blip>
+          <a:stretch>
+            <a:fillRect/>
+          </a:stretch>
+        </p:blipFill>
+        <p:spPr>
+          <a:xfrm>
+            <a:off x="838198" y="1690688"/>
+            <a:ext cx="3398838" cy="3398838"/>
+          </a:xfrm>
+        </p:spPr>
+      </p:pic>
+    </p:spTree>
+    <p:extLst>
+      <p:ext uri="{BB962C8B-B14F-4D97-AF65-F5344CB8AC3E}">
+        <p14:creationId xmlns:p14="http://schemas.microsoft.com/office/powerpoint/2010/main" val="3899177888"/>
+      </p:ext>
+    </p:extLst>
+  </p:cSld>
+  <p:clrMapOvr>
+    <a:masterClrMapping/>
+  </p:clrMapOvr>
+</p:sld>
+</file>
+
+<file path=ppt/slides/slide15.xml><?xml version="1.0" encoding="utf-8"?>
+<p:sld xmlns:a="http://schemas.openxmlformats.org/drawingml/2006/main" xmlns:r="http://schemas.openxmlformats.org/officeDocument/2006/relationships" xmlns:p="http://schemas.openxmlformats.org/presentationml/2006/main">
+  <p:cSld>
+    <p:bg>
+      <p:bgPr>
+        <a:solidFill>
           <a:schemeClr val="bg1">
             <a:tint val="95000"/>
             <a:satMod val="170000"/>
@@ -19809,7 +20863,7 @@
 </p:sld>
 </file>
 
-<file path=ppt/slides/slide14.xml><?xml version="1.0" encoding="utf-8"?>
+<file path=ppt/slides/slide16.xml><?xml version="1.0" encoding="utf-8"?>
 <p:sld xmlns:a="http://schemas.openxmlformats.org/drawingml/2006/main" xmlns:r="http://schemas.openxmlformats.org/officeDocument/2006/relationships" xmlns:p="http://schemas.openxmlformats.org/presentationml/2006/main">
   <p:cSld>
     <p:spTree>
@@ -23489,14 +24543,6 @@
 <file path=ppt/slides/slide8.xml><?xml version="1.0" encoding="utf-8"?>
 <p:sld xmlns:a="http://schemas.openxmlformats.org/drawingml/2006/main" xmlns:r="http://schemas.openxmlformats.org/officeDocument/2006/relationships" xmlns:p="http://schemas.openxmlformats.org/presentationml/2006/main">
   <p:cSld>
-    <p:bg>
-      <p:bgPr>
-        <a:solidFill>
-          <a:schemeClr val="bg1"/>
-        </a:solidFill>
-        <a:effectLst/>
-      </p:bgPr>
-    </p:bg>
     <p:spTree>
       <p:nvGrpSpPr>
         <p:cNvPr id="1" name=""/>
@@ -23513,227 +24559,10 @@
       </p:grpSpPr>
       <p:sp>
         <p:nvSpPr>
-          <p:cNvPr id="22" name="Freeform: Shape 21">
+          <p:cNvPr id="2" name="Title 1">
             <a:extLst>
               <a:ext uri="{FF2B5EF4-FFF2-40B4-BE49-F238E27FC236}">
-                <a16:creationId xmlns:a16="http://schemas.microsoft.com/office/drawing/2014/main" id="{64965EAE-E41A-435F-B993-07E824B6C977}"/>
-              </a:ext>
-            </a:extLst>
-          </p:cNvPr>
-          <p:cNvSpPr>
-            <a:spLocks noGrp="1" noRot="1" noChangeAspect="1" noMove="1" noResize="1" noEditPoints="1" noAdjustHandles="1" noChangeArrowheads="1" noChangeShapeType="1" noTextEdit="1"/>
-          </p:cNvSpPr>
-          <p:nvPr>
-            <p:extLst>
-              <p:ext uri="{386F3935-93C4-4BCD-93E2-E3B085C9AB24}">
-                <p16:designElem xmlns:p16="http://schemas.microsoft.com/office/powerpoint/2015/main" val="1"/>
-              </p:ext>
-            </p:extLst>
-          </p:nvPr>
-        </p:nvSpPr>
-        <p:spPr>
-          <a:xfrm flipV="1">
-            <a:off x="1" y="0"/>
-            <a:ext cx="7539895" cy="6858000"/>
-          </a:xfrm>
-          <a:custGeom>
-            <a:avLst/>
-            <a:gdLst>
-              <a:gd name="connsiteX0" fmla="*/ 7539895 w 7539895"/>
-              <a:gd name="connsiteY0" fmla="*/ 6858000 h 6858000"/>
-              <a:gd name="connsiteX1" fmla="*/ 0 w 7539895"/>
-              <a:gd name="connsiteY1" fmla="*/ 6858000 h 6858000"/>
-              <a:gd name="connsiteX2" fmla="*/ 0 w 7539895"/>
-              <a:gd name="connsiteY2" fmla="*/ 0 h 6858000"/>
-              <a:gd name="connsiteX3" fmla="*/ 4363741 w 7539895"/>
-              <a:gd name="connsiteY3" fmla="*/ 0 h 6858000"/>
-            </a:gdLst>
-            <a:ahLst/>
-            <a:cxnLst>
-              <a:cxn ang="0">
-                <a:pos x="connsiteX0" y="connsiteY0"/>
-              </a:cxn>
-              <a:cxn ang="0">
-                <a:pos x="connsiteX1" y="connsiteY1"/>
-              </a:cxn>
-              <a:cxn ang="0">
-                <a:pos x="connsiteX2" y="connsiteY2"/>
-              </a:cxn>
-              <a:cxn ang="0">
-                <a:pos x="connsiteX3" y="connsiteY3"/>
-              </a:cxn>
-            </a:cxnLst>
-            <a:rect l="l" t="t" r="r" b="b"/>
-            <a:pathLst>
-              <a:path w="7539895" h="6858000">
-                <a:moveTo>
-                  <a:pt x="7539895" y="6858000"/>
-                </a:moveTo>
-                <a:lnTo>
-                  <a:pt x="0" y="6858000"/>
-                </a:lnTo>
-                <a:lnTo>
-                  <a:pt x="0" y="0"/>
-                </a:lnTo>
-                <a:lnTo>
-                  <a:pt x="4363741" y="0"/>
-                </a:lnTo>
-                <a:close/>
-              </a:path>
-            </a:pathLst>
-          </a:custGeom>
-          <a:solidFill>
-            <a:schemeClr val="tx1">
-              <a:lumMod val="85000"/>
-              <a:lumOff val="15000"/>
-              <a:alpha val="70000"/>
-            </a:schemeClr>
-          </a:solidFill>
-          <a:ln>
-            <a:noFill/>
-          </a:ln>
-        </p:spPr>
-        <p:style>
-          <a:lnRef idx="2">
-            <a:schemeClr val="accent1">
-              <a:shade val="50000"/>
-            </a:schemeClr>
-          </a:lnRef>
-          <a:fillRef idx="1">
-            <a:schemeClr val="accent1"/>
-          </a:fillRef>
-          <a:effectRef idx="0">
-            <a:schemeClr val="accent1"/>
-          </a:effectRef>
-          <a:fontRef idx="minor">
-            <a:schemeClr val="lt1"/>
-          </a:fontRef>
-        </p:style>
-        <p:txBody>
-          <a:bodyPr wrap="square" rtlCol="0" anchor="ctr">
-            <a:noAutofit/>
-          </a:bodyPr>
-          <a:lstStyle/>
-          <a:p>
-            <a:pPr algn="ctr"/>
-            <a:endParaRPr lang="en-US"/>
-          </a:p>
-        </p:txBody>
-      </p:sp>
-      <p:sp>
-        <p:nvSpPr>
-          <p:cNvPr id="24" name="Freeform: Shape 23">
-            <a:extLst>
-              <a:ext uri="{FF2B5EF4-FFF2-40B4-BE49-F238E27FC236}">
-                <a16:creationId xmlns:a16="http://schemas.microsoft.com/office/drawing/2014/main" id="{152F8994-E6D4-4311-9548-C3607BC43645}"/>
-              </a:ext>
-            </a:extLst>
-          </p:cNvPr>
-          <p:cNvSpPr>
-            <a:spLocks noGrp="1" noRot="1" noChangeAspect="1" noMove="1" noResize="1" noEditPoints="1" noAdjustHandles="1" noChangeArrowheads="1" noChangeShapeType="1" noTextEdit="1"/>
-          </p:cNvSpPr>
-          <p:nvPr>
-            <p:extLst>
-              <p:ext uri="{386F3935-93C4-4BCD-93E2-E3B085C9AB24}">
-                <p16:designElem xmlns:p16="http://schemas.microsoft.com/office/powerpoint/2015/main" val="1"/>
-              </p:ext>
-            </p:extLst>
-          </p:nvPr>
-        </p:nvSpPr>
-        <p:spPr>
-          <a:xfrm flipV="1">
-            <a:off x="0" y="0"/>
-            <a:ext cx="7092985" cy="6858000"/>
-          </a:xfrm>
-          <a:custGeom>
-            <a:avLst/>
-            <a:gdLst>
-              <a:gd name="connsiteX0" fmla="*/ 7092985 w 7092985"/>
-              <a:gd name="connsiteY0" fmla="*/ 6858000 h 6858000"/>
-              <a:gd name="connsiteX1" fmla="*/ 0 w 7092985"/>
-              <a:gd name="connsiteY1" fmla="*/ 6858000 h 6858000"/>
-              <a:gd name="connsiteX2" fmla="*/ 0 w 7092985"/>
-              <a:gd name="connsiteY2" fmla="*/ 0 h 6858000"/>
-              <a:gd name="connsiteX3" fmla="*/ 3916831 w 7092985"/>
-              <a:gd name="connsiteY3" fmla="*/ 0 h 6858000"/>
-            </a:gdLst>
-            <a:ahLst/>
-            <a:cxnLst>
-              <a:cxn ang="0">
-                <a:pos x="connsiteX0" y="connsiteY0"/>
-              </a:cxn>
-              <a:cxn ang="0">
-                <a:pos x="connsiteX1" y="connsiteY1"/>
-              </a:cxn>
-              <a:cxn ang="0">
-                <a:pos x="connsiteX2" y="connsiteY2"/>
-              </a:cxn>
-              <a:cxn ang="0">
-                <a:pos x="connsiteX3" y="connsiteY3"/>
-              </a:cxn>
-            </a:cxnLst>
-            <a:rect l="l" t="t" r="r" b="b"/>
-            <a:pathLst>
-              <a:path w="7092985" h="6858000">
-                <a:moveTo>
-                  <a:pt x="7092985" y="6858000"/>
-                </a:moveTo>
-                <a:lnTo>
-                  <a:pt x="0" y="6858000"/>
-                </a:lnTo>
-                <a:lnTo>
-                  <a:pt x="0" y="0"/>
-                </a:lnTo>
-                <a:lnTo>
-                  <a:pt x="3916831" y="0"/>
-                </a:lnTo>
-                <a:close/>
-              </a:path>
-            </a:pathLst>
-          </a:custGeom>
-          <a:solidFill>
-            <a:schemeClr val="tx1">
-              <a:lumMod val="85000"/>
-              <a:lumOff val="15000"/>
-            </a:schemeClr>
-          </a:solidFill>
-          <a:ln>
-            <a:noFill/>
-          </a:ln>
-        </p:spPr>
-        <p:style>
-          <a:lnRef idx="2">
-            <a:schemeClr val="accent1">
-              <a:shade val="50000"/>
-            </a:schemeClr>
-          </a:lnRef>
-          <a:fillRef idx="1">
-            <a:schemeClr val="accent1"/>
-          </a:fillRef>
-          <a:effectRef idx="0">
-            <a:schemeClr val="accent1"/>
-          </a:effectRef>
-          <a:fontRef idx="minor">
-            <a:schemeClr val="lt1"/>
-          </a:fontRef>
-        </p:style>
-        <p:txBody>
-          <a:bodyPr wrap="square" rtlCol="0" anchor="ctr">
-            <a:noAutofit/>
-          </a:bodyPr>
-          <a:lstStyle/>
-          <a:p>
-            <a:pPr algn="ctr"/>
-            <a:endParaRPr lang="en-US"/>
-          </a:p>
-        </p:txBody>
-      </p:sp>
-      <p:sp>
-        <p:nvSpPr>
-          <p:cNvPr id="8" name="Title 7">
-            <a:extLst>
-              <a:ext uri="{FF2B5EF4-FFF2-40B4-BE49-F238E27FC236}">
-                <a16:creationId xmlns:a16="http://schemas.microsoft.com/office/drawing/2014/main" id="{9AAF6E53-C7E3-404C-8C15-A04C67BE1A24}"/>
+                <a16:creationId xmlns:a16="http://schemas.microsoft.com/office/drawing/2014/main" id="{3480FB3C-4B87-4419-A9E4-BA511FB9DFDB}"/>
               </a:ext>
             </a:extLst>
           </p:cNvPr>
@@ -23744,35 +24573,24 @@
             <p:ph type="title"/>
           </p:nvPr>
         </p:nvSpPr>
-        <p:spPr>
-          <a:xfrm>
-            <a:off x="838199" y="365125"/>
-            <a:ext cx="5529943" cy="1325563"/>
-          </a:xfrm>
-        </p:spPr>
+        <p:spPr/>
         <p:txBody>
-          <a:bodyPr>
-            <a:normAutofit/>
-          </a:bodyPr>
+          <a:bodyPr/>
           <a:lstStyle/>
           <a:p>
             <a:r>
-              <a:rPr lang="en-US">
-                <a:solidFill>
-                  <a:schemeClr val="bg1"/>
-                </a:solidFill>
-              </a:rPr>
-              <a:t>VS Code DEMO</a:t>
+              <a:rPr lang="en-US" dirty="0"/>
+              <a:t>Scaffolding setup</a:t>
             </a:r>
           </a:p>
         </p:txBody>
       </p:sp>
       <p:sp>
         <p:nvSpPr>
-          <p:cNvPr id="21" name="Content Placeholder 18">
+          <p:cNvPr id="3" name="Content Placeholder 2">
             <a:extLst>
               <a:ext uri="{FF2B5EF4-FFF2-40B4-BE49-F238E27FC236}">
-                <a16:creationId xmlns:a16="http://schemas.microsoft.com/office/drawing/2014/main" id="{74E7A070-D35D-4F51-A17C-F0F85E45F25A}"/>
+                <a16:creationId xmlns:a16="http://schemas.microsoft.com/office/drawing/2014/main" id="{77F6A11F-1CCD-48D7-A6D0-1C597AF8554D}"/>
               </a:ext>
             </a:extLst>
           </p:cNvPr>
@@ -23783,136 +24601,1097 @@
             <p:ph idx="1"/>
           </p:nvPr>
         </p:nvSpPr>
-        <p:spPr>
-          <a:xfrm>
-            <a:off x="838199" y="1825625"/>
-            <a:ext cx="4128169" cy="3399518"/>
-          </a:xfrm>
-        </p:spPr>
+        <p:spPr/>
         <p:txBody>
           <a:bodyPr>
             <a:normAutofit/>
           </a:bodyPr>
           <a:lstStyle/>
           <a:p>
-            <a:endParaRPr lang="en-US" sz="2000">
-              <a:solidFill>
-                <a:schemeClr val="bg1"/>
-              </a:solidFill>
-            </a:endParaRPr>
+            <a:pPr marL="0" indent="0">
+              <a:buNone/>
+            </a:pPr>
+            <a:endParaRPr lang="en-US" dirty="0"/>
           </a:p>
         </p:txBody>
       </p:sp>
-      <p:pic>
-        <p:nvPicPr>
-          <p:cNvPr id="17" name="Content Placeholder 10">
+      <p:graphicFrame>
+        <p:nvGraphicFramePr>
+          <p:cNvPr id="4" name="Table 3">
             <a:extLst>
               <a:ext uri="{FF2B5EF4-FFF2-40B4-BE49-F238E27FC236}">
-                <a16:creationId xmlns:a16="http://schemas.microsoft.com/office/drawing/2014/main" id="{65A7D466-8CEF-4FDA-864F-09BC3FFAA26D}"/>
+                <a16:creationId xmlns:a16="http://schemas.microsoft.com/office/drawing/2014/main" id="{B8A99360-6FF7-4C7D-A5E9-55B79B38D3E7}"/>
               </a:ext>
             </a:extLst>
           </p:cNvPr>
-          <p:cNvPicPr>
-            <a:picLocks noChangeAspect="1"/>
-          </p:cNvPicPr>
-          <p:nvPr/>
-        </p:nvPicPr>
-        <p:blipFill>
-          <a:blip r:embed="rId3">
+          <p:cNvGraphicFramePr>
+            <a:graphicFrameLocks noGrp="1"/>
+          </p:cNvGraphicFramePr>
+          <p:nvPr>
+            <p:extLst>
+              <p:ext uri="{D42A27DB-BD31-4B8C-83A1-F6EECF244321}">
+                <p14:modId xmlns:p14="http://schemas.microsoft.com/office/powerpoint/2010/main" val="1380250429"/>
+              </p:ext>
+            </p:extLst>
+          </p:nvPr>
+        </p:nvGraphicFramePr>
+        <p:xfrm>
+          <a:off x="844461" y="1825625"/>
+          <a:ext cx="10509339" cy="3992880"/>
+        </p:xfrm>
+        <a:graphic>
+          <a:graphicData uri="http://schemas.openxmlformats.org/drawingml/2006/table">
+            <a:tbl>
+              <a:tblPr firstRow="1" bandRow="1">
+                <a:tableStyleId>{5C22544A-7EE6-4342-B048-85BDC9FD1C3A}</a:tableStyleId>
+              </a:tblPr>
+              <a:tblGrid>
+                <a:gridCol w="10509339">
+                  <a:extLst>
+                    <a:ext uri="{9D8B030D-6E8A-4147-A177-3AD203B41FA5}">
+                      <a16:colId xmlns:a16="http://schemas.microsoft.com/office/drawing/2014/main" val="1057070397"/>
+                    </a:ext>
+                  </a:extLst>
+                </a:gridCol>
+              </a:tblGrid>
+              <a:tr h="3712682">
+                <a:tc>
+                  <a:txBody>
+                    <a:bodyPr/>
+                    <a:lstStyle/>
+                    <a:p>
+                      <a:r>
+                        <a:rPr lang="en-US" sz="1600" b="0" dirty="0">
+                          <a:solidFill>
+                            <a:srgbClr val="800000"/>
+                          </a:solidFill>
+                          <a:effectLst/>
+                          <a:latin typeface="Consolas" panose="020B0609020204030204" pitchFamily="49" charset="0"/>
+                        </a:rPr>
+                        <a:t>&lt;Project</a:t>
+                      </a:r>
+                      <a:r>
+                        <a:rPr lang="en-US" sz="1600" b="0" dirty="0">
+                          <a:solidFill>
+                            <a:srgbClr val="000000"/>
+                          </a:solidFill>
+                          <a:effectLst/>
+                          <a:latin typeface="Consolas" panose="020B0609020204030204" pitchFamily="49" charset="0"/>
+                        </a:rPr>
+                        <a:t> </a:t>
+                      </a:r>
+                      <a:r>
+                        <a:rPr lang="en-US" sz="1600" b="0" dirty="0" err="1">
+                          <a:solidFill>
+                            <a:srgbClr val="FF0000"/>
+                          </a:solidFill>
+                          <a:effectLst/>
+                          <a:latin typeface="Consolas" panose="020B0609020204030204" pitchFamily="49" charset="0"/>
+                        </a:rPr>
+                        <a:t>Sdk</a:t>
+                      </a:r>
+                      <a:r>
+                        <a:rPr lang="en-US" sz="1600" b="0" dirty="0">
+                          <a:solidFill>
+                            <a:srgbClr val="000000"/>
+                          </a:solidFill>
+                          <a:effectLst/>
+                          <a:latin typeface="Consolas" panose="020B0609020204030204" pitchFamily="49" charset="0"/>
+                        </a:rPr>
+                        <a:t>=</a:t>
+                      </a:r>
+                      <a:r>
+                        <a:rPr lang="en-US" sz="1600" b="0" dirty="0">
+                          <a:solidFill>
+                            <a:srgbClr val="0000FF"/>
+                          </a:solidFill>
+                          <a:effectLst/>
+                          <a:latin typeface="Consolas" panose="020B0609020204030204" pitchFamily="49" charset="0"/>
+                        </a:rPr>
+                        <a:t>"</a:t>
+                      </a:r>
+                      <a:r>
+                        <a:rPr lang="en-US" sz="1600" b="0" dirty="0" err="1">
+                          <a:solidFill>
+                            <a:srgbClr val="0000FF"/>
+                          </a:solidFill>
+                          <a:effectLst/>
+                          <a:latin typeface="Consolas" panose="020B0609020204030204" pitchFamily="49" charset="0"/>
+                        </a:rPr>
+                        <a:t>Microsoft.NET.Sdk.Web</a:t>
+                      </a:r>
+                      <a:r>
+                        <a:rPr lang="en-US" sz="1600" b="0" dirty="0">
+                          <a:solidFill>
+                            <a:srgbClr val="0000FF"/>
+                          </a:solidFill>
+                          <a:effectLst/>
+                          <a:latin typeface="Consolas" panose="020B0609020204030204" pitchFamily="49" charset="0"/>
+                        </a:rPr>
+                        <a:t>"</a:t>
+                      </a:r>
+                      <a:r>
+                        <a:rPr lang="en-US" sz="1600" b="0" dirty="0">
+                          <a:solidFill>
+                            <a:srgbClr val="800000"/>
+                          </a:solidFill>
+                          <a:effectLst/>
+                          <a:latin typeface="Consolas" panose="020B0609020204030204" pitchFamily="49" charset="0"/>
+                        </a:rPr>
+                        <a:t>&gt;</a:t>
+                      </a:r>
+                      <a:endParaRPr lang="en-US" sz="1600" b="0" dirty="0">
+                        <a:solidFill>
+                          <a:srgbClr val="000000"/>
+                        </a:solidFill>
+                        <a:effectLst/>
+                        <a:latin typeface="Consolas" panose="020B0609020204030204" pitchFamily="49" charset="0"/>
+                      </a:endParaRPr>
+                    </a:p>
+                    <a:p>
+                      <a:r>
+                        <a:rPr lang="en-US" sz="1600" b="0" dirty="0">
+                          <a:solidFill>
+                            <a:srgbClr val="800000"/>
+                          </a:solidFill>
+                          <a:effectLst/>
+                          <a:latin typeface="Consolas" panose="020B0609020204030204" pitchFamily="49" charset="0"/>
+                        </a:rPr>
+                        <a:t>  &lt;</a:t>
+                      </a:r>
+                      <a:r>
+                        <a:rPr lang="en-US" sz="1600" b="0" dirty="0" err="1">
+                          <a:solidFill>
+                            <a:srgbClr val="800000"/>
+                          </a:solidFill>
+                          <a:effectLst/>
+                          <a:latin typeface="Consolas" panose="020B0609020204030204" pitchFamily="49" charset="0"/>
+                        </a:rPr>
+                        <a:t>PropertyGroup</a:t>
+                      </a:r>
+                      <a:r>
+                        <a:rPr lang="en-US" sz="1600" b="0" dirty="0">
+                          <a:solidFill>
+                            <a:srgbClr val="800000"/>
+                          </a:solidFill>
+                          <a:effectLst/>
+                          <a:latin typeface="Consolas" panose="020B0609020204030204" pitchFamily="49" charset="0"/>
+                        </a:rPr>
+                        <a:t>&gt;</a:t>
+                      </a:r>
+                      <a:endParaRPr lang="en-US" sz="1600" b="0" dirty="0">
+                        <a:solidFill>
+                          <a:srgbClr val="000000"/>
+                        </a:solidFill>
+                        <a:effectLst/>
+                        <a:latin typeface="Consolas" panose="020B0609020204030204" pitchFamily="49" charset="0"/>
+                      </a:endParaRPr>
+                    </a:p>
+                    <a:p>
+                      <a:r>
+                        <a:rPr lang="en-US" sz="1600" b="0" dirty="0">
+                          <a:solidFill>
+                            <a:srgbClr val="800000"/>
+                          </a:solidFill>
+                          <a:effectLst/>
+                          <a:latin typeface="Consolas" panose="020B0609020204030204" pitchFamily="49" charset="0"/>
+                        </a:rPr>
+                        <a:t>    &lt;</a:t>
+                      </a:r>
+                      <a:r>
+                        <a:rPr lang="en-US" sz="1600" b="0" dirty="0" err="1">
+                          <a:solidFill>
+                            <a:srgbClr val="800000"/>
+                          </a:solidFill>
+                          <a:effectLst/>
+                          <a:latin typeface="Consolas" panose="020B0609020204030204" pitchFamily="49" charset="0"/>
+                        </a:rPr>
+                        <a:t>TargetFramework</a:t>
+                      </a:r>
+                      <a:r>
+                        <a:rPr lang="en-US" sz="1600" b="0" dirty="0">
+                          <a:solidFill>
+                            <a:srgbClr val="800000"/>
+                          </a:solidFill>
+                          <a:effectLst/>
+                          <a:latin typeface="Consolas" panose="020B0609020204030204" pitchFamily="49" charset="0"/>
+                        </a:rPr>
+                        <a:t>&gt;</a:t>
+                      </a:r>
+                      <a:r>
+                        <a:rPr lang="en-US" sz="1600" b="0" dirty="0">
+                          <a:solidFill>
+                            <a:srgbClr val="000000"/>
+                          </a:solidFill>
+                          <a:effectLst/>
+                          <a:latin typeface="Consolas" panose="020B0609020204030204" pitchFamily="49" charset="0"/>
+                        </a:rPr>
+                        <a:t>netcoreapp2.1</a:t>
+                      </a:r>
+                      <a:r>
+                        <a:rPr lang="en-US" sz="1600" b="0" dirty="0">
+                          <a:solidFill>
+                            <a:srgbClr val="800000"/>
+                          </a:solidFill>
+                          <a:effectLst/>
+                          <a:latin typeface="Consolas" panose="020B0609020204030204" pitchFamily="49" charset="0"/>
+                        </a:rPr>
+                        <a:t>&lt;/</a:t>
+                      </a:r>
+                      <a:r>
+                        <a:rPr lang="en-US" sz="1600" b="0" dirty="0" err="1">
+                          <a:solidFill>
+                            <a:srgbClr val="800000"/>
+                          </a:solidFill>
+                          <a:effectLst/>
+                          <a:latin typeface="Consolas" panose="020B0609020204030204" pitchFamily="49" charset="0"/>
+                        </a:rPr>
+                        <a:t>TargetFramework</a:t>
+                      </a:r>
+                      <a:r>
+                        <a:rPr lang="en-US" sz="1600" b="0" dirty="0">
+                          <a:solidFill>
+                            <a:srgbClr val="800000"/>
+                          </a:solidFill>
+                          <a:effectLst/>
+                          <a:latin typeface="Consolas" panose="020B0609020204030204" pitchFamily="49" charset="0"/>
+                        </a:rPr>
+                        <a:t>&gt;</a:t>
+                      </a:r>
+                      <a:endParaRPr lang="en-US" sz="1600" b="0" dirty="0">
+                        <a:solidFill>
+                          <a:srgbClr val="000000"/>
+                        </a:solidFill>
+                        <a:effectLst/>
+                        <a:latin typeface="Consolas" panose="020B0609020204030204" pitchFamily="49" charset="0"/>
+                      </a:endParaRPr>
+                    </a:p>
+                    <a:p>
+                      <a:r>
+                        <a:rPr lang="en-US" sz="1600" b="0" dirty="0">
+                          <a:solidFill>
+                            <a:srgbClr val="800000"/>
+                          </a:solidFill>
+                          <a:effectLst/>
+                          <a:latin typeface="Consolas" panose="020B0609020204030204" pitchFamily="49" charset="0"/>
+                        </a:rPr>
+                        <a:t>  &lt;/</a:t>
+                      </a:r>
+                      <a:r>
+                        <a:rPr lang="en-US" sz="1600" b="0" dirty="0" err="1">
+                          <a:solidFill>
+                            <a:srgbClr val="800000"/>
+                          </a:solidFill>
+                          <a:effectLst/>
+                          <a:latin typeface="Consolas" panose="020B0609020204030204" pitchFamily="49" charset="0"/>
+                        </a:rPr>
+                        <a:t>PropertyGroup</a:t>
+                      </a:r>
+                      <a:r>
+                        <a:rPr lang="en-US" sz="1600" b="0" dirty="0">
+                          <a:solidFill>
+                            <a:srgbClr val="800000"/>
+                          </a:solidFill>
+                          <a:effectLst/>
+                          <a:latin typeface="Consolas" panose="020B0609020204030204" pitchFamily="49" charset="0"/>
+                        </a:rPr>
+                        <a:t>&gt;</a:t>
+                      </a:r>
+                      <a:endParaRPr lang="en-US" sz="1600" b="0" dirty="0">
+                        <a:solidFill>
+                          <a:srgbClr val="000000"/>
+                        </a:solidFill>
+                        <a:effectLst/>
+                        <a:latin typeface="Consolas" panose="020B0609020204030204" pitchFamily="49" charset="0"/>
+                      </a:endParaRPr>
+                    </a:p>
+                    <a:p>
+                      <a:r>
+                        <a:rPr lang="en-US" sz="1600" b="0" dirty="0">
+                          <a:solidFill>
+                            <a:srgbClr val="800000"/>
+                          </a:solidFill>
+                          <a:effectLst/>
+                          <a:latin typeface="Consolas" panose="020B0609020204030204" pitchFamily="49" charset="0"/>
+                        </a:rPr>
+                        <a:t>  &lt;</a:t>
+                      </a:r>
+                      <a:r>
+                        <a:rPr lang="en-US" sz="1600" b="0" dirty="0" err="1">
+                          <a:solidFill>
+                            <a:srgbClr val="800000"/>
+                          </a:solidFill>
+                          <a:effectLst/>
+                          <a:latin typeface="Consolas" panose="020B0609020204030204" pitchFamily="49" charset="0"/>
+                        </a:rPr>
+                        <a:t>ItemGroup</a:t>
+                      </a:r>
+                      <a:r>
+                        <a:rPr lang="en-US" sz="1600" b="0" dirty="0">
+                          <a:solidFill>
+                            <a:srgbClr val="800000"/>
+                          </a:solidFill>
+                          <a:effectLst/>
+                          <a:latin typeface="Consolas" panose="020B0609020204030204" pitchFamily="49" charset="0"/>
+                        </a:rPr>
+                        <a:t>&gt;</a:t>
+                      </a:r>
+                      <a:endParaRPr lang="en-US" sz="1600" b="0" dirty="0">
+                        <a:solidFill>
+                          <a:srgbClr val="000000"/>
+                        </a:solidFill>
+                        <a:effectLst/>
+                        <a:latin typeface="Consolas" panose="020B0609020204030204" pitchFamily="49" charset="0"/>
+                      </a:endParaRPr>
+                    </a:p>
+                    <a:p>
+                      <a:r>
+                        <a:rPr lang="en-US" sz="1600" b="0" dirty="0">
+                          <a:solidFill>
+                            <a:srgbClr val="800000"/>
+                          </a:solidFill>
+                          <a:effectLst/>
+                          <a:latin typeface="Consolas" panose="020B0609020204030204" pitchFamily="49" charset="0"/>
+                        </a:rPr>
+                        <a:t>    &lt;</a:t>
+                      </a:r>
+                      <a:r>
+                        <a:rPr lang="en-US" sz="1600" b="0" dirty="0" err="1">
+                          <a:solidFill>
+                            <a:srgbClr val="800000"/>
+                          </a:solidFill>
+                          <a:effectLst/>
+                          <a:latin typeface="Consolas" panose="020B0609020204030204" pitchFamily="49" charset="0"/>
+                        </a:rPr>
+                        <a:t>PackageReference</a:t>
+                      </a:r>
+                      <a:r>
+                        <a:rPr lang="en-US" sz="1600" b="0" dirty="0">
+                          <a:solidFill>
+                            <a:srgbClr val="000000"/>
+                          </a:solidFill>
+                          <a:effectLst/>
+                          <a:latin typeface="Consolas" panose="020B0609020204030204" pitchFamily="49" charset="0"/>
+                        </a:rPr>
+                        <a:t> </a:t>
+                      </a:r>
+                      <a:r>
+                        <a:rPr lang="en-US" sz="1600" b="0" dirty="0">
+                          <a:solidFill>
+                            <a:srgbClr val="FF0000"/>
+                          </a:solidFill>
+                          <a:effectLst/>
+                          <a:latin typeface="Consolas" panose="020B0609020204030204" pitchFamily="49" charset="0"/>
+                        </a:rPr>
+                        <a:t>Include</a:t>
+                      </a:r>
+                      <a:r>
+                        <a:rPr lang="en-US" sz="1600" b="0" dirty="0">
+                          <a:solidFill>
+                            <a:srgbClr val="000000"/>
+                          </a:solidFill>
+                          <a:effectLst/>
+                          <a:latin typeface="Consolas" panose="020B0609020204030204" pitchFamily="49" charset="0"/>
+                        </a:rPr>
+                        <a:t>=</a:t>
+                      </a:r>
+                      <a:r>
+                        <a:rPr lang="en-US" sz="1600" b="0" dirty="0">
+                          <a:solidFill>
+                            <a:srgbClr val="0000FF"/>
+                          </a:solidFill>
+                          <a:effectLst/>
+                          <a:latin typeface="Consolas" panose="020B0609020204030204" pitchFamily="49" charset="0"/>
+                        </a:rPr>
+                        <a:t>"</a:t>
+                      </a:r>
+                      <a:r>
+                        <a:rPr lang="en-US" sz="1600" b="0" dirty="0" err="1">
+                          <a:solidFill>
+                            <a:srgbClr val="0000FF"/>
+                          </a:solidFill>
+                          <a:effectLst/>
+                          <a:latin typeface="Consolas" panose="020B0609020204030204" pitchFamily="49" charset="0"/>
+                        </a:rPr>
+                        <a:t>Microsoft.AspNetCore.App</a:t>
+                      </a:r>
+                      <a:r>
+                        <a:rPr lang="en-US" sz="1600" b="0" dirty="0">
+                          <a:solidFill>
+                            <a:srgbClr val="0000FF"/>
+                          </a:solidFill>
+                          <a:effectLst/>
+                          <a:latin typeface="Consolas" panose="020B0609020204030204" pitchFamily="49" charset="0"/>
+                        </a:rPr>
+                        <a:t>"</a:t>
+                      </a:r>
+                      <a:endParaRPr lang="en-US" sz="1600" b="0" dirty="0">
+                        <a:solidFill>
+                          <a:srgbClr val="000000"/>
+                        </a:solidFill>
+                        <a:effectLst/>
+                        <a:latin typeface="Consolas" panose="020B0609020204030204" pitchFamily="49" charset="0"/>
+                      </a:endParaRPr>
+                    </a:p>
+                    <a:p>
+                      <a:r>
+                        <a:rPr lang="en-US" sz="1600" b="0" dirty="0">
+                          <a:solidFill>
+                            <a:srgbClr val="000000"/>
+                          </a:solidFill>
+                          <a:effectLst/>
+                          <a:latin typeface="Consolas" panose="020B0609020204030204" pitchFamily="49" charset="0"/>
+                        </a:rPr>
+                        <a:t>                      </a:t>
+                      </a:r>
+                      <a:r>
+                        <a:rPr lang="en-US" sz="1600" b="0" dirty="0">
+                          <a:solidFill>
+                            <a:srgbClr val="FF0000"/>
+                          </a:solidFill>
+                          <a:effectLst/>
+                          <a:latin typeface="Consolas" panose="020B0609020204030204" pitchFamily="49" charset="0"/>
+                        </a:rPr>
+                        <a:t>Version</a:t>
+                      </a:r>
+                      <a:r>
+                        <a:rPr lang="en-US" sz="1600" b="0" dirty="0">
+                          <a:solidFill>
+                            <a:srgbClr val="000000"/>
+                          </a:solidFill>
+                          <a:effectLst/>
+                          <a:latin typeface="Consolas" panose="020B0609020204030204" pitchFamily="49" charset="0"/>
+                        </a:rPr>
+                        <a:t>=</a:t>
+                      </a:r>
+                      <a:r>
+                        <a:rPr lang="en-US" sz="1600" b="0" dirty="0">
+                          <a:solidFill>
+                            <a:srgbClr val="0000FF"/>
+                          </a:solidFill>
+                          <a:effectLst/>
+                          <a:latin typeface="Consolas" panose="020B0609020204030204" pitchFamily="49" charset="0"/>
+                        </a:rPr>
+                        <a:t>"2.1.0-preview1-final"</a:t>
+                      </a:r>
+                      <a:r>
+                        <a:rPr lang="en-US" sz="1600" b="0" dirty="0">
+                          <a:solidFill>
+                            <a:srgbClr val="000000"/>
+                          </a:solidFill>
+                          <a:effectLst/>
+                          <a:latin typeface="Consolas" panose="020B0609020204030204" pitchFamily="49" charset="0"/>
+                        </a:rPr>
+                        <a:t> </a:t>
+                      </a:r>
+                      <a:r>
+                        <a:rPr lang="en-US" sz="1600" b="0" dirty="0">
+                          <a:solidFill>
+                            <a:srgbClr val="800000"/>
+                          </a:solidFill>
+                          <a:effectLst/>
+                          <a:latin typeface="Consolas" panose="020B0609020204030204" pitchFamily="49" charset="0"/>
+                        </a:rPr>
+                        <a:t>/&gt;</a:t>
+                      </a:r>
+                      <a:endParaRPr lang="en-US" sz="1600" b="0" dirty="0">
+                        <a:solidFill>
+                          <a:srgbClr val="000000"/>
+                        </a:solidFill>
+                        <a:effectLst/>
+                        <a:latin typeface="Consolas" panose="020B0609020204030204" pitchFamily="49" charset="0"/>
+                      </a:endParaRPr>
+                    </a:p>
+                    <a:p>
+                      <a:r>
+                        <a:rPr lang="en-US" sz="1600" b="0" dirty="0">
+                          <a:solidFill>
+                            <a:srgbClr val="800000"/>
+                          </a:solidFill>
+                          <a:effectLst/>
+                          <a:latin typeface="Consolas" panose="020B0609020204030204" pitchFamily="49" charset="0"/>
+                        </a:rPr>
+                        <a:t>    &lt;</a:t>
+                      </a:r>
+                      <a:r>
+                        <a:rPr lang="en-US" sz="1600" b="0" dirty="0" err="1">
+                          <a:solidFill>
+                            <a:srgbClr val="800000"/>
+                          </a:solidFill>
+                          <a:effectLst/>
+                          <a:latin typeface="Consolas" panose="020B0609020204030204" pitchFamily="49" charset="0"/>
+                        </a:rPr>
+                        <a:t>PackageReference</a:t>
+                      </a:r>
+                      <a:r>
+                        <a:rPr lang="en-US" sz="1600" b="0" dirty="0">
+                          <a:solidFill>
+                            <a:srgbClr val="000000"/>
+                          </a:solidFill>
+                          <a:effectLst/>
+                          <a:latin typeface="Consolas" panose="020B0609020204030204" pitchFamily="49" charset="0"/>
+                        </a:rPr>
+                        <a:t> </a:t>
+                      </a:r>
+                      <a:r>
+                        <a:rPr lang="en-US" sz="1600" b="0" dirty="0">
+                          <a:solidFill>
+                            <a:srgbClr val="FF0000"/>
+                          </a:solidFill>
+                          <a:effectLst/>
+                          <a:latin typeface="Consolas" panose="020B0609020204030204" pitchFamily="49" charset="0"/>
+                        </a:rPr>
+                        <a:t>Include</a:t>
+                      </a:r>
+                      <a:r>
+                        <a:rPr lang="en-US" sz="1600" b="0" dirty="0">
+                          <a:solidFill>
+                            <a:srgbClr val="000000"/>
+                          </a:solidFill>
+                          <a:effectLst/>
+                          <a:latin typeface="Consolas" panose="020B0609020204030204" pitchFamily="49" charset="0"/>
+                        </a:rPr>
+                        <a:t>=</a:t>
+                      </a:r>
+                      <a:r>
+                        <a:rPr lang="en-US" sz="1600" b="0" dirty="0">
+                          <a:solidFill>
+                            <a:srgbClr val="0000FF"/>
+                          </a:solidFill>
+                          <a:effectLst/>
+                          <a:latin typeface="Consolas" panose="020B0609020204030204" pitchFamily="49" charset="0"/>
+                        </a:rPr>
+                        <a:t>"</a:t>
+                      </a:r>
+                      <a:r>
+                        <a:rPr lang="en-US" sz="1600" b="0" dirty="0" err="1">
+                          <a:solidFill>
+                            <a:srgbClr val="0000FF"/>
+                          </a:solidFill>
+                          <a:effectLst/>
+                          <a:latin typeface="Consolas" panose="020B0609020204030204" pitchFamily="49" charset="0"/>
+                        </a:rPr>
+                        <a:t>Microsoft.VisualStudio.Web.CodeGeneration.Design</a:t>
+                      </a:r>
+                      <a:r>
+                        <a:rPr lang="en-US" sz="1600" b="0" dirty="0">
+                          <a:solidFill>
+                            <a:srgbClr val="0000FF"/>
+                          </a:solidFill>
+                          <a:effectLst/>
+                          <a:latin typeface="Consolas" panose="020B0609020204030204" pitchFamily="49" charset="0"/>
+                        </a:rPr>
+                        <a:t>"</a:t>
+                      </a:r>
+                      <a:endParaRPr lang="en-US" sz="1600" b="0" dirty="0">
+                        <a:solidFill>
+                          <a:srgbClr val="000000"/>
+                        </a:solidFill>
+                        <a:effectLst/>
+                        <a:latin typeface="Consolas" panose="020B0609020204030204" pitchFamily="49" charset="0"/>
+                      </a:endParaRPr>
+                    </a:p>
+                    <a:p>
+                      <a:r>
+                        <a:rPr lang="en-US" sz="1600" b="0" dirty="0">
+                          <a:solidFill>
+                            <a:srgbClr val="000000"/>
+                          </a:solidFill>
+                          <a:effectLst/>
+                          <a:latin typeface="Consolas" panose="020B0609020204030204" pitchFamily="49" charset="0"/>
+                        </a:rPr>
+                        <a:t>                      </a:t>
+                      </a:r>
+                      <a:r>
+                        <a:rPr lang="en-US" sz="1600" b="0" dirty="0">
+                          <a:solidFill>
+                            <a:srgbClr val="FF0000"/>
+                          </a:solidFill>
+                          <a:effectLst/>
+                          <a:latin typeface="Consolas" panose="020B0609020204030204" pitchFamily="49" charset="0"/>
+                        </a:rPr>
+                        <a:t>Version</a:t>
+                      </a:r>
+                      <a:r>
+                        <a:rPr lang="en-US" sz="1600" b="0" dirty="0">
+                          <a:solidFill>
+                            <a:srgbClr val="000000"/>
+                          </a:solidFill>
+                          <a:effectLst/>
+                          <a:latin typeface="Consolas" panose="020B0609020204030204" pitchFamily="49" charset="0"/>
+                        </a:rPr>
+                        <a:t>=</a:t>
+                      </a:r>
+                      <a:r>
+                        <a:rPr lang="en-US" sz="1600" b="0" dirty="0">
+                          <a:solidFill>
+                            <a:srgbClr val="0000FF"/>
+                          </a:solidFill>
+                          <a:effectLst/>
+                          <a:latin typeface="Consolas" panose="020B0609020204030204" pitchFamily="49" charset="0"/>
+                        </a:rPr>
+                        <a:t>"2.1.0-preview1-final"</a:t>
+                      </a:r>
+                      <a:r>
+                        <a:rPr lang="en-US" sz="1600" b="0" dirty="0">
+                          <a:solidFill>
+                            <a:srgbClr val="000000"/>
+                          </a:solidFill>
+                          <a:effectLst/>
+                          <a:latin typeface="Consolas" panose="020B0609020204030204" pitchFamily="49" charset="0"/>
+                        </a:rPr>
+                        <a:t> </a:t>
+                      </a:r>
+                      <a:r>
+                        <a:rPr lang="en-US" sz="1600" b="0" dirty="0">
+                          <a:solidFill>
+                            <a:srgbClr val="800000"/>
+                          </a:solidFill>
+                          <a:effectLst/>
+                          <a:latin typeface="Consolas" panose="020B0609020204030204" pitchFamily="49" charset="0"/>
+                        </a:rPr>
+                        <a:t>/&gt;</a:t>
+                      </a:r>
+                      <a:endParaRPr lang="en-US" sz="1600" b="0" dirty="0">
+                        <a:solidFill>
+                          <a:srgbClr val="000000"/>
+                        </a:solidFill>
+                        <a:effectLst/>
+                        <a:latin typeface="Consolas" panose="020B0609020204030204" pitchFamily="49" charset="0"/>
+                      </a:endParaRPr>
+                    </a:p>
+                    <a:p>
+                      <a:r>
+                        <a:rPr lang="en-US" sz="1600" b="0" dirty="0">
+                          <a:solidFill>
+                            <a:srgbClr val="800000"/>
+                          </a:solidFill>
+                          <a:effectLst/>
+                          <a:latin typeface="Consolas" panose="020B0609020204030204" pitchFamily="49" charset="0"/>
+                        </a:rPr>
+                        <a:t>  &lt;/</a:t>
+                      </a:r>
+                      <a:r>
+                        <a:rPr lang="en-US" sz="1600" b="0" dirty="0" err="1">
+                          <a:solidFill>
+                            <a:srgbClr val="800000"/>
+                          </a:solidFill>
+                          <a:effectLst/>
+                          <a:latin typeface="Consolas" panose="020B0609020204030204" pitchFamily="49" charset="0"/>
+                        </a:rPr>
+                        <a:t>ItemGroup</a:t>
+                      </a:r>
+                      <a:r>
+                        <a:rPr lang="en-US" sz="1600" b="0" dirty="0">
+                          <a:solidFill>
+                            <a:srgbClr val="800000"/>
+                          </a:solidFill>
+                          <a:effectLst/>
+                          <a:latin typeface="Consolas" panose="020B0609020204030204" pitchFamily="49" charset="0"/>
+                        </a:rPr>
+                        <a:t>&gt;</a:t>
+                      </a:r>
+                      <a:endParaRPr lang="en-US" sz="1600" b="0" dirty="0">
+                        <a:solidFill>
+                          <a:srgbClr val="000000"/>
+                        </a:solidFill>
+                        <a:effectLst/>
+                        <a:latin typeface="Consolas" panose="020B0609020204030204" pitchFamily="49" charset="0"/>
+                      </a:endParaRPr>
+                    </a:p>
+                    <a:p>
+                      <a:r>
+                        <a:rPr lang="en-US" sz="1600" b="0" dirty="0">
+                          <a:solidFill>
+                            <a:srgbClr val="800000"/>
+                          </a:solidFill>
+                          <a:effectLst/>
+                          <a:latin typeface="Consolas" panose="020B0609020204030204" pitchFamily="49" charset="0"/>
+                        </a:rPr>
+                        <a:t>  &lt;</a:t>
+                      </a:r>
+                      <a:r>
+                        <a:rPr lang="en-US" sz="1600" b="0" dirty="0" err="1">
+                          <a:solidFill>
+                            <a:srgbClr val="800000"/>
+                          </a:solidFill>
+                          <a:effectLst/>
+                          <a:latin typeface="Consolas" panose="020B0609020204030204" pitchFamily="49" charset="0"/>
+                        </a:rPr>
+                        <a:t>ItemGroup</a:t>
+                      </a:r>
+                      <a:r>
+                        <a:rPr lang="en-US" sz="1600" b="0" dirty="0">
+                          <a:solidFill>
+                            <a:srgbClr val="800000"/>
+                          </a:solidFill>
+                          <a:effectLst/>
+                          <a:latin typeface="Consolas" panose="020B0609020204030204" pitchFamily="49" charset="0"/>
+                        </a:rPr>
+                        <a:t>&gt;</a:t>
+                      </a:r>
+                      <a:endParaRPr lang="en-US" sz="1600" b="0" dirty="0">
+                        <a:solidFill>
+                          <a:srgbClr val="000000"/>
+                        </a:solidFill>
+                        <a:effectLst/>
+                        <a:latin typeface="Consolas" panose="020B0609020204030204" pitchFamily="49" charset="0"/>
+                      </a:endParaRPr>
+                    </a:p>
+                    <a:p>
+                      <a:r>
+                        <a:rPr lang="en-US" sz="1600" b="0" dirty="0">
+                          <a:solidFill>
+                            <a:srgbClr val="800000"/>
+                          </a:solidFill>
+                          <a:effectLst/>
+                          <a:latin typeface="Consolas" panose="020B0609020204030204" pitchFamily="49" charset="0"/>
+                        </a:rPr>
+                        <a:t>    &lt;</a:t>
+                      </a:r>
+                      <a:r>
+                        <a:rPr lang="en-US" sz="1600" b="0" dirty="0" err="1">
+                          <a:solidFill>
+                            <a:srgbClr val="800000"/>
+                          </a:solidFill>
+                          <a:effectLst/>
+                          <a:latin typeface="Consolas" panose="020B0609020204030204" pitchFamily="49" charset="0"/>
+                        </a:rPr>
+                        <a:t>DotNetCliToolReference</a:t>
+                      </a:r>
+                      <a:r>
+                        <a:rPr lang="en-US" sz="1600" b="0" dirty="0">
+                          <a:solidFill>
+                            <a:srgbClr val="000000"/>
+                          </a:solidFill>
+                          <a:effectLst/>
+                          <a:latin typeface="Consolas" panose="020B0609020204030204" pitchFamily="49" charset="0"/>
+                        </a:rPr>
+                        <a:t> </a:t>
+                      </a:r>
+                      <a:r>
+                        <a:rPr lang="en-US" sz="1600" b="0" dirty="0">
+                          <a:solidFill>
+                            <a:srgbClr val="FF0000"/>
+                          </a:solidFill>
+                          <a:effectLst/>
+                          <a:latin typeface="Consolas" panose="020B0609020204030204" pitchFamily="49" charset="0"/>
+                        </a:rPr>
+                        <a:t>Include</a:t>
+                      </a:r>
+                      <a:r>
+                        <a:rPr lang="en-US" sz="1600" b="0" dirty="0">
+                          <a:solidFill>
+                            <a:srgbClr val="000000"/>
+                          </a:solidFill>
+                          <a:effectLst/>
+                          <a:latin typeface="Consolas" panose="020B0609020204030204" pitchFamily="49" charset="0"/>
+                        </a:rPr>
+                        <a:t>=</a:t>
+                      </a:r>
+                      <a:r>
+                        <a:rPr lang="en-US" sz="1600" b="0" dirty="0">
+                          <a:solidFill>
+                            <a:srgbClr val="0000FF"/>
+                          </a:solidFill>
+                          <a:effectLst/>
+                          <a:latin typeface="Consolas" panose="020B0609020204030204" pitchFamily="49" charset="0"/>
+                        </a:rPr>
+                        <a:t>"</a:t>
+                      </a:r>
+                      <a:r>
+                        <a:rPr lang="en-US" sz="1600" b="0" dirty="0" err="1">
+                          <a:solidFill>
+                            <a:srgbClr val="0000FF"/>
+                          </a:solidFill>
+                          <a:effectLst/>
+                          <a:latin typeface="Consolas" panose="020B0609020204030204" pitchFamily="49" charset="0"/>
+                        </a:rPr>
+                        <a:t>Microsoft.VisualStudio.Web.CodeGeneration.Tools</a:t>
+                      </a:r>
+                      <a:r>
+                        <a:rPr lang="en-US" sz="1600" b="0" dirty="0">
+                          <a:solidFill>
+                            <a:srgbClr val="0000FF"/>
+                          </a:solidFill>
+                          <a:effectLst/>
+                          <a:latin typeface="Consolas" panose="020B0609020204030204" pitchFamily="49" charset="0"/>
+                        </a:rPr>
+                        <a:t>"</a:t>
+                      </a:r>
+                      <a:endParaRPr lang="en-US" sz="1600" b="0" dirty="0">
+                        <a:solidFill>
+                          <a:srgbClr val="000000"/>
+                        </a:solidFill>
+                        <a:effectLst/>
+                        <a:latin typeface="Consolas" panose="020B0609020204030204" pitchFamily="49" charset="0"/>
+                      </a:endParaRPr>
+                    </a:p>
+                    <a:p>
+                      <a:r>
+                        <a:rPr lang="en-US" sz="1600" b="0" dirty="0">
+                          <a:solidFill>
+                            <a:srgbClr val="000000"/>
+                          </a:solidFill>
+                          <a:effectLst/>
+                          <a:latin typeface="Consolas" panose="020B0609020204030204" pitchFamily="49" charset="0"/>
+                        </a:rPr>
+                        <a:t>                            </a:t>
+                      </a:r>
+                      <a:r>
+                        <a:rPr lang="en-US" sz="1600" b="0" dirty="0">
+                          <a:solidFill>
+                            <a:srgbClr val="FF0000"/>
+                          </a:solidFill>
+                          <a:effectLst/>
+                          <a:latin typeface="Consolas" panose="020B0609020204030204" pitchFamily="49" charset="0"/>
+                        </a:rPr>
+                        <a:t>Version</a:t>
+                      </a:r>
+                      <a:r>
+                        <a:rPr lang="en-US" sz="1600" b="0" dirty="0">
+                          <a:solidFill>
+                            <a:srgbClr val="000000"/>
+                          </a:solidFill>
+                          <a:effectLst/>
+                          <a:latin typeface="Consolas" panose="020B0609020204030204" pitchFamily="49" charset="0"/>
+                        </a:rPr>
+                        <a:t>=</a:t>
+                      </a:r>
+                      <a:r>
+                        <a:rPr lang="en-US" sz="1600" b="0" dirty="0">
+                          <a:solidFill>
+                            <a:srgbClr val="0000FF"/>
+                          </a:solidFill>
+                          <a:effectLst/>
+                          <a:latin typeface="Consolas" panose="020B0609020204030204" pitchFamily="49" charset="0"/>
+                        </a:rPr>
+                        <a:t>"2.1.0-preview1-final"</a:t>
+                      </a:r>
+                      <a:r>
+                        <a:rPr lang="en-US" sz="1600" b="0" dirty="0">
+                          <a:solidFill>
+                            <a:srgbClr val="000000"/>
+                          </a:solidFill>
+                          <a:effectLst/>
+                          <a:latin typeface="Consolas" panose="020B0609020204030204" pitchFamily="49" charset="0"/>
+                        </a:rPr>
+                        <a:t> </a:t>
+                      </a:r>
+                      <a:r>
+                        <a:rPr lang="en-US" sz="1600" b="0" dirty="0">
+                          <a:solidFill>
+                            <a:srgbClr val="800000"/>
+                          </a:solidFill>
+                          <a:effectLst/>
+                          <a:latin typeface="Consolas" panose="020B0609020204030204" pitchFamily="49" charset="0"/>
+                        </a:rPr>
+                        <a:t>/&gt;</a:t>
+                      </a:r>
+                      <a:endParaRPr lang="en-US" sz="1600" b="0" dirty="0">
+                        <a:solidFill>
+                          <a:srgbClr val="000000"/>
+                        </a:solidFill>
+                        <a:effectLst/>
+                        <a:latin typeface="Consolas" panose="020B0609020204030204" pitchFamily="49" charset="0"/>
+                      </a:endParaRPr>
+                    </a:p>
+                    <a:p>
+                      <a:r>
+                        <a:rPr lang="en-US" sz="1600" b="0" dirty="0">
+                          <a:solidFill>
+                            <a:srgbClr val="800000"/>
+                          </a:solidFill>
+                          <a:effectLst/>
+                          <a:latin typeface="Consolas" panose="020B0609020204030204" pitchFamily="49" charset="0"/>
+                        </a:rPr>
+                        <a:t>  &lt;/</a:t>
+                      </a:r>
+                      <a:r>
+                        <a:rPr lang="en-US" sz="1600" b="0" dirty="0" err="1">
+                          <a:solidFill>
+                            <a:srgbClr val="800000"/>
+                          </a:solidFill>
+                          <a:effectLst/>
+                          <a:latin typeface="Consolas" panose="020B0609020204030204" pitchFamily="49" charset="0"/>
+                        </a:rPr>
+                        <a:t>ItemGroup</a:t>
+                      </a:r>
+                      <a:r>
+                        <a:rPr lang="en-US" sz="1600" b="0" dirty="0">
+                          <a:solidFill>
+                            <a:srgbClr val="800000"/>
+                          </a:solidFill>
+                          <a:effectLst/>
+                          <a:latin typeface="Consolas" panose="020B0609020204030204" pitchFamily="49" charset="0"/>
+                        </a:rPr>
+                        <a:t>&gt;</a:t>
+                      </a:r>
+                      <a:endParaRPr lang="en-US" sz="1600" b="0" dirty="0">
+                        <a:solidFill>
+                          <a:srgbClr val="000000"/>
+                        </a:solidFill>
+                        <a:effectLst/>
+                        <a:latin typeface="Consolas" panose="020B0609020204030204" pitchFamily="49" charset="0"/>
+                      </a:endParaRPr>
+                    </a:p>
+                    <a:p>
+                      <a:r>
+                        <a:rPr lang="en-US" sz="1600" b="0" dirty="0">
+                          <a:solidFill>
+                            <a:srgbClr val="800000"/>
+                          </a:solidFill>
+                          <a:effectLst/>
+                          <a:latin typeface="Consolas" panose="020B0609020204030204" pitchFamily="49" charset="0"/>
+                        </a:rPr>
+                        <a:t>&lt;/Project&gt;</a:t>
+                      </a:r>
+                      <a:endParaRPr lang="en-US" sz="1600" b="0" dirty="0">
+                        <a:solidFill>
+                          <a:srgbClr val="000000"/>
+                        </a:solidFill>
+                        <a:effectLst/>
+                        <a:latin typeface="Consolas" panose="020B0609020204030204" pitchFamily="49" charset="0"/>
+                      </a:endParaRPr>
+                    </a:p>
+                    <a:p>
+                      <a:endParaRPr lang="en-US" sz="1600" b="0" kern="1200" dirty="0">
+                        <a:solidFill>
+                          <a:schemeClr val="bg1"/>
+                        </a:solidFill>
+                        <a:effectLst/>
+                        <a:latin typeface="+mn-lt"/>
+                        <a:ea typeface="+mn-ea"/>
+                        <a:cs typeface="+mn-cs"/>
+                      </a:endParaRPr>
+                    </a:p>
+                  </a:txBody>
+                  <a:tcPr>
+                    <a:lnL w="12700" cap="flat" cmpd="sng" algn="ctr">
+                      <a:solidFill>
+                        <a:schemeClr val="tx1"/>
+                      </a:solidFill>
+                      <a:prstDash val="solid"/>
+                      <a:round/>
+                      <a:headEnd type="none" w="med" len="med"/>
+                      <a:tailEnd type="none" w="med" len="med"/>
+                    </a:lnL>
+                    <a:lnR w="12700" cap="flat" cmpd="sng" algn="ctr">
+                      <a:solidFill>
+                        <a:schemeClr val="tx1"/>
+                      </a:solidFill>
+                      <a:prstDash val="solid"/>
+                      <a:round/>
+                      <a:headEnd type="none" w="med" len="med"/>
+                      <a:tailEnd type="none" w="med" len="med"/>
+                    </a:lnR>
+                    <a:lnT w="12700" cap="flat" cmpd="sng" algn="ctr">
+                      <a:solidFill>
+                        <a:schemeClr val="tx1"/>
+                      </a:solidFill>
+                      <a:prstDash val="solid"/>
+                      <a:round/>
+                      <a:headEnd type="none" w="med" len="med"/>
+                      <a:tailEnd type="none" w="med" len="med"/>
+                    </a:lnT>
+                    <a:lnB w="12700" cap="flat" cmpd="sng" algn="ctr">
+                      <a:solidFill>
+                        <a:schemeClr val="tx1"/>
+                      </a:solidFill>
+                      <a:prstDash val="solid"/>
+                      <a:round/>
+                      <a:headEnd type="none" w="med" len="med"/>
+                      <a:tailEnd type="none" w="med" len="med"/>
+                    </a:lnB>
+                    <a:solidFill>
+                      <a:schemeClr val="tx1"/>
+                    </a:solidFill>
+                  </a:tcPr>
+                </a:tc>
+                <a:extLst>
+                  <a:ext uri="{0D108BD9-81ED-4DB2-BD59-A6C34878D82A}">
+                    <a16:rowId xmlns:a16="http://schemas.microsoft.com/office/drawing/2014/main" val="3473222697"/>
+                  </a:ext>
+                </a:extLst>
+              </a:tr>
+            </a:tbl>
+          </a:graphicData>
+        </a:graphic>
+      </p:graphicFrame>
+      <p:sp>
+        <p:nvSpPr>
+          <p:cNvPr id="5" name="Rectangle 4">
             <a:extLst>
-              <a:ext uri="{28A0092B-C50C-407E-A947-70E740481C1C}">
-                <a14:useLocalDpi xmlns:a14="http://schemas.microsoft.com/office/drawing/2010/main" val="0"/>
+              <a:ext uri="{FF2B5EF4-FFF2-40B4-BE49-F238E27FC236}">
+                <a16:creationId xmlns:a16="http://schemas.microsoft.com/office/drawing/2014/main" id="{3B618AD7-D58A-4689-9F33-0E6AC68D7FB6}"/>
               </a:ext>
             </a:extLst>
-          </a:blip>
-          <a:stretch>
-            <a:fillRect/>
-          </a:stretch>
-        </p:blipFill>
+          </p:cNvPr>
+          <p:cNvSpPr/>
+          <p:nvPr/>
+        </p:nvSpPr>
         <p:spPr>
           <a:xfrm>
-            <a:off x="1383499" y="2016769"/>
-            <a:ext cx="2835804" cy="2824461"/>
+            <a:off x="838200" y="1379057"/>
+            <a:ext cx="2101236" cy="446567"/>
           </a:xfrm>
           <a:prstGeom prst="rect">
             <a:avLst/>
           </a:prstGeom>
         </p:spPr>
-      </p:pic>
-    </p:spTree>
-    <p:extLst>
-      <p:ext uri="{BB962C8B-B14F-4D97-AF65-F5344CB8AC3E}">
-        <p14:creationId xmlns:p14="http://schemas.microsoft.com/office/powerpoint/2010/main" val="682550062"/>
-      </p:ext>
-    </p:extLst>
-  </p:cSld>
-  <p:clrMapOvr>
-    <a:masterClrMapping/>
-  </p:clrMapOvr>
-</p:sld>
-</file>
-
-<file path=ppt/slides/slide9.xml><?xml version="1.0" encoding="utf-8"?>
-<p:sld xmlns:a="http://schemas.openxmlformats.org/drawingml/2006/main" xmlns:r="http://schemas.openxmlformats.org/officeDocument/2006/relationships" xmlns:p="http://schemas.openxmlformats.org/presentationml/2006/main">
-  <p:cSld>
-    <p:bg>
-      <p:bgPr>
-        <a:solidFill>
-          <a:schemeClr val="bg1"/>
-        </a:solidFill>
-        <a:effectLst/>
-      </p:bgPr>
-    </p:bg>
-    <p:spTree>
-      <p:nvGrpSpPr>
-        <p:cNvPr id="1" name=""/>
-        <p:cNvGrpSpPr/>
-        <p:nvPr/>
-      </p:nvGrpSpPr>
-      <p:grpSpPr>
-        <a:xfrm>
-          <a:off x="0" y="0"/>
-          <a:ext cx="0" cy="0"/>
-          <a:chOff x="0" y="0"/>
-          <a:chExt cx="0" cy="0"/>
-        </a:xfrm>
-      </p:grpSpPr>
+        <p:style>
+          <a:lnRef idx="1">
+            <a:schemeClr val="accent1"/>
+          </a:lnRef>
+          <a:fillRef idx="2">
+            <a:schemeClr val="accent1"/>
+          </a:fillRef>
+          <a:effectRef idx="1">
+            <a:schemeClr val="accent1"/>
+          </a:effectRef>
+          <a:fontRef idx="minor">
+            <a:schemeClr val="dk1"/>
+          </a:fontRef>
+        </p:style>
+        <p:txBody>
+          <a:bodyPr rtlCol="0" anchor="ctr"/>
+          <a:lstStyle/>
+          <a:p>
+            <a:pPr algn="ctr"/>
+            <a:r>
+              <a:rPr lang="en-US" b="1" dirty="0" err="1"/>
+              <a:t>test_app.csproj</a:t>
+            </a:r>
+            <a:endParaRPr lang="en-US" b="1" dirty="0"/>
+          </a:p>
+        </p:txBody>
+      </p:sp>
       <p:sp>
         <p:nvSpPr>
-          <p:cNvPr id="8" name="Rectangle 7">
+          <p:cNvPr id="6" name="Rectangle 5">
             <a:extLst>
               <a:ext uri="{FF2B5EF4-FFF2-40B4-BE49-F238E27FC236}">
-                <a16:creationId xmlns:a16="http://schemas.microsoft.com/office/drawing/2014/main" id="{8D70B121-56F4-4848-B38B-182089D909FA}"/>
+                <a16:creationId xmlns:a16="http://schemas.microsoft.com/office/drawing/2014/main" id="{0B92BF76-046A-486B-8030-FE5C1C8FFF66}"/>
               </a:ext>
             </a:extLst>
           </p:cNvPr>
-          <p:cNvSpPr>
-            <a:spLocks noGrp="1" noRot="1" noChangeAspect="1" noMove="1" noResize="1" noEditPoints="1" noAdjustHandles="1" noChangeArrowheads="1" noChangeShapeType="1" noTextEdit="1"/>
-          </p:cNvSpPr>
-          <p:nvPr>
-            <p:extLst>
-              <p:ext uri="{386F3935-93C4-4BCD-93E2-E3B085C9AB24}">
-                <p16:designElem xmlns:p16="http://schemas.microsoft.com/office/powerpoint/2015/main" val="1"/>
-              </p:ext>
-            </p:extLst>
-          </p:nvPr>
+          <p:cNvSpPr/>
+          <p:nvPr/>
         </p:nvSpPr>
-        <p:spPr bwMode="ltGray">
+        <p:spPr>
           <a:xfrm>
-            <a:off x="321564" y="320040"/>
-            <a:ext cx="11548872" cy="6217920"/>
+            <a:off x="1345834" y="3587024"/>
+            <a:ext cx="8522066" cy="465070"/>
           </a:xfrm>
           <a:prstGeom prst="rect">
             <a:avLst/>
           </a:prstGeom>
           <a:solidFill>
-            <a:schemeClr val="tx1">
-              <a:alpha val="8000"/>
+            <a:schemeClr val="accent1">
+              <a:alpha val="0"/>
             </a:schemeClr>
           </a:solidFill>
-          <a:ln w="127000" cap="sq" cmpd="thinThick">
-            <a:noFill/>
-          </a:ln>
+          <a:ln w="38100"/>
         </p:spPr>
         <p:style>
           <a:lnRef idx="2">
@@ -23939,51 +25718,686 @@
           </a:p>
         </p:txBody>
       </p:sp>
+      <p:sp>
+        <p:nvSpPr>
+          <p:cNvPr id="7" name="Rectangle 6">
+            <a:extLst>
+              <a:ext uri="{FF2B5EF4-FFF2-40B4-BE49-F238E27FC236}">
+                <a16:creationId xmlns:a16="http://schemas.microsoft.com/office/drawing/2014/main" id="{1910EA76-42D7-4F71-AD29-B88B5C2B27AA}"/>
+              </a:ext>
+            </a:extLst>
+          </p:cNvPr>
+          <p:cNvSpPr/>
+          <p:nvPr/>
+        </p:nvSpPr>
+        <p:spPr>
+          <a:xfrm>
+            <a:off x="1345834" y="4564924"/>
+            <a:ext cx="9080866" cy="465070"/>
+          </a:xfrm>
+          <a:prstGeom prst="rect">
+            <a:avLst/>
+          </a:prstGeom>
+          <a:solidFill>
+            <a:schemeClr val="accent1">
+              <a:alpha val="0"/>
+            </a:schemeClr>
+          </a:solidFill>
+          <a:ln w="38100"/>
+        </p:spPr>
+        <p:style>
+          <a:lnRef idx="2">
+            <a:schemeClr val="accent1">
+              <a:shade val="50000"/>
+            </a:schemeClr>
+          </a:lnRef>
+          <a:fillRef idx="1">
+            <a:schemeClr val="accent1"/>
+          </a:fillRef>
+          <a:effectRef idx="0">
+            <a:schemeClr val="accent1"/>
+          </a:effectRef>
+          <a:fontRef idx="minor">
+            <a:schemeClr val="lt1"/>
+          </a:fontRef>
+        </p:style>
+        <p:txBody>
+          <a:bodyPr rtlCol="0" anchor="ctr"/>
+          <a:lstStyle/>
+          <a:p>
+            <a:pPr algn="ctr"/>
+            <a:endParaRPr lang="en-US"/>
+          </a:p>
+        </p:txBody>
+      </p:sp>
+      <p:graphicFrame>
+        <p:nvGraphicFramePr>
+          <p:cNvPr id="8" name="Table 7">
+            <a:extLst>
+              <a:ext uri="{FF2B5EF4-FFF2-40B4-BE49-F238E27FC236}">
+                <a16:creationId xmlns:a16="http://schemas.microsoft.com/office/drawing/2014/main" id="{F7B06C67-7915-4751-ABA7-72FAC3F4291C}"/>
+              </a:ext>
+            </a:extLst>
+          </p:cNvPr>
+          <p:cNvGraphicFramePr>
+            <a:graphicFrameLocks noGrp="1"/>
+          </p:cNvGraphicFramePr>
+          <p:nvPr>
+            <p:extLst>
+              <p:ext uri="{D42A27DB-BD31-4B8C-83A1-F6EECF244321}">
+                <p14:modId xmlns:p14="http://schemas.microsoft.com/office/powerpoint/2010/main" val="1210575365"/>
+              </p:ext>
+            </p:extLst>
+          </p:nvPr>
+        </p:nvGraphicFramePr>
+        <p:xfrm>
+          <a:off x="5051643" y="241300"/>
+          <a:ext cx="6645057" cy="6375400"/>
+        </p:xfrm>
+        <a:graphic>
+          <a:graphicData uri="http://schemas.openxmlformats.org/drawingml/2006/table">
+            <a:tbl>
+              <a:tblPr firstRow="1" bandRow="1">
+                <a:effectLst>
+                  <a:outerShdw blurRad="50800" dist="38100" dir="10800000" algn="r" rotWithShape="0">
+                    <a:prstClr val="black">
+                      <a:alpha val="40000"/>
+                    </a:prstClr>
+                  </a:outerShdw>
+                </a:effectLst>
+                <a:tableStyleId>{5C22544A-7EE6-4342-B048-85BDC9FD1C3A}</a:tableStyleId>
+              </a:tblPr>
+              <a:tblGrid>
+                <a:gridCol w="6645057">
+                  <a:extLst>
+                    <a:ext uri="{9D8B030D-6E8A-4147-A177-3AD203B41FA5}">
+                      <a16:colId xmlns:a16="http://schemas.microsoft.com/office/drawing/2014/main" val="1057070397"/>
+                    </a:ext>
+                  </a:extLst>
+                </a:gridCol>
+              </a:tblGrid>
+              <a:tr h="6375400">
+                <a:tc>
+                  <a:txBody>
+                    <a:bodyPr/>
+                    <a:lstStyle/>
+                    <a:p>
+                      <a:r>
+                        <a:rPr lang="en-US" sz="1600" b="1" dirty="0">
+                          <a:solidFill>
+                            <a:srgbClr val="800000"/>
+                          </a:solidFill>
+                          <a:effectLst/>
+                          <a:latin typeface="Consolas" panose="020B0609020204030204" pitchFamily="49" charset="0"/>
+                        </a:rPr>
+                        <a:t>C:\working_folder\test_app&gt;</a:t>
+                      </a:r>
+                      <a:r>
+                        <a:rPr lang="en-US" sz="1600" b="0" dirty="0">
+                          <a:solidFill>
+                            <a:srgbClr val="800000"/>
+                          </a:solidFill>
+                          <a:effectLst/>
+                          <a:latin typeface="Consolas" panose="020B0609020204030204" pitchFamily="49" charset="0"/>
+                        </a:rPr>
+                        <a:t> </a:t>
+                      </a:r>
+                      <a:r>
+                        <a:rPr lang="en-US" sz="1600" b="0" dirty="0">
+                          <a:solidFill>
+                            <a:srgbClr val="002050"/>
+                          </a:solidFill>
+                          <a:effectLst/>
+                          <a:latin typeface="Consolas" panose="020B0609020204030204" pitchFamily="49" charset="0"/>
+                        </a:rPr>
+                        <a:t>dotnet </a:t>
+                      </a:r>
+                      <a:r>
+                        <a:rPr lang="en-US" sz="1600" b="0" dirty="0" err="1">
+                          <a:solidFill>
+                            <a:srgbClr val="002050"/>
+                          </a:solidFill>
+                          <a:effectLst/>
+                          <a:latin typeface="Consolas" panose="020B0609020204030204" pitchFamily="49" charset="0"/>
+                        </a:rPr>
+                        <a:t>aspnet-codegenerator</a:t>
+                      </a:r>
+                      <a:r>
+                        <a:rPr lang="en-US" sz="1600" b="0" dirty="0">
+                          <a:solidFill>
+                            <a:srgbClr val="002050"/>
+                          </a:solidFill>
+                          <a:effectLst/>
+                          <a:latin typeface="Consolas" panose="020B0609020204030204" pitchFamily="49" charset="0"/>
+                        </a:rPr>
+                        <a:t> -h</a:t>
+                      </a:r>
+                    </a:p>
+                    <a:p>
+                      <a:endParaRPr lang="en-US" sz="1600" b="0" dirty="0">
+                        <a:solidFill>
+                          <a:srgbClr val="800000"/>
+                        </a:solidFill>
+                        <a:effectLst/>
+                        <a:latin typeface="Consolas" panose="020B0609020204030204" pitchFamily="49" charset="0"/>
+                      </a:endParaRPr>
+                    </a:p>
+                    <a:p>
+                      <a:r>
+                        <a:rPr lang="en-US" sz="1600" b="0" dirty="0">
+                          <a:solidFill>
+                            <a:srgbClr val="800000"/>
+                          </a:solidFill>
+                          <a:effectLst/>
+                          <a:latin typeface="Consolas" panose="020B0609020204030204" pitchFamily="49" charset="0"/>
+                        </a:rPr>
+                        <a:t>Usage: </a:t>
+                      </a:r>
+                      <a:r>
+                        <a:rPr lang="en-US" sz="1600" b="0" dirty="0" err="1">
+                          <a:solidFill>
+                            <a:srgbClr val="800000"/>
+                          </a:solidFill>
+                          <a:effectLst/>
+                          <a:latin typeface="Consolas" panose="020B0609020204030204" pitchFamily="49" charset="0"/>
+                        </a:rPr>
+                        <a:t>aspnet-codegenerator</a:t>
+                      </a:r>
+                      <a:r>
+                        <a:rPr lang="en-US" sz="1600" b="0" dirty="0">
+                          <a:solidFill>
+                            <a:srgbClr val="800000"/>
+                          </a:solidFill>
+                          <a:effectLst/>
+                          <a:latin typeface="Consolas" panose="020B0609020204030204" pitchFamily="49" charset="0"/>
+                        </a:rPr>
+                        <a:t> [arguments] [options]</a:t>
+                      </a:r>
+                    </a:p>
+                    <a:p>
+                      <a:endParaRPr lang="en-US" sz="1600" b="0" dirty="0">
+                        <a:solidFill>
+                          <a:srgbClr val="800000"/>
+                        </a:solidFill>
+                        <a:effectLst/>
+                        <a:latin typeface="Consolas" panose="020B0609020204030204" pitchFamily="49" charset="0"/>
+                      </a:endParaRPr>
+                    </a:p>
+                    <a:p>
+                      <a:r>
+                        <a:rPr lang="en-US" sz="1600" b="0" dirty="0">
+                          <a:solidFill>
+                            <a:srgbClr val="800000"/>
+                          </a:solidFill>
+                          <a:effectLst/>
+                          <a:latin typeface="Consolas" panose="020B0609020204030204" pitchFamily="49" charset="0"/>
+                        </a:rPr>
+                        <a:t>Arguments:</a:t>
+                      </a:r>
+                    </a:p>
+                    <a:p>
+                      <a:r>
+                        <a:rPr lang="en-US" sz="1600" b="0" dirty="0">
+                          <a:solidFill>
+                            <a:srgbClr val="800000"/>
+                          </a:solidFill>
+                          <a:effectLst/>
+                          <a:latin typeface="Consolas" panose="020B0609020204030204" pitchFamily="49" charset="0"/>
+                        </a:rPr>
+                        <a:t>  generator  Name of the generator. Check available generators below.</a:t>
+                      </a:r>
+                    </a:p>
+                    <a:p>
+                      <a:endParaRPr lang="en-US" sz="1600" b="0" dirty="0">
+                        <a:solidFill>
+                          <a:srgbClr val="800000"/>
+                        </a:solidFill>
+                        <a:effectLst/>
+                        <a:latin typeface="Consolas" panose="020B0609020204030204" pitchFamily="49" charset="0"/>
+                      </a:endParaRPr>
+                    </a:p>
+                    <a:p>
+                      <a:r>
+                        <a:rPr lang="en-US" sz="1600" b="0" dirty="0">
+                          <a:solidFill>
+                            <a:srgbClr val="800000"/>
+                          </a:solidFill>
+                          <a:effectLst/>
+                          <a:latin typeface="Consolas" panose="020B0609020204030204" pitchFamily="49" charset="0"/>
+                        </a:rPr>
+                        <a:t>Options:</a:t>
+                      </a:r>
+                    </a:p>
+                    <a:p>
+                      <a:r>
+                        <a:rPr lang="en-US" sz="1600" b="0" dirty="0">
+                          <a:solidFill>
+                            <a:srgbClr val="800000"/>
+                          </a:solidFill>
+                          <a:effectLst/>
+                          <a:latin typeface="Consolas" panose="020B0609020204030204" pitchFamily="49" charset="0"/>
+                        </a:rPr>
+                        <a:t>  -p|--project             Path to .</a:t>
+                      </a:r>
+                      <a:r>
+                        <a:rPr lang="en-US" sz="1600" b="0" dirty="0" err="1">
+                          <a:solidFill>
+                            <a:srgbClr val="800000"/>
+                          </a:solidFill>
+                          <a:effectLst/>
+                          <a:latin typeface="Consolas" panose="020B0609020204030204" pitchFamily="49" charset="0"/>
+                        </a:rPr>
+                        <a:t>csproj</a:t>
+                      </a:r>
+                      <a:r>
+                        <a:rPr lang="en-US" sz="1600" b="0" dirty="0">
+                          <a:solidFill>
+                            <a:srgbClr val="800000"/>
+                          </a:solidFill>
+                          <a:effectLst/>
+                          <a:latin typeface="Consolas" panose="020B0609020204030204" pitchFamily="49" charset="0"/>
+                        </a:rPr>
+                        <a:t> file in the project.</a:t>
+                      </a:r>
+                    </a:p>
+                    <a:p>
+                      <a:r>
+                        <a:rPr lang="en-US" sz="1600" b="0" dirty="0">
+                          <a:solidFill>
+                            <a:srgbClr val="800000"/>
+                          </a:solidFill>
+                          <a:effectLst/>
+                          <a:latin typeface="Consolas" panose="020B0609020204030204" pitchFamily="49" charset="0"/>
+                        </a:rPr>
+                        <a:t>  -n|--</a:t>
+                      </a:r>
+                      <a:r>
+                        <a:rPr lang="en-US" sz="1600" b="0" dirty="0" err="1">
+                          <a:solidFill>
+                            <a:srgbClr val="800000"/>
+                          </a:solidFill>
+                          <a:effectLst/>
+                          <a:latin typeface="Consolas" panose="020B0609020204030204" pitchFamily="49" charset="0"/>
+                        </a:rPr>
+                        <a:t>nuget</a:t>
+                      </a:r>
+                      <a:r>
+                        <a:rPr lang="en-US" sz="1600" b="0" dirty="0">
+                          <a:solidFill>
+                            <a:srgbClr val="800000"/>
+                          </a:solidFill>
+                          <a:effectLst/>
+                          <a:latin typeface="Consolas" panose="020B0609020204030204" pitchFamily="49" charset="0"/>
+                        </a:rPr>
+                        <a:t>-package-</a:t>
+                      </a:r>
+                      <a:r>
+                        <a:rPr lang="en-US" sz="1600" b="0" dirty="0" err="1">
+                          <a:solidFill>
+                            <a:srgbClr val="800000"/>
+                          </a:solidFill>
+                          <a:effectLst/>
+                          <a:latin typeface="Consolas" panose="020B0609020204030204" pitchFamily="49" charset="0"/>
+                        </a:rPr>
+                        <a:t>dir</a:t>
+                      </a:r>
+                      <a:r>
+                        <a:rPr lang="en-US" sz="1600" b="0" dirty="0">
+                          <a:solidFill>
+                            <a:srgbClr val="800000"/>
+                          </a:solidFill>
+                          <a:effectLst/>
+                          <a:latin typeface="Consolas" panose="020B0609020204030204" pitchFamily="49" charset="0"/>
+                        </a:rPr>
+                        <a:t>  </a:t>
+                      </a:r>
+                    </a:p>
+                    <a:p>
+                      <a:r>
+                        <a:rPr lang="en-US" sz="1600" b="0" dirty="0">
+                          <a:solidFill>
+                            <a:srgbClr val="800000"/>
+                          </a:solidFill>
+                          <a:effectLst/>
+                          <a:latin typeface="Consolas" panose="020B0609020204030204" pitchFamily="49" charset="0"/>
+                        </a:rPr>
+                        <a:t>  -c|--configuration       </a:t>
+                      </a:r>
+                      <a:r>
+                        <a:rPr lang="en-US" sz="1600" b="0" dirty="0" err="1">
+                          <a:solidFill>
+                            <a:srgbClr val="800000"/>
+                          </a:solidFill>
+                          <a:effectLst/>
+                          <a:latin typeface="Consolas" panose="020B0609020204030204" pitchFamily="49" charset="0"/>
+                        </a:rPr>
+                        <a:t>Configuration</a:t>
+                      </a:r>
+                      <a:r>
+                        <a:rPr lang="en-US" sz="1600" b="0" dirty="0">
+                          <a:solidFill>
+                            <a:srgbClr val="800000"/>
+                          </a:solidFill>
+                          <a:effectLst/>
+                          <a:latin typeface="Consolas" panose="020B0609020204030204" pitchFamily="49" charset="0"/>
+                        </a:rPr>
+                        <a:t> for the project (Possible values: Debug/ Release)  </a:t>
+                      </a:r>
+                    </a:p>
+                    <a:p>
+                      <a:r>
+                        <a:rPr lang="en-US" sz="1600" b="0" dirty="0">
+                          <a:solidFill>
+                            <a:srgbClr val="800000"/>
+                          </a:solidFill>
+                          <a:effectLst/>
+                          <a:latin typeface="Consolas" panose="020B0609020204030204" pitchFamily="49" charset="0"/>
+                        </a:rPr>
+                        <a:t>  -</a:t>
+                      </a:r>
+                      <a:r>
+                        <a:rPr lang="en-US" sz="1600" b="0" dirty="0" err="1">
+                          <a:solidFill>
+                            <a:srgbClr val="800000"/>
+                          </a:solidFill>
+                          <a:effectLst/>
+                          <a:latin typeface="Consolas" panose="020B0609020204030204" pitchFamily="49" charset="0"/>
+                        </a:rPr>
+                        <a:t>tfm</a:t>
+                      </a:r>
+                      <a:r>
+                        <a:rPr lang="en-US" sz="1600" b="0" dirty="0">
+                          <a:solidFill>
+                            <a:srgbClr val="800000"/>
+                          </a:solidFill>
+                          <a:effectLst/>
+                          <a:latin typeface="Consolas" panose="020B0609020204030204" pitchFamily="49" charset="0"/>
+                        </a:rPr>
+                        <a:t>|--target-framework  Target Framework to use. (Short folder name of the </a:t>
+                      </a:r>
+                      <a:r>
+                        <a:rPr lang="en-US" sz="1600" b="0" dirty="0" err="1">
+                          <a:solidFill>
+                            <a:srgbClr val="800000"/>
+                          </a:solidFill>
+                          <a:effectLst/>
+                          <a:latin typeface="Consolas" panose="020B0609020204030204" pitchFamily="49" charset="0"/>
+                        </a:rPr>
+                        <a:t>tfm</a:t>
+                      </a:r>
+                      <a:r>
+                        <a:rPr lang="en-US" sz="1600" b="0" dirty="0">
+                          <a:solidFill>
+                            <a:srgbClr val="800000"/>
+                          </a:solidFill>
+                          <a:effectLst/>
+                          <a:latin typeface="Consolas" panose="020B0609020204030204" pitchFamily="49" charset="0"/>
+                        </a:rPr>
+                        <a:t>. </a:t>
+                      </a:r>
+                      <a:r>
+                        <a:rPr lang="en-US" sz="1600" b="0" dirty="0" err="1">
+                          <a:solidFill>
+                            <a:srgbClr val="800000"/>
+                          </a:solidFill>
+                          <a:effectLst/>
+                          <a:latin typeface="Consolas" panose="020B0609020204030204" pitchFamily="49" charset="0"/>
+                        </a:rPr>
+                        <a:t>eg.</a:t>
+                      </a:r>
+                      <a:r>
+                        <a:rPr lang="en-US" sz="1600" b="0" dirty="0">
+                          <a:solidFill>
+                            <a:srgbClr val="800000"/>
+                          </a:solidFill>
+                          <a:effectLst/>
+                          <a:latin typeface="Consolas" panose="020B0609020204030204" pitchFamily="49" charset="0"/>
+                        </a:rPr>
+                        <a:t> net46)  </a:t>
+                      </a:r>
+                    </a:p>
+                    <a:p>
+                      <a:r>
+                        <a:rPr lang="en-US" sz="1600" b="0" dirty="0">
+                          <a:solidFill>
+                            <a:srgbClr val="800000"/>
+                          </a:solidFill>
+                          <a:effectLst/>
+                          <a:latin typeface="Consolas" panose="020B0609020204030204" pitchFamily="49" charset="0"/>
+                        </a:rPr>
+                        <a:t>  -b|--build-base-path  </a:t>
+                      </a:r>
+                    </a:p>
+                    <a:p>
+                      <a:r>
+                        <a:rPr lang="en-US" sz="1600" b="0" dirty="0">
+                          <a:solidFill>
+                            <a:srgbClr val="800000"/>
+                          </a:solidFill>
+                          <a:effectLst/>
+                          <a:latin typeface="Consolas" panose="020B0609020204030204" pitchFamily="49" charset="0"/>
+                        </a:rPr>
+                        <a:t>  --no-build</a:t>
+                      </a:r>
+                    </a:p>
+                    <a:p>
+                      <a:endParaRPr lang="en-US" sz="1600" b="0" dirty="0">
+                        <a:solidFill>
+                          <a:srgbClr val="800000"/>
+                        </a:solidFill>
+                        <a:effectLst/>
+                        <a:latin typeface="Consolas" panose="020B0609020204030204" pitchFamily="49" charset="0"/>
+                      </a:endParaRPr>
+                    </a:p>
+                    <a:p>
+                      <a:r>
+                        <a:rPr lang="en-US" sz="1600" b="0" dirty="0">
+                          <a:solidFill>
+                            <a:srgbClr val="800000"/>
+                          </a:solidFill>
+                          <a:effectLst/>
+                          <a:latin typeface="Consolas" panose="020B0609020204030204" pitchFamily="49" charset="0"/>
+                        </a:rPr>
+                        <a:t>Available generators:</a:t>
+                      </a:r>
+                    </a:p>
+                    <a:p>
+                      <a:r>
+                        <a:rPr lang="en-US" sz="1600" b="0" dirty="0">
+                          <a:solidFill>
+                            <a:srgbClr val="800000"/>
+                          </a:solidFill>
+                          <a:effectLst/>
+                          <a:latin typeface="Consolas" panose="020B0609020204030204" pitchFamily="49" charset="0"/>
+                        </a:rPr>
+                        <a:t>  area      : Generates an MVC Area.</a:t>
+                      </a:r>
+                    </a:p>
+                    <a:p>
+                      <a:r>
+                        <a:rPr lang="en-US" sz="1600" b="0" dirty="0">
+                          <a:solidFill>
+                            <a:srgbClr val="800000"/>
+                          </a:solidFill>
+                          <a:effectLst/>
+                          <a:latin typeface="Consolas" panose="020B0609020204030204" pitchFamily="49" charset="0"/>
+                        </a:rPr>
+                        <a:t>  controller: Generates a controller.</a:t>
+                      </a:r>
+                    </a:p>
+                    <a:p>
+                      <a:r>
+                        <a:rPr lang="en-US" sz="1600" b="0" dirty="0">
+                          <a:solidFill>
+                            <a:srgbClr val="800000"/>
+                          </a:solidFill>
+                          <a:effectLst/>
+                          <a:latin typeface="Consolas" panose="020B0609020204030204" pitchFamily="49" charset="0"/>
+                        </a:rPr>
+                        <a:t>  identity  : Generates an MVC Area with controllers and</a:t>
+                      </a:r>
+                    </a:p>
+                    <a:p>
+                      <a:r>
+                        <a:rPr lang="en-US" sz="1600" b="0" dirty="0">
+                          <a:solidFill>
+                            <a:srgbClr val="800000"/>
+                          </a:solidFill>
+                          <a:effectLst/>
+                          <a:latin typeface="Consolas" panose="020B0609020204030204" pitchFamily="49" charset="0"/>
+                        </a:rPr>
+                        <a:t>  </a:t>
+                      </a:r>
+                      <a:r>
+                        <a:rPr lang="en-US" sz="1600" b="0" dirty="0" err="1">
+                          <a:solidFill>
+                            <a:srgbClr val="800000"/>
+                          </a:solidFill>
+                          <a:effectLst/>
+                          <a:latin typeface="Consolas" panose="020B0609020204030204" pitchFamily="49" charset="0"/>
+                        </a:rPr>
+                        <a:t>razorpage</a:t>
+                      </a:r>
+                      <a:r>
+                        <a:rPr lang="en-US" sz="1600" b="0" dirty="0">
+                          <a:solidFill>
+                            <a:srgbClr val="800000"/>
+                          </a:solidFill>
+                          <a:effectLst/>
+                          <a:latin typeface="Consolas" panose="020B0609020204030204" pitchFamily="49" charset="0"/>
+                        </a:rPr>
+                        <a:t> : Generates </a:t>
+                      </a:r>
+                      <a:r>
+                        <a:rPr lang="en-US" sz="1600" b="0" dirty="0" err="1">
+                          <a:solidFill>
+                            <a:srgbClr val="800000"/>
+                          </a:solidFill>
+                          <a:effectLst/>
+                          <a:latin typeface="Consolas" panose="020B0609020204030204" pitchFamily="49" charset="0"/>
+                        </a:rPr>
+                        <a:t>RazorPage</a:t>
+                      </a:r>
+                      <a:r>
+                        <a:rPr lang="en-US" sz="1600" b="0" dirty="0">
+                          <a:solidFill>
+                            <a:srgbClr val="800000"/>
+                          </a:solidFill>
+                          <a:effectLst/>
+                          <a:latin typeface="Consolas" panose="020B0609020204030204" pitchFamily="49" charset="0"/>
+                        </a:rPr>
+                        <a:t>(s).</a:t>
+                      </a:r>
+                    </a:p>
+                    <a:p>
+                      <a:r>
+                        <a:rPr lang="en-US" sz="1600" b="0" dirty="0">
+                          <a:solidFill>
+                            <a:srgbClr val="800000"/>
+                          </a:solidFill>
+                          <a:effectLst/>
+                          <a:latin typeface="Consolas" panose="020B0609020204030204" pitchFamily="49" charset="0"/>
+                        </a:rPr>
+                        <a:t>  view      : Generates a view.</a:t>
+                      </a:r>
+                      <a:endParaRPr lang="en-US" sz="1600" b="0" kern="1200" dirty="0">
+                        <a:solidFill>
+                          <a:schemeClr val="bg1"/>
+                        </a:solidFill>
+                        <a:effectLst/>
+                        <a:latin typeface="+mn-lt"/>
+                        <a:ea typeface="+mn-ea"/>
+                        <a:cs typeface="+mn-cs"/>
+                      </a:endParaRPr>
+                    </a:p>
+                  </a:txBody>
+                  <a:tcPr>
+                    <a:lnL w="12700" cap="flat" cmpd="sng" algn="ctr">
+                      <a:solidFill>
+                        <a:schemeClr val="tx1"/>
+                      </a:solidFill>
+                      <a:prstDash val="solid"/>
+                      <a:round/>
+                      <a:headEnd type="none" w="med" len="med"/>
+                      <a:tailEnd type="none" w="med" len="med"/>
+                    </a:lnL>
+                    <a:lnR w="12700" cap="flat" cmpd="sng" algn="ctr">
+                      <a:solidFill>
+                        <a:schemeClr val="tx1"/>
+                      </a:solidFill>
+                      <a:prstDash val="solid"/>
+                      <a:round/>
+                      <a:headEnd type="none" w="med" len="med"/>
+                      <a:tailEnd type="none" w="med" len="med"/>
+                    </a:lnR>
+                    <a:lnT w="12700" cap="flat" cmpd="sng" algn="ctr">
+                      <a:solidFill>
+                        <a:schemeClr val="tx1"/>
+                      </a:solidFill>
+                      <a:prstDash val="solid"/>
+                      <a:round/>
+                      <a:headEnd type="none" w="med" len="med"/>
+                      <a:tailEnd type="none" w="med" len="med"/>
+                    </a:lnT>
+                    <a:lnB w="12700" cap="flat" cmpd="sng" algn="ctr">
+                      <a:solidFill>
+                        <a:schemeClr val="tx1"/>
+                      </a:solidFill>
+                      <a:prstDash val="solid"/>
+                      <a:round/>
+                      <a:headEnd type="none" w="med" len="med"/>
+                      <a:tailEnd type="none" w="med" len="med"/>
+                    </a:lnB>
+                    <a:solidFill>
+                      <a:schemeClr val="tx1"/>
+                    </a:solidFill>
+                  </a:tcPr>
+                </a:tc>
+                <a:extLst>
+                  <a:ext uri="{0D108BD9-81ED-4DB2-BD59-A6C34878D82A}">
+                    <a16:rowId xmlns:a16="http://schemas.microsoft.com/office/drawing/2014/main" val="3473222697"/>
+                  </a:ext>
+                </a:extLst>
+              </a:tr>
+            </a:tbl>
+          </a:graphicData>
+        </a:graphic>
+      </p:graphicFrame>
       <p:cxnSp>
         <p:nvCxnSpPr>
-          <p:cNvPr id="10" name="Straight Connector 9">
+          <p:cNvPr id="9" name="Straight Arrow Connector 8">
             <a:extLst>
               <a:ext uri="{FF2B5EF4-FFF2-40B4-BE49-F238E27FC236}">
-                <a16:creationId xmlns:a16="http://schemas.microsoft.com/office/drawing/2014/main" id="{2D72A2C9-F3CA-4216-8BAD-FA4C970C3C4E}"/>
+                <a16:creationId xmlns:a16="http://schemas.microsoft.com/office/drawing/2014/main" id="{0B19DBA7-BC91-41A4-BC97-E3DFFEE140D2}"/>
               </a:ext>
             </a:extLst>
           </p:cNvPr>
           <p:cNvCxnSpPr>
-            <a:cxnSpLocks noGrp="1" noRot="1" noChangeAspect="1" noMove="1" noResize="1" noEditPoints="1" noAdjustHandles="1" noChangeArrowheads="1" noChangeShapeType="1"/>
+            <a:cxnSpLocks/>
+            <a:endCxn id="13" idx="2"/>
           </p:cNvCxnSpPr>
-          <p:nvPr>
-            <p:extLst>
-              <p:ext uri="{386F3935-93C4-4BCD-93E2-E3B085C9AB24}">
-                <p16:designElem xmlns:p16="http://schemas.microsoft.com/office/powerpoint/2015/main" val="1"/>
-              </p:ext>
-            </p:extLst>
-          </p:nvPr>
+          <p:nvPr/>
         </p:nvCxnSpPr>
         <p:spPr>
-          <a:xfrm>
-            <a:off x="4654296" y="2057400"/>
-            <a:ext cx="0" cy="2743200"/>
+          <a:xfrm flipV="1">
+            <a:off x="4457700" y="554832"/>
+            <a:ext cx="5455444" cy="3623468"/>
           </a:xfrm>
-          <a:prstGeom prst="line">
+          <a:prstGeom prst="straightConnector1">
             <a:avLst/>
           </a:prstGeom>
-          <a:ln w="19050">
-            <a:solidFill>
-              <a:schemeClr val="tx1">
-                <a:lumMod val="85000"/>
-                <a:lumOff val="15000"/>
-              </a:schemeClr>
-            </a:solidFill>
+          <a:ln w="38100">
+            <a:tailEnd type="triangle"/>
           </a:ln>
         </p:spPr>
         <p:style>
-          <a:lnRef idx="1">
+          <a:lnRef idx="3">
             <a:schemeClr val="accent1"/>
           </a:lnRef>
           <a:fillRef idx="0">
             <a:schemeClr val="accent1"/>
           </a:fillRef>
-          <a:effectRef idx="0">
+          <a:effectRef idx="2">
             <a:schemeClr val="accent1"/>
           </a:effectRef>
           <a:fontRef idx="minor">
@@ -23993,91 +26407,60 @@
       </p:cxnSp>
       <p:sp>
         <p:nvSpPr>
-          <p:cNvPr id="2" name="Title 1"/>
-          <p:cNvSpPr>
-            <a:spLocks noGrp="1"/>
-          </p:cNvSpPr>
-          <p:nvPr>
-            <p:ph type="title"/>
-          </p:nvPr>
+          <p:cNvPr id="13" name="Rectangle 12">
+            <a:extLst>
+              <a:ext uri="{FF2B5EF4-FFF2-40B4-BE49-F238E27FC236}">
+                <a16:creationId xmlns:a16="http://schemas.microsoft.com/office/drawing/2014/main" id="{3EEE6FD7-4A90-4DEB-9F12-A4CA46F976D0}"/>
+              </a:ext>
+            </a:extLst>
+          </p:cNvPr>
+          <p:cNvSpPr/>
+          <p:nvPr/>
         </p:nvSpPr>
         <p:spPr>
           <a:xfrm>
-            <a:off x="838200" y="963877"/>
-            <a:ext cx="3494362" cy="4930246"/>
+            <a:off x="8177213" y="294413"/>
+            <a:ext cx="3471862" cy="260419"/>
           </a:xfrm>
+          <a:prstGeom prst="rect">
+            <a:avLst/>
+          </a:prstGeom>
+          <a:solidFill>
+            <a:schemeClr val="accent1">
+              <a:alpha val="0"/>
+            </a:schemeClr>
+          </a:solidFill>
+          <a:ln w="38100"/>
         </p:spPr>
+        <p:style>
+          <a:lnRef idx="2">
+            <a:schemeClr val="accent1">
+              <a:shade val="50000"/>
+            </a:schemeClr>
+          </a:lnRef>
+          <a:fillRef idx="1">
+            <a:schemeClr val="accent1"/>
+          </a:fillRef>
+          <a:effectRef idx="0">
+            <a:schemeClr val="accent1"/>
+          </a:effectRef>
+          <a:fontRef idx="minor">
+            <a:schemeClr val="lt1"/>
+          </a:fontRef>
+        </p:style>
         <p:txBody>
-          <a:bodyPr>
-            <a:normAutofit/>
-          </a:bodyPr>
+          <a:bodyPr rtlCol="0" anchor="ctr"/>
           <a:lstStyle/>
           <a:p>
-            <a:pPr algn="r"/>
-            <a:r>
-              <a:rPr lang="en-US">
-                <a:solidFill>
-                  <a:schemeClr val="accent1"/>
-                </a:solidFill>
-              </a:rPr>
-              <a:t>Integration with VSTS</a:t>
-            </a:r>
-          </a:p>
-        </p:txBody>
-      </p:sp>
-      <p:sp>
-        <p:nvSpPr>
-          <p:cNvPr id="3" name="Content Placeholder 2"/>
-          <p:cNvSpPr>
-            <a:spLocks noGrp="1"/>
-          </p:cNvSpPr>
-          <p:nvPr>
-            <p:ph idx="1"/>
-          </p:nvPr>
-        </p:nvSpPr>
-        <p:spPr>
-          <a:xfrm>
-            <a:off x="4976031" y="963877"/>
-            <a:ext cx="6377769" cy="4930246"/>
-          </a:xfrm>
-        </p:spPr>
-        <p:txBody>
-          <a:bodyPr anchor="ctr">
-            <a:normAutofit/>
-          </a:bodyPr>
-          <a:lstStyle/>
-          <a:p>
-            <a:r>
-              <a:rPr lang="en-US" sz="2400" dirty="0"/>
-              <a:t>CI / CD pipeline</a:t>
-            </a:r>
-          </a:p>
-          <a:p>
-            <a:pPr lvl="1"/>
-            <a:r>
-              <a:rPr lang="en-US" sz="2000" dirty="0"/>
-              <a:t>Build definitions</a:t>
-            </a:r>
-          </a:p>
-          <a:p>
-            <a:pPr lvl="1"/>
-            <a:r>
-              <a:rPr lang="en-US" sz="2000" dirty="0"/>
-              <a:t>Release definitions</a:t>
-            </a:r>
-          </a:p>
-          <a:p>
-            <a:r>
-              <a:rPr lang="en-US" sz="2400" dirty="0"/>
-              <a:t>CLI knowledge needed for advanced cases</a:t>
-            </a:r>
+            <a:pPr algn="ctr"/>
+            <a:endParaRPr lang="en-US"/>
           </a:p>
         </p:txBody>
       </p:sp>
     </p:spTree>
     <p:extLst>
       <p:ext uri="{BB962C8B-B14F-4D97-AF65-F5344CB8AC3E}">
-        <p14:creationId xmlns:p14="http://schemas.microsoft.com/office/powerpoint/2010/main" val="1360020685"/>
+        <p14:creationId xmlns:p14="http://schemas.microsoft.com/office/powerpoint/2010/main" val="484807160"/>
       </p:ext>
     </p:extLst>
   </p:cSld>
@@ -24118,11 +26501,7 @@
                                           </p:stCondLst>
                                         </p:cTn>
                                         <p:tgtEl>
-                                          <p:spTgt spid="3">
-                                            <p:txEl>
-                                              <p:pRg st="0" end="0"/>
-                                            </p:txEl>
-                                          </p:spTgt>
+                                          <p:spTgt spid="9"/>
                                         </p:tgtEl>
                                         <p:attrNameLst>
                                           <p:attrName>style.visibility</p:attrName>
@@ -24136,11 +26515,562 @@
                                       <p:cBhvr>
                                         <p:cTn id="7" dur="500"/>
                                         <p:tgtEl>
-                                          <p:spTgt spid="3">
-                                            <p:txEl>
-                                              <p:pRg st="0" end="0"/>
-                                            </p:txEl>
-                                          </p:spTgt>
+                                          <p:spTgt spid="9"/>
+                                        </p:tgtEl>
+                                      </p:cBhvr>
+                                    </p:animEffect>
+                                  </p:childTnLst>
+                                </p:cTn>
+                              </p:par>
+                              <p:par>
+                                <p:cTn id="8" presetID="10" presetClass="entr" presetSubtype="0" fill="hold" grpId="0" nodeType="withEffect">
+                                  <p:stCondLst>
+                                    <p:cond delay="0"/>
+                                  </p:stCondLst>
+                                  <p:childTnLst>
+                                    <p:set>
+                                      <p:cBhvr>
+                                        <p:cTn id="9" dur="1" fill="hold">
+                                          <p:stCondLst>
+                                            <p:cond delay="0"/>
+                                          </p:stCondLst>
+                                        </p:cTn>
+                                        <p:tgtEl>
+                                          <p:spTgt spid="13"/>
+                                        </p:tgtEl>
+                                        <p:attrNameLst>
+                                          <p:attrName>style.visibility</p:attrName>
+                                        </p:attrNameLst>
+                                      </p:cBhvr>
+                                      <p:to>
+                                        <p:strVal val="visible"/>
+                                      </p:to>
+                                    </p:set>
+                                    <p:animEffect transition="in" filter="fade">
+                                      <p:cBhvr>
+                                        <p:cTn id="10" dur="500"/>
+                                        <p:tgtEl>
+                                          <p:spTgt spid="13"/>
+                                        </p:tgtEl>
+                                      </p:cBhvr>
+                                    </p:animEffect>
+                                  </p:childTnLst>
+                                </p:cTn>
+                              </p:par>
+                              <p:par>
+                                <p:cTn id="11" presetID="10" presetClass="entr" presetSubtype="0" fill="hold" nodeType="withEffect">
+                                  <p:stCondLst>
+                                    <p:cond delay="0"/>
+                                  </p:stCondLst>
+                                  <p:childTnLst>
+                                    <p:set>
+                                      <p:cBhvr>
+                                        <p:cTn id="12" dur="1" fill="hold">
+                                          <p:stCondLst>
+                                            <p:cond delay="0"/>
+                                          </p:stCondLst>
+                                        </p:cTn>
+                                        <p:tgtEl>
+                                          <p:spTgt spid="8"/>
+                                        </p:tgtEl>
+                                        <p:attrNameLst>
+                                          <p:attrName>style.visibility</p:attrName>
+                                        </p:attrNameLst>
+                                      </p:cBhvr>
+                                      <p:to>
+                                        <p:strVal val="visible"/>
+                                      </p:to>
+                                    </p:set>
+                                    <p:animEffect transition="in" filter="fade">
+                                      <p:cBhvr>
+                                        <p:cTn id="13" dur="500"/>
+                                        <p:tgtEl>
+                                          <p:spTgt spid="8"/>
+                                        </p:tgtEl>
+                                      </p:cBhvr>
+                                    </p:animEffect>
+                                  </p:childTnLst>
+                                </p:cTn>
+                              </p:par>
+                            </p:childTnLst>
+                          </p:cTn>
+                        </p:par>
+                      </p:childTnLst>
+                    </p:cTn>
+                  </p:par>
+                </p:childTnLst>
+              </p:cTn>
+              <p:prevCondLst>
+                <p:cond evt="onPrev" delay="0">
+                  <p:tgtEl>
+                    <p:sldTgt/>
+                  </p:tgtEl>
+                </p:cond>
+              </p:prevCondLst>
+              <p:nextCondLst>
+                <p:cond evt="onNext" delay="0">
+                  <p:tgtEl>
+                    <p:sldTgt/>
+                  </p:tgtEl>
+                </p:cond>
+              </p:nextCondLst>
+            </p:seq>
+          </p:childTnLst>
+        </p:cTn>
+      </p:par>
+    </p:tnLst>
+    <p:bldLst>
+      <p:bldP spid="13" grpId="0" animBg="1"/>
+    </p:bldLst>
+  </p:timing>
+</p:sld>
+</file>
+
+<file path=ppt/slides/slide9.xml><?xml version="1.0" encoding="utf-8"?>
+<p:sld xmlns:a="http://schemas.openxmlformats.org/drawingml/2006/main" xmlns:r="http://schemas.openxmlformats.org/officeDocument/2006/relationships" xmlns:p="http://schemas.openxmlformats.org/presentationml/2006/main">
+  <p:cSld>
+    <p:spTree>
+      <p:nvGrpSpPr>
+        <p:cNvPr id="1" name=""/>
+        <p:cNvGrpSpPr/>
+        <p:nvPr/>
+      </p:nvGrpSpPr>
+      <p:grpSpPr>
+        <a:xfrm>
+          <a:off x="0" y="0"/>
+          <a:ext cx="0" cy="0"/>
+          <a:chOff x="0" y="0"/>
+          <a:chExt cx="0" cy="0"/>
+        </a:xfrm>
+      </p:grpSpPr>
+      <p:sp>
+        <p:nvSpPr>
+          <p:cNvPr id="2" name="Title 1">
+            <a:extLst>
+              <a:ext uri="{FF2B5EF4-FFF2-40B4-BE49-F238E27FC236}">
+                <a16:creationId xmlns:a16="http://schemas.microsoft.com/office/drawing/2014/main" id="{3480FB3C-4B87-4419-A9E4-BA511FB9DFDB}"/>
+              </a:ext>
+            </a:extLst>
+          </p:cNvPr>
+          <p:cNvSpPr>
+            <a:spLocks noGrp="1"/>
+          </p:cNvSpPr>
+          <p:nvPr>
+            <p:ph type="title"/>
+          </p:nvPr>
+        </p:nvSpPr>
+        <p:spPr/>
+        <p:txBody>
+          <a:bodyPr/>
+          <a:lstStyle/>
+          <a:p>
+            <a:r>
+              <a:rPr lang="en-US" dirty="0"/>
+              <a:t>Scaffolding command</a:t>
+            </a:r>
+          </a:p>
+        </p:txBody>
+      </p:sp>
+      <p:graphicFrame>
+        <p:nvGraphicFramePr>
+          <p:cNvPr id="4" name="Table 3">
+            <a:extLst>
+              <a:ext uri="{FF2B5EF4-FFF2-40B4-BE49-F238E27FC236}">
+                <a16:creationId xmlns:a16="http://schemas.microsoft.com/office/drawing/2014/main" id="{B8A99360-6FF7-4C7D-A5E9-55B79B38D3E7}"/>
+              </a:ext>
+            </a:extLst>
+          </p:cNvPr>
+          <p:cNvGraphicFramePr>
+            <a:graphicFrameLocks noGrp="1"/>
+          </p:cNvGraphicFramePr>
+          <p:nvPr>
+            <p:extLst>
+              <p:ext uri="{D42A27DB-BD31-4B8C-83A1-F6EECF244321}">
+                <p14:modId xmlns:p14="http://schemas.microsoft.com/office/powerpoint/2010/main" val="1865551855"/>
+              </p:ext>
+            </p:extLst>
+          </p:nvPr>
+        </p:nvGraphicFramePr>
+        <p:xfrm>
+          <a:off x="844461" y="1825625"/>
+          <a:ext cx="10232843" cy="1615440"/>
+        </p:xfrm>
+        <a:graphic>
+          <a:graphicData uri="http://schemas.openxmlformats.org/drawingml/2006/table">
+            <a:tbl>
+              <a:tblPr firstRow="1" bandRow="1">
+                <a:tableStyleId>{5C22544A-7EE6-4342-B048-85BDC9FD1C3A}</a:tableStyleId>
+              </a:tblPr>
+              <a:tblGrid>
+                <a:gridCol w="10232843">
+                  <a:extLst>
+                    <a:ext uri="{9D8B030D-6E8A-4147-A177-3AD203B41FA5}">
+                      <a16:colId xmlns:a16="http://schemas.microsoft.com/office/drawing/2014/main" val="1057070397"/>
+                    </a:ext>
+                  </a:extLst>
+                </a:gridCol>
+              </a:tblGrid>
+              <a:tr h="1463675">
+                <a:tc>
+                  <a:txBody>
+                    <a:bodyPr/>
+                    <a:lstStyle/>
+                    <a:p>
+                      <a:r>
+                        <a:rPr lang="en-US" sz="2000" b="1" kern="1200" dirty="0">
+                          <a:solidFill>
+                            <a:schemeClr val="bg1"/>
+                          </a:solidFill>
+                          <a:effectLst/>
+                          <a:latin typeface="Consolas" panose="020B0609020204030204" pitchFamily="49" charset="0"/>
+                          <a:ea typeface="+mn-ea"/>
+                          <a:cs typeface="+mn-cs"/>
+                        </a:rPr>
+                        <a:t>C:\working_folder\test_app&gt;</a:t>
+                      </a:r>
+                      <a:r>
+                        <a:rPr lang="en-US" sz="2000" b="0" kern="1200" dirty="0">
+                          <a:solidFill>
+                            <a:schemeClr val="bg1"/>
+                          </a:solidFill>
+                          <a:effectLst/>
+                          <a:latin typeface="Consolas" panose="020B0609020204030204" pitchFamily="49" charset="0"/>
+                          <a:ea typeface="+mn-ea"/>
+                          <a:cs typeface="+mn-cs"/>
+                        </a:rPr>
+                        <a:t> </a:t>
+                      </a:r>
+                      <a:r>
+                        <a:rPr lang="en-US" sz="2000" b="0" kern="1200" dirty="0">
+                          <a:solidFill>
+                            <a:srgbClr val="002050"/>
+                          </a:solidFill>
+                          <a:effectLst/>
+                          <a:latin typeface="Consolas" panose="020B0609020204030204" pitchFamily="49" charset="0"/>
+                          <a:ea typeface="+mn-ea"/>
+                          <a:cs typeface="+mn-cs"/>
+                        </a:rPr>
+                        <a:t>dotnet </a:t>
+                      </a:r>
+                      <a:r>
+                        <a:rPr lang="en-US" sz="2000" b="0" kern="1200" dirty="0" err="1">
+                          <a:solidFill>
+                            <a:srgbClr val="002050"/>
+                          </a:solidFill>
+                          <a:effectLst/>
+                          <a:latin typeface="Consolas" panose="020B0609020204030204" pitchFamily="49" charset="0"/>
+                          <a:ea typeface="+mn-ea"/>
+                          <a:cs typeface="+mn-cs"/>
+                        </a:rPr>
+                        <a:t>aspnet-codegenerator</a:t>
+                      </a:r>
+                      <a:r>
+                        <a:rPr lang="en-US" sz="2000" b="0" kern="1200" dirty="0">
+                          <a:solidFill>
+                            <a:srgbClr val="002050"/>
+                          </a:solidFill>
+                          <a:effectLst/>
+                          <a:latin typeface="Consolas" panose="020B0609020204030204" pitchFamily="49" charset="0"/>
+                          <a:ea typeface="+mn-ea"/>
+                          <a:cs typeface="+mn-cs"/>
+                        </a:rPr>
+                        <a:t> identity</a:t>
+                      </a:r>
+                    </a:p>
+                    <a:p>
+                      <a:r>
+                        <a:rPr lang="en-US" sz="2000" b="0" kern="1200" dirty="0">
+                          <a:solidFill>
+                            <a:schemeClr val="bg1"/>
+                          </a:solidFill>
+                          <a:effectLst/>
+                          <a:latin typeface="Consolas" panose="020B0609020204030204" pitchFamily="49" charset="0"/>
+                          <a:ea typeface="+mn-ea"/>
+                          <a:cs typeface="+mn-cs"/>
+                        </a:rPr>
+                        <a:t>Building project ...</a:t>
+                      </a:r>
+                    </a:p>
+                    <a:p>
+                      <a:r>
+                        <a:rPr lang="en-US" sz="2000" b="0" kern="1200" dirty="0">
+                          <a:solidFill>
+                            <a:schemeClr val="bg1"/>
+                          </a:solidFill>
+                          <a:effectLst/>
+                          <a:latin typeface="Consolas" panose="020B0609020204030204" pitchFamily="49" charset="0"/>
+                          <a:ea typeface="+mn-ea"/>
+                          <a:cs typeface="+mn-cs"/>
+                        </a:rPr>
+                        <a:t>Finding the generator 'identity'...</a:t>
+                      </a:r>
+                    </a:p>
+                    <a:p>
+                      <a:r>
+                        <a:rPr lang="en-US" sz="2000" b="0" kern="1200" dirty="0">
+                          <a:solidFill>
+                            <a:schemeClr val="bg1"/>
+                          </a:solidFill>
+                          <a:effectLst/>
+                          <a:latin typeface="Consolas" panose="020B0609020204030204" pitchFamily="49" charset="0"/>
+                          <a:ea typeface="+mn-ea"/>
+                          <a:cs typeface="+mn-cs"/>
+                        </a:rPr>
+                        <a:t>Running the generator 'identity'...</a:t>
+                      </a:r>
+                    </a:p>
+                    <a:p>
+                      <a:r>
+                        <a:rPr lang="en-US" sz="2000" b="0" kern="1200" dirty="0" err="1">
+                          <a:solidFill>
+                            <a:schemeClr val="bg1"/>
+                          </a:solidFill>
+                          <a:effectLst/>
+                          <a:latin typeface="Consolas" panose="020B0609020204030204" pitchFamily="49" charset="0"/>
+                          <a:ea typeface="+mn-ea"/>
+                          <a:cs typeface="+mn-cs"/>
+                        </a:rPr>
+                        <a:t>RunTime</a:t>
+                      </a:r>
+                      <a:r>
+                        <a:rPr lang="en-US" sz="2000" b="0" kern="1200" dirty="0">
+                          <a:solidFill>
+                            <a:schemeClr val="bg1"/>
+                          </a:solidFill>
+                          <a:effectLst/>
+                          <a:latin typeface="Consolas" panose="020B0609020204030204" pitchFamily="49" charset="0"/>
+                          <a:ea typeface="+mn-ea"/>
+                          <a:cs typeface="+mn-cs"/>
+                        </a:rPr>
+                        <a:t> 00:00:15.93</a:t>
+                      </a:r>
+                    </a:p>
+                  </a:txBody>
+                  <a:tcPr>
+                    <a:lnL w="12700" cap="flat" cmpd="sng" algn="ctr">
+                      <a:solidFill>
+                        <a:schemeClr val="tx1"/>
+                      </a:solidFill>
+                      <a:prstDash val="solid"/>
+                      <a:round/>
+                      <a:headEnd type="none" w="med" len="med"/>
+                      <a:tailEnd type="none" w="med" len="med"/>
+                    </a:lnL>
+                    <a:lnR w="12700" cap="flat" cmpd="sng" algn="ctr">
+                      <a:solidFill>
+                        <a:schemeClr val="tx1"/>
+                      </a:solidFill>
+                      <a:prstDash val="solid"/>
+                      <a:round/>
+                      <a:headEnd type="none" w="med" len="med"/>
+                      <a:tailEnd type="none" w="med" len="med"/>
+                    </a:lnR>
+                    <a:lnT w="12700" cap="flat" cmpd="sng" algn="ctr">
+                      <a:solidFill>
+                        <a:schemeClr val="tx1"/>
+                      </a:solidFill>
+                      <a:prstDash val="solid"/>
+                      <a:round/>
+                      <a:headEnd type="none" w="med" len="med"/>
+                      <a:tailEnd type="none" w="med" len="med"/>
+                    </a:lnT>
+                    <a:lnB w="12700" cap="flat" cmpd="sng" algn="ctr">
+                      <a:solidFill>
+                        <a:schemeClr val="tx1"/>
+                      </a:solidFill>
+                      <a:prstDash val="solid"/>
+                      <a:round/>
+                      <a:headEnd type="none" w="med" len="med"/>
+                      <a:tailEnd type="none" w="med" len="med"/>
+                    </a:lnB>
+                    <a:solidFill>
+                      <a:schemeClr val="tx1"/>
+                    </a:solidFill>
+                  </a:tcPr>
+                </a:tc>
+                <a:extLst>
+                  <a:ext uri="{0D108BD9-81ED-4DB2-BD59-A6C34878D82A}">
+                    <a16:rowId xmlns:a16="http://schemas.microsoft.com/office/drawing/2014/main" val="3473222697"/>
+                  </a:ext>
+                </a:extLst>
+              </a:tr>
+            </a:tbl>
+          </a:graphicData>
+        </a:graphic>
+      </p:graphicFrame>
+      <p:pic>
+        <p:nvPicPr>
+          <p:cNvPr id="9" name="Picture 8">
+            <a:extLst>
+              <a:ext uri="{FF2B5EF4-FFF2-40B4-BE49-F238E27FC236}">
+                <a16:creationId xmlns:a16="http://schemas.microsoft.com/office/drawing/2014/main" id="{B527667F-BE19-437F-9E89-8BF3F44CD592}"/>
+              </a:ext>
+            </a:extLst>
+          </p:cNvPr>
+          <p:cNvPicPr>
+            <a:picLocks noChangeAspect="1"/>
+          </p:cNvPicPr>
+          <p:nvPr/>
+        </p:nvPicPr>
+        <p:blipFill>
+          <a:blip r:embed="rId3"/>
+          <a:stretch>
+            <a:fillRect/>
+          </a:stretch>
+        </p:blipFill>
+        <p:spPr>
+          <a:xfrm>
+            <a:off x="6545173" y="846679"/>
+            <a:ext cx="4814888" cy="5330284"/>
+          </a:xfrm>
+          <a:prstGeom prst="rect">
+            <a:avLst/>
+          </a:prstGeom>
+          <a:effectLst>
+            <a:outerShdw blurRad="50800" dist="38100" dir="10800000" algn="r" rotWithShape="0">
+              <a:prstClr val="black">
+                <a:alpha val="40000"/>
+              </a:prstClr>
+            </a:outerShdw>
+          </a:effectLst>
+        </p:spPr>
+      </p:pic>
+      <p:pic>
+        <p:nvPicPr>
+          <p:cNvPr id="10" name="Content Placeholder 9">
+            <a:extLst>
+              <a:ext uri="{FF2B5EF4-FFF2-40B4-BE49-F238E27FC236}">
+                <a16:creationId xmlns:a16="http://schemas.microsoft.com/office/drawing/2014/main" id="{3738CD6D-06FD-46D8-B284-5A9DAE5288B3}"/>
+              </a:ext>
+            </a:extLst>
+          </p:cNvPr>
+          <p:cNvPicPr>
+            <a:picLocks noGrp="1" noChangeAspect="1"/>
+          </p:cNvPicPr>
+          <p:nvPr>
+            <p:ph idx="1"/>
+          </p:nvPr>
+        </p:nvPicPr>
+        <p:blipFill>
+          <a:blip r:embed="rId4"/>
+          <a:stretch>
+            <a:fillRect/>
+          </a:stretch>
+        </p:blipFill>
+        <p:spPr>
+          <a:xfrm>
+            <a:off x="7327900" y="2690949"/>
+            <a:ext cx="3749404" cy="2019166"/>
+          </a:xfrm>
+          <a:prstGeom prst="rect">
+            <a:avLst/>
+          </a:prstGeom>
+        </p:spPr>
+      </p:pic>
+      <p:cxnSp>
+        <p:nvCxnSpPr>
+          <p:cNvPr id="12" name="Straight Arrow Connector 11">
+            <a:extLst>
+              <a:ext uri="{FF2B5EF4-FFF2-40B4-BE49-F238E27FC236}">
+                <a16:creationId xmlns:a16="http://schemas.microsoft.com/office/drawing/2014/main" id="{A1EB338A-E62A-46EC-BECC-F55AF384AEB5}"/>
+              </a:ext>
+            </a:extLst>
+          </p:cNvPr>
+          <p:cNvCxnSpPr>
+            <a:cxnSpLocks/>
+            <a:endCxn id="10" idx="1"/>
+          </p:cNvCxnSpPr>
+          <p:nvPr/>
+        </p:nvCxnSpPr>
+        <p:spPr>
+          <a:xfrm>
+            <a:off x="5460274" y="2873829"/>
+            <a:ext cx="1867626" cy="826703"/>
+          </a:xfrm>
+          <a:prstGeom prst="straightConnector1">
+            <a:avLst/>
+          </a:prstGeom>
+          <a:ln w="38100">
+            <a:tailEnd type="triangle"/>
+          </a:ln>
+        </p:spPr>
+        <p:style>
+          <a:lnRef idx="3">
+            <a:schemeClr val="accent1"/>
+          </a:lnRef>
+          <a:fillRef idx="0">
+            <a:schemeClr val="accent1"/>
+          </a:fillRef>
+          <a:effectRef idx="2">
+            <a:schemeClr val="accent1"/>
+          </a:effectRef>
+          <a:fontRef idx="minor">
+            <a:schemeClr val="tx1"/>
+          </a:fontRef>
+        </p:style>
+      </p:cxnSp>
+    </p:spTree>
+    <p:extLst>
+      <p:ext uri="{BB962C8B-B14F-4D97-AF65-F5344CB8AC3E}">
+        <p14:creationId xmlns:p14="http://schemas.microsoft.com/office/powerpoint/2010/main" val="219970565"/>
+      </p:ext>
+    </p:extLst>
+  </p:cSld>
+  <p:clrMapOvr>
+    <a:masterClrMapping/>
+  </p:clrMapOvr>
+  <p:timing>
+    <p:tnLst>
+      <p:par>
+        <p:cTn id="1" dur="indefinite" restart="never" nodeType="tmRoot">
+          <p:childTnLst>
+            <p:seq concurrent="1" nextAc="seek">
+              <p:cTn id="2" dur="indefinite" nodeType="mainSeq">
+                <p:childTnLst>
+                  <p:par>
+                    <p:cTn id="3" fill="hold">
+                      <p:stCondLst>
+                        <p:cond delay="indefinite"/>
+                        <p:cond evt="onBegin" delay="0">
+                          <p:tn val="2"/>
+                        </p:cond>
+                      </p:stCondLst>
+                      <p:childTnLst>
+                        <p:par>
+                          <p:cTn id="4" fill="hold">
+                            <p:stCondLst>
+                              <p:cond delay="0"/>
+                            </p:stCondLst>
+                            <p:childTnLst>
+                              <p:par>
+                                <p:cTn id="5" presetID="10" presetClass="entr" presetSubtype="0" fill="hold" nodeType="withEffect">
+                                  <p:stCondLst>
+                                    <p:cond delay="0"/>
+                                  </p:stCondLst>
+                                  <p:childTnLst>
+                                    <p:set>
+                                      <p:cBhvr>
+                                        <p:cTn id="6" dur="1" fill="hold">
+                                          <p:stCondLst>
+                                            <p:cond delay="0"/>
+                                          </p:stCondLst>
+                                        </p:cTn>
+                                        <p:tgtEl>
+                                          <p:spTgt spid="4"/>
+                                        </p:tgtEl>
+                                        <p:attrNameLst>
+                                          <p:attrName>style.visibility</p:attrName>
+                                        </p:attrNameLst>
+                                      </p:cBhvr>
+                                      <p:to>
+                                        <p:strVal val="visible"/>
+                                      </p:to>
+                                    </p:set>
+                                    <p:animEffect transition="in" filter="fade">
+                                      <p:cBhvr>
+                                        <p:cTn id="7" dur="500"/>
+                                        <p:tgtEl>
+                                          <p:spTgt spid="4"/>
                                         </p:tgtEl>
                                       </p:cBhvr>
                                     </p:animEffect>
@@ -24179,11 +27109,7 @@
                                           </p:stCondLst>
                                         </p:cTn>
                                         <p:tgtEl>
-                                          <p:spTgt spid="3">
-                                            <p:txEl>
-                                              <p:pRg st="1" end="1"/>
-                                            </p:txEl>
-                                          </p:spTgt>
+                                          <p:spTgt spid="12"/>
                                         </p:tgtEl>
                                         <p:attrNameLst>
                                           <p:attrName>style.visibility</p:attrName>
@@ -24197,54 +27123,28 @@
                                       <p:cBhvr>
                                         <p:cTn id="12" dur="500"/>
                                         <p:tgtEl>
-                                          <p:spTgt spid="3">
-                                            <p:txEl>
-                                              <p:pRg st="1" end="1"/>
-                                            </p:txEl>
-                                          </p:spTgt>
+                                          <p:spTgt spid="12"/>
                                         </p:tgtEl>
                                       </p:cBhvr>
                                     </p:animEffect>
                                   </p:childTnLst>
                                 </p:cTn>
                               </p:par>
-                            </p:childTnLst>
-                          </p:cTn>
-                        </p:par>
-                      </p:childTnLst>
-                    </p:cTn>
-                  </p:par>
-                  <p:par>
-                    <p:cTn id="13" fill="hold">
-                      <p:stCondLst>
-                        <p:cond delay="indefinite"/>
-                      </p:stCondLst>
-                      <p:childTnLst>
-                        <p:par>
-                          <p:cTn id="14" fill="hold">
-                            <p:stCondLst>
-                              <p:cond delay="0"/>
-                            </p:stCondLst>
-                            <p:childTnLst>
                               <p:par>
-                                <p:cTn id="15" presetID="10" presetClass="entr" presetSubtype="0" fill="hold" nodeType="clickEffect">
+                                <p:cTn id="13" presetID="10" presetClass="entr" presetSubtype="0" fill="hold" nodeType="withEffect">
                                   <p:stCondLst>
                                     <p:cond delay="0"/>
                                   </p:stCondLst>
                                   <p:childTnLst>
                                     <p:set>
                                       <p:cBhvr>
-                                        <p:cTn id="16" dur="1" fill="hold">
+                                        <p:cTn id="14" dur="1" fill="hold">
                                           <p:stCondLst>
                                             <p:cond delay="0"/>
                                           </p:stCondLst>
                                         </p:cTn>
                                         <p:tgtEl>
-                                          <p:spTgt spid="3">
-                                            <p:txEl>
-                                              <p:pRg st="2" end="2"/>
-                                            </p:txEl>
-                                          </p:spTgt>
+                                          <p:spTgt spid="10"/>
                                         </p:tgtEl>
                                         <p:attrNameLst>
                                           <p:attrName>style.visibility</p:attrName>
@@ -24256,56 +27156,30 @@
                                     </p:set>
                                     <p:animEffect transition="in" filter="fade">
                                       <p:cBhvr>
-                                        <p:cTn id="17" dur="500"/>
+                                        <p:cTn id="15" dur="500"/>
                                         <p:tgtEl>
-                                          <p:spTgt spid="3">
-                                            <p:txEl>
-                                              <p:pRg st="2" end="2"/>
-                                            </p:txEl>
-                                          </p:spTgt>
+                                          <p:spTgt spid="10"/>
                                         </p:tgtEl>
                                       </p:cBhvr>
                                     </p:animEffect>
                                   </p:childTnLst>
                                 </p:cTn>
                               </p:par>
-                            </p:childTnLst>
-                          </p:cTn>
-                        </p:par>
-                      </p:childTnLst>
-                    </p:cTn>
-                  </p:par>
-                  <p:par>
-                    <p:cTn id="18" fill="hold">
-                      <p:stCondLst>
-                        <p:cond delay="indefinite"/>
-                      </p:stCondLst>
-                      <p:childTnLst>
-                        <p:par>
-                          <p:cTn id="19" fill="hold">
-                            <p:stCondLst>
-                              <p:cond delay="0"/>
-                            </p:stCondLst>
-                            <p:childTnLst>
                               <p:par>
-                                <p:cTn id="20" presetID="10" presetClass="entr" presetSubtype="0" fill="hold" nodeType="clickEffect">
+                                <p:cTn id="16" presetID="10" presetClass="entr" presetSubtype="0" fill="hold" nodeType="withEffect">
                                   <p:stCondLst>
                                     <p:cond delay="0"/>
                                   </p:stCondLst>
                                   <p:childTnLst>
                                     <p:set>
                                       <p:cBhvr>
-                                        <p:cTn id="21" dur="1" fill="hold">
+                                        <p:cTn id="17" dur="1" fill="hold">
                                           <p:stCondLst>
                                             <p:cond delay="0"/>
                                           </p:stCondLst>
                                         </p:cTn>
                                         <p:tgtEl>
-                                          <p:spTgt spid="3">
-                                            <p:txEl>
-                                              <p:pRg st="3" end="3"/>
-                                            </p:txEl>
-                                          </p:spTgt>
+                                          <p:spTgt spid="9"/>
                                         </p:tgtEl>
                                         <p:attrNameLst>
                                           <p:attrName>style.visibility</p:attrName>
@@ -24317,13 +27191,9 @@
                                     </p:set>
                                     <p:animEffect transition="in" filter="fade">
                                       <p:cBhvr>
-                                        <p:cTn id="22" dur="500"/>
+                                        <p:cTn id="18" dur="500"/>
                                         <p:tgtEl>
-                                          <p:spTgt spid="3">
-                                            <p:txEl>
-                                              <p:pRg st="3" end="3"/>
-                                            </p:txEl>
-                                          </p:spTgt>
+                                          <p:spTgt spid="9"/>
                                         </p:tgtEl>
                                       </p:cBhvr>
                                     </p:animEffect>

</xml_diff>

<commit_message>
Add screenshot to VS Code demo slide
</commit_message>
<xml_diff>
--- a/Tour de .NET Core CLI.pptx
+++ b/Tour de .NET Core CLI.pptx
@@ -26219,6 +26219,36 @@
           <a:chExt cx="0" cy="0"/>
         </a:xfrm>
       </p:grpSpPr>
+      <p:pic>
+        <p:nvPicPr>
+          <p:cNvPr id="3" name="Picture 2">
+            <a:extLst>
+              <a:ext uri="{FF2B5EF4-FFF2-40B4-BE49-F238E27FC236}">
+                <a16:creationId xmlns:a16="http://schemas.microsoft.com/office/drawing/2014/main" id="{5270840F-C26C-442D-89C2-544503FCA346}"/>
+              </a:ext>
+            </a:extLst>
+          </p:cNvPr>
+          <p:cNvPicPr>
+            <a:picLocks noChangeAspect="1"/>
+          </p:cNvPicPr>
+          <p:nvPr/>
+        </p:nvPicPr>
+        <p:blipFill>
+          <a:blip r:embed="rId3"/>
+          <a:stretch>
+            <a:fillRect/>
+          </a:stretch>
+        </p:blipFill>
+        <p:spPr>
+          <a:xfrm>
+            <a:off x="3090055" y="-1"/>
+            <a:ext cx="9101945" cy="6858000"/>
+          </a:xfrm>
+          <a:prstGeom prst="rect">
+            <a:avLst/>
+          </a:prstGeom>
+        </p:spPr>
+      </p:pic>
       <p:sp>
         <p:nvSpPr>
           <p:cNvPr id="22" name="Freeform: Shape 21">
@@ -26526,7 +26556,7 @@
           <p:nvPr/>
         </p:nvPicPr>
         <p:blipFill>
-          <a:blip r:embed="rId3">
+          <a:blip r:embed="rId4">
             <a:extLst>
               <a:ext uri="{28A0092B-C50C-407E-A947-70E740481C1C}">
                 <a14:useLocalDpi xmlns:a14="http://schemas.microsoft.com/office/drawing/2010/main" val="0"/>

</xml_diff>

<commit_message>
Add gist links to last slide
</commit_message>
<xml_diff>
--- a/Tour de .NET Core CLI.pptx
+++ b/Tour de .NET Core CLI.pptx
@@ -22372,12 +22372,12 @@
         <p:spPr>
           <a:xfrm>
             <a:off x="838200" y="1825624"/>
-            <a:ext cx="10515600" cy="4667251"/>
+            <a:ext cx="10896600" cy="4667251"/>
           </a:xfrm>
         </p:spPr>
         <p:txBody>
           <a:bodyPr>
-            <a:normAutofit fontScale="85000" lnSpcReduction="20000"/>
+            <a:normAutofit lnSpcReduction="10000"/>
           </a:bodyPr>
           <a:lstStyle/>
           <a:p>
@@ -22385,9 +22385,18 @@
               <a:buNone/>
             </a:pPr>
             <a:r>
+              <a:rPr lang="en-US" dirty="0">
+                <a:solidFill>
+                  <a:srgbClr val="A0C4E5"/>
+                </a:solidFill>
+              </a:rPr>
+              <a:t>Slides:</a:t>
+            </a:r>
+            <a:r>
               <a:rPr lang="en-US" b="1" dirty="0"/>
-              <a:t>aka.ms/N44not</a:t>
+              <a:t> aka.ms/N44not</a:t>
             </a:r>
+            <a:endParaRPr lang="en-US" dirty="0"/>
           </a:p>
           <a:p>
             <a:pPr marL="0" indent="0">
@@ -22399,43 +22408,70 @@
             <a:pPr marL="0" indent="0">
               <a:buNone/>
             </a:pPr>
-            <a:endParaRPr lang="en-US" dirty="0"/>
-          </a:p>
-          <a:p>
-            <a:pPr marL="0" indent="0">
+            <a:r>
+              <a:rPr lang="en-US" dirty="0" err="1">
+                <a:solidFill>
+                  <a:srgbClr val="A0C4E5"/>
+                </a:solidFill>
+              </a:rPr>
+              <a:t>Gists</a:t>
+            </a:r>
+            <a:r>
+              <a:rPr lang="en-US" dirty="0">
+                <a:solidFill>
+                  <a:srgbClr val="A0C4E5"/>
+                </a:solidFill>
+              </a:rPr>
+              <a:t>:</a:t>
+            </a:r>
+          </a:p>
+          <a:p>
+            <a:r>
+              <a:rPr lang="en-US" dirty="0">
+                <a:solidFill>
+                  <a:srgbClr val="A0C4E5"/>
+                </a:solidFill>
+              </a:rPr>
+              <a:t>Commands:</a:t>
+            </a:r>
+          </a:p>
+          <a:p>
+            <a:pPr marL="457200" lvl="1" indent="0">
               <a:buNone/>
             </a:pPr>
-            <a:endParaRPr lang="en-US" dirty="0"/>
-          </a:p>
-          <a:p>
-            <a:pPr marL="0" indent="0">
+            <a:r>
+              <a:rPr lang="en-US" b="1" dirty="0"/>
+              <a:t>aka.ms/</a:t>
+            </a:r>
+            <a:r>
+              <a:rPr lang="en-US" b="1" dirty="0" err="1"/>
+              <a:t>Mbozcr</a:t>
+            </a:r>
+            <a:endParaRPr lang="en-US" b="1" dirty="0"/>
+          </a:p>
+          <a:p>
+            <a:r>
+              <a:rPr lang="en-US" dirty="0">
+                <a:solidFill>
+                  <a:srgbClr val="A0C4E5"/>
+                </a:solidFill>
+              </a:rPr>
+              <a:t>Templates:</a:t>
+            </a:r>
+          </a:p>
+          <a:p>
+            <a:pPr marL="457200" lvl="1" indent="0">
               <a:buNone/>
             </a:pPr>
-            <a:endParaRPr lang="en-US" dirty="0"/>
-          </a:p>
-          <a:p>
-            <a:pPr marL="0" indent="0">
-              <a:buNone/>
-            </a:pPr>
-            <a:endParaRPr lang="en-US" dirty="0"/>
-          </a:p>
-          <a:p>
-            <a:pPr marL="0" indent="0">
-              <a:buNone/>
-            </a:pPr>
-            <a:endParaRPr lang="en-US" dirty="0"/>
-          </a:p>
-          <a:p>
-            <a:pPr marL="0" indent="0">
-              <a:buNone/>
-            </a:pPr>
-            <a:endParaRPr lang="en-US" dirty="0"/>
-          </a:p>
-          <a:p>
-            <a:pPr marL="0" indent="0">
-              <a:buNone/>
-            </a:pPr>
-            <a:endParaRPr lang="en-US" dirty="0"/>
+            <a:r>
+              <a:rPr lang="en-US" b="1" dirty="0"/>
+              <a:t>aka.ms/</a:t>
+            </a:r>
+            <a:r>
+              <a:rPr lang="en-US" b="1" dirty="0" err="1"/>
+              <a:t>Bhaecq</a:t>
+            </a:r>
+            <a:endParaRPr lang="en-US" b="1" dirty="0"/>
           </a:p>
           <a:p>
             <a:pPr marL="0" indent="0">
@@ -22484,7 +22520,7 @@
         </p:spPr>
         <p:txBody>
           <a:bodyPr>
-            <a:normAutofit fontScale="85000" lnSpcReduction="20000"/>
+            <a:normAutofit lnSpcReduction="10000"/>
           </a:bodyPr>
           <a:lstStyle/>
           <a:p>
@@ -22507,42 +22543,6 @@
           </a:p>
         </p:txBody>
       </p:sp>
-      <p:pic>
-        <p:nvPicPr>
-          <p:cNvPr id="9" name="Picture 8" descr="A picture containing indoor, object&#10;&#10;Description generated with high confidence">
-            <a:extLst>
-              <a:ext uri="{FF2B5EF4-FFF2-40B4-BE49-F238E27FC236}">
-                <a16:creationId xmlns:a16="http://schemas.microsoft.com/office/drawing/2014/main" id="{CD03B99F-532A-4D3B-BCE0-AD181E37FCEC}"/>
-              </a:ext>
-            </a:extLst>
-          </p:cNvPr>
-          <p:cNvPicPr>
-            <a:picLocks noChangeAspect="1"/>
-          </p:cNvPicPr>
-          <p:nvPr/>
-        </p:nvPicPr>
-        <p:blipFill>
-          <a:blip r:embed="rId4">
-            <a:extLst>
-              <a:ext uri="{28A0092B-C50C-407E-A947-70E740481C1C}">
-                <a14:useLocalDpi xmlns:a14="http://schemas.microsoft.com/office/drawing/2010/main" val="0"/>
-              </a:ext>
-            </a:extLst>
-          </a:blip>
-          <a:stretch>
-            <a:fillRect/>
-          </a:stretch>
-        </p:blipFill>
-        <p:spPr>
-          <a:xfrm>
-            <a:off x="937260" y="2308021"/>
-            <a:ext cx="3386546" cy="3386546"/>
-          </a:xfrm>
-          <a:prstGeom prst="rect">
-            <a:avLst/>
-          </a:prstGeom>
-        </p:spPr>
-      </p:pic>
       <p:sp>
         <p:nvSpPr>
           <p:cNvPr id="3" name="TextBox 2">
@@ -22598,7 +22598,7 @@
           <p:nvPr/>
         </p:nvPicPr>
         <p:blipFill>
-          <a:blip r:embed="rId5" cstate="print">
+          <a:blip r:embed="rId4" cstate="print">
             <a:extLst>
               <a:ext uri="{28A0092B-C50C-407E-A947-70E740481C1C}">
                 <a14:useLocalDpi xmlns:a14="http://schemas.microsoft.com/office/drawing/2010/main" val="0"/>
@@ -22617,6 +22617,102 @@
           <a:prstGeom prst="rect">
             <a:avLst/>
           </a:prstGeom>
+        </p:spPr>
+      </p:pic>
+      <p:pic>
+        <p:nvPicPr>
+          <p:cNvPr id="10" name="Picture 2" descr="http://www.freeiconspng.com/uploads/github-logo-icon-30.png">
+            <a:extLst>
+              <a:ext uri="{FF2B5EF4-FFF2-40B4-BE49-F238E27FC236}">
+                <a16:creationId xmlns:a16="http://schemas.microsoft.com/office/drawing/2014/main" id="{DCC58F26-AEDB-4E25-B910-6CB9522A56BD}"/>
+              </a:ext>
+            </a:extLst>
+          </p:cNvPr>
+          <p:cNvPicPr>
+            <a:picLocks noChangeAspect="1" noChangeArrowheads="1"/>
+          </p:cNvPicPr>
+          <p:nvPr/>
+        </p:nvPicPr>
+        <p:blipFill>
+          <a:blip r:embed="rId5">
+            <a:lum bright="70000" contrast="-70000"/>
+            <a:extLst>
+              <a:ext uri="{28A0092B-C50C-407E-A947-70E740481C1C}">
+                <a14:useLocalDpi xmlns:a14="http://schemas.microsoft.com/office/drawing/2010/main" val="0"/>
+              </a:ext>
+            </a:extLst>
+          </a:blip>
+          <a:srcRect/>
+          <a:stretch>
+            <a:fillRect/>
+          </a:stretch>
+        </p:blipFill>
+        <p:spPr bwMode="auto">
+          <a:xfrm>
+            <a:off x="1716437" y="2373608"/>
+            <a:ext cx="913109" cy="913109"/>
+          </a:xfrm>
+          <a:prstGeom prst="rect">
+            <a:avLst/>
+          </a:prstGeom>
+          <a:noFill/>
+          <a:extLst>
+            <a:ext uri="{909E8E84-426E-40DD-AFC4-6F175D3DCCD1}">
+              <a14:hiddenFill xmlns:a14="http://schemas.microsoft.com/office/drawing/2010/main">
+                <a:solidFill>
+                  <a:srgbClr val="FFFFFF"/>
+                </a:solidFill>
+              </a14:hiddenFill>
+            </a:ext>
+          </a:extLst>
+        </p:spPr>
+      </p:pic>
+      <p:pic>
+        <p:nvPicPr>
+          <p:cNvPr id="11" name="Picture 2" descr="http://www.freeiconspng.com/uploads/github-logo-icon-30.png">
+            <a:extLst>
+              <a:ext uri="{FF2B5EF4-FFF2-40B4-BE49-F238E27FC236}">
+                <a16:creationId xmlns:a16="http://schemas.microsoft.com/office/drawing/2014/main" id="{A8AAC434-52BC-40A4-A875-D6D8D13E4F93}"/>
+              </a:ext>
+            </a:extLst>
+          </p:cNvPr>
+          <p:cNvPicPr>
+            <a:picLocks noChangeAspect="1" noChangeArrowheads="1"/>
+          </p:cNvPicPr>
+          <p:nvPr/>
+        </p:nvPicPr>
+        <p:blipFill>
+          <a:blip r:embed="rId5">
+            <a:lum bright="70000" contrast="-70000"/>
+            <a:extLst>
+              <a:ext uri="{28A0092B-C50C-407E-A947-70E740481C1C}">
+                <a14:useLocalDpi xmlns:a14="http://schemas.microsoft.com/office/drawing/2010/main" val="0"/>
+              </a:ext>
+            </a:extLst>
+          </a:blip>
+          <a:srcRect/>
+          <a:stretch>
+            <a:fillRect/>
+          </a:stretch>
+        </p:blipFill>
+        <p:spPr bwMode="auto">
+          <a:xfrm>
+            <a:off x="4224828" y="1460499"/>
+            <a:ext cx="913109" cy="913109"/>
+          </a:xfrm>
+          <a:prstGeom prst="rect">
+            <a:avLst/>
+          </a:prstGeom>
+          <a:noFill/>
+          <a:extLst>
+            <a:ext uri="{909E8E84-426E-40DD-AFC4-6F175D3DCCD1}">
+              <a14:hiddenFill xmlns:a14="http://schemas.microsoft.com/office/drawing/2010/main">
+                <a:solidFill>
+                  <a:srgbClr val="FFFFFF"/>
+                </a:solidFill>
+              </a14:hiddenFill>
+            </a:ext>
+          </a:extLst>
         </p:spPr>
       </p:pic>
     </p:spTree>

</xml_diff>